<commit_message>
Updated final ppt and added abstract
</commit_message>
<xml_diff>
--- a/Documentation/Final_Presentation.pptx
+++ b/Documentation/Final_Presentation.pptx
@@ -5,19 +5,22 @@
     <p:sldMasterId id="2147483672" r:id="rId1"/>
   </p:sldMasterIdLst>
   <p:notesMasterIdLst>
-    <p:notesMasterId r:id="rId12"/>
+    <p:notesMasterId r:id="rId15"/>
   </p:notesMasterIdLst>
   <p:sldIdLst>
     <p:sldId id="256" r:id="rId2"/>
     <p:sldId id="265" r:id="rId3"/>
-    <p:sldId id="257" r:id="rId4"/>
-    <p:sldId id="258" r:id="rId5"/>
-    <p:sldId id="259" r:id="rId6"/>
-    <p:sldId id="260" r:id="rId7"/>
+    <p:sldId id="266" r:id="rId4"/>
+    <p:sldId id="257" r:id="rId5"/>
+    <p:sldId id="258" r:id="rId6"/>
+    <p:sldId id="259" r:id="rId7"/>
     <p:sldId id="261" r:id="rId8"/>
-    <p:sldId id="262" r:id="rId9"/>
-    <p:sldId id="263" r:id="rId10"/>
-    <p:sldId id="264" r:id="rId11"/>
+    <p:sldId id="269" r:id="rId9"/>
+    <p:sldId id="260" r:id="rId10"/>
+    <p:sldId id="267" r:id="rId11"/>
+    <p:sldId id="268" r:id="rId12"/>
+    <p:sldId id="263" r:id="rId13"/>
+    <p:sldId id="264" r:id="rId14"/>
   </p:sldIdLst>
   <p:sldSz cx="9144000" cy="6858000" type="screen4x3"/>
   <p:notesSz cx="7010400" cy="9296400"/>
@@ -201,7 +204,7 @@
           <a:p>
             <a:fld id="{F8A13CF6-5412-437F-BBE9-70CB654C0E12}" type="datetimeFigureOut">
               <a:rPr lang="en-US" smtClean="0"/>
-              <a:t>5/2/2012</a:t>
+              <a:t>5/7/2012</a:t>
             </a:fld>
             <a:endParaRPr lang="en-US"/>
           </a:p>
@@ -553,6 +556,286 @@
 </p:notes>
 </file>
 
+<file path=ppt/notesSlides/notesSlide10.xml><?xml version="1.0" encoding="utf-8"?>
+<p:notes xmlns:a="http://schemas.openxmlformats.org/drawingml/2006/main" xmlns:r="http://schemas.openxmlformats.org/officeDocument/2006/relationships" xmlns:p="http://schemas.openxmlformats.org/presentationml/2006/main">
+  <p:cSld>
+    <p:spTree>
+      <p:nvGrpSpPr>
+        <p:cNvPr id="1" name=""/>
+        <p:cNvGrpSpPr/>
+        <p:nvPr/>
+      </p:nvGrpSpPr>
+      <p:grpSpPr>
+        <a:xfrm>
+          <a:off x="0" y="0"/>
+          <a:ext cx="0" cy="0"/>
+          <a:chOff x="0" y="0"/>
+          <a:chExt cx="0" cy="0"/>
+        </a:xfrm>
+      </p:grpSpPr>
+      <p:sp>
+        <p:nvSpPr>
+          <p:cNvPr id="2" name="Slide Image Placeholder 1"/>
+          <p:cNvSpPr>
+            <a:spLocks noGrp="1" noRot="1" noChangeAspect="1"/>
+          </p:cNvSpPr>
+          <p:nvPr>
+            <p:ph type="sldImg"/>
+          </p:nvPr>
+        </p:nvSpPr>
+        <p:spPr/>
+      </p:sp>
+      <p:sp>
+        <p:nvSpPr>
+          <p:cNvPr id="3" name="Notes Placeholder 2"/>
+          <p:cNvSpPr>
+            <a:spLocks noGrp="1"/>
+          </p:cNvSpPr>
+          <p:nvPr>
+            <p:ph type="body" idx="1"/>
+          </p:nvPr>
+        </p:nvSpPr>
+        <p:spPr/>
+        <p:txBody>
+          <a:bodyPr/>
+          <a:lstStyle/>
+          <a:p>
+            <a:r>
+              <a:rPr lang="en-US" dirty="0" smtClean="0"/>
+              <a:t>***********May need a re-write on the caption </a:t>
+            </a:r>
+            <a:endParaRPr lang="en-US" dirty="0"/>
+          </a:p>
+        </p:txBody>
+      </p:sp>
+      <p:sp>
+        <p:nvSpPr>
+          <p:cNvPr id="4" name="Slide Number Placeholder 3"/>
+          <p:cNvSpPr>
+            <a:spLocks noGrp="1"/>
+          </p:cNvSpPr>
+          <p:nvPr>
+            <p:ph type="sldNum" sz="quarter" idx="10"/>
+          </p:nvPr>
+        </p:nvSpPr>
+        <p:spPr/>
+        <p:txBody>
+          <a:bodyPr/>
+          <a:lstStyle/>
+          <a:p>
+            <a:fld id="{6538AC3F-63CE-4DD6-92CD-9B13526C2825}" type="slidenum">
+              <a:rPr lang="en-US" smtClean="0"/>
+              <a:t>11</a:t>
+            </a:fld>
+            <a:endParaRPr lang="en-US"/>
+          </a:p>
+        </p:txBody>
+      </p:sp>
+    </p:spTree>
+    <p:extLst>
+      <p:ext uri="{BB962C8B-B14F-4D97-AF65-F5344CB8AC3E}">
+        <p14:creationId xmlns:p14="http://schemas.microsoft.com/office/powerpoint/2010/main" val="717272626"/>
+      </p:ext>
+    </p:extLst>
+  </p:cSld>
+  <p:clrMapOvr>
+    <a:masterClrMapping/>
+  </p:clrMapOvr>
+</p:notes>
+</file>
+
+<file path=ppt/notesSlides/notesSlide11.xml><?xml version="1.0" encoding="utf-8"?>
+<p:notes xmlns:a="http://schemas.openxmlformats.org/drawingml/2006/main" xmlns:r="http://schemas.openxmlformats.org/officeDocument/2006/relationships" xmlns:p="http://schemas.openxmlformats.org/presentationml/2006/main">
+  <p:cSld>
+    <p:spTree>
+      <p:nvGrpSpPr>
+        <p:cNvPr id="1" name=""/>
+        <p:cNvGrpSpPr/>
+        <p:nvPr/>
+      </p:nvGrpSpPr>
+      <p:grpSpPr>
+        <a:xfrm>
+          <a:off x="0" y="0"/>
+          <a:ext cx="0" cy="0"/>
+          <a:chOff x="0" y="0"/>
+          <a:chExt cx="0" cy="0"/>
+        </a:xfrm>
+      </p:grpSpPr>
+      <p:sp>
+        <p:nvSpPr>
+          <p:cNvPr id="2" name="Slide Image Placeholder 1"/>
+          <p:cNvSpPr>
+            <a:spLocks noGrp="1" noRot="1" noChangeAspect="1"/>
+          </p:cNvSpPr>
+          <p:nvPr>
+            <p:ph type="sldImg"/>
+          </p:nvPr>
+        </p:nvSpPr>
+        <p:spPr/>
+      </p:sp>
+      <p:sp>
+        <p:nvSpPr>
+          <p:cNvPr id="3" name="Notes Placeholder 2"/>
+          <p:cNvSpPr>
+            <a:spLocks noGrp="1"/>
+          </p:cNvSpPr>
+          <p:nvPr>
+            <p:ph type="body" idx="1"/>
+          </p:nvPr>
+        </p:nvSpPr>
+        <p:spPr/>
+        <p:txBody>
+          <a:bodyPr/>
+          <a:lstStyle/>
+          <a:p>
+            <a:endParaRPr lang="en-US" dirty="0"/>
+          </a:p>
+        </p:txBody>
+      </p:sp>
+      <p:sp>
+        <p:nvSpPr>
+          <p:cNvPr id="4" name="Slide Number Placeholder 3"/>
+          <p:cNvSpPr>
+            <a:spLocks noGrp="1"/>
+          </p:cNvSpPr>
+          <p:nvPr>
+            <p:ph type="sldNum" sz="quarter" idx="10"/>
+          </p:nvPr>
+        </p:nvSpPr>
+        <p:spPr/>
+        <p:txBody>
+          <a:bodyPr/>
+          <a:lstStyle/>
+          <a:p>
+            <a:fld id="{6538AC3F-63CE-4DD6-92CD-9B13526C2825}" type="slidenum">
+              <a:rPr lang="en-US" smtClean="0"/>
+              <a:t>12</a:t>
+            </a:fld>
+            <a:endParaRPr lang="en-US"/>
+          </a:p>
+        </p:txBody>
+      </p:sp>
+    </p:spTree>
+    <p:extLst>
+      <p:ext uri="{BB962C8B-B14F-4D97-AF65-F5344CB8AC3E}">
+        <p14:creationId xmlns:p14="http://schemas.microsoft.com/office/powerpoint/2010/main" val="2185386872"/>
+      </p:ext>
+    </p:extLst>
+  </p:cSld>
+  <p:clrMapOvr>
+    <a:masterClrMapping/>
+  </p:clrMapOvr>
+</p:notes>
+</file>
+
+<file path=ppt/notesSlides/notesSlide12.xml><?xml version="1.0" encoding="utf-8"?>
+<p:notes xmlns:a="http://schemas.openxmlformats.org/drawingml/2006/main" xmlns:r="http://schemas.openxmlformats.org/officeDocument/2006/relationships" xmlns:p="http://schemas.openxmlformats.org/presentationml/2006/main">
+  <p:cSld>
+    <p:spTree>
+      <p:nvGrpSpPr>
+        <p:cNvPr id="1" name=""/>
+        <p:cNvGrpSpPr/>
+        <p:nvPr/>
+      </p:nvGrpSpPr>
+      <p:grpSpPr>
+        <a:xfrm>
+          <a:off x="0" y="0"/>
+          <a:ext cx="0" cy="0"/>
+          <a:chOff x="0" y="0"/>
+          <a:chExt cx="0" cy="0"/>
+        </a:xfrm>
+      </p:grpSpPr>
+      <p:sp>
+        <p:nvSpPr>
+          <p:cNvPr id="2" name="Slide Image Placeholder 1"/>
+          <p:cNvSpPr>
+            <a:spLocks noGrp="1" noRot="1" noChangeAspect="1"/>
+          </p:cNvSpPr>
+          <p:nvPr>
+            <p:ph type="sldImg"/>
+          </p:nvPr>
+        </p:nvSpPr>
+        <p:spPr/>
+      </p:sp>
+      <p:sp>
+        <p:nvSpPr>
+          <p:cNvPr id="3" name="Notes Placeholder 2"/>
+          <p:cNvSpPr>
+            <a:spLocks noGrp="1"/>
+          </p:cNvSpPr>
+          <p:nvPr>
+            <p:ph type="body" idx="1"/>
+          </p:nvPr>
+        </p:nvSpPr>
+        <p:spPr/>
+        <p:txBody>
+          <a:bodyPr/>
+          <a:lstStyle/>
+          <a:p>
+            <a:pPr defTabSz="931774">
+              <a:defRPr/>
+            </a:pPr>
+            <a:r>
+              <a:rPr lang="en-US" dirty="0" smtClean="0"/>
+              <a:t>References:</a:t>
+            </a:r>
+            <a:endParaRPr lang="en-US" dirty="0">
+              <a:hlinkClick r:id="rId3"/>
+            </a:endParaRPr>
+          </a:p>
+          <a:p>
+            <a:pPr defTabSz="931774">
+              <a:defRPr/>
+            </a:pPr>
+            <a:r>
+              <a:rPr lang="en-US" dirty="0">
+                <a:hlinkClick r:id="rId3"/>
+              </a:rPr>
+              <a:t>http://en.wikipedia.org/wiki/List_of_open-source_healthcare_software#Electronic_health_or_medical_record</a:t>
+            </a:r>
+            <a:endParaRPr lang="en-US" dirty="0"/>
+          </a:p>
+          <a:p>
+            <a:endParaRPr lang="en-US" dirty="0"/>
+          </a:p>
+        </p:txBody>
+      </p:sp>
+      <p:sp>
+        <p:nvSpPr>
+          <p:cNvPr id="4" name="Slide Number Placeholder 3"/>
+          <p:cNvSpPr>
+            <a:spLocks noGrp="1"/>
+          </p:cNvSpPr>
+          <p:nvPr>
+            <p:ph type="sldNum" sz="quarter" idx="10"/>
+          </p:nvPr>
+        </p:nvSpPr>
+        <p:spPr/>
+        <p:txBody>
+          <a:bodyPr/>
+          <a:lstStyle/>
+          <a:p>
+            <a:fld id="{6538AC3F-63CE-4DD6-92CD-9B13526C2825}" type="slidenum">
+              <a:rPr lang="en-US" smtClean="0"/>
+              <a:t>13</a:t>
+            </a:fld>
+            <a:endParaRPr lang="en-US"/>
+          </a:p>
+        </p:txBody>
+      </p:sp>
+    </p:spTree>
+    <p:extLst>
+      <p:ext uri="{BB962C8B-B14F-4D97-AF65-F5344CB8AC3E}">
+        <p14:creationId xmlns:p14="http://schemas.microsoft.com/office/powerpoint/2010/main" val="15417223"/>
+      </p:ext>
+    </p:extLst>
+  </p:cSld>
+  <p:clrMapOvr>
+    <a:masterClrMapping/>
+  </p:clrMapOvr>
+</p:notes>
+</file>
+
 <file path=ppt/notesSlides/notesSlide2.xml><?xml version="1.0" encoding="utf-8"?>
 <p:notes xmlns:a="http://schemas.openxmlformats.org/drawingml/2006/main" xmlns:r="http://schemas.openxmlformats.org/officeDocument/2006/relationships" xmlns:p="http://schemas.openxmlformats.org/presentationml/2006/main">
   <p:cSld>
@@ -597,127 +880,6 @@
           <a:bodyPr/>
           <a:lstStyle/>
           <a:p>
-            <a:pPr defTabSz="931774">
-              <a:defRPr/>
-            </a:pPr>
-            <a:r>
-              <a:rPr lang="en-US" b="1" dirty="0" smtClean="0"/>
-              <a:t>Why -</a:t>
-            </a:r>
-            <a:r>
-              <a:rPr lang="en-US" dirty="0" smtClean="0"/>
-              <a:t> </a:t>
-            </a:r>
-          </a:p>
-          <a:p>
-            <a:pPr defTabSz="931774">
-              <a:defRPr/>
-            </a:pPr>
-            <a:r>
-              <a:rPr lang="en-US" dirty="0" smtClean="0"/>
-              <a:t>This project is for Mitchells</a:t>
-            </a:r>
-            <a:r>
-              <a:rPr lang="en-US" baseline="0" dirty="0" smtClean="0"/>
-              <a:t> Plain Community H</a:t>
-            </a:r>
-            <a:r>
-              <a:rPr lang="en-US" dirty="0" smtClean="0"/>
-              <a:t>ealthcare</a:t>
-            </a:r>
-            <a:r>
-              <a:rPr lang="en-US" baseline="0" dirty="0" smtClean="0"/>
-              <a:t> </a:t>
-            </a:r>
-            <a:r>
-              <a:rPr lang="en-US" dirty="0" smtClean="0"/>
-              <a:t>Center in Cape</a:t>
-            </a:r>
-            <a:r>
-              <a:rPr lang="en-US" baseline="0" dirty="0" smtClean="0"/>
-              <a:t> Town, South </a:t>
-            </a:r>
-            <a:r>
-              <a:rPr lang="en-US" dirty="0" smtClean="0"/>
-              <a:t>Africa that treats patients for HIV/AIDS. All</a:t>
-            </a:r>
-            <a:r>
-              <a:rPr lang="en-US" baseline="0" dirty="0" smtClean="0"/>
-              <a:t> patients records are currently hard copy only, and patients’ records get displaced and damaged. </a:t>
-            </a:r>
-            <a:r>
-              <a:rPr lang="en-US" dirty="0" smtClean="0"/>
-              <a:t>Ultimately, a “hassle</a:t>
-            </a:r>
-            <a:r>
-              <a:rPr lang="en-US" baseline="0" dirty="0" smtClean="0"/>
-              <a:t> free treatment process”</a:t>
-            </a:r>
-          </a:p>
-          <a:p>
-            <a:endParaRPr lang="en-US" b="1" dirty="0" smtClean="0"/>
-          </a:p>
-          <a:p>
-            <a:r>
-              <a:rPr lang="en-US" b="1" dirty="0" smtClean="0"/>
-              <a:t>What - </a:t>
-            </a:r>
-          </a:p>
-          <a:p>
-            <a:r>
-              <a:rPr lang="en-US" dirty="0" smtClean="0"/>
-              <a:t>Solve the problem of</a:t>
-            </a:r>
-            <a:r>
-              <a:rPr lang="en-US" baseline="0" dirty="0" smtClean="0"/>
-              <a:t> displacement and damage to patients’ files</a:t>
-            </a:r>
-          </a:p>
-          <a:p>
-            <a:r>
-              <a:rPr lang="en-US" baseline="0" dirty="0" smtClean="0"/>
-              <a:t> - Eliminate identity theft</a:t>
-            </a:r>
-          </a:p>
-          <a:p>
-            <a:r>
-              <a:rPr lang="en-US" baseline="0" dirty="0" smtClean="0"/>
-              <a:t> - Ensure patient stays on the right regiment</a:t>
-            </a:r>
-            <a:endParaRPr lang="en-US" dirty="0" smtClean="0"/>
-          </a:p>
-          <a:p>
-            <a:endParaRPr lang="en-US" b="1" dirty="0" smtClean="0"/>
-          </a:p>
-          <a:p>
-            <a:r>
-              <a:rPr lang="en-US" b="1" dirty="0" smtClean="0"/>
-              <a:t>How -</a:t>
-            </a:r>
-            <a:r>
-              <a:rPr lang="en-US" dirty="0" smtClean="0"/>
-              <a:t> </a:t>
-            </a:r>
-          </a:p>
-          <a:p>
-            <a:r>
-              <a:rPr lang="en-US" dirty="0" smtClean="0"/>
-              <a:t>A software system that backs up patients’ files securely so that they can be readily available when needed </a:t>
-            </a:r>
-          </a:p>
-          <a:p>
-            <a:r>
-              <a:rPr lang="en-US" baseline="0" dirty="0" smtClean="0"/>
-              <a:t> - I</a:t>
-            </a:r>
-            <a:r>
-              <a:rPr lang="en-US" dirty="0" smtClean="0"/>
-              <a:t>dentity</a:t>
-            </a:r>
-            <a:r>
-              <a:rPr lang="en-US" baseline="0" dirty="0" smtClean="0"/>
-              <a:t> theft eliminated by integrating a photo into the system for each patient so that they can be identified through facial recognition and name, eliminating the need for a patient ID card, making the overall process smoother and easier for patients’</a:t>
-            </a:r>
             <a:endParaRPr lang="en-US" dirty="0"/>
           </a:p>
         </p:txBody>
@@ -739,7 +901,7 @@
           <a:p>
             <a:fld id="{6538AC3F-63CE-4DD6-92CD-9B13526C2825}" type="slidenum">
               <a:rPr lang="en-US" smtClean="0"/>
-              <a:t>3</a:t>
+              <a:t>2</a:t>
             </a:fld>
             <a:endParaRPr lang="en-US"/>
           </a:p>
@@ -748,7 +910,7 @@
     </p:spTree>
     <p:extLst>
       <p:ext uri="{BB962C8B-B14F-4D97-AF65-F5344CB8AC3E}">
-        <p14:creationId xmlns:p14="http://schemas.microsoft.com/office/powerpoint/2010/main" val="4121720833"/>
+        <p14:creationId xmlns:p14="http://schemas.microsoft.com/office/powerpoint/2010/main" val="93275497"/>
       </p:ext>
     </p:extLst>
   </p:cSld>
@@ -803,55 +965,21 @@
           <a:lstStyle/>
           <a:p>
             <a:r>
-              <a:rPr lang="en-US" dirty="0"/>
-              <a:t>It is important to weigh patient confidentiality against a public responsibility to support national priorities.</a:t>
-            </a:r>
-          </a:p>
-          <a:p>
+              <a:rPr lang="en-US" dirty="0" smtClean="0"/>
+              <a:t>-MCHC is one of the few public health clinics</a:t>
+            </a:r>
+            <a:r>
+              <a:rPr lang="en-US" baseline="0" dirty="0" smtClean="0"/>
+              <a:t> in South Africa, </a:t>
+            </a:r>
+          </a:p>
+          <a:p>
+            <a:r>
+              <a:rPr lang="en-US" baseline="0" dirty="0" smtClean="0"/>
+              <a:t>-Only 2 physicians</a:t>
+            </a:r>
             <a:endParaRPr lang="en-US" dirty="0"/>
           </a:p>
-          <a:p>
-            <a:r>
-              <a:rPr lang="en-US" dirty="0"/>
-              <a:t>Pros:</a:t>
-            </a:r>
-          </a:p>
-          <a:p>
-            <a:r>
-              <a:rPr lang="en-US" dirty="0"/>
-              <a:t> - Hospitals/Clinics more efficient</a:t>
-            </a:r>
-          </a:p>
-          <a:p>
-            <a:r>
-              <a:rPr lang="en-US" dirty="0"/>
-              <a:t> - Reduce medical errors</a:t>
-            </a:r>
-          </a:p>
-          <a:p>
-            <a:r>
-              <a:rPr lang="en-US" dirty="0"/>
-              <a:t> - Lower healthcare costs</a:t>
-            </a:r>
-          </a:p>
-          <a:p>
-            <a:endParaRPr lang="en-US" dirty="0"/>
-          </a:p>
-          <a:p>
-            <a:endParaRPr lang="en-US" dirty="0"/>
-          </a:p>
-          <a:p>
-            <a:endParaRPr lang="en-US" dirty="0"/>
-          </a:p>
-          <a:p>
-            <a:endParaRPr lang="en-US" dirty="0"/>
-          </a:p>
-          <a:p>
-            <a:endParaRPr lang="en-US" dirty="0"/>
-          </a:p>
-          <a:p>
-            <a:endParaRPr lang="en-US" dirty="0"/>
-          </a:p>
         </p:txBody>
       </p:sp>
       <p:sp>
@@ -871,7 +999,7 @@
           <a:p>
             <a:fld id="{6538AC3F-63CE-4DD6-92CD-9B13526C2825}" type="slidenum">
               <a:rPr lang="en-US" smtClean="0"/>
-              <a:t>4</a:t>
+              <a:t>3</a:t>
             </a:fld>
             <a:endParaRPr lang="en-US"/>
           </a:p>
@@ -880,7 +1008,7 @@
     </p:spTree>
     <p:extLst>
       <p:ext uri="{BB962C8B-B14F-4D97-AF65-F5344CB8AC3E}">
-        <p14:creationId xmlns:p14="http://schemas.microsoft.com/office/powerpoint/2010/main" val="4279931477"/>
+        <p14:creationId xmlns:p14="http://schemas.microsoft.com/office/powerpoint/2010/main" val="2162373667"/>
       </p:ext>
     </p:extLst>
   </p:cSld>
@@ -934,261 +1062,126 @@
           <a:bodyPr/>
           <a:lstStyle/>
           <a:p>
+            <a:pPr defTabSz="931774">
+              <a:defRPr/>
+            </a:pPr>
+            <a:r>
+              <a:rPr lang="en-US" b="1" dirty="0" smtClean="0"/>
+              <a:t>Why -</a:t>
+            </a:r>
             <a:r>
               <a:rPr lang="en-US" dirty="0" smtClean="0"/>
-              <a:t>Background info on </a:t>
-            </a:r>
-          </a:p>
-          <a:p>
-            <a:r>
-              <a:rPr lang="en-US" dirty="0" err="1" smtClean="0"/>
-              <a:t>VistA</a:t>
-            </a:r>
+              <a:t> </a:t>
+            </a:r>
+          </a:p>
+          <a:p>
+            <a:pPr defTabSz="931774">
+              <a:defRPr/>
+            </a:pPr>
             <a:r>
               <a:rPr lang="en-US" dirty="0" smtClean="0"/>
-              <a:t>- Veterans health info systems and technology</a:t>
+              <a:t>This project is for Mitchells</a:t>
             </a:r>
             <a:r>
               <a:rPr lang="en-US" baseline="0" dirty="0" smtClean="0"/>
-              <a:t> Architecture </a:t>
-            </a:r>
-          </a:p>
-          <a:p>
-            <a:r>
-              <a:rPr lang="en-US" baseline="0" dirty="0" smtClean="0"/>
-              <a:t>Used throughout the US </a:t>
-            </a:r>
-            <a:r>
-              <a:rPr lang="en-US" baseline="0" dirty="0" err="1" smtClean="0"/>
-              <a:t>Dept</a:t>
-            </a:r>
-            <a:r>
-              <a:rPr lang="en-US" baseline="0" dirty="0" smtClean="0"/>
-              <a:t> of Veteran Affairs </a:t>
-            </a:r>
-          </a:p>
-          <a:p>
-            <a:r>
-              <a:rPr lang="en-US" baseline="0" dirty="0" smtClean="0"/>
-              <a:t>80 different clinical </a:t>
-            </a:r>
-            <a:r>
-              <a:rPr lang="en-US" baseline="0" dirty="0" err="1" smtClean="0"/>
-              <a:t>fxns</a:t>
-            </a:r>
-            <a:r>
-              <a:rPr lang="en-US" baseline="0" dirty="0" smtClean="0"/>
-              <a:t>, including: Mental Health, Blind Rehab, Ambulatory care, Radiology, Pharmaceutical, </a:t>
-            </a:r>
-            <a:r>
-              <a:rPr lang="en-US" baseline="0" dirty="0" err="1" smtClean="0"/>
-              <a:t>etc</a:t>
-            </a:r>
-            <a:r>
-              <a:rPr lang="en-US" baseline="0" dirty="0" smtClean="0"/>
-              <a:t>, </a:t>
-            </a:r>
-            <a:r>
-              <a:rPr lang="en-US" baseline="0" dirty="0" err="1" smtClean="0"/>
-              <a:t>etc</a:t>
+              <a:t> Plain Community H</a:t>
+            </a:r>
+            <a:r>
+              <a:rPr lang="en-US" dirty="0" smtClean="0"/>
+              <a:t>ealthcare</a:t>
             </a:r>
             <a:r>
               <a:rPr lang="en-US" baseline="0" dirty="0" smtClean="0"/>
               <a:t> </a:t>
             </a:r>
             <a:r>
-              <a:rPr lang="en-US" baseline="0" dirty="0" err="1" smtClean="0"/>
-              <a:t>etc</a:t>
-            </a:r>
-            <a:endParaRPr lang="en-US" baseline="0" dirty="0" smtClean="0"/>
-          </a:p>
-          <a:p>
+              <a:rPr lang="en-US" dirty="0" smtClean="0"/>
+              <a:t>Center in Cape</a:t>
+            </a:r>
             <a:r>
               <a:rPr lang="en-US" baseline="0" dirty="0" smtClean="0"/>
-              <a:t>Software modules for clinical care and financial </a:t>
-            </a:r>
-            <a:r>
-              <a:rPr lang="en-US" baseline="0" dirty="0" err="1" smtClean="0"/>
-              <a:t>fxns</a:t>
-            </a:r>
-            <a:endParaRPr lang="en-US" baseline="0" dirty="0" smtClean="0"/>
-          </a:p>
-          <a:p>
+              <a:t> Town, South </a:t>
+            </a:r>
+            <a:r>
+              <a:rPr lang="en-US" dirty="0" smtClean="0"/>
+              <a:t>Africa that treats patients for HIV/AIDS. All</a:t>
+            </a:r>
             <a:r>
               <a:rPr lang="en-US" baseline="0" dirty="0" smtClean="0"/>
-              <a:t>Currently the largest medical system in the US, provides care to 8 million veterans</a:t>
-            </a:r>
-          </a:p>
-          <a:p>
+              <a:t> patients records are currently hard copy only, and patients’ records get displaced and damaged. </a:t>
+            </a:r>
+            <a:r>
+              <a:rPr lang="en-US" dirty="0" smtClean="0"/>
+              <a:t>Ultimately, a “hassle</a:t>
+            </a:r>
             <a:r>
               <a:rPr lang="en-US" baseline="0" dirty="0" smtClean="0"/>
-              <a:t>Already had automated data processing previously, but added a GUI in 1997. </a:t>
-            </a:r>
-          </a:p>
-          <a:p>
+              <a:t> free treatment process”</a:t>
+            </a:r>
+          </a:p>
+          <a:p>
+            <a:endParaRPr lang="en-US" b="1" dirty="0" smtClean="0"/>
+          </a:p>
+          <a:p>
+            <a:r>
+              <a:rPr lang="en-US" b="1" dirty="0" smtClean="0"/>
+              <a:t>What - </a:t>
+            </a:r>
+          </a:p>
+          <a:p>
+            <a:r>
+              <a:rPr lang="en-US" dirty="0" smtClean="0"/>
+              <a:t>Solve the problem of</a:t>
+            </a:r>
             <a:r>
               <a:rPr lang="en-US" baseline="0" dirty="0" smtClean="0"/>
-              <a:t>One of the first client-server architectures, that allowed health care providers to review and update a patient’s electronic medical record</a:t>
+              <a:t> displacement and damage to patients’ files</a:t>
+            </a:r>
+          </a:p>
+          <a:p>
+            <a:r>
+              <a:rPr lang="en-US" baseline="0" dirty="0" smtClean="0"/>
+              <a:t> - Eliminate identity theft</a:t>
+            </a:r>
+          </a:p>
+          <a:p>
+            <a:r>
+              <a:rPr lang="en-US" baseline="0" dirty="0" smtClean="0"/>
+              <a:t> - Ensure patient stays on the right regiment</a:t>
             </a:r>
             <a:endParaRPr lang="en-US" dirty="0" smtClean="0"/>
           </a:p>
           <a:p>
-            <a:endParaRPr lang="en-US" dirty="0" smtClean="0"/>
-          </a:p>
-          <a:p>
+            <a:endParaRPr lang="en-US" b="1" dirty="0" smtClean="0"/>
+          </a:p>
+          <a:p>
+            <a:r>
+              <a:rPr lang="en-US" b="1" dirty="0" smtClean="0"/>
+              <a:t>How -</a:t>
+            </a:r>
             <a:r>
               <a:rPr lang="en-US" dirty="0" smtClean="0"/>
-              <a:t>THIRRA-  </a:t>
-            </a:r>
-            <a:r>
-              <a:rPr lang="en-US" dirty="0"/>
-              <a:t> project title Portable System </a:t>
-            </a:r>
-            <a:r>
-              <a:rPr lang="en-US" dirty="0" err="1"/>
-              <a:t>for</a:t>
-            </a:r>
-            <a:r>
-              <a:rPr lang="en-US" b="1" dirty="0" err="1"/>
-              <a:t>T</a:t>
-            </a:r>
-            <a:r>
-              <a:rPr lang="en-US" dirty="0" err="1"/>
-              <a:t>eleHealth</a:t>
-            </a:r>
-            <a:r>
-              <a:rPr lang="en-US" dirty="0"/>
-              <a:t> and </a:t>
-            </a:r>
-            <a:r>
-              <a:rPr lang="en-US" b="1" dirty="0"/>
-              <a:t>H</a:t>
-            </a:r>
-            <a:r>
-              <a:rPr lang="en-US" dirty="0"/>
-              <a:t>ealth </a:t>
-            </a:r>
-            <a:r>
-              <a:rPr lang="en-US" b="1" dirty="0"/>
-              <a:t>I</a:t>
-            </a:r>
-            <a:r>
-              <a:rPr lang="en-US" dirty="0"/>
-              <a:t>nformatics for </a:t>
-            </a:r>
-            <a:r>
-              <a:rPr lang="en-US" b="1" dirty="0"/>
-              <a:t>R</a:t>
-            </a:r>
-            <a:r>
-              <a:rPr lang="en-US" dirty="0"/>
-              <a:t>ural and </a:t>
-            </a:r>
-            <a:r>
-              <a:rPr lang="en-US" b="1" dirty="0"/>
-              <a:t>R</a:t>
-            </a:r>
-            <a:r>
-              <a:rPr lang="en-US" dirty="0"/>
-              <a:t>emote </a:t>
-            </a:r>
-            <a:r>
-              <a:rPr lang="en-US" b="1" dirty="0"/>
-              <a:t>A</a:t>
-            </a:r>
-            <a:r>
-              <a:rPr lang="en-US" dirty="0"/>
-              <a:t>reas. </a:t>
-            </a:r>
-          </a:p>
-          <a:p>
-            <a:r>
-              <a:rPr lang="en-US" dirty="0"/>
-              <a:t>Started in 2007, Written in PHP, with a </a:t>
-            </a:r>
-            <a:r>
-              <a:rPr lang="en-US" dirty="0" err="1"/>
-              <a:t>PostgreSQL</a:t>
-            </a:r>
-            <a:r>
-              <a:rPr lang="en-US" dirty="0"/>
-              <a:t> database backend. </a:t>
-            </a:r>
-          </a:p>
-          <a:p>
-            <a:endParaRPr lang="en-US" dirty="0" smtClean="0"/>
+              <a:t> </a:t>
+            </a:r>
+          </a:p>
+          <a:p>
+            <a:r>
+              <a:rPr lang="en-US" dirty="0" smtClean="0"/>
+              <a:t>A software system that backs up patients’ files securely so that they can be readily available when needed </a:t>
+            </a:r>
           </a:p>
           <a:p>
             <a:r>
               <a:rPr lang="en-US" baseline="0" dirty="0" smtClean="0"/>
-              <a:t>ZEPRS- </a:t>
-            </a:r>
-            <a:r>
-              <a:rPr lang="en-US" dirty="0"/>
-              <a:t>The </a:t>
-            </a:r>
-            <a:r>
-              <a:rPr lang="en-US" b="1" dirty="0"/>
-              <a:t>Zambia Electronic </a:t>
-            </a:r>
-            <a:r>
-              <a:rPr lang="en-US" b="1" dirty="0">
-                <a:hlinkClick r:id="rId3" tooltip="Perinatal"/>
-              </a:rPr>
-              <a:t>Perinatal</a:t>
-            </a:r>
-            <a:r>
-              <a:rPr lang="en-US" b="1" dirty="0"/>
-              <a:t> Record System</a:t>
-            </a:r>
-            <a:r>
-              <a:rPr lang="en-US" dirty="0"/>
-              <a:t> (</a:t>
-            </a:r>
-            <a:r>
-              <a:rPr lang="en-US" b="1" dirty="0"/>
-              <a:t>ZEPRS</a:t>
-            </a:r>
-            <a:r>
-              <a:rPr lang="en-US" dirty="0"/>
-              <a:t>) </a:t>
-            </a:r>
-          </a:p>
-          <a:p>
-            <a:r>
-              <a:rPr lang="en-US" dirty="0"/>
-              <a:t>- For an obesity clinic</a:t>
-            </a:r>
-            <a:endParaRPr lang="en-US" dirty="0" smtClean="0"/>
-          </a:p>
-          <a:p>
+              <a:t> - I</a:t>
+            </a:r>
             <a:r>
               <a:rPr lang="en-US" dirty="0" smtClean="0"/>
-              <a:t>-lacks security measures</a:t>
+              <a:t>dentity</a:t>
             </a:r>
             <a:r>
               <a:rPr lang="en-US" baseline="0" dirty="0" smtClean="0"/>
-              <a:t> (i.e. encryption) </a:t>
-            </a:r>
-            <a:endParaRPr lang="en-US" dirty="0" smtClean="0"/>
-          </a:p>
-          <a:p>
-            <a:endParaRPr lang="en-US" dirty="0" smtClean="0"/>
-          </a:p>
-          <a:p>
-            <a:r>
-              <a:rPr lang="en-US" dirty="0" err="1" smtClean="0"/>
-              <a:t>OpenEMR</a:t>
-            </a:r>
-            <a:r>
-              <a:rPr lang="en-US" dirty="0" smtClean="0"/>
-              <a:t> V 1.0 released in June 2001</a:t>
-            </a:r>
-          </a:p>
-          <a:p>
-            <a:r>
-              <a:rPr lang="en-US" dirty="0" smtClean="0"/>
-              <a:t>-3700 downloads p/month</a:t>
+              <a:t> theft eliminated by integrating a photo into the system for each patient so that they can be identified through facial recognition and name, eliminating the need for a patient ID card, making the overall process smoother and easier for patients’</a:t>
             </a:r>
             <a:endParaRPr lang="en-US" dirty="0"/>
           </a:p>
@@ -1211,7 +1204,7 @@
           <a:p>
             <a:fld id="{6538AC3F-63CE-4DD6-92CD-9B13526C2825}" type="slidenum">
               <a:rPr lang="en-US" smtClean="0"/>
-              <a:t>5</a:t>
+              <a:t>4</a:t>
             </a:fld>
             <a:endParaRPr lang="en-US"/>
           </a:p>
@@ -1220,7 +1213,7 @@
     </p:spTree>
     <p:extLst>
       <p:ext uri="{BB962C8B-B14F-4D97-AF65-F5344CB8AC3E}">
-        <p14:creationId xmlns:p14="http://schemas.microsoft.com/office/powerpoint/2010/main" val="3006771749"/>
+        <p14:creationId xmlns:p14="http://schemas.microsoft.com/office/powerpoint/2010/main" val="4121720833"/>
       </p:ext>
     </p:extLst>
   </p:cSld>
@@ -1275,21 +1268,55 @@
           <a:lstStyle/>
           <a:p>
             <a:r>
-              <a:rPr lang="en-US" dirty="0" smtClean="0"/>
-              <a:t>- Taken out financial data</a:t>
-            </a:r>
-            <a:r>
-              <a:rPr lang="en-US" baseline="0" dirty="0" smtClean="0"/>
-              <a:t> </a:t>
-            </a:r>
-          </a:p>
-          <a:p>
-            <a:r>
-              <a:rPr lang="en-US" baseline="0" dirty="0" smtClean="0"/>
-              <a:t>- Safeguard, (electronic paper trail) </a:t>
-            </a:r>
+              <a:rPr lang="en-US" dirty="0"/>
+              <a:t>It is important to weigh patient confidentiality against a public responsibility to support national priorities.</a:t>
+            </a:r>
+          </a:p>
+          <a:p>
             <a:endParaRPr lang="en-US" dirty="0"/>
           </a:p>
+          <a:p>
+            <a:r>
+              <a:rPr lang="en-US" dirty="0"/>
+              <a:t>Pros:</a:t>
+            </a:r>
+          </a:p>
+          <a:p>
+            <a:r>
+              <a:rPr lang="en-US" dirty="0"/>
+              <a:t> - Hospitals/Clinics more efficient</a:t>
+            </a:r>
+          </a:p>
+          <a:p>
+            <a:r>
+              <a:rPr lang="en-US" dirty="0"/>
+              <a:t> - Reduce medical errors</a:t>
+            </a:r>
+          </a:p>
+          <a:p>
+            <a:r>
+              <a:rPr lang="en-US" dirty="0"/>
+              <a:t> - Lower healthcare costs</a:t>
+            </a:r>
+          </a:p>
+          <a:p>
+            <a:endParaRPr lang="en-US" dirty="0"/>
+          </a:p>
+          <a:p>
+            <a:endParaRPr lang="en-US" dirty="0"/>
+          </a:p>
+          <a:p>
+            <a:endParaRPr lang="en-US" dirty="0"/>
+          </a:p>
+          <a:p>
+            <a:endParaRPr lang="en-US" dirty="0"/>
+          </a:p>
+          <a:p>
+            <a:endParaRPr lang="en-US" dirty="0"/>
+          </a:p>
+          <a:p>
+            <a:endParaRPr lang="en-US" dirty="0"/>
+          </a:p>
         </p:txBody>
       </p:sp>
       <p:sp>
@@ -1309,7 +1336,7 @@
           <a:p>
             <a:fld id="{6538AC3F-63CE-4DD6-92CD-9B13526C2825}" type="slidenum">
               <a:rPr lang="en-US" smtClean="0"/>
-              <a:t>6</a:t>
+              <a:t>5</a:t>
             </a:fld>
             <a:endParaRPr lang="en-US"/>
           </a:p>
@@ -1318,7 +1345,7 @@
     </p:spTree>
     <p:extLst>
       <p:ext uri="{BB962C8B-B14F-4D97-AF65-F5344CB8AC3E}">
-        <p14:creationId xmlns:p14="http://schemas.microsoft.com/office/powerpoint/2010/main" val="2423766743"/>
+        <p14:creationId xmlns:p14="http://schemas.microsoft.com/office/powerpoint/2010/main" val="4279931477"/>
       </p:ext>
     </p:extLst>
   </p:cSld>
@@ -1374,11 +1401,259 @@
           <a:p>
             <a:r>
               <a:rPr lang="en-US" dirty="0" smtClean="0"/>
-              <a:t>These are the 3 ‘big’ things the “state of the art” software</a:t>
+              <a:t>Background info on </a:t>
+            </a:r>
+          </a:p>
+          <a:p>
+            <a:r>
+              <a:rPr lang="en-US" dirty="0" err="1" smtClean="0"/>
+              <a:t>VistA</a:t>
+            </a:r>
+            <a:r>
+              <a:rPr lang="en-US" dirty="0" smtClean="0"/>
+              <a:t>- Veterans health info systems and technology</a:t>
             </a:r>
             <a:r>
               <a:rPr lang="en-US" baseline="0" dirty="0" smtClean="0"/>
-              <a:t> uses</a:t>
+              <a:t> Architecture </a:t>
+            </a:r>
+          </a:p>
+          <a:p>
+            <a:r>
+              <a:rPr lang="en-US" baseline="0" dirty="0" smtClean="0"/>
+              <a:t>Used throughout the US </a:t>
+            </a:r>
+            <a:r>
+              <a:rPr lang="en-US" baseline="0" dirty="0" err="1" smtClean="0"/>
+              <a:t>Dept</a:t>
+            </a:r>
+            <a:r>
+              <a:rPr lang="en-US" baseline="0" dirty="0" smtClean="0"/>
+              <a:t> of Veteran Affairs </a:t>
+            </a:r>
+          </a:p>
+          <a:p>
+            <a:r>
+              <a:rPr lang="en-US" baseline="0" dirty="0" smtClean="0"/>
+              <a:t>80 different clinical </a:t>
+            </a:r>
+            <a:r>
+              <a:rPr lang="en-US" baseline="0" dirty="0" err="1" smtClean="0"/>
+              <a:t>fxns</a:t>
+            </a:r>
+            <a:r>
+              <a:rPr lang="en-US" baseline="0" dirty="0" smtClean="0"/>
+              <a:t>, including: Mental Health, Blind Rehab, Ambulatory care, Radiology, Pharmaceutical, </a:t>
+            </a:r>
+            <a:r>
+              <a:rPr lang="en-US" baseline="0" dirty="0" err="1" smtClean="0"/>
+              <a:t>etc</a:t>
+            </a:r>
+            <a:r>
+              <a:rPr lang="en-US" baseline="0" dirty="0" smtClean="0"/>
+              <a:t>, </a:t>
+            </a:r>
+            <a:r>
+              <a:rPr lang="en-US" baseline="0" dirty="0" err="1" smtClean="0"/>
+              <a:t>etc</a:t>
+            </a:r>
+            <a:r>
+              <a:rPr lang="en-US" baseline="0" dirty="0" smtClean="0"/>
+              <a:t> </a:t>
+            </a:r>
+            <a:r>
+              <a:rPr lang="en-US" baseline="0" dirty="0" err="1" smtClean="0"/>
+              <a:t>etc</a:t>
+            </a:r>
+            <a:endParaRPr lang="en-US" baseline="0" dirty="0" smtClean="0"/>
+          </a:p>
+          <a:p>
+            <a:r>
+              <a:rPr lang="en-US" baseline="0" dirty="0" smtClean="0"/>
+              <a:t>Software modules for clinical care and financial </a:t>
+            </a:r>
+            <a:r>
+              <a:rPr lang="en-US" baseline="0" dirty="0" err="1" smtClean="0"/>
+              <a:t>fxns</a:t>
+            </a:r>
+            <a:endParaRPr lang="en-US" baseline="0" dirty="0" smtClean="0"/>
+          </a:p>
+          <a:p>
+            <a:r>
+              <a:rPr lang="en-US" baseline="0" dirty="0" smtClean="0"/>
+              <a:t>Currently the largest medical system in the US, provides care to 8 million veterans</a:t>
+            </a:r>
+          </a:p>
+          <a:p>
+            <a:r>
+              <a:rPr lang="en-US" baseline="0" dirty="0" smtClean="0"/>
+              <a:t>Already had automated data processing previously, but added a GUI in 1997. </a:t>
+            </a:r>
+          </a:p>
+          <a:p>
+            <a:r>
+              <a:rPr lang="en-US" baseline="0" dirty="0" smtClean="0"/>
+              <a:t>One of the first client-server architectures, that allowed health care providers to review and update a patient’s electronic medical record</a:t>
+            </a:r>
+            <a:endParaRPr lang="en-US" dirty="0" smtClean="0"/>
+          </a:p>
+          <a:p>
+            <a:endParaRPr lang="en-US" dirty="0" smtClean="0"/>
+          </a:p>
+          <a:p>
+            <a:r>
+              <a:rPr lang="en-US" dirty="0" smtClean="0"/>
+              <a:t>THIRRA-  </a:t>
+            </a:r>
+            <a:r>
+              <a:rPr lang="en-US" dirty="0"/>
+              <a:t> project title Portable System </a:t>
+            </a:r>
+            <a:r>
+              <a:rPr lang="en-US" dirty="0" err="1"/>
+              <a:t>for</a:t>
+            </a:r>
+            <a:r>
+              <a:rPr lang="en-US" b="1" dirty="0" err="1"/>
+              <a:t>T</a:t>
+            </a:r>
+            <a:r>
+              <a:rPr lang="en-US" dirty="0" err="1"/>
+              <a:t>eleHealth</a:t>
+            </a:r>
+            <a:r>
+              <a:rPr lang="en-US" dirty="0"/>
+              <a:t> and </a:t>
+            </a:r>
+            <a:r>
+              <a:rPr lang="en-US" b="1" dirty="0"/>
+              <a:t>H</a:t>
+            </a:r>
+            <a:r>
+              <a:rPr lang="en-US" dirty="0"/>
+              <a:t>ealth </a:t>
+            </a:r>
+            <a:r>
+              <a:rPr lang="en-US" b="1" dirty="0"/>
+              <a:t>I</a:t>
+            </a:r>
+            <a:r>
+              <a:rPr lang="en-US" dirty="0"/>
+              <a:t>nformatics for </a:t>
+            </a:r>
+            <a:r>
+              <a:rPr lang="en-US" b="1" dirty="0"/>
+              <a:t>R</a:t>
+            </a:r>
+            <a:r>
+              <a:rPr lang="en-US" dirty="0"/>
+              <a:t>ural and </a:t>
+            </a:r>
+            <a:r>
+              <a:rPr lang="en-US" b="1" dirty="0"/>
+              <a:t>R</a:t>
+            </a:r>
+            <a:r>
+              <a:rPr lang="en-US" dirty="0"/>
+              <a:t>emote </a:t>
+            </a:r>
+            <a:r>
+              <a:rPr lang="en-US" b="1" dirty="0"/>
+              <a:t>A</a:t>
+            </a:r>
+            <a:r>
+              <a:rPr lang="en-US" dirty="0"/>
+              <a:t>reas. </a:t>
+            </a:r>
+          </a:p>
+          <a:p>
+            <a:r>
+              <a:rPr lang="en-US" dirty="0"/>
+              <a:t>Started in 2007, Written in PHP, with a </a:t>
+            </a:r>
+            <a:r>
+              <a:rPr lang="en-US" dirty="0" err="1"/>
+              <a:t>PostgreSQL</a:t>
+            </a:r>
+            <a:r>
+              <a:rPr lang="en-US" dirty="0"/>
+              <a:t> database backend. </a:t>
+            </a:r>
+          </a:p>
+          <a:p>
+            <a:endParaRPr lang="en-US" dirty="0" smtClean="0"/>
+          </a:p>
+          <a:p>
+            <a:r>
+              <a:rPr lang="en-US" baseline="0" dirty="0" smtClean="0"/>
+              <a:t>ZEPRS- </a:t>
+            </a:r>
+            <a:r>
+              <a:rPr lang="en-US" dirty="0"/>
+              <a:t>The </a:t>
+            </a:r>
+            <a:r>
+              <a:rPr lang="en-US" b="1" dirty="0"/>
+              <a:t>Zambia Electronic </a:t>
+            </a:r>
+            <a:r>
+              <a:rPr lang="en-US" b="1" dirty="0">
+                <a:hlinkClick r:id="rId3" tooltip="Perinatal"/>
+              </a:rPr>
+              <a:t>Perinatal</a:t>
+            </a:r>
+            <a:r>
+              <a:rPr lang="en-US" b="1" dirty="0"/>
+              <a:t> Record System</a:t>
+            </a:r>
+            <a:r>
+              <a:rPr lang="en-US" dirty="0"/>
+              <a:t> (</a:t>
+            </a:r>
+            <a:r>
+              <a:rPr lang="en-US" b="1" dirty="0"/>
+              <a:t>ZEPRS</a:t>
+            </a:r>
+            <a:r>
+              <a:rPr lang="en-US" dirty="0"/>
+              <a:t>) </a:t>
+            </a:r>
+          </a:p>
+          <a:p>
+            <a:r>
+              <a:rPr lang="en-US" dirty="0"/>
+              <a:t>- For an obesity clinic</a:t>
+            </a:r>
+            <a:endParaRPr lang="en-US" dirty="0" smtClean="0"/>
+          </a:p>
+          <a:p>
+            <a:r>
+              <a:rPr lang="en-US" dirty="0" smtClean="0"/>
+              <a:t>-lacks security measures</a:t>
+            </a:r>
+            <a:r>
+              <a:rPr lang="en-US" baseline="0" dirty="0" smtClean="0"/>
+              <a:t> (i.e. encryption) </a:t>
+            </a:r>
+            <a:endParaRPr lang="en-US" dirty="0" smtClean="0"/>
+          </a:p>
+          <a:p>
+            <a:endParaRPr lang="en-US" dirty="0" smtClean="0"/>
+          </a:p>
+          <a:p>
+            <a:r>
+              <a:rPr lang="en-US" dirty="0" err="1" smtClean="0"/>
+              <a:t>OpenEMR</a:t>
+            </a:r>
+            <a:r>
+              <a:rPr lang="en-US" dirty="0" smtClean="0"/>
+              <a:t> V 1.0 released in June 2001</a:t>
+            </a:r>
+          </a:p>
+          <a:p>
+            <a:r>
+              <a:rPr lang="en-US" dirty="0" smtClean="0"/>
+              <a:t>-3700 downloads p/month</a:t>
             </a:r>
             <a:endParaRPr lang="en-US" dirty="0"/>
           </a:p>
@@ -1401,7 +1676,7 @@
           <a:p>
             <a:fld id="{6538AC3F-63CE-4DD6-92CD-9B13526C2825}" type="slidenum">
               <a:rPr lang="en-US" smtClean="0"/>
-              <a:t>7</a:t>
+              <a:t>6</a:t>
             </a:fld>
             <a:endParaRPr lang="en-US"/>
           </a:p>
@@ -1410,7 +1685,7 @@
     </p:spTree>
     <p:extLst>
       <p:ext uri="{BB962C8B-B14F-4D97-AF65-F5344CB8AC3E}">
-        <p14:creationId xmlns:p14="http://schemas.microsoft.com/office/powerpoint/2010/main" val="109463441"/>
+        <p14:creationId xmlns:p14="http://schemas.microsoft.com/office/powerpoint/2010/main" val="3006771749"/>
       </p:ext>
     </p:extLst>
   </p:cSld>
@@ -1464,7 +1739,36 @@
           <a:bodyPr/>
           <a:lstStyle/>
           <a:p>
-            <a:endParaRPr lang="en-US"/>
+            <a:r>
+              <a:rPr lang="en-US" dirty="0" smtClean="0"/>
+              <a:t>These are the 3 ‘big’ things the “state of the art” software</a:t>
+            </a:r>
+            <a:r>
+              <a:rPr lang="en-US" baseline="0" dirty="0" smtClean="0"/>
+              <a:t> </a:t>
+            </a:r>
+            <a:r>
+              <a:rPr lang="en-US" baseline="0" dirty="0" smtClean="0"/>
+              <a:t>uses </a:t>
+            </a:r>
+          </a:p>
+          <a:p>
+            <a:endParaRPr lang="en-US" baseline="0" dirty="0" smtClean="0"/>
+          </a:p>
+          <a:p>
+            <a:r>
+              <a:rPr lang="en-US" baseline="0" dirty="0" smtClean="0"/>
+              <a:t>Closing Comment: “So if </a:t>
+            </a:r>
+            <a:r>
+              <a:rPr lang="en-US" baseline="0" dirty="0" err="1" smtClean="0"/>
+              <a:t>OpenEMR</a:t>
+            </a:r>
+            <a:r>
+              <a:rPr lang="en-US" baseline="0" dirty="0" smtClean="0"/>
+              <a:t> is so great, why is it not a good fit for our specific application?” (go to next slide)</a:t>
+            </a:r>
+            <a:endParaRPr lang="en-US" dirty="0"/>
           </a:p>
         </p:txBody>
       </p:sp>
@@ -1485,7 +1789,7 @@
           <a:p>
             <a:fld id="{6538AC3F-63CE-4DD6-92CD-9B13526C2825}" type="slidenum">
               <a:rPr lang="en-US" smtClean="0"/>
-              <a:t>8</a:t>
+              <a:t>7</a:t>
             </a:fld>
             <a:endParaRPr lang="en-US"/>
           </a:p>
@@ -1494,7 +1798,7 @@
     </p:spTree>
     <p:extLst>
       <p:ext uri="{BB962C8B-B14F-4D97-AF65-F5344CB8AC3E}">
-        <p14:creationId xmlns:p14="http://schemas.microsoft.com/office/powerpoint/2010/main" val="920279097"/>
+        <p14:creationId xmlns:p14="http://schemas.microsoft.com/office/powerpoint/2010/main" val="109463441"/>
       </p:ext>
     </p:extLst>
   </p:cSld>
@@ -1550,12 +1854,14 @@
           <a:p>
             <a:r>
               <a:rPr lang="en-US" dirty="0" smtClean="0"/>
-              <a:t>i.e.</a:t>
+              <a:t>-Too</a:t>
             </a:r>
             <a:r>
               <a:rPr lang="en-US" baseline="0" dirty="0" smtClean="0"/>
-              <a:t> physicians, pharmacist, receptionist </a:t>
-            </a:r>
+              <a:t> much going on, could be complicated. </a:t>
+            </a:r>
+          </a:p>
+          <a:p>
             <a:endParaRPr lang="en-US" dirty="0"/>
           </a:p>
         </p:txBody>
@@ -1577,7 +1883,7 @@
           <a:p>
             <a:fld id="{6538AC3F-63CE-4DD6-92CD-9B13526C2825}" type="slidenum">
               <a:rPr lang="en-US" smtClean="0"/>
-              <a:t>9</a:t>
+              <a:t>8</a:t>
             </a:fld>
             <a:endParaRPr lang="en-US"/>
           </a:p>
@@ -1586,7 +1892,7 @@
     </p:spTree>
     <p:extLst>
       <p:ext uri="{BB962C8B-B14F-4D97-AF65-F5344CB8AC3E}">
-        <p14:creationId xmlns:p14="http://schemas.microsoft.com/office/powerpoint/2010/main" val="2185386872"/>
+        <p14:creationId xmlns:p14="http://schemas.microsoft.com/office/powerpoint/2010/main" val="2329334437"/>
       </p:ext>
     </p:extLst>
   </p:cSld>
@@ -1640,32 +1946,66 @@
           <a:bodyPr/>
           <a:lstStyle/>
           <a:p>
-            <a:pPr defTabSz="931774">
-              <a:defRPr/>
+            <a:r>
+              <a:rPr lang="en-US" dirty="0" smtClean="0"/>
+              <a:t>- Taken out financial data</a:t>
+            </a:r>
+            <a:r>
+              <a:rPr lang="en-US" baseline="0" dirty="0" smtClean="0"/>
+              <a:t> </a:t>
+            </a:r>
+          </a:p>
+          <a:p>
+            <a:pPr marL="171450" indent="-171450">
+              <a:buFontTx/>
+              <a:buChar char="-"/>
             </a:pPr>
             <a:r>
-              <a:rPr lang="en-US" dirty="0" smtClean="0"/>
-              <a:t>References:</a:t>
-            </a:r>
-            <a:endParaRPr lang="en-US" dirty="0">
-              <a:hlinkClick r:id="rId3"/>
-            </a:endParaRPr>
-          </a:p>
-          <a:p>
-            <a:pPr defTabSz="931774">
-              <a:defRPr/>
+              <a:rPr lang="en-US" baseline="0" dirty="0" smtClean="0"/>
+              <a:t>Safeguard</a:t>
+            </a:r>
+            <a:r>
+              <a:rPr lang="en-US" baseline="0" dirty="0" smtClean="0"/>
+              <a:t>, (electronic paper trail) </a:t>
+            </a:r>
+            <a:r>
+              <a:rPr lang="en-US" baseline="0" dirty="0" smtClean="0"/>
+              <a:t> </a:t>
+            </a:r>
+          </a:p>
+          <a:p>
+            <a:pPr marL="171450" indent="-171450">
+              <a:buFontTx/>
+              <a:buChar char="-"/>
             </a:pPr>
             <a:r>
-              <a:rPr lang="en-US" dirty="0">
-                <a:hlinkClick r:id="rId3"/>
-              </a:rPr>
-              <a:t>http://en.wikipedia.org/wiki/List_of_open-source_healthcare_software#Electronic_health_or_medical_record</a:t>
-            </a:r>
+              <a:rPr lang="en-US" baseline="0" dirty="0" smtClean="0"/>
+              <a:t>SHA1 for message Authentication, DHE_RSA as the key exchange mechanism, allows for HTTPS Protocol, ( combination of hypertext transfer </a:t>
+            </a:r>
+            <a:r>
+              <a:rPr lang="en-US" baseline="0" dirty="0" err="1" smtClean="0"/>
+              <a:t>protocal</a:t>
+            </a:r>
+            <a:r>
+              <a:rPr lang="en-US" baseline="0" dirty="0" smtClean="0"/>
+              <a:t> and SSL/TLS </a:t>
+            </a:r>
+            <a:r>
+              <a:rPr lang="en-US" baseline="0" dirty="0" err="1" smtClean="0"/>
+              <a:t>protocal</a:t>
+            </a:r>
+            <a:r>
+              <a:rPr lang="en-US" baseline="0" dirty="0" smtClean="0"/>
+              <a:t>.) Provides encrypted communication to allow for secure identification of a network web server </a:t>
+            </a:r>
+          </a:p>
+          <a:p>
+            <a:pPr marL="171450" indent="-171450">
+              <a:buFontTx/>
+              <a:buChar char="-"/>
+            </a:pPr>
             <a:endParaRPr lang="en-US" dirty="0"/>
           </a:p>
-          <a:p>
-            <a:endParaRPr lang="en-US" dirty="0"/>
-          </a:p>
         </p:txBody>
       </p:sp>
       <p:sp>
@@ -1685,7 +2025,7 @@
           <a:p>
             <a:fld id="{6538AC3F-63CE-4DD6-92CD-9B13526C2825}" type="slidenum">
               <a:rPr lang="en-US" smtClean="0"/>
-              <a:t>10</a:t>
+              <a:t>9</a:t>
             </a:fld>
             <a:endParaRPr lang="en-US"/>
           </a:p>
@@ -1694,7 +2034,7 @@
     </p:spTree>
     <p:extLst>
       <p:ext uri="{BB962C8B-B14F-4D97-AF65-F5344CB8AC3E}">
-        <p14:creationId xmlns:p14="http://schemas.microsoft.com/office/powerpoint/2010/main" val="15417223"/>
+        <p14:creationId xmlns:p14="http://schemas.microsoft.com/office/powerpoint/2010/main" val="2423766743"/>
       </p:ext>
     </p:extLst>
   </p:cSld>
@@ -1891,7 +2231,7 @@
           <a:p>
             <a:fld id="{F860A560-75BB-4DDF-8B63-A975FA1C797F}" type="datetime1">
               <a:rPr lang="en-US" smtClean="0"/>
-              <a:t>5/2/2012</a:t>
+              <a:t>5/7/2012</a:t>
             </a:fld>
             <a:endParaRPr lang="en-US"/>
           </a:p>
@@ -2063,7 +2403,7 @@
           <a:p>
             <a:fld id="{819A4B5B-3CC6-4E48-8F80-7D599914EF89}" type="datetime1">
               <a:rPr lang="en-US" smtClean="0"/>
-              <a:t>5/2/2012</a:t>
+              <a:t>5/7/2012</a:t>
             </a:fld>
             <a:endParaRPr lang="en-US"/>
           </a:p>
@@ -2238,7 +2578,7 @@
           <a:p>
             <a:fld id="{AB5F6EC1-A62E-41C8-88AD-A2D7337832AA}" type="datetime1">
               <a:rPr lang="en-US" smtClean="0"/>
-              <a:t>5/2/2012</a:t>
+              <a:t>5/7/2012</a:t>
             </a:fld>
             <a:endParaRPr lang="en-US"/>
           </a:p>
@@ -2403,7 +2743,7 @@
           <a:p>
             <a:fld id="{555C1C78-3ACF-46D8-8BB2-57E2D7F6FC19}" type="datetime1">
               <a:rPr lang="en-US" smtClean="0"/>
-              <a:t>5/2/2012</a:t>
+              <a:t>5/7/2012</a:t>
             </a:fld>
             <a:endParaRPr lang="en-US"/>
           </a:p>
@@ -2649,7 +2989,7 @@
           <a:p>
             <a:fld id="{F55A0451-9590-4A1C-9976-5B991B64B9EA}" type="datetime1">
               <a:rPr lang="en-US" smtClean="0"/>
-              <a:t>5/2/2012</a:t>
+              <a:t>5/7/2012</a:t>
             </a:fld>
             <a:endParaRPr lang="en-US"/>
           </a:p>
@@ -2746,7 +3086,7 @@
           <a:p>
             <a:fld id="{EA026219-B328-42D7-AAAF-98D7A5F4B509}" type="datetime1">
               <a:rPr lang="en-US" smtClean="0"/>
-              <a:t>5/2/2012</a:t>
+              <a:t>5/7/2012</a:t>
             </a:fld>
             <a:endParaRPr lang="en-US"/>
           </a:p>
@@ -3120,7 +3460,7 @@
           <a:p>
             <a:fld id="{C3C85DBB-887A-43C7-AF91-EDD9C8BD0F87}" type="datetime1">
               <a:rPr lang="en-US" smtClean="0"/>
-              <a:t>5/2/2012</a:t>
+              <a:t>5/7/2012</a:t>
             </a:fld>
             <a:endParaRPr lang="en-US"/>
           </a:p>
@@ -3375,7 +3715,7 @@
           <a:p>
             <a:fld id="{6BB3112F-08FD-4A00-8761-87402F2FB62E}" type="datetime1">
               <a:rPr lang="en-US" smtClean="0"/>
-              <a:t>5/2/2012</a:t>
+              <a:t>5/7/2012</a:t>
             </a:fld>
             <a:endParaRPr lang="en-US"/>
           </a:p>
@@ -3465,7 +3805,7 @@
           <a:p>
             <a:fld id="{774FBF8C-E852-4416-8043-D9509D71997B}" type="datetime1">
               <a:rPr lang="en-US" smtClean="0"/>
-              <a:t>5/2/2012</a:t>
+              <a:t>5/7/2012</a:t>
             </a:fld>
             <a:endParaRPr lang="en-US"/>
           </a:p>
@@ -3739,7 +4079,7 @@
           <a:p>
             <a:fld id="{370F731C-0A04-47AB-95E7-C4B7280CE3EF}" type="datetime1">
               <a:rPr lang="en-US" smtClean="0"/>
-              <a:t>5/2/2012</a:t>
+              <a:t>5/7/2012</a:t>
             </a:fld>
             <a:endParaRPr lang="en-US"/>
           </a:p>
@@ -4011,7 +4351,7 @@
           <a:p>
             <a:fld id="{6E71A764-0912-4B71-AEAC-C5429135FCA3}" type="datetime1">
               <a:rPr lang="en-US" smtClean="0"/>
-              <a:t>5/2/2012</a:t>
+              <a:t>5/7/2012</a:t>
             </a:fld>
             <a:endParaRPr lang="en-US"/>
           </a:p>
@@ -4311,7 +4651,7 @@
           <a:p>
             <a:fld id="{3F326007-896C-49C9-B074-1A1918D84138}" type="datetime1">
               <a:rPr lang="en-US" smtClean="0"/>
-              <a:t>5/2/2012</a:t>
+              <a:t>5/7/2012</a:t>
             </a:fld>
             <a:endParaRPr lang="en-US"/>
           </a:p>
@@ -4841,22 +5181,23 @@
             <a:pPr algn="ctr"/>
             <a:r>
               <a:rPr lang="en-US" dirty="0" smtClean="0"/>
-              <a:t>CS475 - Senior Project </a:t>
-            </a:r>
+              <a:t>Department of Computer Science</a:t>
+            </a:r>
+            <a:endParaRPr lang="en-US" dirty="0" smtClean="0"/>
           </a:p>
           <a:p>
             <a:pPr algn="ctr"/>
             <a:r>
               <a:rPr lang="en-US" dirty="0" smtClean="0"/>
-              <a:t>29</a:t>
-            </a:r>
-            <a:r>
-              <a:rPr lang="en-US" baseline="30000" dirty="0" smtClean="0"/>
-              <a:t>th</a:t>
+              <a:t>Spring</a:t>
             </a:r>
             <a:r>
               <a:rPr lang="en-US" dirty="0" smtClean="0"/>
-              <a:t> March 2012</a:t>
+              <a:t> </a:t>
+            </a:r>
+            <a:r>
+              <a:rPr lang="en-US" dirty="0" smtClean="0"/>
+              <a:t>2012</a:t>
             </a:r>
             <a:endParaRPr lang="en-US" dirty="0"/>
           </a:p>
@@ -4934,6 +5275,518 @@
         </p:nvSpPr>
         <p:spPr>
           <a:xfrm>
+            <a:off x="914400" y="0"/>
+            <a:ext cx="7315200" cy="1154097"/>
+          </a:xfrm>
+        </p:spPr>
+        <p:txBody>
+          <a:bodyPr/>
+          <a:lstStyle/>
+          <a:p>
+            <a:pPr algn="ctr"/>
+            <a:r>
+              <a:rPr lang="en-US" dirty="0" smtClean="0"/>
+              <a:t>System Context Diagram</a:t>
+            </a:r>
+            <a:endParaRPr lang="en-US" dirty="0"/>
+          </a:p>
+        </p:txBody>
+      </p:sp>
+      <p:sp>
+        <p:nvSpPr>
+          <p:cNvPr id="4" name="Slide Number Placeholder 3"/>
+          <p:cNvSpPr>
+            <a:spLocks noGrp="1"/>
+          </p:cNvSpPr>
+          <p:nvPr>
+            <p:ph type="sldNum" sz="quarter" idx="12"/>
+          </p:nvPr>
+        </p:nvSpPr>
+        <p:spPr/>
+        <p:txBody>
+          <a:bodyPr/>
+          <a:lstStyle/>
+          <a:p>
+            <a:fld id="{85816456-AF90-4826-9770-6E0598D9C364}" type="slidenum">
+              <a:rPr lang="en-US" smtClean="0"/>
+              <a:t>10</a:t>
+            </a:fld>
+            <a:endParaRPr lang="en-US" dirty="0"/>
+          </a:p>
+        </p:txBody>
+      </p:sp>
+      <p:pic>
+        <p:nvPicPr>
+          <p:cNvPr id="1026" name="Picture 2" descr="This diagram depicts the basic input, output, and processing of the SEMRS system. &#10;" title="System Context Diagram"/>
+          <p:cNvPicPr>
+            <a:picLocks noGrp="1" noChangeAspect="1" noChangeArrowheads="1"/>
+          </p:cNvPicPr>
+          <p:nvPr>
+            <p:ph idx="1"/>
+          </p:nvPr>
+        </p:nvPicPr>
+        <p:blipFill>
+          <a:blip r:embed="rId2">
+            <a:extLst>
+              <a:ext uri="{28A0092B-C50C-407E-A947-70E740481C1C}">
+                <a14:useLocalDpi xmlns:a14="http://schemas.microsoft.com/office/drawing/2010/main" val="0"/>
+              </a:ext>
+            </a:extLst>
+          </a:blip>
+          <a:srcRect/>
+          <a:stretch>
+            <a:fillRect/>
+          </a:stretch>
+        </p:blipFill>
+        <p:spPr bwMode="auto">
+          <a:xfrm>
+            <a:off x="1371600" y="1444141"/>
+            <a:ext cx="6553200" cy="3889859"/>
+          </a:xfrm>
+          <a:prstGeom prst="rect">
+            <a:avLst/>
+          </a:prstGeom>
+          <a:noFill/>
+          <a:ln>
+            <a:noFill/>
+          </a:ln>
+          <a:effectLst/>
+          <a:extLst>
+            <a:ext uri="{909E8E84-426E-40DD-AFC4-6F175D3DCCD1}">
+              <a14:hiddenFill xmlns:a14="http://schemas.microsoft.com/office/drawing/2010/main">
+                <a:solidFill>
+                  <a:schemeClr val="accent1"/>
+                </a:solidFill>
+              </a14:hiddenFill>
+            </a:ext>
+            <a:ext uri="{91240B29-F687-4F45-9708-019B960494DF}">
+              <a14:hiddenLine xmlns:a14="http://schemas.microsoft.com/office/drawing/2010/main" w="9525">
+                <a:solidFill>
+                  <a:schemeClr val="tx1"/>
+                </a:solidFill>
+                <a:miter lim="800000"/>
+                <a:headEnd/>
+                <a:tailEnd/>
+              </a14:hiddenLine>
+            </a:ext>
+            <a:ext uri="{AF507438-7753-43E0-B8FC-AC1667EBCBE1}">
+              <a14:hiddenEffects xmlns:a14="http://schemas.microsoft.com/office/drawing/2010/main">
+                <a:effectLst>
+                  <a:outerShdw dist="35921" dir="2700000" algn="ctr" rotWithShape="0">
+                    <a:schemeClr val="bg2"/>
+                  </a:outerShdw>
+                </a:effectLst>
+              </a14:hiddenEffects>
+            </a:ext>
+          </a:extLst>
+        </p:spPr>
+      </p:pic>
+      <p:sp>
+        <p:nvSpPr>
+          <p:cNvPr id="5" name="TextBox 4"/>
+          <p:cNvSpPr txBox="1"/>
+          <p:nvPr/>
+        </p:nvSpPr>
+        <p:spPr>
+          <a:xfrm>
+            <a:off x="1371600" y="5638800"/>
+            <a:ext cx="6553200" cy="646331"/>
+          </a:xfrm>
+          <a:prstGeom prst="rect">
+            <a:avLst/>
+          </a:prstGeom>
+          <a:noFill/>
+        </p:spPr>
+        <p:txBody>
+          <a:bodyPr wrap="square" rtlCol="0">
+            <a:spAutoFit/>
+          </a:bodyPr>
+          <a:lstStyle/>
+          <a:p>
+            <a:r>
+              <a:rPr lang="en-US" dirty="0" smtClean="0"/>
+              <a:t>This system context diagram depicts the basic input, output, and processing of the SEMRS system. </a:t>
+            </a:r>
+            <a:endParaRPr lang="en-US" dirty="0"/>
+          </a:p>
+        </p:txBody>
+      </p:sp>
+    </p:spTree>
+    <p:extLst>
+      <p:ext uri="{BB962C8B-B14F-4D97-AF65-F5344CB8AC3E}">
+        <p14:creationId xmlns:p14="http://schemas.microsoft.com/office/powerpoint/2010/main" val="3990745985"/>
+      </p:ext>
+    </p:extLst>
+  </p:cSld>
+  <p:clrMapOvr>
+    <a:masterClrMapping/>
+  </p:clrMapOvr>
+  <p:timing>
+    <p:tnLst>
+      <p:par>
+        <p:cTn id="1" dur="indefinite" restart="never" nodeType="tmRoot"/>
+      </p:par>
+    </p:tnLst>
+  </p:timing>
+</p:sld>
+</file>
+
+<file path=ppt/slides/slide11.xml><?xml version="1.0" encoding="utf-8"?>
+<p:sld xmlns:a="http://schemas.openxmlformats.org/drawingml/2006/main" xmlns:r="http://schemas.openxmlformats.org/officeDocument/2006/relationships" xmlns:p="http://schemas.openxmlformats.org/presentationml/2006/main">
+  <p:cSld>
+    <p:spTree>
+      <p:nvGrpSpPr>
+        <p:cNvPr id="1" name=""/>
+        <p:cNvGrpSpPr/>
+        <p:nvPr/>
+      </p:nvGrpSpPr>
+      <p:grpSpPr>
+        <a:xfrm>
+          <a:off x="0" y="0"/>
+          <a:ext cx="0" cy="0"/>
+          <a:chOff x="0" y="0"/>
+          <a:chExt cx="0" cy="0"/>
+        </a:xfrm>
+      </p:grpSpPr>
+      <p:sp>
+        <p:nvSpPr>
+          <p:cNvPr id="2" name="Title 1"/>
+          <p:cNvSpPr>
+            <a:spLocks noGrp="1"/>
+          </p:cNvSpPr>
+          <p:nvPr>
+            <p:ph type="title"/>
+          </p:nvPr>
+        </p:nvSpPr>
+        <p:spPr>
+          <a:xfrm>
+            <a:off x="914400" y="76200"/>
+            <a:ext cx="7315200" cy="1154097"/>
+          </a:xfrm>
+        </p:spPr>
+        <p:txBody>
+          <a:bodyPr/>
+          <a:lstStyle/>
+          <a:p>
+            <a:pPr algn="ctr"/>
+            <a:r>
+              <a:rPr lang="en-US" dirty="0" smtClean="0"/>
+              <a:t>Use Case Diagram</a:t>
+            </a:r>
+            <a:endParaRPr lang="en-US" dirty="0"/>
+          </a:p>
+        </p:txBody>
+      </p:sp>
+      <p:sp>
+        <p:nvSpPr>
+          <p:cNvPr id="4" name="Slide Number Placeholder 3"/>
+          <p:cNvSpPr>
+            <a:spLocks noGrp="1"/>
+          </p:cNvSpPr>
+          <p:nvPr>
+            <p:ph type="sldNum" sz="quarter" idx="12"/>
+          </p:nvPr>
+        </p:nvSpPr>
+        <p:spPr/>
+        <p:txBody>
+          <a:bodyPr/>
+          <a:lstStyle/>
+          <a:p>
+            <a:fld id="{85816456-AF90-4826-9770-6E0598D9C364}" type="slidenum">
+              <a:rPr lang="en-US" smtClean="0"/>
+              <a:t>11</a:t>
+            </a:fld>
+            <a:endParaRPr lang="en-US" dirty="0"/>
+          </a:p>
+        </p:txBody>
+      </p:sp>
+      <p:pic>
+        <p:nvPicPr>
+          <p:cNvPr id="2050" name="Picture 2"/>
+          <p:cNvPicPr>
+            <a:picLocks noGrp="1" noChangeAspect="1" noChangeArrowheads="1"/>
+          </p:cNvPicPr>
+          <p:nvPr>
+            <p:ph idx="1"/>
+          </p:nvPr>
+        </p:nvPicPr>
+        <p:blipFill>
+          <a:blip r:embed="rId3">
+            <a:extLst>
+              <a:ext uri="{28A0092B-C50C-407E-A947-70E740481C1C}">
+                <a14:useLocalDpi xmlns:a14="http://schemas.microsoft.com/office/drawing/2010/main" val="0"/>
+              </a:ext>
+            </a:extLst>
+          </a:blip>
+          <a:srcRect/>
+          <a:stretch>
+            <a:fillRect/>
+          </a:stretch>
+        </p:blipFill>
+        <p:spPr bwMode="auto">
+          <a:xfrm>
+            <a:off x="1219200" y="1371600"/>
+            <a:ext cx="6762565" cy="3962400"/>
+          </a:xfrm>
+          <a:prstGeom prst="rect">
+            <a:avLst/>
+          </a:prstGeom>
+          <a:noFill/>
+          <a:ln>
+            <a:noFill/>
+          </a:ln>
+          <a:effectLst/>
+          <a:extLst>
+            <a:ext uri="{909E8E84-426E-40DD-AFC4-6F175D3DCCD1}">
+              <a14:hiddenFill xmlns:a14="http://schemas.microsoft.com/office/drawing/2010/main">
+                <a:solidFill>
+                  <a:schemeClr val="accent1"/>
+                </a:solidFill>
+              </a14:hiddenFill>
+            </a:ext>
+            <a:ext uri="{91240B29-F687-4F45-9708-019B960494DF}">
+              <a14:hiddenLine xmlns:a14="http://schemas.microsoft.com/office/drawing/2010/main" w="9525">
+                <a:solidFill>
+                  <a:schemeClr val="tx1"/>
+                </a:solidFill>
+                <a:miter lim="800000"/>
+                <a:headEnd/>
+                <a:tailEnd/>
+              </a14:hiddenLine>
+            </a:ext>
+            <a:ext uri="{AF507438-7753-43E0-B8FC-AC1667EBCBE1}">
+              <a14:hiddenEffects xmlns:a14="http://schemas.microsoft.com/office/drawing/2010/main">
+                <a:effectLst>
+                  <a:outerShdw dist="35921" dir="2700000" algn="ctr" rotWithShape="0">
+                    <a:schemeClr val="bg2"/>
+                  </a:outerShdw>
+                </a:effectLst>
+              </a14:hiddenEffects>
+            </a:ext>
+          </a:extLst>
+        </p:spPr>
+      </p:pic>
+      <p:sp>
+        <p:nvSpPr>
+          <p:cNvPr id="6" name="TextBox 5"/>
+          <p:cNvSpPr txBox="1"/>
+          <p:nvPr/>
+        </p:nvSpPr>
+        <p:spPr>
+          <a:xfrm>
+            <a:off x="1219200" y="5638800"/>
+            <a:ext cx="6858000" cy="646331"/>
+          </a:xfrm>
+          <a:prstGeom prst="rect">
+            <a:avLst/>
+          </a:prstGeom>
+          <a:noFill/>
+        </p:spPr>
+        <p:txBody>
+          <a:bodyPr wrap="square" rtlCol="0">
+            <a:spAutoFit/>
+          </a:bodyPr>
+          <a:lstStyle/>
+          <a:p>
+            <a:r>
+              <a:rPr lang="en-US" dirty="0" smtClean="0"/>
+              <a:t>This use case diagram depicts the different user account types and what they have access to within the SEMRS system. </a:t>
+            </a:r>
+            <a:endParaRPr lang="en-US" dirty="0"/>
+          </a:p>
+        </p:txBody>
+      </p:sp>
+    </p:spTree>
+    <p:extLst>
+      <p:ext uri="{BB962C8B-B14F-4D97-AF65-F5344CB8AC3E}">
+        <p14:creationId xmlns:p14="http://schemas.microsoft.com/office/powerpoint/2010/main" val="1891132232"/>
+      </p:ext>
+    </p:extLst>
+  </p:cSld>
+  <p:clrMapOvr>
+    <a:masterClrMapping/>
+  </p:clrMapOvr>
+  <p:timing>
+    <p:tnLst>
+      <p:par>
+        <p:cTn id="1" dur="indefinite" restart="never" nodeType="tmRoot"/>
+      </p:par>
+    </p:tnLst>
+  </p:timing>
+</p:sld>
+</file>
+
+<file path=ppt/slides/slide12.xml><?xml version="1.0" encoding="utf-8"?>
+<p:sld xmlns:a="http://schemas.openxmlformats.org/drawingml/2006/main" xmlns:r="http://schemas.openxmlformats.org/officeDocument/2006/relationships" xmlns:p="http://schemas.openxmlformats.org/presentationml/2006/main">
+  <p:cSld>
+    <p:spTree>
+      <p:nvGrpSpPr>
+        <p:cNvPr id="1" name=""/>
+        <p:cNvGrpSpPr/>
+        <p:nvPr/>
+      </p:nvGrpSpPr>
+      <p:grpSpPr>
+        <a:xfrm>
+          <a:off x="0" y="0"/>
+          <a:ext cx="0" cy="0"/>
+          <a:chOff x="0" y="0"/>
+          <a:chExt cx="0" cy="0"/>
+        </a:xfrm>
+      </p:grpSpPr>
+      <p:sp>
+        <p:nvSpPr>
+          <p:cNvPr id="2" name="Title 1"/>
+          <p:cNvSpPr>
+            <a:spLocks noGrp="1"/>
+          </p:cNvSpPr>
+          <p:nvPr>
+            <p:ph type="title"/>
+          </p:nvPr>
+        </p:nvSpPr>
+        <p:spPr>
+          <a:xfrm>
+            <a:off x="0" y="381000"/>
+            <a:ext cx="8458200" cy="793812"/>
+          </a:xfrm>
+        </p:spPr>
+        <p:txBody>
+          <a:bodyPr>
+            <a:normAutofit/>
+          </a:bodyPr>
+          <a:lstStyle/>
+          <a:p>
+            <a:pPr algn="ctr"/>
+            <a:r>
+              <a:rPr lang="en-US" dirty="0" smtClean="0"/>
+              <a:t>Future Work</a:t>
+            </a:r>
+            <a:endParaRPr lang="en-US" dirty="0"/>
+          </a:p>
+        </p:txBody>
+      </p:sp>
+      <p:sp>
+        <p:nvSpPr>
+          <p:cNvPr id="3" name="Content Placeholder 2"/>
+          <p:cNvSpPr>
+            <a:spLocks noGrp="1"/>
+          </p:cNvSpPr>
+          <p:nvPr>
+            <p:ph idx="1"/>
+          </p:nvPr>
+        </p:nvSpPr>
+        <p:spPr>
+          <a:xfrm>
+            <a:off x="914400" y="1752600"/>
+            <a:ext cx="7391400" cy="4556761"/>
+          </a:xfrm>
+        </p:spPr>
+        <p:txBody>
+          <a:bodyPr>
+            <a:normAutofit/>
+          </a:bodyPr>
+          <a:lstStyle/>
+          <a:p>
+            <a:pPr>
+              <a:lnSpc>
+                <a:spcPct val="200000"/>
+              </a:lnSpc>
+            </a:pPr>
+            <a:r>
+              <a:rPr lang="en-US" sz="2800" dirty="0" smtClean="0"/>
+              <a:t>Ability to upload Patient files</a:t>
+            </a:r>
+            <a:endParaRPr lang="en-US" sz="2800" dirty="0" smtClean="0"/>
+          </a:p>
+          <a:p>
+            <a:pPr>
+              <a:lnSpc>
+                <a:spcPct val="200000"/>
+              </a:lnSpc>
+            </a:pPr>
+            <a:endParaRPr lang="en-US" sz="2800" dirty="0" smtClean="0"/>
+          </a:p>
+          <a:p>
+            <a:pPr>
+              <a:lnSpc>
+                <a:spcPct val="200000"/>
+              </a:lnSpc>
+            </a:pPr>
+            <a:endParaRPr lang="en-US" sz="2800" dirty="0" smtClean="0"/>
+          </a:p>
+        </p:txBody>
+      </p:sp>
+      <p:sp>
+        <p:nvSpPr>
+          <p:cNvPr id="7" name="Slide Number Placeholder 6"/>
+          <p:cNvSpPr>
+            <a:spLocks noGrp="1"/>
+          </p:cNvSpPr>
+          <p:nvPr>
+            <p:ph type="sldNum" sz="quarter" idx="12"/>
+          </p:nvPr>
+        </p:nvSpPr>
+        <p:spPr/>
+        <p:txBody>
+          <a:bodyPr/>
+          <a:lstStyle/>
+          <a:p>
+            <a:fld id="{85816456-AF90-4826-9770-6E0598D9C364}" type="slidenum">
+              <a:rPr lang="en-US" smtClean="0"/>
+              <a:t>12</a:t>
+            </a:fld>
+            <a:endParaRPr lang="en-US" dirty="0"/>
+          </a:p>
+        </p:txBody>
+      </p:sp>
+    </p:spTree>
+    <p:extLst>
+      <p:ext uri="{BB962C8B-B14F-4D97-AF65-F5344CB8AC3E}">
+        <p14:creationId xmlns:p14="http://schemas.microsoft.com/office/powerpoint/2010/main" val="3200271559"/>
+      </p:ext>
+    </p:extLst>
+  </p:cSld>
+  <p:clrMapOvr>
+    <a:masterClrMapping/>
+  </p:clrMapOvr>
+  <p:timing>
+    <p:tnLst>
+      <p:par>
+        <p:cTn id="1" dur="indefinite" restart="never" nodeType="tmRoot"/>
+      </p:par>
+    </p:tnLst>
+  </p:timing>
+</p:sld>
+</file>
+
+<file path=ppt/slides/slide13.xml><?xml version="1.0" encoding="utf-8"?>
+<p:sld xmlns:a="http://schemas.openxmlformats.org/drawingml/2006/main" xmlns:r="http://schemas.openxmlformats.org/officeDocument/2006/relationships" xmlns:p="http://schemas.openxmlformats.org/presentationml/2006/main">
+  <p:cSld>
+    <p:spTree>
+      <p:nvGrpSpPr>
+        <p:cNvPr id="1" name=""/>
+        <p:cNvGrpSpPr/>
+        <p:nvPr/>
+      </p:nvGrpSpPr>
+      <p:grpSpPr>
+        <a:xfrm>
+          <a:off x="0" y="0"/>
+          <a:ext cx="0" cy="0"/>
+          <a:chOff x="0" y="0"/>
+          <a:chExt cx="0" cy="0"/>
+        </a:xfrm>
+      </p:grpSpPr>
+      <p:sp>
+        <p:nvSpPr>
+          <p:cNvPr id="2" name="Title 1"/>
+          <p:cNvSpPr>
+            <a:spLocks noGrp="1"/>
+          </p:cNvSpPr>
+          <p:nvPr>
+            <p:ph type="title"/>
+          </p:nvPr>
+        </p:nvSpPr>
+        <p:spPr>
+          <a:xfrm>
             <a:off x="0" y="0"/>
             <a:ext cx="9144000" cy="6858000"/>
           </a:xfrm>
@@ -4977,7 +5830,7 @@
           <a:p>
             <a:fld id="{85816456-AF90-4826-9770-6E0598D9C364}" type="slidenum">
               <a:rPr lang="en-US" smtClean="0"/>
-              <a:t>10</a:t>
+              <a:t>13</a:t>
             </a:fld>
             <a:endParaRPr lang="en-US" dirty="0"/>
           </a:p>
@@ -5032,20 +5885,18 @@
         </p:nvSpPr>
         <p:spPr>
           <a:xfrm>
-            <a:off x="0" y="533400"/>
-            <a:ext cx="8458200" cy="641412"/>
+            <a:off x="914400" y="152400"/>
+            <a:ext cx="7315200" cy="1154097"/>
           </a:xfrm>
         </p:spPr>
         <p:txBody>
-          <a:bodyPr>
-            <a:normAutofit fontScale="90000"/>
-          </a:bodyPr>
+          <a:bodyPr/>
           <a:lstStyle/>
           <a:p>
             <a:pPr algn="ctr"/>
             <a:r>
               <a:rPr lang="en-US" dirty="0" smtClean="0"/>
-              <a:t>Project Focus</a:t>
+              <a:t>Problem Statement</a:t>
             </a:r>
             <a:endParaRPr lang="en-US" dirty="0"/>
           </a:p>
@@ -5063,97 +5914,68 @@
         </p:nvSpPr>
         <p:spPr>
           <a:xfrm>
-            <a:off x="914400" y="1295401"/>
-            <a:ext cx="7315200" cy="5013960"/>
+            <a:off x="914400" y="1828800"/>
+            <a:ext cx="7315200" cy="3539527"/>
           </a:xfrm>
         </p:spPr>
         <p:txBody>
-          <a:bodyPr>
-            <a:normAutofit fontScale="92500"/>
-          </a:bodyPr>
-          <a:lstStyle/>
-          <a:p>
-            <a:r>
-              <a:rPr lang="en-US" sz="2800" dirty="0" smtClean="0"/>
-              <a:t>HIPAA</a:t>
-            </a:r>
-          </a:p>
-          <a:p>
-            <a:pPr lvl="1"/>
-            <a:r>
-              <a:rPr lang="en-US" sz="2400" dirty="0" smtClean="0"/>
-              <a:t>Encrypting all patient data using </a:t>
-            </a:r>
-            <a:r>
-              <a:rPr lang="en-US" sz="2400" dirty="0" err="1" smtClean="0"/>
-              <a:t>OpenSSL</a:t>
-            </a:r>
-            <a:r>
-              <a:rPr lang="en-US" sz="2400" dirty="0" smtClean="0"/>
-              <a:t> key pairs</a:t>
-            </a:r>
-          </a:p>
-          <a:p>
-            <a:r>
-              <a:rPr lang="en-US" sz="2800" dirty="0" smtClean="0"/>
-              <a:t>Secure connection HTTPS</a:t>
-            </a:r>
-          </a:p>
-          <a:p>
-            <a:pPr lvl="1"/>
-            <a:r>
-              <a:rPr lang="en-US" sz="2400" dirty="0" smtClean="0"/>
-              <a:t>256 bit</a:t>
-            </a:r>
-          </a:p>
-          <a:p>
-            <a:pPr lvl="1"/>
-            <a:r>
-              <a:rPr lang="en-US" sz="2400" dirty="0" smtClean="0"/>
-              <a:t>SHA1 – Message authentication</a:t>
-            </a:r>
-          </a:p>
-          <a:p>
-            <a:pPr lvl="1"/>
-            <a:r>
-              <a:rPr lang="en-US" sz="2400" dirty="0" smtClean="0"/>
-              <a:t>DHE_RSA – Key exchange mechanism</a:t>
-            </a:r>
-          </a:p>
-          <a:p>
-            <a:r>
-              <a:rPr lang="en-US" sz="2800" dirty="0" smtClean="0"/>
-              <a:t>$_SESSION control</a:t>
-            </a:r>
-          </a:p>
-          <a:p>
-            <a:pPr lvl="1"/>
-            <a:r>
-              <a:rPr lang="en-US" sz="2400" dirty="0" smtClean="0"/>
-              <a:t>Automatic logout after 10 minutes inactivity</a:t>
-            </a:r>
-          </a:p>
-          <a:p>
-            <a:r>
-              <a:rPr lang="en-US" sz="2800" dirty="0" smtClean="0"/>
-              <a:t>User </a:t>
-            </a:r>
-            <a:r>
-              <a:rPr lang="en-US" sz="2800" dirty="0"/>
-              <a:t>a</a:t>
-            </a:r>
-            <a:r>
-              <a:rPr lang="en-US" sz="2800" dirty="0" smtClean="0"/>
-              <a:t>ccess control</a:t>
-            </a:r>
-          </a:p>
-          <a:p>
-            <a:pPr lvl="1"/>
-            <a:r>
-              <a:rPr lang="en-US" sz="2600" dirty="0" smtClean="0"/>
-              <a:t>Permissions for certain features are granted based on a user group.</a:t>
-            </a:r>
-            <a:endParaRPr lang="en-US" sz="2600" dirty="0"/>
+          <a:bodyPr/>
+          <a:lstStyle/>
+          <a:p>
+            <a:pPr lvl="1">
+              <a:lnSpc>
+                <a:spcPct val="150000"/>
+              </a:lnSpc>
+            </a:pPr>
+            <a:r>
+              <a:rPr lang="en-US" sz="3000" dirty="0" smtClean="0"/>
+              <a:t>Designed Specifically for MCHC</a:t>
+            </a:r>
+          </a:p>
+          <a:p>
+            <a:pPr lvl="1">
+              <a:lnSpc>
+                <a:spcPct val="150000"/>
+              </a:lnSpc>
+            </a:pPr>
+            <a:r>
+              <a:rPr lang="en-US" sz="3000" dirty="0" smtClean="0"/>
+              <a:t>Loss/Damage to Patient’s files</a:t>
+            </a:r>
+            <a:endParaRPr lang="en-US" sz="3000" dirty="0"/>
+          </a:p>
+          <a:p>
+            <a:pPr lvl="1">
+              <a:lnSpc>
+                <a:spcPct val="150000"/>
+              </a:lnSpc>
+            </a:pPr>
+            <a:r>
+              <a:rPr lang="en-US" sz="3000" dirty="0"/>
+              <a:t>Delay or hinder treatment </a:t>
+            </a:r>
+            <a:r>
+              <a:rPr lang="en-US" sz="3000" dirty="0" smtClean="0"/>
+              <a:t>progress</a:t>
+            </a:r>
+          </a:p>
+          <a:p>
+            <a:pPr lvl="1">
+              <a:lnSpc>
+                <a:spcPct val="150000"/>
+              </a:lnSpc>
+            </a:pPr>
+            <a:r>
+              <a:rPr lang="en-US" sz="3000" dirty="0" smtClean="0"/>
+              <a:t>Issue of identity theft</a:t>
+            </a:r>
+            <a:endParaRPr lang="en-US" sz="3000" dirty="0"/>
+          </a:p>
+          <a:p>
+            <a:pPr marL="45720" indent="0">
+              <a:buNone/>
+            </a:pPr>
+            <a:endParaRPr lang="en-US" dirty="0"/>
           </a:p>
         </p:txBody>
       </p:sp>
@@ -5183,20 +6005,13 @@
     </p:spTree>
     <p:extLst>
       <p:ext uri="{BB962C8B-B14F-4D97-AF65-F5344CB8AC3E}">
-        <p14:creationId xmlns:p14="http://schemas.microsoft.com/office/powerpoint/2010/main" val="3797125041"/>
+        <p14:creationId xmlns:p14="http://schemas.microsoft.com/office/powerpoint/2010/main" val="941291479"/>
       </p:ext>
     </p:extLst>
   </p:cSld>
   <p:clrMapOvr>
     <a:masterClrMapping/>
   </p:clrMapOvr>
-  <p:timing>
-    <p:tnLst>
-      <p:par>
-        <p:cTn id="1" dur="indefinite" restart="never" nodeType="tmRoot"/>
-      </p:par>
-    </p:tnLst>
-  </p:timing>
 </p:sld>
 </file>
 
@@ -5229,6 +6044,172 @@
         </p:nvSpPr>
         <p:spPr>
           <a:xfrm>
+            <a:off x="914400" y="141303"/>
+            <a:ext cx="7315200" cy="1154097"/>
+          </a:xfrm>
+        </p:spPr>
+        <p:txBody>
+          <a:bodyPr/>
+          <a:lstStyle/>
+          <a:p>
+            <a:pPr algn="ctr"/>
+            <a:r>
+              <a:rPr lang="en-US" dirty="0" smtClean="0"/>
+              <a:t>Motivation</a:t>
+            </a:r>
+            <a:endParaRPr lang="en-US" dirty="0"/>
+          </a:p>
+        </p:txBody>
+      </p:sp>
+      <p:sp>
+        <p:nvSpPr>
+          <p:cNvPr id="3" name="Content Placeholder 2"/>
+          <p:cNvSpPr>
+            <a:spLocks noGrp="1"/>
+          </p:cNvSpPr>
+          <p:nvPr>
+            <p:ph idx="1"/>
+          </p:nvPr>
+        </p:nvSpPr>
+        <p:spPr>
+          <a:xfrm>
+            <a:off x="914400" y="1676400"/>
+            <a:ext cx="7315200" cy="4114800"/>
+          </a:xfrm>
+        </p:spPr>
+        <p:txBody>
+          <a:bodyPr>
+            <a:normAutofit lnSpcReduction="10000"/>
+          </a:bodyPr>
+          <a:lstStyle/>
+          <a:p>
+            <a:r>
+              <a:rPr lang="en-US" sz="3200" dirty="0" smtClean="0"/>
+              <a:t>MCHC needs a better medical records system</a:t>
+            </a:r>
+          </a:p>
+          <a:p>
+            <a:r>
+              <a:rPr lang="en-US" sz="3200" dirty="0" smtClean="0"/>
+              <a:t>This system can improve the overall treatment process</a:t>
+            </a:r>
+          </a:p>
+          <a:p>
+            <a:r>
+              <a:rPr lang="en-US" sz="3200" dirty="0" smtClean="0"/>
+              <a:t>Want to provide a system that is: </a:t>
+            </a:r>
+          </a:p>
+          <a:p>
+            <a:pPr marL="45720" indent="0">
+              <a:buNone/>
+            </a:pPr>
+            <a:r>
+              <a:rPr lang="en-US" dirty="0" smtClean="0"/>
+              <a:t>	</a:t>
+            </a:r>
+            <a:r>
+              <a:rPr lang="en-US" sz="2800" dirty="0" smtClean="0"/>
+              <a:t>-Easy to use </a:t>
+            </a:r>
+          </a:p>
+          <a:p>
+            <a:pPr marL="45720" indent="0">
+              <a:buNone/>
+            </a:pPr>
+            <a:r>
+              <a:rPr lang="en-US" sz="2800" dirty="0"/>
+              <a:t>	</a:t>
+            </a:r>
+            <a:r>
+              <a:rPr lang="en-US" sz="2800" dirty="0" smtClean="0"/>
+              <a:t>-Secure </a:t>
+            </a:r>
+          </a:p>
+          <a:p>
+            <a:pPr marL="45720" indent="0">
+              <a:buNone/>
+            </a:pPr>
+            <a:r>
+              <a:rPr lang="en-US" sz="2800" dirty="0"/>
+              <a:t>	</a:t>
+            </a:r>
+            <a:r>
+              <a:rPr lang="en-US" sz="2800" dirty="0" smtClean="0"/>
+              <a:t>-Without unnecessary features</a:t>
+            </a:r>
+            <a:endParaRPr lang="en-US" sz="2800" dirty="0"/>
+          </a:p>
+          <a:p>
+            <a:endParaRPr lang="en-US" dirty="0"/>
+          </a:p>
+        </p:txBody>
+      </p:sp>
+      <p:sp>
+        <p:nvSpPr>
+          <p:cNvPr id="4" name="Slide Number Placeholder 3"/>
+          <p:cNvSpPr>
+            <a:spLocks noGrp="1"/>
+          </p:cNvSpPr>
+          <p:nvPr>
+            <p:ph type="sldNum" sz="quarter" idx="12"/>
+          </p:nvPr>
+        </p:nvSpPr>
+        <p:spPr/>
+        <p:txBody>
+          <a:bodyPr/>
+          <a:lstStyle/>
+          <a:p>
+            <a:fld id="{85816456-AF90-4826-9770-6E0598D9C364}" type="slidenum">
+              <a:rPr lang="en-US" smtClean="0"/>
+              <a:t>3</a:t>
+            </a:fld>
+            <a:endParaRPr lang="en-US" dirty="0"/>
+          </a:p>
+        </p:txBody>
+      </p:sp>
+    </p:spTree>
+    <p:extLst>
+      <p:ext uri="{BB962C8B-B14F-4D97-AF65-F5344CB8AC3E}">
+        <p14:creationId xmlns:p14="http://schemas.microsoft.com/office/powerpoint/2010/main" val="2035189606"/>
+      </p:ext>
+    </p:extLst>
+  </p:cSld>
+  <p:clrMapOvr>
+    <a:masterClrMapping/>
+  </p:clrMapOvr>
+</p:sld>
+</file>
+
+<file path=ppt/slides/slide4.xml><?xml version="1.0" encoding="utf-8"?>
+<p:sld xmlns:a="http://schemas.openxmlformats.org/drawingml/2006/main" xmlns:r="http://schemas.openxmlformats.org/officeDocument/2006/relationships" xmlns:p="http://schemas.openxmlformats.org/presentationml/2006/main">
+  <p:cSld>
+    <p:spTree>
+      <p:nvGrpSpPr>
+        <p:cNvPr id="1" name=""/>
+        <p:cNvGrpSpPr/>
+        <p:nvPr/>
+      </p:nvGrpSpPr>
+      <p:grpSpPr>
+        <a:xfrm>
+          <a:off x="0" y="0"/>
+          <a:ext cx="0" cy="0"/>
+          <a:chOff x="0" y="0"/>
+          <a:chExt cx="0" cy="0"/>
+        </a:xfrm>
+      </p:grpSpPr>
+      <p:sp>
+        <p:nvSpPr>
+          <p:cNvPr id="2" name="Title 1"/>
+          <p:cNvSpPr>
+            <a:spLocks noGrp="1"/>
+          </p:cNvSpPr>
+          <p:nvPr>
+            <p:ph type="title"/>
+          </p:nvPr>
+        </p:nvSpPr>
+        <p:spPr>
+          <a:xfrm>
             <a:off x="27708" y="533400"/>
             <a:ext cx="8430491" cy="634552"/>
           </a:xfrm>
@@ -5354,7 +6335,7 @@
           <a:p>
             <a:fld id="{85816456-AF90-4826-9770-6E0598D9C364}" type="slidenum">
               <a:rPr lang="en-US" smtClean="0"/>
-              <a:t>3</a:t>
+              <a:t>4</a:t>
             </a:fld>
             <a:endParaRPr lang="en-US" dirty="0"/>
           </a:p>
@@ -5380,7 +6361,7 @@
 </p:sld>
 </file>
 
-<file path=ppt/slides/slide4.xml><?xml version="1.0" encoding="utf-8"?>
+<file path=ppt/slides/slide5.xml><?xml version="1.0" encoding="utf-8"?>
 <p:sld xmlns:a="http://schemas.openxmlformats.org/drawingml/2006/main" xmlns:r="http://schemas.openxmlformats.org/officeDocument/2006/relationships" xmlns:p="http://schemas.openxmlformats.org/presentationml/2006/main">
   <p:cSld>
     <p:spTree>
@@ -5542,7 +6523,7 @@
           <a:p>
             <a:fld id="{85816456-AF90-4826-9770-6E0598D9C364}" type="slidenum">
               <a:rPr lang="en-US" smtClean="0"/>
-              <a:t>4</a:t>
+              <a:t>5</a:t>
             </a:fld>
             <a:endParaRPr lang="en-US" dirty="0"/>
           </a:p>
@@ -5552,189 +6533,6 @@
     <p:extLst>
       <p:ext uri="{BB962C8B-B14F-4D97-AF65-F5344CB8AC3E}">
         <p14:creationId xmlns:p14="http://schemas.microsoft.com/office/powerpoint/2010/main" val="2383770867"/>
-      </p:ext>
-    </p:extLst>
-  </p:cSld>
-  <p:clrMapOvr>
-    <a:masterClrMapping/>
-  </p:clrMapOvr>
-  <p:timing>
-    <p:tnLst>
-      <p:par>
-        <p:cTn id="1" dur="indefinite" restart="never" nodeType="tmRoot"/>
-      </p:par>
-    </p:tnLst>
-  </p:timing>
-</p:sld>
-</file>
-
-<file path=ppt/slides/slide5.xml><?xml version="1.0" encoding="utf-8"?>
-<p:sld xmlns:a="http://schemas.openxmlformats.org/drawingml/2006/main" xmlns:r="http://schemas.openxmlformats.org/officeDocument/2006/relationships" xmlns:p="http://schemas.openxmlformats.org/presentationml/2006/main">
-  <p:cSld>
-    <p:spTree>
-      <p:nvGrpSpPr>
-        <p:cNvPr id="1" name=""/>
-        <p:cNvGrpSpPr/>
-        <p:nvPr/>
-      </p:nvGrpSpPr>
-      <p:grpSpPr>
-        <a:xfrm>
-          <a:off x="0" y="0"/>
-          <a:ext cx="0" cy="0"/>
-          <a:chOff x="0" y="0"/>
-          <a:chExt cx="0" cy="0"/>
-        </a:xfrm>
-      </p:grpSpPr>
-      <p:sp>
-        <p:nvSpPr>
-          <p:cNvPr id="2" name="Title 1"/>
-          <p:cNvSpPr>
-            <a:spLocks noGrp="1"/>
-          </p:cNvSpPr>
-          <p:nvPr>
-            <p:ph type="title"/>
-          </p:nvPr>
-        </p:nvSpPr>
-        <p:spPr>
-          <a:xfrm>
-            <a:off x="0" y="457200"/>
-            <a:ext cx="8458200" cy="717612"/>
-          </a:xfrm>
-        </p:spPr>
-        <p:txBody>
-          <a:bodyPr>
-            <a:normAutofit/>
-          </a:bodyPr>
-          <a:lstStyle/>
-          <a:p>
-            <a:pPr algn="ctr"/>
-            <a:r>
-              <a:rPr lang="en-US" dirty="0" smtClean="0"/>
-              <a:t>History of Past EMR Systems</a:t>
-            </a:r>
-            <a:endParaRPr lang="en-US" dirty="0"/>
-          </a:p>
-        </p:txBody>
-      </p:sp>
-      <p:sp>
-        <p:nvSpPr>
-          <p:cNvPr id="3" name="Content Placeholder 2"/>
-          <p:cNvSpPr>
-            <a:spLocks noGrp="1"/>
-          </p:cNvSpPr>
-          <p:nvPr>
-            <p:ph idx="1"/>
-          </p:nvPr>
-        </p:nvSpPr>
-        <p:spPr>
-          <a:xfrm>
-            <a:off x="914400" y="1600201"/>
-            <a:ext cx="7315200" cy="4709160"/>
-          </a:xfrm>
-        </p:spPr>
-        <p:txBody>
-          <a:bodyPr>
-            <a:normAutofit/>
-          </a:bodyPr>
-          <a:lstStyle/>
-          <a:p>
-            <a:pPr>
-              <a:lnSpc>
-                <a:spcPct val="150000"/>
-              </a:lnSpc>
-            </a:pPr>
-            <a:r>
-              <a:rPr lang="en-US" sz="2800" dirty="0" smtClean="0"/>
-              <a:t>Earliest dates back to 1995; </a:t>
-            </a:r>
-            <a:r>
-              <a:rPr lang="en-US" sz="2800" dirty="0" err="1" smtClean="0"/>
-              <a:t>VistA</a:t>
-            </a:r>
-            <a:endParaRPr lang="en-US" sz="2800" dirty="0" smtClean="0"/>
-          </a:p>
-          <a:p>
-            <a:pPr>
-              <a:lnSpc>
-                <a:spcPct val="150000"/>
-              </a:lnSpc>
-            </a:pPr>
-            <a:r>
-              <a:rPr lang="en-US" sz="2800" dirty="0" smtClean="0"/>
-              <a:t>Few web enabled EMR systems:</a:t>
-            </a:r>
-          </a:p>
-          <a:p>
-            <a:pPr lvl="1">
-              <a:lnSpc>
-                <a:spcPct val="150000"/>
-              </a:lnSpc>
-            </a:pPr>
-            <a:r>
-              <a:rPr lang="en-US" sz="2800" dirty="0" smtClean="0"/>
-              <a:t>ZEPRS - 2001</a:t>
-            </a:r>
-          </a:p>
-          <a:p>
-            <a:pPr lvl="1">
-              <a:lnSpc>
-                <a:spcPct val="150000"/>
-              </a:lnSpc>
-            </a:pPr>
-            <a:r>
-              <a:rPr lang="en-US" sz="2600" dirty="0" err="1" smtClean="0"/>
-              <a:t>OpenEMR</a:t>
-            </a:r>
-            <a:r>
-              <a:rPr lang="en-US" sz="2600" dirty="0" smtClean="0"/>
-              <a:t> – 2001</a:t>
-            </a:r>
-          </a:p>
-          <a:p>
-            <a:pPr lvl="1">
-              <a:lnSpc>
-                <a:spcPct val="150000"/>
-              </a:lnSpc>
-            </a:pPr>
-            <a:r>
-              <a:rPr lang="en-US" sz="2400" dirty="0"/>
-              <a:t>THIRRA - </a:t>
-            </a:r>
-            <a:r>
-              <a:rPr lang="en-US" sz="2400" dirty="0" smtClean="0"/>
-              <a:t>2007</a:t>
-            </a:r>
-            <a:endParaRPr lang="en-US" sz="2400" dirty="0"/>
-          </a:p>
-        </p:txBody>
-      </p:sp>
-      <p:sp>
-        <p:nvSpPr>
-          <p:cNvPr id="7" name="Slide Number Placeholder 6"/>
-          <p:cNvSpPr>
-            <a:spLocks noGrp="1"/>
-          </p:cNvSpPr>
-          <p:nvPr>
-            <p:ph type="sldNum" sz="quarter" idx="12"/>
-          </p:nvPr>
-        </p:nvSpPr>
-        <p:spPr/>
-        <p:txBody>
-          <a:bodyPr/>
-          <a:lstStyle/>
-          <a:p>
-            <a:fld id="{85816456-AF90-4826-9770-6E0598D9C364}" type="slidenum">
-              <a:rPr lang="en-US" smtClean="0"/>
-              <a:t>5</a:t>
-            </a:fld>
-            <a:endParaRPr lang="en-US" dirty="0"/>
-          </a:p>
-        </p:txBody>
-      </p:sp>
-    </p:spTree>
-    <p:extLst>
-      <p:ext uri="{BB962C8B-B14F-4D97-AF65-F5344CB8AC3E}">
-        <p14:creationId xmlns:p14="http://schemas.microsoft.com/office/powerpoint/2010/main" val="1664243675"/>
       </p:ext>
     </p:extLst>
   </p:cSld>
@@ -5780,8 +6578,8 @@
         </p:nvSpPr>
         <p:spPr>
           <a:xfrm>
-            <a:off x="0" y="381000"/>
-            <a:ext cx="8458200" cy="793812"/>
+            <a:off x="0" y="457200"/>
+            <a:ext cx="8458200" cy="717612"/>
           </a:xfrm>
         </p:spPr>
         <p:txBody>
@@ -5793,7 +6591,7 @@
             <a:pPr algn="ctr"/>
             <a:r>
               <a:rPr lang="en-US" dirty="0" smtClean="0"/>
-              <a:t>How SEMRS is Different?</a:t>
+              <a:t>History of Past EMR Systems</a:t>
             </a:r>
             <a:endParaRPr lang="en-US" dirty="0"/>
           </a:p>
@@ -5811,8 +6609,8 @@
         </p:nvSpPr>
         <p:spPr>
           <a:xfrm>
-            <a:off x="914400" y="1676400"/>
-            <a:ext cx="7315200" cy="4632961"/>
+            <a:off x="914400" y="1600201"/>
+            <a:ext cx="7315200" cy="4709160"/>
           </a:xfrm>
         </p:spPr>
         <p:txBody>
@@ -5823,44 +6621,71 @@
           <a:p>
             <a:pPr>
               <a:lnSpc>
-                <a:spcPct val="200000"/>
+                <a:spcPct val="150000"/>
               </a:lnSpc>
             </a:pPr>
             <a:r>
               <a:rPr lang="en-US" sz="2800" dirty="0" smtClean="0"/>
-              <a:t>Simply a backup, not meant to replace paper files. </a:t>
-            </a:r>
+              <a:t>Earliest dates back to 1995; </a:t>
+            </a:r>
+            <a:r>
+              <a:rPr lang="en-US" sz="2800" dirty="0" err="1" smtClean="0"/>
+              <a:t>VistA</a:t>
+            </a:r>
+            <a:endParaRPr lang="en-US" sz="2800" dirty="0" smtClean="0"/>
           </a:p>
           <a:p>
             <a:pPr>
               <a:lnSpc>
-                <a:spcPct val="200000"/>
+                <a:spcPct val="150000"/>
               </a:lnSpc>
             </a:pPr>
             <a:r>
               <a:rPr lang="en-US" sz="2800" dirty="0" smtClean="0"/>
-              <a:t>Much simpler than </a:t>
-            </a:r>
-            <a:r>
-              <a:rPr lang="en-US" sz="2800" dirty="0" err="1" smtClean="0"/>
-              <a:t>OpenEMR</a:t>
-            </a:r>
-            <a:r>
-              <a:rPr lang="en-US" sz="2800" dirty="0" smtClean="0"/>
-              <a:t>, took out many unneeded features. </a:t>
-            </a:r>
-          </a:p>
-          <a:p>
-            <a:pPr>
+              <a:t>Few web enabled EMR systems:</a:t>
+            </a:r>
+          </a:p>
+          <a:p>
+            <a:pPr lvl="1">
               <a:lnSpc>
-                <a:spcPct val="200000"/>
+                <a:spcPct val="150000"/>
               </a:lnSpc>
             </a:pPr>
             <a:r>
               <a:rPr lang="en-US" sz="2800" dirty="0" smtClean="0"/>
-              <a:t>Onsite Access through intranet (LAN).</a:t>
-            </a:r>
-            <a:endParaRPr lang="en-US" sz="2800" dirty="0"/>
+              <a:t>ZEPRS - 2001</a:t>
+            </a:r>
+          </a:p>
+          <a:p>
+            <a:pPr lvl="1">
+              <a:lnSpc>
+                <a:spcPct val="150000"/>
+              </a:lnSpc>
+            </a:pPr>
+            <a:r>
+              <a:rPr lang="en-US" sz="2600" dirty="0" err="1" smtClean="0"/>
+              <a:t>OpenEMR</a:t>
+            </a:r>
+            <a:r>
+              <a:rPr lang="en-US" sz="2600" dirty="0" smtClean="0"/>
+              <a:t> – 2001</a:t>
+            </a:r>
+          </a:p>
+          <a:p>
+            <a:pPr lvl="1">
+              <a:lnSpc>
+                <a:spcPct val="150000"/>
+              </a:lnSpc>
+            </a:pPr>
+            <a:r>
+              <a:rPr lang="en-US" sz="2400" dirty="0"/>
+              <a:t>THIRRA - </a:t>
+            </a:r>
+            <a:r>
+              <a:rPr lang="en-US" sz="2400" dirty="0" smtClean="0"/>
+              <a:t>2007</a:t>
+            </a:r>
+            <a:endParaRPr lang="en-US" sz="2400" dirty="0"/>
           </a:p>
         </p:txBody>
       </p:sp>
@@ -5890,7 +6715,7 @@
     </p:spTree>
     <p:extLst>
       <p:ext uri="{BB962C8B-B14F-4D97-AF65-F5344CB8AC3E}">
-        <p14:creationId xmlns:p14="http://schemas.microsoft.com/office/powerpoint/2010/main" val="1669242324"/>
+        <p14:creationId xmlns:p14="http://schemas.microsoft.com/office/powerpoint/2010/main" val="1664243675"/>
       </p:ext>
     </p:extLst>
   </p:cSld>
@@ -6091,20 +6916,18 @@
         </p:nvSpPr>
         <p:spPr>
           <a:xfrm>
-            <a:off x="0" y="457200"/>
-            <a:ext cx="8458200" cy="717612"/>
+            <a:off x="914400" y="76200"/>
+            <a:ext cx="7315200" cy="1154097"/>
           </a:xfrm>
         </p:spPr>
         <p:txBody>
-          <a:bodyPr>
-            <a:normAutofit/>
-          </a:bodyPr>
+          <a:bodyPr/>
           <a:lstStyle/>
           <a:p>
             <a:pPr algn="ctr"/>
             <a:r>
-              <a:rPr lang="en-US" dirty="0" smtClean="0"/>
-              <a:t>Where We are Today</a:t>
+              <a:rPr lang="en-US" dirty="0" err="1" smtClean="0"/>
+              <a:t>OpenEMR</a:t>
             </a:r>
             <a:endParaRPr lang="en-US" dirty="0"/>
           </a:p>
@@ -6122,103 +6945,44 @@
         </p:nvSpPr>
         <p:spPr>
           <a:xfrm>
-            <a:off x="914400" y="1600200"/>
-            <a:ext cx="7315200" cy="4709161"/>
+            <a:off x="914400" y="5568696"/>
+            <a:ext cx="7315200" cy="740664"/>
           </a:xfrm>
         </p:spPr>
         <p:txBody>
-          <a:bodyPr>
-            <a:normAutofit fontScale="92500" lnSpcReduction="10000"/>
-          </a:bodyPr>
-          <a:lstStyle/>
-          <a:p>
-            <a:pPr>
-              <a:lnSpc>
-                <a:spcPct val="200000"/>
-              </a:lnSpc>
+          <a:bodyPr/>
+          <a:lstStyle/>
+          <a:p>
+            <a:pPr marL="45720" indent="0" algn="ctr">
+              <a:buNone/>
             </a:pPr>
             <a:r>
-              <a:rPr lang="en-US" sz="2800" dirty="0" smtClean="0"/>
-              <a:t>Successfully </a:t>
-            </a:r>
-            <a:r>
-              <a:rPr lang="en-US" sz="2800" dirty="0"/>
-              <a:t>l</a:t>
-            </a:r>
-            <a:r>
-              <a:rPr lang="en-US" sz="2800" dirty="0" smtClean="0"/>
-              <a:t>ogin as:</a:t>
-            </a:r>
-          </a:p>
-          <a:p>
-            <a:pPr lvl="1">
-              <a:lnSpc>
-                <a:spcPct val="200000"/>
-              </a:lnSpc>
-            </a:pPr>
-            <a:r>
-              <a:rPr lang="en-US" sz="2600" dirty="0" smtClean="0"/>
-              <a:t>Administrator</a:t>
-            </a:r>
-          </a:p>
-          <a:p>
-            <a:pPr lvl="2">
-              <a:lnSpc>
-                <a:spcPct val="200000"/>
-              </a:lnSpc>
-            </a:pPr>
-            <a:r>
-              <a:rPr lang="en-US" sz="2400" dirty="0" smtClean="0"/>
-              <a:t>Add users</a:t>
-            </a:r>
-          </a:p>
-          <a:p>
-            <a:pPr lvl="1">
-              <a:lnSpc>
-                <a:spcPct val="200000"/>
-              </a:lnSpc>
-            </a:pPr>
-            <a:r>
-              <a:rPr lang="en-US" sz="2600" dirty="0" smtClean="0"/>
-              <a:t>Physician</a:t>
-            </a:r>
-            <a:endParaRPr lang="en-US" sz="2600" dirty="0"/>
-          </a:p>
-          <a:p>
-            <a:pPr lvl="2">
-              <a:lnSpc>
-                <a:spcPct val="200000"/>
-              </a:lnSpc>
-            </a:pPr>
-            <a:r>
-              <a:rPr lang="en-US" sz="2400" dirty="0" smtClean="0"/>
-              <a:t>Add patients</a:t>
-            </a:r>
-          </a:p>
-          <a:p>
-            <a:pPr>
-              <a:lnSpc>
-                <a:spcPct val="200000"/>
-              </a:lnSpc>
-            </a:pPr>
-            <a:r>
-              <a:rPr lang="en-US" sz="2800" dirty="0" smtClean="0"/>
-              <a:t>Search </a:t>
-            </a:r>
-            <a:r>
-              <a:rPr lang="en-US" sz="2800" dirty="0"/>
-              <a:t>p</a:t>
-            </a:r>
-            <a:r>
-              <a:rPr lang="en-US" sz="2800" dirty="0" smtClean="0"/>
-              <a:t>atients.</a:t>
-            </a:r>
-          </a:p>
-        </p:txBody>
-      </p:sp>
-      <p:sp>
-        <p:nvSpPr>
-          <p:cNvPr id="7" name="Slide Number Placeholder 6"/>
+              <a:rPr lang="en-US" dirty="0" smtClean="0"/>
+              <a:t>A screenshot of </a:t>
+            </a:r>
+            <a:r>
+              <a:rPr lang="en-US" dirty="0" err="1" smtClean="0"/>
+              <a:t>OpenEMR’s</a:t>
+            </a:r>
+            <a:r>
+              <a:rPr lang="en-US" dirty="0" smtClean="0"/>
+              <a:t> </a:t>
+            </a:r>
+            <a:r>
+              <a:rPr lang="en-US" dirty="0" err="1" smtClean="0"/>
+              <a:t>mainscreen</a:t>
+            </a:r>
+            <a:r>
+              <a:rPr lang="en-US" dirty="0" smtClean="0"/>
+              <a:t>. </a:t>
+            </a:r>
+            <a:endParaRPr lang="en-US" dirty="0"/>
+          </a:p>
+        </p:txBody>
+      </p:sp>
+      <p:sp>
+        <p:nvSpPr>
+          <p:cNvPr id="4" name="Slide Number Placeholder 3"/>
           <p:cNvSpPr>
             <a:spLocks noGrp="1"/>
           </p:cNvSpPr>
@@ -6239,10 +7003,74 @@
           </a:p>
         </p:txBody>
       </p:sp>
+      <p:pic>
+        <p:nvPicPr>
+          <p:cNvPr id="3074" name="Picture 2"/>
+          <p:cNvPicPr>
+            <a:picLocks noChangeAspect="1" noChangeArrowheads="1"/>
+          </p:cNvPicPr>
+          <p:nvPr/>
+        </p:nvPicPr>
+        <p:blipFill>
+          <a:blip r:embed="rId3">
+            <a:extLst>
+              <a:ext uri="{28A0092B-C50C-407E-A947-70E740481C1C}">
+                <a14:useLocalDpi xmlns:a14="http://schemas.microsoft.com/office/drawing/2010/main" val="0"/>
+              </a:ext>
+            </a:extLst>
+          </a:blip>
+          <a:srcRect/>
+          <a:stretch>
+            <a:fillRect/>
+          </a:stretch>
+        </p:blipFill>
+        <p:spPr bwMode="auto">
+          <a:xfrm>
+            <a:off x="685800" y="1600200"/>
+            <a:ext cx="7848600" cy="3968496"/>
+          </a:xfrm>
+          <a:prstGeom prst="rect">
+            <a:avLst/>
+          </a:prstGeom>
+          <a:noFill/>
+          <a:ln>
+            <a:noFill/>
+          </a:ln>
+          <a:effectLst/>
+          <a:extLst>
+            <a:ext uri="{909E8E84-426E-40DD-AFC4-6F175D3DCCD1}">
+              <a14:hiddenFill xmlns:a14="http://schemas.microsoft.com/office/drawing/2010/main">
+                <a:solidFill>
+                  <a:schemeClr val="accent1"/>
+                </a:solidFill>
+              </a14:hiddenFill>
+            </a:ext>
+            <a:ext uri="{91240B29-F687-4F45-9708-019B960494DF}">
+              <a14:hiddenLine xmlns:a14="http://schemas.microsoft.com/office/drawing/2010/main" w="9525">
+                <a:solidFill>
+                  <a:schemeClr val="tx1"/>
+                </a:solidFill>
+                <a:miter lim="800000"/>
+                <a:headEnd/>
+                <a:tailEnd/>
+              </a14:hiddenLine>
+            </a:ext>
+            <a:ext uri="{AF507438-7753-43E0-B8FC-AC1667EBCBE1}">
+              <a14:hiddenEffects xmlns:a14="http://schemas.microsoft.com/office/drawing/2010/main">
+                <a:effectLst>
+                  <a:outerShdw dist="35921" dir="2700000" algn="ctr" rotWithShape="0">
+                    <a:schemeClr val="bg2"/>
+                  </a:outerShdw>
+                </a:effectLst>
+              </a14:hiddenEffects>
+            </a:ext>
+          </a:extLst>
+        </p:spPr>
+      </p:pic>
     </p:spTree>
     <p:extLst>
       <p:ext uri="{BB962C8B-B14F-4D97-AF65-F5344CB8AC3E}">
-        <p14:creationId xmlns:p14="http://schemas.microsoft.com/office/powerpoint/2010/main" val="387050783"/>
+        <p14:creationId xmlns:p14="http://schemas.microsoft.com/office/powerpoint/2010/main" val="1425691774"/>
       </p:ext>
     </p:extLst>
   </p:cSld>
@@ -6301,7 +7129,7 @@
             <a:pPr algn="ctr"/>
             <a:r>
               <a:rPr lang="en-US" dirty="0" smtClean="0"/>
-              <a:t>What Still Needs to be Done </a:t>
+              <a:t>Solution</a:t>
             </a:r>
             <a:endParaRPr lang="en-US" dirty="0"/>
           </a:p>
@@ -6319,13 +7147,13 @@
         </p:nvSpPr>
         <p:spPr>
           <a:xfrm>
-            <a:off x="914400" y="1752600"/>
-            <a:ext cx="7391400" cy="4556761"/>
+            <a:off x="914400" y="1676400"/>
+            <a:ext cx="7315200" cy="4632961"/>
           </a:xfrm>
         </p:spPr>
         <p:txBody>
           <a:bodyPr>
-            <a:normAutofit lnSpcReduction="10000"/>
+            <a:normAutofit/>
           </a:bodyPr>
           <a:lstStyle/>
           <a:p>
@@ -6336,7 +7164,27 @@
             </a:pPr>
             <a:r>
               <a:rPr lang="en-US" sz="2800" dirty="0" smtClean="0"/>
-              <a:t>Successful Login for all User Account types.</a:t>
+              <a:t>Much </a:t>
+            </a:r>
+            <a:r>
+              <a:rPr lang="en-US" sz="2800" dirty="0" smtClean="0"/>
+              <a:t>simpler than </a:t>
+            </a:r>
+            <a:r>
+              <a:rPr lang="en-US" sz="2800" dirty="0" err="1" smtClean="0"/>
+              <a:t>OpenEMR</a:t>
+            </a:r>
+            <a:r>
+              <a:rPr lang="en-US" sz="2800" dirty="0" smtClean="0"/>
+              <a:t>, </a:t>
+            </a:r>
+            <a:r>
+              <a:rPr lang="en-US" sz="2800" dirty="0" smtClean="0"/>
+              <a:t>removed </a:t>
+            </a:r>
+            <a:r>
+              <a:rPr lang="en-US" sz="2800" dirty="0" smtClean="0"/>
+              <a:t>many unneeded features. </a:t>
             </a:r>
           </a:p>
           <a:p>
@@ -6346,12 +7194,12 @@
               </a:lnSpc>
             </a:pPr>
             <a:r>
-              <a:rPr lang="en-US" sz="2800" dirty="0"/>
-              <a:t>Encrypting information in database</a:t>
-            </a:r>
-            <a:r>
               <a:rPr lang="en-US" sz="2800" dirty="0" smtClean="0"/>
-              <a:t>.</a:t>
+              <a:t>Onsite Access through intranet (LAN</a:t>
+            </a:r>
+            <a:r>
+              <a:rPr lang="en-US" sz="2800" dirty="0" smtClean="0"/>
+              <a:t>).</a:t>
             </a:r>
           </a:p>
           <a:p>
@@ -6362,49 +7210,38 @@
             </a:pPr>
             <a:r>
               <a:rPr lang="en-US" sz="2800" dirty="0" smtClean="0"/>
-              <a:t>Associate images </a:t>
-            </a:r>
-            <a:r>
-              <a:rPr lang="en-US" sz="2800" dirty="0"/>
-              <a:t>with </a:t>
-            </a:r>
-            <a:r>
-              <a:rPr lang="en-US" sz="2800" dirty="0" smtClean="0"/>
-              <a:t>patients by storing patient </a:t>
-            </a:r>
-            <a:r>
-              <a:rPr lang="en-US" sz="2800" dirty="0"/>
-              <a:t>photos on server file system</a:t>
-            </a:r>
-            <a:r>
-              <a:rPr lang="en-US" sz="2800" dirty="0" smtClean="0"/>
-              <a:t>.</a:t>
-            </a:r>
-          </a:p>
-          <a:p>
-            <a:pPr>
-              <a:lnSpc>
-                <a:spcPct val="200000"/>
-              </a:lnSpc>
-            </a:pPr>
-            <a:r>
-              <a:rPr lang="en-US" sz="2800" dirty="0" smtClean="0"/>
-              <a:t>Audit (Log) Table.</a:t>
-            </a:r>
-          </a:p>
-          <a:p>
-            <a:pPr>
-              <a:lnSpc>
-                <a:spcPct val="200000"/>
-              </a:lnSpc>
-            </a:pPr>
-            <a:endParaRPr lang="en-US" sz="2800" dirty="0" smtClean="0"/>
+              <a:t>SSL Encryption </a:t>
+            </a:r>
+            <a:endParaRPr lang="en-US" sz="2800" dirty="0"/>
+          </a:p>
+        </p:txBody>
+      </p:sp>
+      <p:sp>
+        <p:nvSpPr>
+          <p:cNvPr id="7" name="Slide Number Placeholder 6"/>
+          <p:cNvSpPr>
+            <a:spLocks noGrp="1"/>
+          </p:cNvSpPr>
+          <p:nvPr>
+            <p:ph type="sldNum" sz="quarter" idx="12"/>
+          </p:nvPr>
+        </p:nvSpPr>
+        <p:spPr/>
+        <p:txBody>
+          <a:bodyPr/>
+          <a:lstStyle/>
+          <a:p>
+            <a:fld id="{85816456-AF90-4826-9770-6E0598D9C364}" type="slidenum">
+              <a:rPr lang="en-US" smtClean="0"/>
+              <a:t>9</a:t>
+            </a:fld>
+            <a:endParaRPr lang="en-US" dirty="0"/>
           </a:p>
         </p:txBody>
       </p:sp>
       <p:pic>
         <p:nvPicPr>
-          <p:cNvPr id="8" name="Picture 7"/>
+          <p:cNvPr id="5" name="Picture 4"/>
           <p:cNvPicPr>
             <a:picLocks noChangeAspect="1"/>
           </p:cNvPicPr>
@@ -6432,33 +7269,10 @@
           </a:prstGeom>
         </p:spPr>
       </p:pic>
-      <p:sp>
-        <p:nvSpPr>
-          <p:cNvPr id="7" name="Slide Number Placeholder 6"/>
-          <p:cNvSpPr>
-            <a:spLocks noGrp="1"/>
-          </p:cNvSpPr>
-          <p:nvPr>
-            <p:ph type="sldNum" sz="quarter" idx="12"/>
-          </p:nvPr>
-        </p:nvSpPr>
-        <p:spPr/>
-        <p:txBody>
-          <a:bodyPr/>
-          <a:lstStyle/>
-          <a:p>
-            <a:fld id="{85816456-AF90-4826-9770-6E0598D9C364}" type="slidenum">
-              <a:rPr lang="en-US" smtClean="0"/>
-              <a:t>9</a:t>
-            </a:fld>
-            <a:endParaRPr lang="en-US" dirty="0"/>
-          </a:p>
-        </p:txBody>
-      </p:sp>
     </p:spTree>
     <p:extLst>
       <p:ext uri="{BB962C8B-B14F-4D97-AF65-F5344CB8AC3E}">
-        <p14:creationId xmlns:p14="http://schemas.microsoft.com/office/powerpoint/2010/main" val="3200271559"/>
+        <p14:creationId xmlns:p14="http://schemas.microsoft.com/office/powerpoint/2010/main" val="1669242324"/>
       </p:ext>
     </p:extLst>
   </p:cSld>

</xml_diff>

<commit_message>
Updated final ppt and abstract
</commit_message>
<xml_diff>
--- a/Documentation/Final_Presentation.pptx
+++ b/Documentation/Final_Presentation.pptx
@@ -5,22 +5,21 @@
     <p:sldMasterId id="2147483672" r:id="rId1"/>
   </p:sldMasterIdLst>
   <p:notesMasterIdLst>
-    <p:notesMasterId r:id="rId15"/>
+    <p:notesMasterId r:id="rId14"/>
   </p:notesMasterIdLst>
   <p:sldIdLst>
     <p:sldId id="256" r:id="rId2"/>
     <p:sldId id="265" r:id="rId3"/>
     <p:sldId id="266" r:id="rId4"/>
-    <p:sldId id="257" r:id="rId5"/>
+    <p:sldId id="259" r:id="rId5"/>
     <p:sldId id="258" r:id="rId6"/>
-    <p:sldId id="259" r:id="rId7"/>
-    <p:sldId id="261" r:id="rId8"/>
-    <p:sldId id="269" r:id="rId9"/>
-    <p:sldId id="260" r:id="rId10"/>
-    <p:sldId id="267" r:id="rId11"/>
-    <p:sldId id="268" r:id="rId12"/>
-    <p:sldId id="263" r:id="rId13"/>
-    <p:sldId id="264" r:id="rId14"/>
+    <p:sldId id="260" r:id="rId7"/>
+    <p:sldId id="267" r:id="rId8"/>
+    <p:sldId id="268" r:id="rId9"/>
+    <p:sldId id="263" r:id="rId10"/>
+    <p:sldId id="261" r:id="rId11"/>
+    <p:sldId id="269" r:id="rId12"/>
+    <p:sldId id="264" r:id="rId13"/>
   </p:sldIdLst>
   <p:sldSz cx="9144000" cy="6858000" type="screen4x3"/>
   <p:notesSz cx="7010400" cy="9296400"/>
@@ -204,7 +203,7 @@
           <a:p>
             <a:fld id="{F8A13CF6-5412-437F-BBE9-70CB654C0E12}" type="datetimeFigureOut">
               <a:rPr lang="en-US" smtClean="0"/>
-              <a:t>5/7/2012</a:t>
+              <a:t>5/8/2012</a:t>
             </a:fld>
             <a:endParaRPr lang="en-US"/>
           </a:p>
@@ -602,8 +601,14 @@
           <a:p>
             <a:r>
               <a:rPr lang="en-US" dirty="0" smtClean="0"/>
-              <a:t>***********May need a re-write on the caption </a:t>
-            </a:r>
+              <a:t>-Too</a:t>
+            </a:r>
+            <a:r>
+              <a:rPr lang="en-US" baseline="0" dirty="0" smtClean="0"/>
+              <a:t> much going on, could be complicated. </a:t>
+            </a:r>
+          </a:p>
+          <a:p>
             <a:endParaRPr lang="en-US" dirty="0"/>
           </a:p>
         </p:txBody>
@@ -634,7 +639,7 @@
     </p:spTree>
     <p:extLst>
       <p:ext uri="{BB962C8B-B14F-4D97-AF65-F5344CB8AC3E}">
-        <p14:creationId xmlns:p14="http://schemas.microsoft.com/office/powerpoint/2010/main" val="717272626"/>
+        <p14:creationId xmlns:p14="http://schemas.microsoft.com/office/powerpoint/2010/main" val="2329334437"/>
       </p:ext>
     </p:extLst>
   </p:cSld>
@@ -688,90 +693,6 @@
           <a:bodyPr/>
           <a:lstStyle/>
           <a:p>
-            <a:endParaRPr lang="en-US" dirty="0"/>
-          </a:p>
-        </p:txBody>
-      </p:sp>
-      <p:sp>
-        <p:nvSpPr>
-          <p:cNvPr id="4" name="Slide Number Placeholder 3"/>
-          <p:cNvSpPr>
-            <a:spLocks noGrp="1"/>
-          </p:cNvSpPr>
-          <p:nvPr>
-            <p:ph type="sldNum" sz="quarter" idx="10"/>
-          </p:nvPr>
-        </p:nvSpPr>
-        <p:spPr/>
-        <p:txBody>
-          <a:bodyPr/>
-          <a:lstStyle/>
-          <a:p>
-            <a:fld id="{6538AC3F-63CE-4DD6-92CD-9B13526C2825}" type="slidenum">
-              <a:rPr lang="en-US" smtClean="0"/>
-              <a:t>12</a:t>
-            </a:fld>
-            <a:endParaRPr lang="en-US"/>
-          </a:p>
-        </p:txBody>
-      </p:sp>
-    </p:spTree>
-    <p:extLst>
-      <p:ext uri="{BB962C8B-B14F-4D97-AF65-F5344CB8AC3E}">
-        <p14:creationId xmlns:p14="http://schemas.microsoft.com/office/powerpoint/2010/main" val="2185386872"/>
-      </p:ext>
-    </p:extLst>
-  </p:cSld>
-  <p:clrMapOvr>
-    <a:masterClrMapping/>
-  </p:clrMapOvr>
-</p:notes>
-</file>
-
-<file path=ppt/notesSlides/notesSlide12.xml><?xml version="1.0" encoding="utf-8"?>
-<p:notes xmlns:a="http://schemas.openxmlformats.org/drawingml/2006/main" xmlns:r="http://schemas.openxmlformats.org/officeDocument/2006/relationships" xmlns:p="http://schemas.openxmlformats.org/presentationml/2006/main">
-  <p:cSld>
-    <p:spTree>
-      <p:nvGrpSpPr>
-        <p:cNvPr id="1" name=""/>
-        <p:cNvGrpSpPr/>
-        <p:nvPr/>
-      </p:nvGrpSpPr>
-      <p:grpSpPr>
-        <a:xfrm>
-          <a:off x="0" y="0"/>
-          <a:ext cx="0" cy="0"/>
-          <a:chOff x="0" y="0"/>
-          <a:chExt cx="0" cy="0"/>
-        </a:xfrm>
-      </p:grpSpPr>
-      <p:sp>
-        <p:nvSpPr>
-          <p:cNvPr id="2" name="Slide Image Placeholder 1"/>
-          <p:cNvSpPr>
-            <a:spLocks noGrp="1" noRot="1" noChangeAspect="1"/>
-          </p:cNvSpPr>
-          <p:nvPr>
-            <p:ph type="sldImg"/>
-          </p:nvPr>
-        </p:nvSpPr>
-        <p:spPr/>
-      </p:sp>
-      <p:sp>
-        <p:nvSpPr>
-          <p:cNvPr id="3" name="Notes Placeholder 2"/>
-          <p:cNvSpPr>
-            <a:spLocks noGrp="1"/>
-          </p:cNvSpPr>
-          <p:nvPr>
-            <p:ph type="body" idx="1"/>
-          </p:nvPr>
-        </p:nvSpPr>
-        <p:spPr/>
-        <p:txBody>
-          <a:bodyPr/>
-          <a:lstStyle/>
-          <a:p>
             <a:pPr defTabSz="931774">
               <a:defRPr/>
             </a:pPr>
@@ -817,7 +738,7 @@
           <a:p>
             <a:fld id="{6538AC3F-63CE-4DD6-92CD-9B13526C2825}" type="slidenum">
               <a:rPr lang="en-US" smtClean="0"/>
-              <a:t>13</a:t>
+              <a:t>12</a:t>
             </a:fld>
             <a:endParaRPr lang="en-US"/>
           </a:p>
@@ -880,6 +801,64 @@
           <a:bodyPr/>
           <a:lstStyle/>
           <a:p>
+            <a:pPr defTabSz="931774">
+              <a:defRPr/>
+            </a:pPr>
+            <a:r>
+              <a:rPr lang="en-US" b="1" dirty="0" smtClean="0"/>
+              <a:t>Why -</a:t>
+            </a:r>
+            <a:r>
+              <a:rPr lang="en-US" dirty="0" smtClean="0"/>
+              <a:t> </a:t>
+            </a:r>
+          </a:p>
+          <a:p>
+            <a:pPr defTabSz="931774">
+              <a:defRPr/>
+            </a:pPr>
+            <a:r>
+              <a:rPr lang="en-US" dirty="0" smtClean="0"/>
+              <a:t>This project is for Mitchells</a:t>
+            </a:r>
+            <a:r>
+              <a:rPr lang="en-US" baseline="0" dirty="0" smtClean="0"/>
+              <a:t> Plain Community H</a:t>
+            </a:r>
+            <a:r>
+              <a:rPr lang="en-US" dirty="0" smtClean="0"/>
+              <a:t>ealthcare</a:t>
+            </a:r>
+            <a:r>
+              <a:rPr lang="en-US" baseline="0" dirty="0" smtClean="0"/>
+              <a:t> </a:t>
+            </a:r>
+            <a:r>
+              <a:rPr lang="en-US" dirty="0" smtClean="0"/>
+              <a:t>Center in Cape</a:t>
+            </a:r>
+            <a:r>
+              <a:rPr lang="en-US" baseline="0" dirty="0" smtClean="0"/>
+              <a:t> Town, South </a:t>
+            </a:r>
+            <a:r>
+              <a:rPr lang="en-US" dirty="0" smtClean="0"/>
+              <a:t>Africa that treats patients for HIV/AIDS. All</a:t>
+            </a:r>
+            <a:r>
+              <a:rPr lang="en-US" baseline="0" dirty="0" smtClean="0"/>
+              <a:t> patients records are currently hard copy only, and patients’ records get displaced and damaged. </a:t>
+            </a:r>
+            <a:r>
+              <a:rPr lang="en-US" dirty="0" smtClean="0"/>
+              <a:t>Ultimately, a “hassle</a:t>
+            </a:r>
+            <a:r>
+              <a:rPr lang="en-US" baseline="0" dirty="0" smtClean="0"/>
+              <a:t> free treatment process”</a:t>
+            </a:r>
+          </a:p>
+          <a:p>
             <a:endParaRPr lang="en-US" dirty="0"/>
           </a:p>
         </p:txBody>
@@ -976,8 +955,46 @@
           <a:p>
             <a:r>
               <a:rPr lang="en-US" baseline="0" dirty="0" smtClean="0"/>
-              <a:t>-Only 2 physicians</a:t>
-            </a:r>
+              <a:t>-Only 2 </a:t>
+            </a:r>
+            <a:r>
+              <a:rPr lang="en-US" baseline="0" dirty="0" smtClean="0"/>
+              <a:t>physicians</a:t>
+            </a:r>
+          </a:p>
+          <a:p>
+            <a:endParaRPr lang="en-US" baseline="0" dirty="0" smtClean="0"/>
+          </a:p>
+          <a:p>
+            <a:r>
+              <a:rPr lang="en-US" b="1" dirty="0" smtClean="0"/>
+              <a:t>What - </a:t>
+            </a:r>
+          </a:p>
+          <a:p>
+            <a:r>
+              <a:rPr lang="en-US" dirty="0" smtClean="0"/>
+              <a:t>Solve the problem of</a:t>
+            </a:r>
+            <a:r>
+              <a:rPr lang="en-US" baseline="0" dirty="0" smtClean="0"/>
+              <a:t> displacement and damage to patients’ files</a:t>
+            </a:r>
+          </a:p>
+          <a:p>
+            <a:r>
+              <a:rPr lang="en-US" baseline="0" dirty="0" smtClean="0"/>
+              <a:t> - Eliminate identity theft</a:t>
+            </a:r>
+          </a:p>
+          <a:p>
+            <a:r>
+              <a:rPr lang="en-US" baseline="0" dirty="0" smtClean="0"/>
+              <a:t> - Ensure patient stays on the right regiment</a:t>
+            </a:r>
+            <a:endParaRPr lang="en-US" dirty="0" smtClean="0"/>
+          </a:p>
+          <a:p>
             <a:endParaRPr lang="en-US" dirty="0"/>
           </a:p>
         </p:txBody>
@@ -1062,126 +1079,280 @@
           <a:bodyPr/>
           <a:lstStyle/>
           <a:p>
-            <a:pPr defTabSz="931774">
-              <a:defRPr/>
-            </a:pPr>
-            <a:r>
-              <a:rPr lang="en-US" b="1" dirty="0" smtClean="0"/>
-              <a:t>Why -</a:t>
-            </a:r>
             <a:r>
               <a:rPr lang="en-US" dirty="0" smtClean="0"/>
-              <a:t> </a:t>
-            </a:r>
-          </a:p>
-          <a:p>
-            <a:pPr defTabSz="931774">
-              <a:defRPr/>
-            </a:pPr>
+              <a:t>****Need Pro’s and Con’s****</a:t>
+            </a:r>
+          </a:p>
+          <a:p>
             <a:r>
               <a:rPr lang="en-US" dirty="0" smtClean="0"/>
-              <a:t>This project is for Mitchells</a:t>
+              <a:t>****table/chart****</a:t>
+            </a:r>
+          </a:p>
+          <a:p>
+            <a:endParaRPr lang="en-US" dirty="0" smtClean="0"/>
+          </a:p>
+          <a:p>
+            <a:r>
+              <a:rPr lang="en-US" dirty="0" smtClean="0"/>
+              <a:t>Background </a:t>
+            </a:r>
+            <a:r>
+              <a:rPr lang="en-US" dirty="0" smtClean="0"/>
+              <a:t>info on </a:t>
+            </a:r>
+          </a:p>
+          <a:p>
+            <a:r>
+              <a:rPr lang="en-US" dirty="0" err="1" smtClean="0"/>
+              <a:t>VistA</a:t>
+            </a:r>
+            <a:r>
+              <a:rPr lang="en-US" dirty="0" smtClean="0"/>
+              <a:t>- Veterans health info systems and technology</a:t>
             </a:r>
             <a:r>
               <a:rPr lang="en-US" baseline="0" dirty="0" smtClean="0"/>
-              <a:t> Plain Community H</a:t>
-            </a:r>
-            <a:r>
-              <a:rPr lang="en-US" dirty="0" smtClean="0"/>
-              <a:t>ealthcare</a:t>
+              <a:t> Architecture </a:t>
+            </a:r>
+          </a:p>
+          <a:p>
+            <a:r>
+              <a:rPr lang="en-US" baseline="0" dirty="0" smtClean="0"/>
+              <a:t>Used throughout the US </a:t>
+            </a:r>
+            <a:r>
+              <a:rPr lang="en-US" baseline="0" dirty="0" err="1" smtClean="0"/>
+              <a:t>Dept</a:t>
+            </a:r>
+            <a:r>
+              <a:rPr lang="en-US" baseline="0" dirty="0" smtClean="0"/>
+              <a:t> of Veteran Affairs </a:t>
+            </a:r>
+          </a:p>
+          <a:p>
+            <a:r>
+              <a:rPr lang="en-US" baseline="0" dirty="0" smtClean="0"/>
+              <a:t>80 different clinical </a:t>
+            </a:r>
+            <a:r>
+              <a:rPr lang="en-US" baseline="0" dirty="0" err="1" smtClean="0"/>
+              <a:t>fxns</a:t>
+            </a:r>
+            <a:r>
+              <a:rPr lang="en-US" baseline="0" dirty="0" smtClean="0"/>
+              <a:t>, including: Mental Health, Blind Rehab, Ambulatory care, Radiology, Pharmaceutical, </a:t>
+            </a:r>
+            <a:r>
+              <a:rPr lang="en-US" baseline="0" dirty="0" err="1" smtClean="0"/>
+              <a:t>etc</a:t>
+            </a:r>
+            <a:r>
+              <a:rPr lang="en-US" baseline="0" dirty="0" smtClean="0"/>
+              <a:t>, </a:t>
+            </a:r>
+            <a:r>
+              <a:rPr lang="en-US" baseline="0" dirty="0" err="1" smtClean="0"/>
+              <a:t>etc</a:t>
             </a:r>
             <a:r>
               <a:rPr lang="en-US" baseline="0" dirty="0" smtClean="0"/>
               <a:t> </a:t>
             </a:r>
             <a:r>
+              <a:rPr lang="en-US" baseline="0" dirty="0" err="1" smtClean="0"/>
+              <a:t>etc</a:t>
+            </a:r>
+            <a:endParaRPr lang="en-US" baseline="0" dirty="0" smtClean="0"/>
+          </a:p>
+          <a:p>
+            <a:r>
+              <a:rPr lang="en-US" baseline="0" dirty="0" smtClean="0"/>
+              <a:t>Software modules for clinical care and financial </a:t>
+            </a:r>
+            <a:r>
+              <a:rPr lang="en-US" baseline="0" dirty="0" err="1" smtClean="0"/>
+              <a:t>fxns</a:t>
+            </a:r>
+            <a:endParaRPr lang="en-US" baseline="0" dirty="0" smtClean="0"/>
+          </a:p>
+          <a:p>
+            <a:r>
+              <a:rPr lang="en-US" baseline="0" dirty="0" smtClean="0"/>
+              <a:t>Currently the largest medical system in the US, provides care to 8 million veterans</a:t>
+            </a:r>
+          </a:p>
+          <a:p>
+            <a:r>
+              <a:rPr lang="en-US" baseline="0" dirty="0" smtClean="0"/>
+              <a:t>Already had automated data processing previously, but added a GUI in 1997. </a:t>
+            </a:r>
+          </a:p>
+          <a:p>
+            <a:r>
+              <a:rPr lang="en-US" baseline="0" dirty="0" smtClean="0"/>
+              <a:t>One of the first client-server architectures, that allowed health care providers to review and update a patient’s electronic medical record</a:t>
+            </a:r>
+            <a:endParaRPr lang="en-US" dirty="0" smtClean="0"/>
+          </a:p>
+          <a:p>
+            <a:endParaRPr lang="en-US" dirty="0" smtClean="0"/>
+          </a:p>
+          <a:p>
+            <a:r>
               <a:rPr lang="en-US" dirty="0" smtClean="0"/>
-              <a:t>Center in Cape</a:t>
-            </a:r>
+              <a:t>THIRRA-  </a:t>
+            </a:r>
+            <a:r>
+              <a:rPr lang="en-US" dirty="0"/>
+              <a:t> project title Portable System </a:t>
+            </a:r>
+            <a:r>
+              <a:rPr lang="en-US" dirty="0" err="1"/>
+              <a:t>for</a:t>
+            </a:r>
+            <a:r>
+              <a:rPr lang="en-US" b="1" dirty="0" err="1"/>
+              <a:t>T</a:t>
+            </a:r>
+            <a:r>
+              <a:rPr lang="en-US" dirty="0" err="1"/>
+              <a:t>eleHealth</a:t>
+            </a:r>
+            <a:r>
+              <a:rPr lang="en-US" dirty="0"/>
+              <a:t> and </a:t>
+            </a:r>
+            <a:r>
+              <a:rPr lang="en-US" b="1" dirty="0"/>
+              <a:t>H</a:t>
+            </a:r>
+            <a:r>
+              <a:rPr lang="en-US" dirty="0"/>
+              <a:t>ealth </a:t>
+            </a:r>
+            <a:r>
+              <a:rPr lang="en-US" b="1" dirty="0"/>
+              <a:t>I</a:t>
+            </a:r>
+            <a:r>
+              <a:rPr lang="en-US" dirty="0"/>
+              <a:t>nformatics for </a:t>
+            </a:r>
+            <a:r>
+              <a:rPr lang="en-US" b="1" dirty="0"/>
+              <a:t>R</a:t>
+            </a:r>
+            <a:r>
+              <a:rPr lang="en-US" dirty="0"/>
+              <a:t>ural and </a:t>
+            </a:r>
+            <a:r>
+              <a:rPr lang="en-US" b="1" dirty="0"/>
+              <a:t>R</a:t>
+            </a:r>
+            <a:r>
+              <a:rPr lang="en-US" dirty="0"/>
+              <a:t>emote </a:t>
+            </a:r>
+            <a:r>
+              <a:rPr lang="en-US" b="1" dirty="0"/>
+              <a:t>A</a:t>
+            </a:r>
+            <a:r>
+              <a:rPr lang="en-US" dirty="0"/>
+              <a:t>reas. </a:t>
+            </a:r>
+          </a:p>
+          <a:p>
+            <a:r>
+              <a:rPr lang="en-US" dirty="0"/>
+              <a:t>Started in 2007, Written in PHP, with a </a:t>
+            </a:r>
+            <a:r>
+              <a:rPr lang="en-US" dirty="0" err="1"/>
+              <a:t>PostgreSQL</a:t>
+            </a:r>
+            <a:r>
+              <a:rPr lang="en-US" dirty="0"/>
+              <a:t> database backend. </a:t>
+            </a:r>
+          </a:p>
+          <a:p>
+            <a:endParaRPr lang="en-US" dirty="0" smtClean="0"/>
+          </a:p>
+          <a:p>
             <a:r>
               <a:rPr lang="en-US" baseline="0" dirty="0" smtClean="0"/>
-              <a:t> Town, South </a:t>
-            </a:r>
+              <a:t>ZEPRS- </a:t>
+            </a:r>
+            <a:r>
+              <a:rPr lang="en-US" dirty="0"/>
+              <a:t>The </a:t>
+            </a:r>
+            <a:r>
+              <a:rPr lang="en-US" b="1" dirty="0"/>
+              <a:t>Zambia Electronic </a:t>
+            </a:r>
+            <a:r>
+              <a:rPr lang="en-US" b="1" dirty="0">
+                <a:hlinkClick r:id="rId3" tooltip="Perinatal"/>
+              </a:rPr>
+              <a:t>Perinatal</a:t>
+            </a:r>
+            <a:r>
+              <a:rPr lang="en-US" b="1" dirty="0"/>
+              <a:t> Record System</a:t>
+            </a:r>
+            <a:r>
+              <a:rPr lang="en-US" dirty="0"/>
+              <a:t> (</a:t>
+            </a:r>
+            <a:r>
+              <a:rPr lang="en-US" b="1" dirty="0"/>
+              <a:t>ZEPRS</a:t>
+            </a:r>
+            <a:r>
+              <a:rPr lang="en-US" dirty="0"/>
+              <a:t>) </a:t>
+            </a:r>
+          </a:p>
+          <a:p>
+            <a:r>
+              <a:rPr lang="en-US" dirty="0"/>
+              <a:t>- For an obesity clinic</a:t>
+            </a:r>
+            <a:endParaRPr lang="en-US" dirty="0" smtClean="0"/>
+          </a:p>
+          <a:p>
             <a:r>
               <a:rPr lang="en-US" dirty="0" smtClean="0"/>
-              <a:t>Africa that treats patients for HIV/AIDS. All</a:t>
+              <a:t>-lacks security measures</a:t>
             </a:r>
             <a:r>
               <a:rPr lang="en-US" baseline="0" dirty="0" smtClean="0"/>
-              <a:t> patients records are currently hard copy only, and patients’ records get displaced and damaged. </a:t>
+              <a:t> (i.e. encryption) </a:t>
+            </a:r>
+            <a:endParaRPr lang="en-US" dirty="0" smtClean="0"/>
+          </a:p>
+          <a:p>
+            <a:endParaRPr lang="en-US" dirty="0" smtClean="0"/>
+          </a:p>
+          <a:p>
+            <a:r>
+              <a:rPr lang="en-US" dirty="0" err="1" smtClean="0"/>
+              <a:t>OpenEMR</a:t>
             </a:r>
             <a:r>
               <a:rPr lang="en-US" dirty="0" smtClean="0"/>
-              <a:t>Ultimately, a “hassle</a:t>
-            </a:r>
-            <a:r>
-              <a:rPr lang="en-US" baseline="0" dirty="0" smtClean="0"/>
-              <a:t> free treatment process”</a:t>
-            </a:r>
-          </a:p>
-          <a:p>
-            <a:endParaRPr lang="en-US" b="1" dirty="0" smtClean="0"/>
-          </a:p>
-          <a:p>
-            <a:r>
-              <a:rPr lang="en-US" b="1" dirty="0" smtClean="0"/>
-              <a:t>What - </a:t>
+              <a:t> V 1.0 released in June 2001</a:t>
             </a:r>
           </a:p>
           <a:p>
             <a:r>
               <a:rPr lang="en-US" dirty="0" smtClean="0"/>
-              <a:t>Solve the problem of</a:t>
-            </a:r>
-            <a:r>
-              <a:rPr lang="en-US" baseline="0" dirty="0" smtClean="0"/>
-              <a:t> displacement and damage to patients’ files</a:t>
-            </a:r>
-          </a:p>
-          <a:p>
-            <a:r>
-              <a:rPr lang="en-US" baseline="0" dirty="0" smtClean="0"/>
-              <a:t> - Eliminate identity theft</a:t>
-            </a:r>
-          </a:p>
-          <a:p>
-            <a:r>
-              <a:rPr lang="en-US" baseline="0" dirty="0" smtClean="0"/>
-              <a:t> - Ensure patient stays on the right regiment</a:t>
-            </a:r>
-            <a:endParaRPr lang="en-US" dirty="0" smtClean="0"/>
-          </a:p>
-          <a:p>
-            <a:endParaRPr lang="en-US" b="1" dirty="0" smtClean="0"/>
-          </a:p>
-          <a:p>
-            <a:r>
-              <a:rPr lang="en-US" b="1" dirty="0" smtClean="0"/>
-              <a:t>How -</a:t>
-            </a:r>
-            <a:r>
-              <a:rPr lang="en-US" dirty="0" smtClean="0"/>
-              <a:t> </a:t>
-            </a:r>
-          </a:p>
-          <a:p>
-            <a:r>
-              <a:rPr lang="en-US" dirty="0" smtClean="0"/>
-              <a:t>A software system that backs up patients’ files securely so that they can be readily available when needed </a:t>
-            </a:r>
-          </a:p>
-          <a:p>
-            <a:r>
-              <a:rPr lang="en-US" baseline="0" dirty="0" smtClean="0"/>
-              <a:t> - I</a:t>
-            </a:r>
-            <a:r>
-              <a:rPr lang="en-US" dirty="0" smtClean="0"/>
-              <a:t>dentity</a:t>
-            </a:r>
-            <a:r>
-              <a:rPr lang="en-US" baseline="0" dirty="0" smtClean="0"/>
-              <a:t> theft eliminated by integrating a photo into the system for each patient so that they can be identified through facial recognition and name, eliminating the need for a patient ID card, making the overall process smoother and easier for patients’</a:t>
+              <a:t>-3700 downloads p/month</a:t>
             </a:r>
             <a:endParaRPr lang="en-US" dirty="0"/>
           </a:p>
@@ -1213,7 +1384,7 @@
     </p:spTree>
     <p:extLst>
       <p:ext uri="{BB962C8B-B14F-4D97-AF65-F5344CB8AC3E}">
-        <p14:creationId xmlns:p14="http://schemas.microsoft.com/office/powerpoint/2010/main" val="4121720833"/>
+        <p14:creationId xmlns:p14="http://schemas.microsoft.com/office/powerpoint/2010/main" val="3006771749"/>
       </p:ext>
     </p:extLst>
   </p:cSld>
@@ -1401,260 +1572,92 @@
           <a:p>
             <a:r>
               <a:rPr lang="en-US" dirty="0" smtClean="0"/>
-              <a:t>Background info on </a:t>
-            </a:r>
-          </a:p>
-          <a:p>
-            <a:r>
-              <a:rPr lang="en-US" dirty="0" err="1" smtClean="0"/>
-              <a:t>VistA</a:t>
-            </a:r>
-            <a:r>
-              <a:rPr lang="en-US" dirty="0" smtClean="0"/>
-              <a:t>- Veterans health info systems and technology</a:t>
-            </a:r>
-            <a:r>
-              <a:rPr lang="en-US" baseline="0" dirty="0" smtClean="0"/>
-              <a:t> Architecture </a:t>
-            </a:r>
-          </a:p>
-          <a:p>
-            <a:r>
-              <a:rPr lang="en-US" baseline="0" dirty="0" smtClean="0"/>
-              <a:t>Used throughout the US </a:t>
-            </a:r>
-            <a:r>
-              <a:rPr lang="en-US" baseline="0" dirty="0" err="1" smtClean="0"/>
-              <a:t>Dept</a:t>
-            </a:r>
-            <a:r>
-              <a:rPr lang="en-US" baseline="0" dirty="0" smtClean="0"/>
-              <a:t> of Veteran Affairs </a:t>
-            </a:r>
-          </a:p>
-          <a:p>
-            <a:r>
-              <a:rPr lang="en-US" baseline="0" dirty="0" smtClean="0"/>
-              <a:t>80 different clinical </a:t>
-            </a:r>
-            <a:r>
-              <a:rPr lang="en-US" baseline="0" dirty="0" err="1" smtClean="0"/>
-              <a:t>fxns</a:t>
-            </a:r>
-            <a:r>
-              <a:rPr lang="en-US" baseline="0" dirty="0" smtClean="0"/>
-              <a:t>, including: Mental Health, Blind Rehab, Ambulatory care, Radiology, Pharmaceutical, </a:t>
-            </a:r>
-            <a:r>
-              <a:rPr lang="en-US" baseline="0" dirty="0" err="1" smtClean="0"/>
-              <a:t>etc</a:t>
-            </a:r>
-            <a:r>
-              <a:rPr lang="en-US" baseline="0" dirty="0" smtClean="0"/>
-              <a:t>, </a:t>
-            </a:r>
-            <a:r>
-              <a:rPr lang="en-US" baseline="0" dirty="0" err="1" smtClean="0"/>
-              <a:t>etc</a:t>
+              <a:t>- Taken out financial data</a:t>
             </a:r>
             <a:r>
               <a:rPr lang="en-US" baseline="0" dirty="0" smtClean="0"/>
               <a:t> </a:t>
             </a:r>
+          </a:p>
+          <a:p>
+            <a:pPr marL="171450" indent="-171450">
+              <a:buFontTx/>
+              <a:buChar char="-"/>
+            </a:pPr>
+            <a:r>
+              <a:rPr lang="en-US" baseline="0" dirty="0" smtClean="0"/>
+              <a:t>Safeguard, (electronic paper trail)  </a:t>
+            </a:r>
+          </a:p>
+          <a:p>
+            <a:pPr marL="171450" indent="-171450">
+              <a:buFontTx/>
+              <a:buChar char="-"/>
+            </a:pPr>
+            <a:r>
+              <a:rPr lang="en-US" baseline="0" dirty="0" smtClean="0"/>
+              <a:t>SHA1 for message Authentication, DHE_RSA as the key exchange mechanism, allows for HTTPS Protocol, ( combination of hypertext transfer </a:t>
+            </a:r>
             <a:r>
               <a:rPr lang="en-US" baseline="0" dirty="0" err="1" smtClean="0"/>
-              <a:t>etc</a:t>
-            </a:r>
-            <a:endParaRPr lang="en-US" baseline="0" dirty="0" smtClean="0"/>
-          </a:p>
-          <a:p>
+              <a:t>protocal</a:t>
+            </a:r>
             <a:r>
               <a:rPr lang="en-US" baseline="0" dirty="0" smtClean="0"/>
-              <a:t>Software modules for clinical care and financial </a:t>
+              <a:t> and SSL/TLS </a:t>
             </a:r>
             <a:r>
               <a:rPr lang="en-US" baseline="0" dirty="0" err="1" smtClean="0"/>
-              <a:t>fxns</a:t>
-            </a:r>
-            <a:endParaRPr lang="en-US" baseline="0" dirty="0" smtClean="0"/>
-          </a:p>
-          <a:p>
+              <a:t>protocal</a:t>
+            </a:r>
             <a:r>
               <a:rPr lang="en-US" baseline="0" dirty="0" smtClean="0"/>
-              <a:t>Currently the largest medical system in the US, provides care to 8 million veterans</a:t>
+              <a:t>.) Provides encrypted communication to allow for secure identification of a network web server </a:t>
+            </a:r>
+          </a:p>
+          <a:p>
+            <a:pPr marL="171450" indent="-171450">
+              <a:buFontTx/>
+              <a:buChar char="-"/>
+            </a:pPr>
+            <a:endParaRPr lang="en-US" dirty="0" smtClean="0"/>
+          </a:p>
+          <a:p>
+            <a:r>
+              <a:rPr lang="en-US" b="1" dirty="0" smtClean="0"/>
+              <a:t>How -</a:t>
+            </a:r>
+            <a:r>
+              <a:rPr lang="en-US" dirty="0" smtClean="0"/>
+              <a:t> </a:t>
+            </a:r>
+          </a:p>
+          <a:p>
+            <a:r>
+              <a:rPr lang="en-US" dirty="0" smtClean="0"/>
+              <a:t>A software system that backs up patients’ files securely so that they can be readily available when needed </a:t>
             </a:r>
           </a:p>
           <a:p>
             <a:r>
               <a:rPr lang="en-US" baseline="0" dirty="0" smtClean="0"/>
-              <a:t>Already had automated data processing previously, but added a GUI in 1997. </a:t>
-            </a:r>
-          </a:p>
-          <a:p>
+              <a:t> - I</a:t>
+            </a:r>
+            <a:r>
+              <a:rPr lang="en-US" dirty="0" smtClean="0"/>
+              <a:t>dentity</a:t>
+            </a:r>
             <a:r>
               <a:rPr lang="en-US" baseline="0" dirty="0" smtClean="0"/>
-              <a:t>One of the first client-server architectures, that allowed health care providers to review and update a patient’s electronic medical record</a:t>
+              <a:t> theft eliminated by integrating a photo into the system for each patient so that they can be identified through facial recognition and name, eliminating the need for a patient ID card, making the overall process smoother and easier for patients’</a:t>
             </a:r>
             <a:endParaRPr lang="en-US" dirty="0" smtClean="0"/>
           </a:p>
           <a:p>
-            <a:endParaRPr lang="en-US" dirty="0" smtClean="0"/>
-          </a:p>
-          <a:p>
-            <a:r>
-              <a:rPr lang="en-US" dirty="0" smtClean="0"/>
-              <a:t>THIRRA-  </a:t>
-            </a:r>
-            <a:r>
-              <a:rPr lang="en-US" dirty="0"/>
-              <a:t> project title Portable System </a:t>
-            </a:r>
-            <a:r>
-              <a:rPr lang="en-US" dirty="0" err="1"/>
-              <a:t>for</a:t>
-            </a:r>
-            <a:r>
-              <a:rPr lang="en-US" b="1" dirty="0" err="1"/>
-              <a:t>T</a:t>
-            </a:r>
-            <a:r>
-              <a:rPr lang="en-US" dirty="0" err="1"/>
-              <a:t>eleHealth</a:t>
-            </a:r>
-            <a:r>
-              <a:rPr lang="en-US" dirty="0"/>
-              <a:t> and </a:t>
-            </a:r>
-            <a:r>
-              <a:rPr lang="en-US" b="1" dirty="0"/>
-              <a:t>H</a:t>
-            </a:r>
-            <a:r>
-              <a:rPr lang="en-US" dirty="0"/>
-              <a:t>ealth </a:t>
-            </a:r>
-            <a:r>
-              <a:rPr lang="en-US" b="1" dirty="0"/>
-              <a:t>I</a:t>
-            </a:r>
-            <a:r>
-              <a:rPr lang="en-US" dirty="0"/>
-              <a:t>nformatics for </a:t>
-            </a:r>
-            <a:r>
-              <a:rPr lang="en-US" b="1" dirty="0"/>
-              <a:t>R</a:t>
-            </a:r>
-            <a:r>
-              <a:rPr lang="en-US" dirty="0"/>
-              <a:t>ural and </a:t>
-            </a:r>
-            <a:r>
-              <a:rPr lang="en-US" b="1" dirty="0"/>
-              <a:t>R</a:t>
-            </a:r>
-            <a:r>
-              <a:rPr lang="en-US" dirty="0"/>
-              <a:t>emote </a:t>
-            </a:r>
-            <a:r>
-              <a:rPr lang="en-US" b="1" dirty="0"/>
-              <a:t>A</a:t>
-            </a:r>
-            <a:r>
-              <a:rPr lang="en-US" dirty="0"/>
-              <a:t>reas. </a:t>
-            </a:r>
-          </a:p>
-          <a:p>
-            <a:r>
-              <a:rPr lang="en-US" dirty="0"/>
-              <a:t>Started in 2007, Written in PHP, with a </a:t>
-            </a:r>
-            <a:r>
-              <a:rPr lang="en-US" dirty="0" err="1"/>
-              <a:t>PostgreSQL</a:t>
-            </a:r>
-            <a:r>
-              <a:rPr lang="en-US" dirty="0"/>
-              <a:t> database backend. </a:t>
-            </a:r>
-          </a:p>
-          <a:p>
-            <a:endParaRPr lang="en-US" dirty="0" smtClean="0"/>
-          </a:p>
-          <a:p>
-            <a:r>
-              <a:rPr lang="en-US" baseline="0" dirty="0" smtClean="0"/>
-              <a:t>ZEPRS- </a:t>
-            </a:r>
-            <a:r>
-              <a:rPr lang="en-US" dirty="0"/>
-              <a:t>The </a:t>
-            </a:r>
-            <a:r>
-              <a:rPr lang="en-US" b="1" dirty="0"/>
-              <a:t>Zambia Electronic </a:t>
-            </a:r>
-            <a:r>
-              <a:rPr lang="en-US" b="1" dirty="0">
-                <a:hlinkClick r:id="rId3" tooltip="Perinatal"/>
-              </a:rPr>
-              <a:t>Perinatal</a:t>
-            </a:r>
-            <a:r>
-              <a:rPr lang="en-US" b="1" dirty="0"/>
-              <a:t> Record System</a:t>
-            </a:r>
-            <a:r>
-              <a:rPr lang="en-US" dirty="0"/>
-              <a:t> (</a:t>
-            </a:r>
-            <a:r>
-              <a:rPr lang="en-US" b="1" dirty="0"/>
-              <a:t>ZEPRS</a:t>
-            </a:r>
-            <a:r>
-              <a:rPr lang="en-US" dirty="0"/>
-              <a:t>) </a:t>
-            </a:r>
-          </a:p>
-          <a:p>
-            <a:r>
-              <a:rPr lang="en-US" dirty="0"/>
-              <a:t>- For an obesity clinic</a:t>
-            </a:r>
-            <a:endParaRPr lang="en-US" dirty="0" smtClean="0"/>
-          </a:p>
-          <a:p>
-            <a:r>
-              <a:rPr lang="en-US" dirty="0" smtClean="0"/>
-              <a:t>-lacks security measures</a:t>
-            </a:r>
-            <a:r>
-              <a:rPr lang="en-US" baseline="0" dirty="0" smtClean="0"/>
-              <a:t> (i.e. encryption) </a:t>
-            </a:r>
-            <a:endParaRPr lang="en-US" dirty="0" smtClean="0"/>
-          </a:p>
-          <a:p>
-            <a:endParaRPr lang="en-US" dirty="0" smtClean="0"/>
-          </a:p>
-          <a:p>
-            <a:r>
-              <a:rPr lang="en-US" dirty="0" err="1" smtClean="0"/>
-              <a:t>OpenEMR</a:t>
-            </a:r>
-            <a:r>
-              <a:rPr lang="en-US" dirty="0" smtClean="0"/>
-              <a:t> V 1.0 released in June 2001</a:t>
-            </a:r>
-          </a:p>
-          <a:p>
-            <a:r>
-              <a:rPr lang="en-US" dirty="0" smtClean="0"/>
-              <a:t>-3700 downloads p/month</a:t>
-            </a:r>
+            <a:pPr marL="171450" indent="-171450">
+              <a:buFontTx/>
+              <a:buChar char="-"/>
+            </a:pPr>
             <a:endParaRPr lang="en-US" dirty="0"/>
           </a:p>
         </p:txBody>
@@ -1685,7 +1688,7 @@
     </p:spTree>
     <p:extLst>
       <p:ext uri="{BB962C8B-B14F-4D97-AF65-F5344CB8AC3E}">
-        <p14:creationId xmlns:p14="http://schemas.microsoft.com/office/powerpoint/2010/main" val="3006771749"/>
+        <p14:creationId xmlns:p14="http://schemas.microsoft.com/office/powerpoint/2010/main" val="2423766743"/>
       </p:ext>
     </p:extLst>
   </p:cSld>
@@ -1741,32 +1744,7 @@
           <a:p>
             <a:r>
               <a:rPr lang="en-US" dirty="0" smtClean="0"/>
-              <a:t>These are the 3 ‘big’ things the “state of the art” software</a:t>
-            </a:r>
-            <a:r>
-              <a:rPr lang="en-US" baseline="0" dirty="0" smtClean="0"/>
-              <a:t> </a:t>
-            </a:r>
-            <a:r>
-              <a:rPr lang="en-US" baseline="0" dirty="0" smtClean="0"/>
-              <a:t>uses </a:t>
-            </a:r>
-          </a:p>
-          <a:p>
-            <a:endParaRPr lang="en-US" baseline="0" dirty="0" smtClean="0"/>
-          </a:p>
-          <a:p>
-            <a:r>
-              <a:rPr lang="en-US" baseline="0" dirty="0" smtClean="0"/>
-              <a:t>Closing Comment: “So if </a:t>
-            </a:r>
-            <a:r>
-              <a:rPr lang="en-US" baseline="0" dirty="0" err="1" smtClean="0"/>
-              <a:t>OpenEMR</a:t>
-            </a:r>
-            <a:r>
-              <a:rPr lang="en-US" baseline="0" dirty="0" smtClean="0"/>
-              <a:t> is so great, why is it not a good fit for our specific application?” (go to next slide)</a:t>
+              <a:t>***********May need a re-write on the caption </a:t>
             </a:r>
             <a:endParaRPr lang="en-US" dirty="0"/>
           </a:p>
@@ -1789,7 +1767,7 @@
           <a:p>
             <a:fld id="{6538AC3F-63CE-4DD6-92CD-9B13526C2825}" type="slidenum">
               <a:rPr lang="en-US" smtClean="0"/>
-              <a:t>7</a:t>
+              <a:t>8</a:t>
             </a:fld>
             <a:endParaRPr lang="en-US"/>
           </a:p>
@@ -1798,7 +1776,7 @@
     </p:spTree>
     <p:extLst>
       <p:ext uri="{BB962C8B-B14F-4D97-AF65-F5344CB8AC3E}">
-        <p14:creationId xmlns:p14="http://schemas.microsoft.com/office/powerpoint/2010/main" val="109463441"/>
+        <p14:creationId xmlns:p14="http://schemas.microsoft.com/office/powerpoint/2010/main" val="717272626"/>
       </p:ext>
     </p:extLst>
   </p:cSld>
@@ -1852,16 +1830,6 @@
           <a:bodyPr/>
           <a:lstStyle/>
           <a:p>
-            <a:r>
-              <a:rPr lang="en-US" dirty="0" smtClean="0"/>
-              <a:t>-Too</a:t>
-            </a:r>
-            <a:r>
-              <a:rPr lang="en-US" baseline="0" dirty="0" smtClean="0"/>
-              <a:t> much going on, could be complicated. </a:t>
-            </a:r>
-          </a:p>
-          <a:p>
             <a:endParaRPr lang="en-US" dirty="0"/>
           </a:p>
         </p:txBody>
@@ -1883,7 +1851,7 @@
           <a:p>
             <a:fld id="{6538AC3F-63CE-4DD6-92CD-9B13526C2825}" type="slidenum">
               <a:rPr lang="en-US" smtClean="0"/>
-              <a:t>8</a:t>
+              <a:t>9</a:t>
             </a:fld>
             <a:endParaRPr lang="en-US"/>
           </a:p>
@@ -1892,7 +1860,7 @@
     </p:spTree>
     <p:extLst>
       <p:ext uri="{BB962C8B-B14F-4D97-AF65-F5344CB8AC3E}">
-        <p14:creationId xmlns:p14="http://schemas.microsoft.com/office/powerpoint/2010/main" val="2329334437"/>
+        <p14:creationId xmlns:p14="http://schemas.microsoft.com/office/powerpoint/2010/main" val="2185386872"/>
       </p:ext>
     </p:extLst>
   </p:cSld>
@@ -1948,62 +1916,29 @@
           <a:p>
             <a:r>
               <a:rPr lang="en-US" dirty="0" smtClean="0"/>
-              <a:t>- Taken out financial data</a:t>
+              <a:t>These are the 3 ‘big’ things the “state of the art” software</a:t>
             </a:r>
             <a:r>
               <a:rPr lang="en-US" baseline="0" dirty="0" smtClean="0"/>
-              <a:t> </a:t>
-            </a:r>
-          </a:p>
-          <a:p>
-            <a:pPr marL="171450" indent="-171450">
-              <a:buFontTx/>
-              <a:buChar char="-"/>
-            </a:pPr>
+              <a:t> uses </a:t>
+            </a:r>
+          </a:p>
+          <a:p>
+            <a:endParaRPr lang="en-US" baseline="0" dirty="0" smtClean="0"/>
+          </a:p>
+          <a:p>
             <a:r>
               <a:rPr lang="en-US" baseline="0" dirty="0" smtClean="0"/>
-              <a:t>Safeguard</a:t>
+              <a:t>Closing Comment: “So if </a:t>
+            </a:r>
+            <a:r>
+              <a:rPr lang="en-US" baseline="0" dirty="0" err="1" smtClean="0"/>
+              <a:t>OpenEMR</a:t>
             </a:r>
             <a:r>
               <a:rPr lang="en-US" baseline="0" dirty="0" smtClean="0"/>
-              <a:t>, (electronic paper trail) </a:t>
-            </a:r>
-            <a:r>
-              <a:rPr lang="en-US" baseline="0" dirty="0" smtClean="0"/>
-              <a:t> </a:t>
-            </a:r>
-          </a:p>
-          <a:p>
-            <a:pPr marL="171450" indent="-171450">
-              <a:buFontTx/>
-              <a:buChar char="-"/>
-            </a:pPr>
-            <a:r>
-              <a:rPr lang="en-US" baseline="0" dirty="0" smtClean="0"/>
-              <a:t>SHA1 for message Authentication, DHE_RSA as the key exchange mechanism, allows for HTTPS Protocol, ( combination of hypertext transfer </a:t>
-            </a:r>
-            <a:r>
-              <a:rPr lang="en-US" baseline="0" dirty="0" err="1" smtClean="0"/>
-              <a:t>protocal</a:t>
-            </a:r>
-            <a:r>
-              <a:rPr lang="en-US" baseline="0" dirty="0" smtClean="0"/>
-              <a:t> and SSL/TLS </a:t>
-            </a:r>
-            <a:r>
-              <a:rPr lang="en-US" baseline="0" dirty="0" err="1" smtClean="0"/>
-              <a:t>protocal</a:t>
-            </a:r>
-            <a:r>
-              <a:rPr lang="en-US" baseline="0" dirty="0" smtClean="0"/>
-              <a:t>.) Provides encrypted communication to allow for secure identification of a network web server </a:t>
-            </a:r>
-          </a:p>
-          <a:p>
-            <a:pPr marL="171450" indent="-171450">
-              <a:buFontTx/>
-              <a:buChar char="-"/>
-            </a:pPr>
+              <a:t> is so great, why is it not a good fit for our specific application?” (go to next slide)</a:t>
+            </a:r>
             <a:endParaRPr lang="en-US" dirty="0"/>
           </a:p>
         </p:txBody>
@@ -2025,7 +1960,7 @@
           <a:p>
             <a:fld id="{6538AC3F-63CE-4DD6-92CD-9B13526C2825}" type="slidenum">
               <a:rPr lang="en-US" smtClean="0"/>
-              <a:t>9</a:t>
+              <a:t>10</a:t>
             </a:fld>
             <a:endParaRPr lang="en-US"/>
           </a:p>
@@ -2034,7 +1969,7 @@
     </p:spTree>
     <p:extLst>
       <p:ext uri="{BB962C8B-B14F-4D97-AF65-F5344CB8AC3E}">
-        <p14:creationId xmlns:p14="http://schemas.microsoft.com/office/powerpoint/2010/main" val="2423766743"/>
+        <p14:creationId xmlns:p14="http://schemas.microsoft.com/office/powerpoint/2010/main" val="109463441"/>
       </p:ext>
     </p:extLst>
   </p:cSld>
@@ -2231,7 +2166,7 @@
           <a:p>
             <a:fld id="{F860A560-75BB-4DDF-8B63-A975FA1C797F}" type="datetime1">
               <a:rPr lang="en-US" smtClean="0"/>
-              <a:t>5/7/2012</a:t>
+              <a:t>5/8/2012</a:t>
             </a:fld>
             <a:endParaRPr lang="en-US"/>
           </a:p>
@@ -2403,7 +2338,7 @@
           <a:p>
             <a:fld id="{819A4B5B-3CC6-4E48-8F80-7D599914EF89}" type="datetime1">
               <a:rPr lang="en-US" smtClean="0"/>
-              <a:t>5/7/2012</a:t>
+              <a:t>5/8/2012</a:t>
             </a:fld>
             <a:endParaRPr lang="en-US"/>
           </a:p>
@@ -2578,7 +2513,7 @@
           <a:p>
             <a:fld id="{AB5F6EC1-A62E-41C8-88AD-A2D7337832AA}" type="datetime1">
               <a:rPr lang="en-US" smtClean="0"/>
-              <a:t>5/7/2012</a:t>
+              <a:t>5/8/2012</a:t>
             </a:fld>
             <a:endParaRPr lang="en-US"/>
           </a:p>
@@ -2743,7 +2678,7 @@
           <a:p>
             <a:fld id="{555C1C78-3ACF-46D8-8BB2-57E2D7F6FC19}" type="datetime1">
               <a:rPr lang="en-US" smtClean="0"/>
-              <a:t>5/7/2012</a:t>
+              <a:t>5/8/2012</a:t>
             </a:fld>
             <a:endParaRPr lang="en-US"/>
           </a:p>
@@ -2989,7 +2924,7 @@
           <a:p>
             <a:fld id="{F55A0451-9590-4A1C-9976-5B991B64B9EA}" type="datetime1">
               <a:rPr lang="en-US" smtClean="0"/>
-              <a:t>5/7/2012</a:t>
+              <a:t>5/8/2012</a:t>
             </a:fld>
             <a:endParaRPr lang="en-US"/>
           </a:p>
@@ -3086,7 +3021,7 @@
           <a:p>
             <a:fld id="{EA026219-B328-42D7-AAAF-98D7A5F4B509}" type="datetime1">
               <a:rPr lang="en-US" smtClean="0"/>
-              <a:t>5/7/2012</a:t>
+              <a:t>5/8/2012</a:t>
             </a:fld>
             <a:endParaRPr lang="en-US"/>
           </a:p>
@@ -3460,7 +3395,7 @@
           <a:p>
             <a:fld id="{C3C85DBB-887A-43C7-AF91-EDD9C8BD0F87}" type="datetime1">
               <a:rPr lang="en-US" smtClean="0"/>
-              <a:t>5/7/2012</a:t>
+              <a:t>5/8/2012</a:t>
             </a:fld>
             <a:endParaRPr lang="en-US"/>
           </a:p>
@@ -3715,7 +3650,7 @@
           <a:p>
             <a:fld id="{6BB3112F-08FD-4A00-8761-87402F2FB62E}" type="datetime1">
               <a:rPr lang="en-US" smtClean="0"/>
-              <a:t>5/7/2012</a:t>
+              <a:t>5/8/2012</a:t>
             </a:fld>
             <a:endParaRPr lang="en-US"/>
           </a:p>
@@ -3805,7 +3740,7 @@
           <a:p>
             <a:fld id="{774FBF8C-E852-4416-8043-D9509D71997B}" type="datetime1">
               <a:rPr lang="en-US" smtClean="0"/>
-              <a:t>5/7/2012</a:t>
+              <a:t>5/8/2012</a:t>
             </a:fld>
             <a:endParaRPr lang="en-US"/>
           </a:p>
@@ -4079,7 +4014,7 @@
           <a:p>
             <a:fld id="{370F731C-0A04-47AB-95E7-C4B7280CE3EF}" type="datetime1">
               <a:rPr lang="en-US" smtClean="0"/>
-              <a:t>5/7/2012</a:t>
+              <a:t>5/8/2012</a:t>
             </a:fld>
             <a:endParaRPr lang="en-US"/>
           </a:p>
@@ -4351,7 +4286,7 @@
           <a:p>
             <a:fld id="{6E71A764-0912-4B71-AEAC-C5429135FCA3}" type="datetime1">
               <a:rPr lang="en-US" smtClean="0"/>
-              <a:t>5/7/2012</a:t>
+              <a:t>5/8/2012</a:t>
             </a:fld>
             <a:endParaRPr lang="en-US"/>
           </a:p>
@@ -4651,7 +4586,7 @@
           <a:p>
             <a:fld id="{3F326007-896C-49C9-B074-1A1918D84138}" type="datetime1">
               <a:rPr lang="en-US" smtClean="0"/>
-              <a:t>5/7/2012</a:t>
+              <a:t>5/8/2012</a:t>
             </a:fld>
             <a:endParaRPr lang="en-US"/>
           </a:p>
@@ -5183,21 +5118,12 @@
               <a:rPr lang="en-US" dirty="0" smtClean="0"/>
               <a:t>Department of Computer Science</a:t>
             </a:r>
-            <a:endParaRPr lang="en-US" dirty="0" smtClean="0"/>
           </a:p>
           <a:p>
             <a:pPr algn="ctr"/>
             <a:r>
               <a:rPr lang="en-US" dirty="0" smtClean="0"/>
-              <a:t>Spring</a:t>
-            </a:r>
-            <a:r>
-              <a:rPr lang="en-US" dirty="0" smtClean="0"/>
-              <a:t> </a:t>
-            </a:r>
-            <a:r>
-              <a:rPr lang="en-US" dirty="0" smtClean="0"/>
-              <a:t>2012</a:t>
+              <a:t>Spring 2012</a:t>
             </a:r>
             <a:endParaRPr lang="en-US" dirty="0"/>
           </a:p>
@@ -5275,18 +5201,24 @@
         </p:nvSpPr>
         <p:spPr>
           <a:xfrm>
-            <a:off x="914400" y="0"/>
-            <a:ext cx="7315200" cy="1154097"/>
+            <a:off x="0" y="457200"/>
+            <a:ext cx="8458200" cy="696897"/>
           </a:xfrm>
         </p:spPr>
         <p:txBody>
-          <a:bodyPr/>
+          <a:bodyPr>
+            <a:normAutofit fontScale="90000"/>
+          </a:bodyPr>
           <a:lstStyle/>
           <a:p>
             <a:pPr algn="ctr"/>
             <a:r>
               <a:rPr lang="en-US" dirty="0" smtClean="0"/>
-              <a:t>System Context Diagram</a:t>
+              <a:t>Concepts Incorporated from </a:t>
+            </a:r>
+            <a:r>
+              <a:rPr lang="en-US" dirty="0" err="1" smtClean="0"/>
+              <a:t>OpenEMR</a:t>
             </a:r>
             <a:endParaRPr lang="en-US" dirty="0"/>
           </a:p>
@@ -5294,7 +5226,67 @@
       </p:sp>
       <p:sp>
         <p:nvSpPr>
-          <p:cNvPr id="4" name="Slide Number Placeholder 3"/>
+          <p:cNvPr id="3" name="Content Placeholder 2"/>
+          <p:cNvSpPr>
+            <a:spLocks noGrp="1"/>
+          </p:cNvSpPr>
+          <p:nvPr>
+            <p:ph idx="1"/>
+          </p:nvPr>
+        </p:nvSpPr>
+        <p:spPr>
+          <a:xfrm>
+            <a:off x="914400" y="1752600"/>
+            <a:ext cx="7315200" cy="4556761"/>
+          </a:xfrm>
+        </p:spPr>
+        <p:txBody>
+          <a:bodyPr>
+            <a:normAutofit/>
+          </a:bodyPr>
+          <a:lstStyle/>
+          <a:p>
+            <a:pPr marL="342900" indent="-342900">
+              <a:lnSpc>
+                <a:spcPct val="200000"/>
+              </a:lnSpc>
+            </a:pPr>
+            <a:r>
+              <a:rPr lang="en-US" sz="3200" dirty="0" smtClean="0"/>
+              <a:t>Patient records encrypted.</a:t>
+            </a:r>
+          </a:p>
+          <a:p>
+            <a:pPr marL="342900" indent="-342900">
+              <a:lnSpc>
+                <a:spcPct val="200000"/>
+              </a:lnSpc>
+            </a:pPr>
+            <a:r>
+              <a:rPr lang="en-US" sz="3200" dirty="0" smtClean="0"/>
+              <a:t>User access controls.</a:t>
+            </a:r>
+          </a:p>
+          <a:p>
+            <a:pPr marL="342900" indent="-342900">
+              <a:lnSpc>
+                <a:spcPct val="200000"/>
+              </a:lnSpc>
+            </a:pPr>
+            <a:r>
+              <a:rPr lang="en-US" sz="3200" dirty="0"/>
+              <a:t>R</a:t>
+            </a:r>
+            <a:r>
+              <a:rPr lang="en-US" sz="3200" dirty="0" smtClean="0"/>
+              <a:t>emote access from a web browser.</a:t>
+            </a:r>
+          </a:p>
+        </p:txBody>
+      </p:sp>
+      <p:sp>
+        <p:nvSpPr>
+          <p:cNvPr id="7" name="Slide Number Placeholder 6"/>
           <p:cNvSpPr>
             <a:spLocks noGrp="1"/>
           </p:cNvSpPr>
@@ -5315,106 +5307,10 @@
           </a:p>
         </p:txBody>
       </p:sp>
-      <p:pic>
-        <p:nvPicPr>
-          <p:cNvPr id="1026" name="Picture 2" descr="This diagram depicts the basic input, output, and processing of the SEMRS system. &#10;" title="System Context Diagram"/>
-          <p:cNvPicPr>
-            <a:picLocks noGrp="1" noChangeAspect="1" noChangeArrowheads="1"/>
-          </p:cNvPicPr>
-          <p:nvPr>
-            <p:ph idx="1"/>
-          </p:nvPr>
-        </p:nvPicPr>
-        <p:blipFill>
-          <a:blip r:embed="rId2">
-            <a:extLst>
-              <a:ext uri="{28A0092B-C50C-407E-A947-70E740481C1C}">
-                <a14:useLocalDpi xmlns:a14="http://schemas.microsoft.com/office/drawing/2010/main" val="0"/>
-              </a:ext>
-            </a:extLst>
-          </a:blip>
-          <a:srcRect/>
-          <a:stretch>
-            <a:fillRect/>
-          </a:stretch>
-        </p:blipFill>
-        <p:spPr bwMode="auto">
-          <a:xfrm>
-            <a:off x="1371600" y="1444141"/>
-            <a:ext cx="6553200" cy="3889859"/>
-          </a:xfrm>
-          <a:prstGeom prst="rect">
-            <a:avLst/>
-          </a:prstGeom>
-          <a:noFill/>
-          <a:ln>
-            <a:noFill/>
-          </a:ln>
-          <a:effectLst/>
-          <a:extLst>
-            <a:ext uri="{909E8E84-426E-40DD-AFC4-6F175D3DCCD1}">
-              <a14:hiddenFill xmlns:a14="http://schemas.microsoft.com/office/drawing/2010/main">
-                <a:solidFill>
-                  <a:schemeClr val="accent1"/>
-                </a:solidFill>
-              </a14:hiddenFill>
-            </a:ext>
-            <a:ext uri="{91240B29-F687-4F45-9708-019B960494DF}">
-              <a14:hiddenLine xmlns:a14="http://schemas.microsoft.com/office/drawing/2010/main" w="9525">
-                <a:solidFill>
-                  <a:schemeClr val="tx1"/>
-                </a:solidFill>
-                <a:miter lim="800000"/>
-                <a:headEnd/>
-                <a:tailEnd/>
-              </a14:hiddenLine>
-            </a:ext>
-            <a:ext uri="{AF507438-7753-43E0-B8FC-AC1667EBCBE1}">
-              <a14:hiddenEffects xmlns:a14="http://schemas.microsoft.com/office/drawing/2010/main">
-                <a:effectLst>
-                  <a:outerShdw dist="35921" dir="2700000" algn="ctr" rotWithShape="0">
-                    <a:schemeClr val="bg2"/>
-                  </a:outerShdw>
-                </a:effectLst>
-              </a14:hiddenEffects>
-            </a:ext>
-          </a:extLst>
-        </p:spPr>
-      </p:pic>
-      <p:sp>
-        <p:nvSpPr>
-          <p:cNvPr id="5" name="TextBox 4"/>
-          <p:cNvSpPr txBox="1"/>
-          <p:nvPr/>
-        </p:nvSpPr>
-        <p:spPr>
-          <a:xfrm>
-            <a:off x="1371600" y="5638800"/>
-            <a:ext cx="6553200" cy="646331"/>
-          </a:xfrm>
-          <a:prstGeom prst="rect">
-            <a:avLst/>
-          </a:prstGeom>
-          <a:noFill/>
-        </p:spPr>
-        <p:txBody>
-          <a:bodyPr wrap="square" rtlCol="0">
-            <a:spAutoFit/>
-          </a:bodyPr>
-          <a:lstStyle/>
-          <a:p>
-            <a:r>
-              <a:rPr lang="en-US" dirty="0" smtClean="0"/>
-              <a:t>This system context diagram depicts the basic input, output, and processing of the SEMRS system. </a:t>
-            </a:r>
-            <a:endParaRPr lang="en-US" dirty="0"/>
-          </a:p>
-        </p:txBody>
-      </p:sp>
     </p:spTree>
     <p:extLst>
       <p:ext uri="{BB962C8B-B14F-4D97-AF65-F5344CB8AC3E}">
-        <p14:creationId xmlns:p14="http://schemas.microsoft.com/office/powerpoint/2010/main" val="3990745985"/>
+        <p14:creationId xmlns:p14="http://schemas.microsoft.com/office/powerpoint/2010/main" val="2619002814"/>
       </p:ext>
     </p:extLst>
   </p:cSld>
@@ -5470,1462 +5366,6 @@
           <a:p>
             <a:pPr algn="ctr"/>
             <a:r>
-              <a:rPr lang="en-US" dirty="0" smtClean="0"/>
-              <a:t>Use Case Diagram</a:t>
-            </a:r>
-            <a:endParaRPr lang="en-US" dirty="0"/>
-          </a:p>
-        </p:txBody>
-      </p:sp>
-      <p:sp>
-        <p:nvSpPr>
-          <p:cNvPr id="4" name="Slide Number Placeholder 3"/>
-          <p:cNvSpPr>
-            <a:spLocks noGrp="1"/>
-          </p:cNvSpPr>
-          <p:nvPr>
-            <p:ph type="sldNum" sz="quarter" idx="12"/>
-          </p:nvPr>
-        </p:nvSpPr>
-        <p:spPr/>
-        <p:txBody>
-          <a:bodyPr/>
-          <a:lstStyle/>
-          <a:p>
-            <a:fld id="{85816456-AF90-4826-9770-6E0598D9C364}" type="slidenum">
-              <a:rPr lang="en-US" smtClean="0"/>
-              <a:t>11</a:t>
-            </a:fld>
-            <a:endParaRPr lang="en-US" dirty="0"/>
-          </a:p>
-        </p:txBody>
-      </p:sp>
-      <p:pic>
-        <p:nvPicPr>
-          <p:cNvPr id="2050" name="Picture 2"/>
-          <p:cNvPicPr>
-            <a:picLocks noGrp="1" noChangeAspect="1" noChangeArrowheads="1"/>
-          </p:cNvPicPr>
-          <p:nvPr>
-            <p:ph idx="1"/>
-          </p:nvPr>
-        </p:nvPicPr>
-        <p:blipFill>
-          <a:blip r:embed="rId3">
-            <a:extLst>
-              <a:ext uri="{28A0092B-C50C-407E-A947-70E740481C1C}">
-                <a14:useLocalDpi xmlns:a14="http://schemas.microsoft.com/office/drawing/2010/main" val="0"/>
-              </a:ext>
-            </a:extLst>
-          </a:blip>
-          <a:srcRect/>
-          <a:stretch>
-            <a:fillRect/>
-          </a:stretch>
-        </p:blipFill>
-        <p:spPr bwMode="auto">
-          <a:xfrm>
-            <a:off x="1219200" y="1371600"/>
-            <a:ext cx="6762565" cy="3962400"/>
-          </a:xfrm>
-          <a:prstGeom prst="rect">
-            <a:avLst/>
-          </a:prstGeom>
-          <a:noFill/>
-          <a:ln>
-            <a:noFill/>
-          </a:ln>
-          <a:effectLst/>
-          <a:extLst>
-            <a:ext uri="{909E8E84-426E-40DD-AFC4-6F175D3DCCD1}">
-              <a14:hiddenFill xmlns:a14="http://schemas.microsoft.com/office/drawing/2010/main">
-                <a:solidFill>
-                  <a:schemeClr val="accent1"/>
-                </a:solidFill>
-              </a14:hiddenFill>
-            </a:ext>
-            <a:ext uri="{91240B29-F687-4F45-9708-019B960494DF}">
-              <a14:hiddenLine xmlns:a14="http://schemas.microsoft.com/office/drawing/2010/main" w="9525">
-                <a:solidFill>
-                  <a:schemeClr val="tx1"/>
-                </a:solidFill>
-                <a:miter lim="800000"/>
-                <a:headEnd/>
-                <a:tailEnd/>
-              </a14:hiddenLine>
-            </a:ext>
-            <a:ext uri="{AF507438-7753-43E0-B8FC-AC1667EBCBE1}">
-              <a14:hiddenEffects xmlns:a14="http://schemas.microsoft.com/office/drawing/2010/main">
-                <a:effectLst>
-                  <a:outerShdw dist="35921" dir="2700000" algn="ctr" rotWithShape="0">
-                    <a:schemeClr val="bg2"/>
-                  </a:outerShdw>
-                </a:effectLst>
-              </a14:hiddenEffects>
-            </a:ext>
-          </a:extLst>
-        </p:spPr>
-      </p:pic>
-      <p:sp>
-        <p:nvSpPr>
-          <p:cNvPr id="6" name="TextBox 5"/>
-          <p:cNvSpPr txBox="1"/>
-          <p:nvPr/>
-        </p:nvSpPr>
-        <p:spPr>
-          <a:xfrm>
-            <a:off x="1219200" y="5638800"/>
-            <a:ext cx="6858000" cy="646331"/>
-          </a:xfrm>
-          <a:prstGeom prst="rect">
-            <a:avLst/>
-          </a:prstGeom>
-          <a:noFill/>
-        </p:spPr>
-        <p:txBody>
-          <a:bodyPr wrap="square" rtlCol="0">
-            <a:spAutoFit/>
-          </a:bodyPr>
-          <a:lstStyle/>
-          <a:p>
-            <a:r>
-              <a:rPr lang="en-US" dirty="0" smtClean="0"/>
-              <a:t>This use case diagram depicts the different user account types and what they have access to within the SEMRS system. </a:t>
-            </a:r>
-            <a:endParaRPr lang="en-US" dirty="0"/>
-          </a:p>
-        </p:txBody>
-      </p:sp>
-    </p:spTree>
-    <p:extLst>
-      <p:ext uri="{BB962C8B-B14F-4D97-AF65-F5344CB8AC3E}">
-        <p14:creationId xmlns:p14="http://schemas.microsoft.com/office/powerpoint/2010/main" val="1891132232"/>
-      </p:ext>
-    </p:extLst>
-  </p:cSld>
-  <p:clrMapOvr>
-    <a:masterClrMapping/>
-  </p:clrMapOvr>
-  <p:timing>
-    <p:tnLst>
-      <p:par>
-        <p:cTn id="1" dur="indefinite" restart="never" nodeType="tmRoot"/>
-      </p:par>
-    </p:tnLst>
-  </p:timing>
-</p:sld>
-</file>
-
-<file path=ppt/slides/slide12.xml><?xml version="1.0" encoding="utf-8"?>
-<p:sld xmlns:a="http://schemas.openxmlformats.org/drawingml/2006/main" xmlns:r="http://schemas.openxmlformats.org/officeDocument/2006/relationships" xmlns:p="http://schemas.openxmlformats.org/presentationml/2006/main">
-  <p:cSld>
-    <p:spTree>
-      <p:nvGrpSpPr>
-        <p:cNvPr id="1" name=""/>
-        <p:cNvGrpSpPr/>
-        <p:nvPr/>
-      </p:nvGrpSpPr>
-      <p:grpSpPr>
-        <a:xfrm>
-          <a:off x="0" y="0"/>
-          <a:ext cx="0" cy="0"/>
-          <a:chOff x="0" y="0"/>
-          <a:chExt cx="0" cy="0"/>
-        </a:xfrm>
-      </p:grpSpPr>
-      <p:sp>
-        <p:nvSpPr>
-          <p:cNvPr id="2" name="Title 1"/>
-          <p:cNvSpPr>
-            <a:spLocks noGrp="1"/>
-          </p:cNvSpPr>
-          <p:nvPr>
-            <p:ph type="title"/>
-          </p:nvPr>
-        </p:nvSpPr>
-        <p:spPr>
-          <a:xfrm>
-            <a:off x="0" y="381000"/>
-            <a:ext cx="8458200" cy="793812"/>
-          </a:xfrm>
-        </p:spPr>
-        <p:txBody>
-          <a:bodyPr>
-            <a:normAutofit/>
-          </a:bodyPr>
-          <a:lstStyle/>
-          <a:p>
-            <a:pPr algn="ctr"/>
-            <a:r>
-              <a:rPr lang="en-US" dirty="0" smtClean="0"/>
-              <a:t>Future Work</a:t>
-            </a:r>
-            <a:endParaRPr lang="en-US" dirty="0"/>
-          </a:p>
-        </p:txBody>
-      </p:sp>
-      <p:sp>
-        <p:nvSpPr>
-          <p:cNvPr id="3" name="Content Placeholder 2"/>
-          <p:cNvSpPr>
-            <a:spLocks noGrp="1"/>
-          </p:cNvSpPr>
-          <p:nvPr>
-            <p:ph idx="1"/>
-          </p:nvPr>
-        </p:nvSpPr>
-        <p:spPr>
-          <a:xfrm>
-            <a:off x="914400" y="1752600"/>
-            <a:ext cx="7391400" cy="4556761"/>
-          </a:xfrm>
-        </p:spPr>
-        <p:txBody>
-          <a:bodyPr>
-            <a:normAutofit/>
-          </a:bodyPr>
-          <a:lstStyle/>
-          <a:p>
-            <a:pPr>
-              <a:lnSpc>
-                <a:spcPct val="200000"/>
-              </a:lnSpc>
-            </a:pPr>
-            <a:r>
-              <a:rPr lang="en-US" sz="2800" dirty="0" smtClean="0"/>
-              <a:t>Ability to upload Patient files</a:t>
-            </a:r>
-            <a:endParaRPr lang="en-US" sz="2800" dirty="0" smtClean="0"/>
-          </a:p>
-          <a:p>
-            <a:pPr>
-              <a:lnSpc>
-                <a:spcPct val="200000"/>
-              </a:lnSpc>
-            </a:pPr>
-            <a:endParaRPr lang="en-US" sz="2800" dirty="0" smtClean="0"/>
-          </a:p>
-          <a:p>
-            <a:pPr>
-              <a:lnSpc>
-                <a:spcPct val="200000"/>
-              </a:lnSpc>
-            </a:pPr>
-            <a:endParaRPr lang="en-US" sz="2800" dirty="0" smtClean="0"/>
-          </a:p>
-        </p:txBody>
-      </p:sp>
-      <p:sp>
-        <p:nvSpPr>
-          <p:cNvPr id="7" name="Slide Number Placeholder 6"/>
-          <p:cNvSpPr>
-            <a:spLocks noGrp="1"/>
-          </p:cNvSpPr>
-          <p:nvPr>
-            <p:ph type="sldNum" sz="quarter" idx="12"/>
-          </p:nvPr>
-        </p:nvSpPr>
-        <p:spPr/>
-        <p:txBody>
-          <a:bodyPr/>
-          <a:lstStyle/>
-          <a:p>
-            <a:fld id="{85816456-AF90-4826-9770-6E0598D9C364}" type="slidenum">
-              <a:rPr lang="en-US" smtClean="0"/>
-              <a:t>12</a:t>
-            </a:fld>
-            <a:endParaRPr lang="en-US" dirty="0"/>
-          </a:p>
-        </p:txBody>
-      </p:sp>
-    </p:spTree>
-    <p:extLst>
-      <p:ext uri="{BB962C8B-B14F-4D97-AF65-F5344CB8AC3E}">
-        <p14:creationId xmlns:p14="http://schemas.microsoft.com/office/powerpoint/2010/main" val="3200271559"/>
-      </p:ext>
-    </p:extLst>
-  </p:cSld>
-  <p:clrMapOvr>
-    <a:masterClrMapping/>
-  </p:clrMapOvr>
-  <p:timing>
-    <p:tnLst>
-      <p:par>
-        <p:cTn id="1" dur="indefinite" restart="never" nodeType="tmRoot"/>
-      </p:par>
-    </p:tnLst>
-  </p:timing>
-</p:sld>
-</file>
-
-<file path=ppt/slides/slide13.xml><?xml version="1.0" encoding="utf-8"?>
-<p:sld xmlns:a="http://schemas.openxmlformats.org/drawingml/2006/main" xmlns:r="http://schemas.openxmlformats.org/officeDocument/2006/relationships" xmlns:p="http://schemas.openxmlformats.org/presentationml/2006/main">
-  <p:cSld>
-    <p:spTree>
-      <p:nvGrpSpPr>
-        <p:cNvPr id="1" name=""/>
-        <p:cNvGrpSpPr/>
-        <p:nvPr/>
-      </p:nvGrpSpPr>
-      <p:grpSpPr>
-        <a:xfrm>
-          <a:off x="0" y="0"/>
-          <a:ext cx="0" cy="0"/>
-          <a:chOff x="0" y="0"/>
-          <a:chExt cx="0" cy="0"/>
-        </a:xfrm>
-      </p:grpSpPr>
-      <p:sp>
-        <p:nvSpPr>
-          <p:cNvPr id="2" name="Title 1"/>
-          <p:cNvSpPr>
-            <a:spLocks noGrp="1"/>
-          </p:cNvSpPr>
-          <p:nvPr>
-            <p:ph type="title"/>
-          </p:nvPr>
-        </p:nvSpPr>
-        <p:spPr>
-          <a:xfrm>
-            <a:off x="0" y="0"/>
-            <a:ext cx="9144000" cy="6858000"/>
-          </a:xfrm>
-        </p:spPr>
-        <p:txBody>
-          <a:bodyPr anchor="ctr">
-            <a:normAutofit/>
-          </a:bodyPr>
-          <a:lstStyle/>
-          <a:p>
-            <a:pPr algn="ctr"/>
-            <a:r>
-              <a:rPr lang="en-US" dirty="0" smtClean="0"/>
-              <a:t>fin</a:t>
-            </a:r>
-            <a:r>
-              <a:rPr lang="en-US" dirty="0"/>
-              <a:t/>
-            </a:r>
-            <a:br>
-              <a:rPr lang="en-US" dirty="0"/>
-            </a:br>
-            <a:endParaRPr lang="en-US" dirty="0"/>
-          </a:p>
-        </p:txBody>
-      </p:sp>
-      <p:sp>
-        <p:nvSpPr>
-          <p:cNvPr id="6" name="Slide Number Placeholder 5"/>
-          <p:cNvSpPr>
-            <a:spLocks noGrp="1"/>
-          </p:cNvSpPr>
-          <p:nvPr>
-            <p:ph type="sldNum" sz="quarter" idx="12"/>
-          </p:nvPr>
-        </p:nvSpPr>
-        <p:spPr/>
-        <p:txBody>
-          <a:bodyPr/>
-          <a:lstStyle/>
-          <a:p>
-            <a:fld id="{85816456-AF90-4826-9770-6E0598D9C364}" type="slidenum">
-              <a:rPr lang="en-US" smtClean="0"/>
-              <a:t>13</a:t>
-            </a:fld>
-            <a:endParaRPr lang="en-US" dirty="0"/>
-          </a:p>
-        </p:txBody>
-      </p:sp>
-    </p:spTree>
-    <p:extLst>
-      <p:ext uri="{BB962C8B-B14F-4D97-AF65-F5344CB8AC3E}">
-        <p14:creationId xmlns:p14="http://schemas.microsoft.com/office/powerpoint/2010/main" val="544880957"/>
-      </p:ext>
-    </p:extLst>
-  </p:cSld>
-  <p:clrMapOvr>
-    <a:masterClrMapping/>
-  </p:clrMapOvr>
-  <p:timing>
-    <p:tnLst>
-      <p:par>
-        <p:cTn id="1" dur="indefinite" restart="never" nodeType="tmRoot"/>
-      </p:par>
-    </p:tnLst>
-  </p:timing>
-</p:sld>
-</file>
-
-<file path=ppt/slides/slide2.xml><?xml version="1.0" encoding="utf-8"?>
-<p:sld xmlns:a="http://schemas.openxmlformats.org/drawingml/2006/main" xmlns:r="http://schemas.openxmlformats.org/officeDocument/2006/relationships" xmlns:p="http://schemas.openxmlformats.org/presentationml/2006/main">
-  <p:cSld>
-    <p:spTree>
-      <p:nvGrpSpPr>
-        <p:cNvPr id="1" name=""/>
-        <p:cNvGrpSpPr/>
-        <p:nvPr/>
-      </p:nvGrpSpPr>
-      <p:grpSpPr>
-        <a:xfrm>
-          <a:off x="0" y="0"/>
-          <a:ext cx="0" cy="0"/>
-          <a:chOff x="0" y="0"/>
-          <a:chExt cx="0" cy="0"/>
-        </a:xfrm>
-      </p:grpSpPr>
-      <p:sp>
-        <p:nvSpPr>
-          <p:cNvPr id="2" name="Title 1"/>
-          <p:cNvSpPr>
-            <a:spLocks noGrp="1"/>
-          </p:cNvSpPr>
-          <p:nvPr>
-            <p:ph type="title"/>
-          </p:nvPr>
-        </p:nvSpPr>
-        <p:spPr>
-          <a:xfrm>
-            <a:off x="914400" y="152400"/>
-            <a:ext cx="7315200" cy="1154097"/>
-          </a:xfrm>
-        </p:spPr>
-        <p:txBody>
-          <a:bodyPr/>
-          <a:lstStyle/>
-          <a:p>
-            <a:pPr algn="ctr"/>
-            <a:r>
-              <a:rPr lang="en-US" dirty="0" smtClean="0"/>
-              <a:t>Problem Statement</a:t>
-            </a:r>
-            <a:endParaRPr lang="en-US" dirty="0"/>
-          </a:p>
-        </p:txBody>
-      </p:sp>
-      <p:sp>
-        <p:nvSpPr>
-          <p:cNvPr id="3" name="Content Placeholder 2"/>
-          <p:cNvSpPr>
-            <a:spLocks noGrp="1"/>
-          </p:cNvSpPr>
-          <p:nvPr>
-            <p:ph idx="1"/>
-          </p:nvPr>
-        </p:nvSpPr>
-        <p:spPr>
-          <a:xfrm>
-            <a:off x="914400" y="1828800"/>
-            <a:ext cx="7315200" cy="3539527"/>
-          </a:xfrm>
-        </p:spPr>
-        <p:txBody>
-          <a:bodyPr/>
-          <a:lstStyle/>
-          <a:p>
-            <a:pPr lvl="1">
-              <a:lnSpc>
-                <a:spcPct val="150000"/>
-              </a:lnSpc>
-            </a:pPr>
-            <a:r>
-              <a:rPr lang="en-US" sz="3000" dirty="0" smtClean="0"/>
-              <a:t>Designed Specifically for MCHC</a:t>
-            </a:r>
-          </a:p>
-          <a:p>
-            <a:pPr lvl="1">
-              <a:lnSpc>
-                <a:spcPct val="150000"/>
-              </a:lnSpc>
-            </a:pPr>
-            <a:r>
-              <a:rPr lang="en-US" sz="3000" dirty="0" smtClean="0"/>
-              <a:t>Loss/Damage to Patient’s files</a:t>
-            </a:r>
-            <a:endParaRPr lang="en-US" sz="3000" dirty="0"/>
-          </a:p>
-          <a:p>
-            <a:pPr lvl="1">
-              <a:lnSpc>
-                <a:spcPct val="150000"/>
-              </a:lnSpc>
-            </a:pPr>
-            <a:r>
-              <a:rPr lang="en-US" sz="3000" dirty="0"/>
-              <a:t>Delay or hinder treatment </a:t>
-            </a:r>
-            <a:r>
-              <a:rPr lang="en-US" sz="3000" dirty="0" smtClean="0"/>
-              <a:t>progress</a:t>
-            </a:r>
-          </a:p>
-          <a:p>
-            <a:pPr lvl="1">
-              <a:lnSpc>
-                <a:spcPct val="150000"/>
-              </a:lnSpc>
-            </a:pPr>
-            <a:r>
-              <a:rPr lang="en-US" sz="3000" dirty="0" smtClean="0"/>
-              <a:t>Issue of identity theft</a:t>
-            </a:r>
-            <a:endParaRPr lang="en-US" sz="3000" dirty="0"/>
-          </a:p>
-          <a:p>
-            <a:pPr marL="45720" indent="0">
-              <a:buNone/>
-            </a:pPr>
-            <a:endParaRPr lang="en-US" dirty="0"/>
-          </a:p>
-        </p:txBody>
-      </p:sp>
-      <p:sp>
-        <p:nvSpPr>
-          <p:cNvPr id="4" name="Slide Number Placeholder 3"/>
-          <p:cNvSpPr>
-            <a:spLocks noGrp="1"/>
-          </p:cNvSpPr>
-          <p:nvPr>
-            <p:ph type="sldNum" sz="quarter" idx="12"/>
-          </p:nvPr>
-        </p:nvSpPr>
-        <p:spPr/>
-        <p:txBody>
-          <a:bodyPr/>
-          <a:lstStyle/>
-          <a:p>
-            <a:fld id="{85816456-AF90-4826-9770-6E0598D9C364}" type="slidenum">
-              <a:rPr lang="en-US" smtClean="0"/>
-              <a:t>2</a:t>
-            </a:fld>
-            <a:endParaRPr lang="en-US" dirty="0"/>
-          </a:p>
-        </p:txBody>
-      </p:sp>
-    </p:spTree>
-    <p:extLst>
-      <p:ext uri="{BB962C8B-B14F-4D97-AF65-F5344CB8AC3E}">
-        <p14:creationId xmlns:p14="http://schemas.microsoft.com/office/powerpoint/2010/main" val="941291479"/>
-      </p:ext>
-    </p:extLst>
-  </p:cSld>
-  <p:clrMapOvr>
-    <a:masterClrMapping/>
-  </p:clrMapOvr>
-</p:sld>
-</file>
-
-<file path=ppt/slides/slide3.xml><?xml version="1.0" encoding="utf-8"?>
-<p:sld xmlns:a="http://schemas.openxmlformats.org/drawingml/2006/main" xmlns:r="http://schemas.openxmlformats.org/officeDocument/2006/relationships" xmlns:p="http://schemas.openxmlformats.org/presentationml/2006/main">
-  <p:cSld>
-    <p:spTree>
-      <p:nvGrpSpPr>
-        <p:cNvPr id="1" name=""/>
-        <p:cNvGrpSpPr/>
-        <p:nvPr/>
-      </p:nvGrpSpPr>
-      <p:grpSpPr>
-        <a:xfrm>
-          <a:off x="0" y="0"/>
-          <a:ext cx="0" cy="0"/>
-          <a:chOff x="0" y="0"/>
-          <a:chExt cx="0" cy="0"/>
-        </a:xfrm>
-      </p:grpSpPr>
-      <p:sp>
-        <p:nvSpPr>
-          <p:cNvPr id="2" name="Title 1"/>
-          <p:cNvSpPr>
-            <a:spLocks noGrp="1"/>
-          </p:cNvSpPr>
-          <p:nvPr>
-            <p:ph type="title"/>
-          </p:nvPr>
-        </p:nvSpPr>
-        <p:spPr>
-          <a:xfrm>
-            <a:off x="914400" y="141303"/>
-            <a:ext cx="7315200" cy="1154097"/>
-          </a:xfrm>
-        </p:spPr>
-        <p:txBody>
-          <a:bodyPr/>
-          <a:lstStyle/>
-          <a:p>
-            <a:pPr algn="ctr"/>
-            <a:r>
-              <a:rPr lang="en-US" dirty="0" smtClean="0"/>
-              <a:t>Motivation</a:t>
-            </a:r>
-            <a:endParaRPr lang="en-US" dirty="0"/>
-          </a:p>
-        </p:txBody>
-      </p:sp>
-      <p:sp>
-        <p:nvSpPr>
-          <p:cNvPr id="3" name="Content Placeholder 2"/>
-          <p:cNvSpPr>
-            <a:spLocks noGrp="1"/>
-          </p:cNvSpPr>
-          <p:nvPr>
-            <p:ph idx="1"/>
-          </p:nvPr>
-        </p:nvSpPr>
-        <p:spPr>
-          <a:xfrm>
-            <a:off x="914400" y="1676400"/>
-            <a:ext cx="7315200" cy="4114800"/>
-          </a:xfrm>
-        </p:spPr>
-        <p:txBody>
-          <a:bodyPr>
-            <a:normAutofit lnSpcReduction="10000"/>
-          </a:bodyPr>
-          <a:lstStyle/>
-          <a:p>
-            <a:r>
-              <a:rPr lang="en-US" sz="3200" dirty="0" smtClean="0"/>
-              <a:t>MCHC needs a better medical records system</a:t>
-            </a:r>
-          </a:p>
-          <a:p>
-            <a:r>
-              <a:rPr lang="en-US" sz="3200" dirty="0" smtClean="0"/>
-              <a:t>This system can improve the overall treatment process</a:t>
-            </a:r>
-          </a:p>
-          <a:p>
-            <a:r>
-              <a:rPr lang="en-US" sz="3200" dirty="0" smtClean="0"/>
-              <a:t>Want to provide a system that is: </a:t>
-            </a:r>
-          </a:p>
-          <a:p>
-            <a:pPr marL="45720" indent="0">
-              <a:buNone/>
-            </a:pPr>
-            <a:r>
-              <a:rPr lang="en-US" dirty="0" smtClean="0"/>
-              <a:t>	</a:t>
-            </a:r>
-            <a:r>
-              <a:rPr lang="en-US" sz="2800" dirty="0" smtClean="0"/>
-              <a:t>-Easy to use </a:t>
-            </a:r>
-          </a:p>
-          <a:p>
-            <a:pPr marL="45720" indent="0">
-              <a:buNone/>
-            </a:pPr>
-            <a:r>
-              <a:rPr lang="en-US" sz="2800" dirty="0"/>
-              <a:t>	</a:t>
-            </a:r>
-            <a:r>
-              <a:rPr lang="en-US" sz="2800" dirty="0" smtClean="0"/>
-              <a:t>-Secure </a:t>
-            </a:r>
-          </a:p>
-          <a:p>
-            <a:pPr marL="45720" indent="0">
-              <a:buNone/>
-            </a:pPr>
-            <a:r>
-              <a:rPr lang="en-US" sz="2800" dirty="0"/>
-              <a:t>	</a:t>
-            </a:r>
-            <a:r>
-              <a:rPr lang="en-US" sz="2800" dirty="0" smtClean="0"/>
-              <a:t>-Without unnecessary features</a:t>
-            </a:r>
-            <a:endParaRPr lang="en-US" sz="2800" dirty="0"/>
-          </a:p>
-          <a:p>
-            <a:endParaRPr lang="en-US" dirty="0"/>
-          </a:p>
-        </p:txBody>
-      </p:sp>
-      <p:sp>
-        <p:nvSpPr>
-          <p:cNvPr id="4" name="Slide Number Placeholder 3"/>
-          <p:cNvSpPr>
-            <a:spLocks noGrp="1"/>
-          </p:cNvSpPr>
-          <p:nvPr>
-            <p:ph type="sldNum" sz="quarter" idx="12"/>
-          </p:nvPr>
-        </p:nvSpPr>
-        <p:spPr/>
-        <p:txBody>
-          <a:bodyPr/>
-          <a:lstStyle/>
-          <a:p>
-            <a:fld id="{85816456-AF90-4826-9770-6E0598D9C364}" type="slidenum">
-              <a:rPr lang="en-US" smtClean="0"/>
-              <a:t>3</a:t>
-            </a:fld>
-            <a:endParaRPr lang="en-US" dirty="0"/>
-          </a:p>
-        </p:txBody>
-      </p:sp>
-    </p:spTree>
-    <p:extLst>
-      <p:ext uri="{BB962C8B-B14F-4D97-AF65-F5344CB8AC3E}">
-        <p14:creationId xmlns:p14="http://schemas.microsoft.com/office/powerpoint/2010/main" val="2035189606"/>
-      </p:ext>
-    </p:extLst>
-  </p:cSld>
-  <p:clrMapOvr>
-    <a:masterClrMapping/>
-  </p:clrMapOvr>
-</p:sld>
-</file>
-
-<file path=ppt/slides/slide4.xml><?xml version="1.0" encoding="utf-8"?>
-<p:sld xmlns:a="http://schemas.openxmlformats.org/drawingml/2006/main" xmlns:r="http://schemas.openxmlformats.org/officeDocument/2006/relationships" xmlns:p="http://schemas.openxmlformats.org/presentationml/2006/main">
-  <p:cSld>
-    <p:spTree>
-      <p:nvGrpSpPr>
-        <p:cNvPr id="1" name=""/>
-        <p:cNvGrpSpPr/>
-        <p:nvPr/>
-      </p:nvGrpSpPr>
-      <p:grpSpPr>
-        <a:xfrm>
-          <a:off x="0" y="0"/>
-          <a:ext cx="0" cy="0"/>
-          <a:chOff x="0" y="0"/>
-          <a:chExt cx="0" cy="0"/>
-        </a:xfrm>
-      </p:grpSpPr>
-      <p:sp>
-        <p:nvSpPr>
-          <p:cNvPr id="2" name="Title 1"/>
-          <p:cNvSpPr>
-            <a:spLocks noGrp="1"/>
-          </p:cNvSpPr>
-          <p:nvPr>
-            <p:ph type="title"/>
-          </p:nvPr>
-        </p:nvSpPr>
-        <p:spPr>
-          <a:xfrm>
-            <a:off x="27708" y="533400"/>
-            <a:ext cx="8430491" cy="634552"/>
-          </a:xfrm>
-        </p:spPr>
-        <p:txBody>
-          <a:bodyPr>
-            <a:noAutofit/>
-          </a:bodyPr>
-          <a:lstStyle/>
-          <a:p>
-            <a:pPr algn="ctr"/>
-            <a:r>
-              <a:rPr lang="en-US" dirty="0" smtClean="0"/>
-              <a:t>Summary of SEMRS</a:t>
-            </a:r>
-            <a:endParaRPr lang="en-US" dirty="0"/>
-          </a:p>
-        </p:txBody>
-      </p:sp>
-      <p:sp>
-        <p:nvSpPr>
-          <p:cNvPr id="3" name="Content Placeholder 2"/>
-          <p:cNvSpPr>
-            <a:spLocks noGrp="1"/>
-          </p:cNvSpPr>
-          <p:nvPr>
-            <p:ph idx="1"/>
-          </p:nvPr>
-        </p:nvSpPr>
-        <p:spPr>
-          <a:xfrm>
-            <a:off x="914400" y="1600201"/>
-            <a:ext cx="7772400" cy="4709160"/>
-          </a:xfrm>
-        </p:spPr>
-        <p:txBody>
-          <a:bodyPr>
-            <a:normAutofit lnSpcReduction="10000"/>
-          </a:bodyPr>
-          <a:lstStyle/>
-          <a:p>
-            <a:pPr>
-              <a:lnSpc>
-                <a:spcPct val="150000"/>
-              </a:lnSpc>
-            </a:pPr>
-            <a:r>
-              <a:rPr lang="en-US" sz="3200" dirty="0" smtClean="0"/>
-              <a:t>Motivation - Why we chose this project?</a:t>
-            </a:r>
-          </a:p>
-          <a:p>
-            <a:pPr lvl="1">
-              <a:lnSpc>
-                <a:spcPct val="150000"/>
-              </a:lnSpc>
-            </a:pPr>
-            <a:r>
-              <a:rPr lang="en-US" sz="3000" dirty="0" smtClean="0"/>
-              <a:t>Record backup </a:t>
-            </a:r>
-          </a:p>
-          <a:p>
-            <a:pPr>
-              <a:lnSpc>
-                <a:spcPct val="150000"/>
-              </a:lnSpc>
-            </a:pPr>
-            <a:r>
-              <a:rPr lang="en-US" sz="3200" dirty="0" smtClean="0"/>
-              <a:t>Problem - What we are solving?</a:t>
-            </a:r>
-          </a:p>
-          <a:p>
-            <a:pPr lvl="1">
-              <a:lnSpc>
-                <a:spcPct val="150000"/>
-              </a:lnSpc>
-            </a:pPr>
-            <a:r>
-              <a:rPr lang="en-US" sz="3000" dirty="0" smtClean="0"/>
-              <a:t>Identity theft</a:t>
-            </a:r>
-          </a:p>
-          <a:p>
-            <a:pPr lvl="1">
-              <a:lnSpc>
-                <a:spcPct val="150000"/>
-              </a:lnSpc>
-            </a:pPr>
-            <a:r>
-              <a:rPr lang="en-US" sz="3000" dirty="0" smtClean="0"/>
-              <a:t>Delay or hinder treatment progress</a:t>
-            </a:r>
-          </a:p>
-          <a:p>
-            <a:pPr>
-              <a:lnSpc>
-                <a:spcPct val="150000"/>
-              </a:lnSpc>
-            </a:pPr>
-            <a:r>
-              <a:rPr lang="en-US" sz="3200" dirty="0" smtClean="0"/>
-              <a:t>Solution - How we are fixing it?</a:t>
-            </a:r>
-          </a:p>
-        </p:txBody>
-      </p:sp>
-      <p:sp>
-        <p:nvSpPr>
-          <p:cNvPr id="7" name="Slide Number Placeholder 6"/>
-          <p:cNvSpPr>
-            <a:spLocks noGrp="1"/>
-          </p:cNvSpPr>
-          <p:nvPr>
-            <p:ph type="sldNum" sz="quarter" idx="12"/>
-          </p:nvPr>
-        </p:nvSpPr>
-        <p:spPr/>
-        <p:txBody>
-          <a:bodyPr/>
-          <a:lstStyle/>
-          <a:p>
-            <a:fld id="{85816456-AF90-4826-9770-6E0598D9C364}" type="slidenum">
-              <a:rPr lang="en-US" smtClean="0"/>
-              <a:t>4</a:t>
-            </a:fld>
-            <a:endParaRPr lang="en-US" dirty="0"/>
-          </a:p>
-        </p:txBody>
-      </p:sp>
-    </p:spTree>
-    <p:extLst>
-      <p:ext uri="{BB962C8B-B14F-4D97-AF65-F5344CB8AC3E}">
-        <p14:creationId xmlns:p14="http://schemas.microsoft.com/office/powerpoint/2010/main" val="3032684912"/>
-      </p:ext>
-    </p:extLst>
-  </p:cSld>
-  <p:clrMapOvr>
-    <a:masterClrMapping/>
-  </p:clrMapOvr>
-  <p:timing>
-    <p:tnLst>
-      <p:par>
-        <p:cTn id="1" dur="indefinite" restart="never" nodeType="tmRoot"/>
-      </p:par>
-    </p:tnLst>
-  </p:timing>
-</p:sld>
-</file>
-
-<file path=ppt/slides/slide5.xml><?xml version="1.0" encoding="utf-8"?>
-<p:sld xmlns:a="http://schemas.openxmlformats.org/drawingml/2006/main" xmlns:r="http://schemas.openxmlformats.org/officeDocument/2006/relationships" xmlns:p="http://schemas.openxmlformats.org/presentationml/2006/main">
-  <p:cSld>
-    <p:spTree>
-      <p:nvGrpSpPr>
-        <p:cNvPr id="1" name=""/>
-        <p:cNvGrpSpPr/>
-        <p:nvPr/>
-      </p:nvGrpSpPr>
-      <p:grpSpPr>
-        <a:xfrm>
-          <a:off x="0" y="0"/>
-          <a:ext cx="0" cy="0"/>
-          <a:chOff x="0" y="0"/>
-          <a:chExt cx="0" cy="0"/>
-        </a:xfrm>
-      </p:grpSpPr>
-      <p:sp>
-        <p:nvSpPr>
-          <p:cNvPr id="2" name="Title 1"/>
-          <p:cNvSpPr>
-            <a:spLocks noGrp="1"/>
-          </p:cNvSpPr>
-          <p:nvPr>
-            <p:ph type="title"/>
-          </p:nvPr>
-        </p:nvSpPr>
-        <p:spPr>
-          <a:xfrm>
-            <a:off x="0" y="381000"/>
-            <a:ext cx="8458200" cy="773097"/>
-          </a:xfrm>
-        </p:spPr>
-        <p:txBody>
-          <a:bodyPr>
-            <a:normAutofit/>
-          </a:bodyPr>
-          <a:lstStyle/>
-          <a:p>
-            <a:pPr algn="ctr"/>
-            <a:r>
-              <a:rPr lang="en-US" dirty="0" smtClean="0"/>
-              <a:t>Medical Databases Overview </a:t>
-            </a:r>
-            <a:endParaRPr lang="en-US" dirty="0"/>
-          </a:p>
-        </p:txBody>
-      </p:sp>
-      <p:sp>
-        <p:nvSpPr>
-          <p:cNvPr id="3" name="Content Placeholder 2"/>
-          <p:cNvSpPr>
-            <a:spLocks noGrp="1"/>
-          </p:cNvSpPr>
-          <p:nvPr>
-            <p:ph idx="1"/>
-          </p:nvPr>
-        </p:nvSpPr>
-        <p:spPr>
-          <a:xfrm>
-            <a:off x="876300" y="1676401"/>
-            <a:ext cx="7315200" cy="3505200"/>
-          </a:xfrm>
-        </p:spPr>
-        <p:txBody>
-          <a:bodyPr>
-            <a:normAutofit/>
-          </a:bodyPr>
-          <a:lstStyle/>
-          <a:p>
-            <a:pPr>
-              <a:lnSpc>
-                <a:spcPct val="150000"/>
-              </a:lnSpc>
-            </a:pPr>
-            <a:r>
-              <a:rPr lang="en-US" sz="2800" dirty="0" smtClean="0"/>
-              <a:t>Healthcare world moving away from paper records.</a:t>
-            </a:r>
-          </a:p>
-          <a:p>
-            <a:pPr>
-              <a:lnSpc>
-                <a:spcPct val="150000"/>
-              </a:lnSpc>
-            </a:pPr>
-            <a:r>
-              <a:rPr lang="en-US" sz="2800" dirty="0" smtClean="0"/>
-              <a:t>Patient confidentiality &gt; National priorities</a:t>
-            </a:r>
-          </a:p>
-          <a:p>
-            <a:pPr>
-              <a:lnSpc>
-                <a:spcPct val="150000"/>
-              </a:lnSpc>
-            </a:pPr>
-            <a:r>
-              <a:rPr lang="en-US" sz="2800" dirty="0" smtClean="0"/>
-              <a:t>How private are these records and who has access ? </a:t>
-            </a:r>
-          </a:p>
-        </p:txBody>
-      </p:sp>
-      <p:pic>
-        <p:nvPicPr>
-          <p:cNvPr id="2050" name="Picture 2" descr="C:\Users\Ryan\AppData\Local\Microsoft\Windows\Temporary Internet Files\Content.IE5\HLIERN46\MP900422184[1].jpg"/>
-          <p:cNvPicPr>
-            <a:picLocks noChangeAspect="1" noChangeArrowheads="1"/>
-          </p:cNvPicPr>
-          <p:nvPr/>
-        </p:nvPicPr>
-        <p:blipFill>
-          <a:blip r:embed="rId3" cstate="print">
-            <a:extLst>
-              <a:ext uri="{28A0092B-C50C-407E-A947-70E740481C1C}">
-                <a14:useLocalDpi xmlns:a14="http://schemas.microsoft.com/office/drawing/2010/main" val="0"/>
-              </a:ext>
-            </a:extLst>
-          </a:blip>
-          <a:srcRect/>
-          <a:stretch>
-            <a:fillRect/>
-          </a:stretch>
-        </p:blipFill>
-        <p:spPr bwMode="auto">
-          <a:xfrm>
-            <a:off x="3276600" y="5283041"/>
-            <a:ext cx="2057400" cy="1371064"/>
-          </a:xfrm>
-          <a:prstGeom prst="rect">
-            <a:avLst/>
-          </a:prstGeom>
-          <a:noFill/>
-          <a:extLst>
-            <a:ext uri="{909E8E84-426E-40DD-AFC4-6F175D3DCCD1}">
-              <a14:hiddenFill xmlns:a14="http://schemas.microsoft.com/office/drawing/2010/main">
-                <a:solidFill>
-                  <a:srgbClr val="FFFFFF"/>
-                </a:solidFill>
-              </a14:hiddenFill>
-            </a:ext>
-          </a:extLst>
-        </p:spPr>
-      </p:pic>
-      <p:sp>
-        <p:nvSpPr>
-          <p:cNvPr id="7" name="Slide Number Placeholder 6"/>
-          <p:cNvSpPr>
-            <a:spLocks noGrp="1"/>
-          </p:cNvSpPr>
-          <p:nvPr>
-            <p:ph type="sldNum" sz="quarter" idx="12"/>
-          </p:nvPr>
-        </p:nvSpPr>
-        <p:spPr/>
-        <p:txBody>
-          <a:bodyPr/>
-          <a:lstStyle/>
-          <a:p>
-            <a:fld id="{85816456-AF90-4826-9770-6E0598D9C364}" type="slidenum">
-              <a:rPr lang="en-US" smtClean="0"/>
-              <a:t>5</a:t>
-            </a:fld>
-            <a:endParaRPr lang="en-US" dirty="0"/>
-          </a:p>
-        </p:txBody>
-      </p:sp>
-    </p:spTree>
-    <p:extLst>
-      <p:ext uri="{BB962C8B-B14F-4D97-AF65-F5344CB8AC3E}">
-        <p14:creationId xmlns:p14="http://schemas.microsoft.com/office/powerpoint/2010/main" val="2383770867"/>
-      </p:ext>
-    </p:extLst>
-  </p:cSld>
-  <p:clrMapOvr>
-    <a:masterClrMapping/>
-  </p:clrMapOvr>
-  <p:timing>
-    <p:tnLst>
-      <p:par>
-        <p:cTn id="1" dur="indefinite" restart="never" nodeType="tmRoot"/>
-      </p:par>
-    </p:tnLst>
-  </p:timing>
-</p:sld>
-</file>
-
-<file path=ppt/slides/slide6.xml><?xml version="1.0" encoding="utf-8"?>
-<p:sld xmlns:a="http://schemas.openxmlformats.org/drawingml/2006/main" xmlns:r="http://schemas.openxmlformats.org/officeDocument/2006/relationships" xmlns:p="http://schemas.openxmlformats.org/presentationml/2006/main">
-  <p:cSld>
-    <p:spTree>
-      <p:nvGrpSpPr>
-        <p:cNvPr id="1" name=""/>
-        <p:cNvGrpSpPr/>
-        <p:nvPr/>
-      </p:nvGrpSpPr>
-      <p:grpSpPr>
-        <a:xfrm>
-          <a:off x="0" y="0"/>
-          <a:ext cx="0" cy="0"/>
-          <a:chOff x="0" y="0"/>
-          <a:chExt cx="0" cy="0"/>
-        </a:xfrm>
-      </p:grpSpPr>
-      <p:sp>
-        <p:nvSpPr>
-          <p:cNvPr id="2" name="Title 1"/>
-          <p:cNvSpPr>
-            <a:spLocks noGrp="1"/>
-          </p:cNvSpPr>
-          <p:nvPr>
-            <p:ph type="title"/>
-          </p:nvPr>
-        </p:nvSpPr>
-        <p:spPr>
-          <a:xfrm>
-            <a:off x="0" y="457200"/>
-            <a:ext cx="8458200" cy="717612"/>
-          </a:xfrm>
-        </p:spPr>
-        <p:txBody>
-          <a:bodyPr>
-            <a:normAutofit/>
-          </a:bodyPr>
-          <a:lstStyle/>
-          <a:p>
-            <a:pPr algn="ctr"/>
-            <a:r>
-              <a:rPr lang="en-US" dirty="0" smtClean="0"/>
-              <a:t>History of Past EMR Systems</a:t>
-            </a:r>
-            <a:endParaRPr lang="en-US" dirty="0"/>
-          </a:p>
-        </p:txBody>
-      </p:sp>
-      <p:sp>
-        <p:nvSpPr>
-          <p:cNvPr id="3" name="Content Placeholder 2"/>
-          <p:cNvSpPr>
-            <a:spLocks noGrp="1"/>
-          </p:cNvSpPr>
-          <p:nvPr>
-            <p:ph idx="1"/>
-          </p:nvPr>
-        </p:nvSpPr>
-        <p:spPr>
-          <a:xfrm>
-            <a:off x="914400" y="1600201"/>
-            <a:ext cx="7315200" cy="4709160"/>
-          </a:xfrm>
-        </p:spPr>
-        <p:txBody>
-          <a:bodyPr>
-            <a:normAutofit/>
-          </a:bodyPr>
-          <a:lstStyle/>
-          <a:p>
-            <a:pPr>
-              <a:lnSpc>
-                <a:spcPct val="150000"/>
-              </a:lnSpc>
-            </a:pPr>
-            <a:r>
-              <a:rPr lang="en-US" sz="2800" dirty="0" smtClean="0"/>
-              <a:t>Earliest dates back to 1995; </a:t>
-            </a:r>
-            <a:r>
-              <a:rPr lang="en-US" sz="2800" dirty="0" err="1" smtClean="0"/>
-              <a:t>VistA</a:t>
-            </a:r>
-            <a:endParaRPr lang="en-US" sz="2800" dirty="0" smtClean="0"/>
-          </a:p>
-          <a:p>
-            <a:pPr>
-              <a:lnSpc>
-                <a:spcPct val="150000"/>
-              </a:lnSpc>
-            </a:pPr>
-            <a:r>
-              <a:rPr lang="en-US" sz="2800" dirty="0" smtClean="0"/>
-              <a:t>Few web enabled EMR systems:</a:t>
-            </a:r>
-          </a:p>
-          <a:p>
-            <a:pPr lvl="1">
-              <a:lnSpc>
-                <a:spcPct val="150000"/>
-              </a:lnSpc>
-            </a:pPr>
-            <a:r>
-              <a:rPr lang="en-US" sz="2800" dirty="0" smtClean="0"/>
-              <a:t>ZEPRS - 2001</a:t>
-            </a:r>
-          </a:p>
-          <a:p>
-            <a:pPr lvl="1">
-              <a:lnSpc>
-                <a:spcPct val="150000"/>
-              </a:lnSpc>
-            </a:pPr>
-            <a:r>
-              <a:rPr lang="en-US" sz="2600" dirty="0" err="1" smtClean="0"/>
-              <a:t>OpenEMR</a:t>
-            </a:r>
-            <a:r>
-              <a:rPr lang="en-US" sz="2600" dirty="0" smtClean="0"/>
-              <a:t> – 2001</a:t>
-            </a:r>
-          </a:p>
-          <a:p>
-            <a:pPr lvl="1">
-              <a:lnSpc>
-                <a:spcPct val="150000"/>
-              </a:lnSpc>
-            </a:pPr>
-            <a:r>
-              <a:rPr lang="en-US" sz="2400" dirty="0"/>
-              <a:t>THIRRA - </a:t>
-            </a:r>
-            <a:r>
-              <a:rPr lang="en-US" sz="2400" dirty="0" smtClean="0"/>
-              <a:t>2007</a:t>
-            </a:r>
-            <a:endParaRPr lang="en-US" sz="2400" dirty="0"/>
-          </a:p>
-        </p:txBody>
-      </p:sp>
-      <p:sp>
-        <p:nvSpPr>
-          <p:cNvPr id="7" name="Slide Number Placeholder 6"/>
-          <p:cNvSpPr>
-            <a:spLocks noGrp="1"/>
-          </p:cNvSpPr>
-          <p:nvPr>
-            <p:ph type="sldNum" sz="quarter" idx="12"/>
-          </p:nvPr>
-        </p:nvSpPr>
-        <p:spPr/>
-        <p:txBody>
-          <a:bodyPr/>
-          <a:lstStyle/>
-          <a:p>
-            <a:fld id="{85816456-AF90-4826-9770-6E0598D9C364}" type="slidenum">
-              <a:rPr lang="en-US" smtClean="0"/>
-              <a:t>6</a:t>
-            </a:fld>
-            <a:endParaRPr lang="en-US" dirty="0"/>
-          </a:p>
-        </p:txBody>
-      </p:sp>
-    </p:spTree>
-    <p:extLst>
-      <p:ext uri="{BB962C8B-B14F-4D97-AF65-F5344CB8AC3E}">
-        <p14:creationId xmlns:p14="http://schemas.microsoft.com/office/powerpoint/2010/main" val="1664243675"/>
-      </p:ext>
-    </p:extLst>
-  </p:cSld>
-  <p:clrMapOvr>
-    <a:masterClrMapping/>
-  </p:clrMapOvr>
-  <p:timing>
-    <p:tnLst>
-      <p:par>
-        <p:cTn id="1" dur="indefinite" restart="never" nodeType="tmRoot"/>
-      </p:par>
-    </p:tnLst>
-  </p:timing>
-</p:sld>
-</file>
-
-<file path=ppt/slides/slide7.xml><?xml version="1.0" encoding="utf-8"?>
-<p:sld xmlns:a="http://schemas.openxmlformats.org/drawingml/2006/main" xmlns:r="http://schemas.openxmlformats.org/officeDocument/2006/relationships" xmlns:p="http://schemas.openxmlformats.org/presentationml/2006/main">
-  <p:cSld>
-    <p:spTree>
-      <p:nvGrpSpPr>
-        <p:cNvPr id="1" name=""/>
-        <p:cNvGrpSpPr/>
-        <p:nvPr/>
-      </p:nvGrpSpPr>
-      <p:grpSpPr>
-        <a:xfrm>
-          <a:off x="0" y="0"/>
-          <a:ext cx="0" cy="0"/>
-          <a:chOff x="0" y="0"/>
-          <a:chExt cx="0" cy="0"/>
-        </a:xfrm>
-      </p:grpSpPr>
-      <p:sp>
-        <p:nvSpPr>
-          <p:cNvPr id="2" name="Title 1"/>
-          <p:cNvSpPr>
-            <a:spLocks noGrp="1"/>
-          </p:cNvSpPr>
-          <p:nvPr>
-            <p:ph type="title"/>
-          </p:nvPr>
-        </p:nvSpPr>
-        <p:spPr>
-          <a:xfrm>
-            <a:off x="0" y="457200"/>
-            <a:ext cx="8458200" cy="696897"/>
-          </a:xfrm>
-        </p:spPr>
-        <p:txBody>
-          <a:bodyPr>
-            <a:normAutofit fontScale="90000"/>
-          </a:bodyPr>
-          <a:lstStyle/>
-          <a:p>
-            <a:pPr algn="ctr"/>
-            <a:r>
-              <a:rPr lang="en-US" dirty="0" smtClean="0"/>
-              <a:t>Concepts Incorporated from </a:t>
-            </a:r>
-            <a:r>
-              <a:rPr lang="en-US" dirty="0" err="1" smtClean="0"/>
-              <a:t>OpenEMR</a:t>
-            </a:r>
-            <a:endParaRPr lang="en-US" dirty="0"/>
-          </a:p>
-        </p:txBody>
-      </p:sp>
-      <p:sp>
-        <p:nvSpPr>
-          <p:cNvPr id="3" name="Content Placeholder 2"/>
-          <p:cNvSpPr>
-            <a:spLocks noGrp="1"/>
-          </p:cNvSpPr>
-          <p:nvPr>
-            <p:ph idx="1"/>
-          </p:nvPr>
-        </p:nvSpPr>
-        <p:spPr>
-          <a:xfrm>
-            <a:off x="914400" y="1752600"/>
-            <a:ext cx="7315200" cy="4556761"/>
-          </a:xfrm>
-        </p:spPr>
-        <p:txBody>
-          <a:bodyPr>
-            <a:normAutofit/>
-          </a:bodyPr>
-          <a:lstStyle/>
-          <a:p>
-            <a:pPr marL="342900" indent="-342900">
-              <a:lnSpc>
-                <a:spcPct val="200000"/>
-              </a:lnSpc>
-            </a:pPr>
-            <a:r>
-              <a:rPr lang="en-US" sz="3200" dirty="0" smtClean="0"/>
-              <a:t>Patient records encrypted.</a:t>
-            </a:r>
-          </a:p>
-          <a:p>
-            <a:pPr marL="342900" indent="-342900">
-              <a:lnSpc>
-                <a:spcPct val="200000"/>
-              </a:lnSpc>
-            </a:pPr>
-            <a:r>
-              <a:rPr lang="en-US" sz="3200" dirty="0" smtClean="0"/>
-              <a:t>User access controls.</a:t>
-            </a:r>
-          </a:p>
-          <a:p>
-            <a:pPr marL="342900" indent="-342900">
-              <a:lnSpc>
-                <a:spcPct val="200000"/>
-              </a:lnSpc>
-            </a:pPr>
-            <a:r>
-              <a:rPr lang="en-US" sz="3200" dirty="0"/>
-              <a:t>R</a:t>
-            </a:r>
-            <a:r>
-              <a:rPr lang="en-US" sz="3200" dirty="0" smtClean="0"/>
-              <a:t>emote access from a web browser.</a:t>
-            </a:r>
-          </a:p>
-        </p:txBody>
-      </p:sp>
-      <p:sp>
-        <p:nvSpPr>
-          <p:cNvPr id="7" name="Slide Number Placeholder 6"/>
-          <p:cNvSpPr>
-            <a:spLocks noGrp="1"/>
-          </p:cNvSpPr>
-          <p:nvPr>
-            <p:ph type="sldNum" sz="quarter" idx="12"/>
-          </p:nvPr>
-        </p:nvSpPr>
-        <p:spPr/>
-        <p:txBody>
-          <a:bodyPr/>
-          <a:lstStyle/>
-          <a:p>
-            <a:fld id="{85816456-AF90-4826-9770-6E0598D9C364}" type="slidenum">
-              <a:rPr lang="en-US" smtClean="0"/>
-              <a:t>7</a:t>
-            </a:fld>
-            <a:endParaRPr lang="en-US" dirty="0"/>
-          </a:p>
-        </p:txBody>
-      </p:sp>
-    </p:spTree>
-    <p:extLst>
-      <p:ext uri="{BB962C8B-B14F-4D97-AF65-F5344CB8AC3E}">
-        <p14:creationId xmlns:p14="http://schemas.microsoft.com/office/powerpoint/2010/main" val="2619002814"/>
-      </p:ext>
-    </p:extLst>
-  </p:cSld>
-  <p:clrMapOvr>
-    <a:masterClrMapping/>
-  </p:clrMapOvr>
-  <p:timing>
-    <p:tnLst>
-      <p:par>
-        <p:cTn id="1" dur="indefinite" restart="never" nodeType="tmRoot"/>
-      </p:par>
-    </p:tnLst>
-  </p:timing>
-</p:sld>
-</file>
-
-<file path=ppt/slides/slide8.xml><?xml version="1.0" encoding="utf-8"?>
-<p:sld xmlns:a="http://schemas.openxmlformats.org/drawingml/2006/main" xmlns:r="http://schemas.openxmlformats.org/officeDocument/2006/relationships" xmlns:p="http://schemas.openxmlformats.org/presentationml/2006/main">
-  <p:cSld>
-    <p:spTree>
-      <p:nvGrpSpPr>
-        <p:cNvPr id="1" name=""/>
-        <p:cNvGrpSpPr/>
-        <p:nvPr/>
-      </p:nvGrpSpPr>
-      <p:grpSpPr>
-        <a:xfrm>
-          <a:off x="0" y="0"/>
-          <a:ext cx="0" cy="0"/>
-          <a:chOff x="0" y="0"/>
-          <a:chExt cx="0" cy="0"/>
-        </a:xfrm>
-      </p:grpSpPr>
-      <p:sp>
-        <p:nvSpPr>
-          <p:cNvPr id="2" name="Title 1"/>
-          <p:cNvSpPr>
-            <a:spLocks noGrp="1"/>
-          </p:cNvSpPr>
-          <p:nvPr>
-            <p:ph type="title"/>
-          </p:nvPr>
-        </p:nvSpPr>
-        <p:spPr>
-          <a:xfrm>
-            <a:off x="914400" y="76200"/>
-            <a:ext cx="7315200" cy="1154097"/>
-          </a:xfrm>
-        </p:spPr>
-        <p:txBody>
-          <a:bodyPr/>
-          <a:lstStyle/>
-          <a:p>
-            <a:pPr algn="ctr"/>
-            <a:r>
               <a:rPr lang="en-US" dirty="0" err="1" smtClean="0"/>
               <a:t>OpenEMR</a:t>
             </a:r>
@@ -6997,7 +5437,7 @@
           <a:p>
             <a:fld id="{85816456-AF90-4826-9770-6E0598D9C364}" type="slidenum">
               <a:rPr lang="en-US" smtClean="0"/>
-              <a:t>8</a:t>
+              <a:t>11</a:t>
             </a:fld>
             <a:endParaRPr lang="en-US" dirty="0"/>
           </a:p>
@@ -7087,7 +5527,7 @@
 </p:sld>
 </file>
 
-<file path=ppt/slides/slide9.xml><?xml version="1.0" encoding="utf-8"?>
+<file path=ppt/slides/slide12.xml><?xml version="1.0" encoding="utf-8"?>
 <p:sld xmlns:a="http://schemas.openxmlformats.org/drawingml/2006/main" xmlns:r="http://schemas.openxmlformats.org/officeDocument/2006/relationships" xmlns:p="http://schemas.openxmlformats.org/presentationml/2006/main">
   <p:cSld>
     <p:spTree>
@@ -7116,6 +5556,810 @@
         </p:nvSpPr>
         <p:spPr>
           <a:xfrm>
+            <a:off x="0" y="0"/>
+            <a:ext cx="9144000" cy="6858000"/>
+          </a:xfrm>
+        </p:spPr>
+        <p:txBody>
+          <a:bodyPr anchor="ctr">
+            <a:normAutofit/>
+          </a:bodyPr>
+          <a:lstStyle/>
+          <a:p>
+            <a:pPr algn="ctr"/>
+            <a:r>
+              <a:rPr lang="en-US" dirty="0" smtClean="0"/>
+              <a:t>The End</a:t>
+            </a:r>
+            <a:r>
+              <a:rPr lang="en-US" dirty="0"/>
+              <a:t/>
+            </a:r>
+            <a:br>
+              <a:rPr lang="en-US" dirty="0"/>
+            </a:br>
+            <a:endParaRPr lang="en-US" dirty="0"/>
+          </a:p>
+        </p:txBody>
+      </p:sp>
+      <p:sp>
+        <p:nvSpPr>
+          <p:cNvPr id="6" name="Slide Number Placeholder 5"/>
+          <p:cNvSpPr>
+            <a:spLocks noGrp="1"/>
+          </p:cNvSpPr>
+          <p:nvPr>
+            <p:ph type="sldNum" sz="quarter" idx="12"/>
+          </p:nvPr>
+        </p:nvSpPr>
+        <p:spPr/>
+        <p:txBody>
+          <a:bodyPr/>
+          <a:lstStyle/>
+          <a:p>
+            <a:fld id="{85816456-AF90-4826-9770-6E0598D9C364}" type="slidenum">
+              <a:rPr lang="en-US" smtClean="0"/>
+              <a:t>12</a:t>
+            </a:fld>
+            <a:endParaRPr lang="en-US" dirty="0"/>
+          </a:p>
+        </p:txBody>
+      </p:sp>
+    </p:spTree>
+    <p:extLst>
+      <p:ext uri="{BB962C8B-B14F-4D97-AF65-F5344CB8AC3E}">
+        <p14:creationId xmlns:p14="http://schemas.microsoft.com/office/powerpoint/2010/main" val="544880957"/>
+      </p:ext>
+    </p:extLst>
+  </p:cSld>
+  <p:clrMapOvr>
+    <a:masterClrMapping/>
+  </p:clrMapOvr>
+  <p:timing>
+    <p:tnLst>
+      <p:par>
+        <p:cTn id="1" dur="indefinite" restart="never" nodeType="tmRoot"/>
+      </p:par>
+    </p:tnLst>
+  </p:timing>
+</p:sld>
+</file>
+
+<file path=ppt/slides/slide2.xml><?xml version="1.0" encoding="utf-8"?>
+<p:sld xmlns:a="http://schemas.openxmlformats.org/drawingml/2006/main" xmlns:r="http://schemas.openxmlformats.org/officeDocument/2006/relationships" xmlns:p="http://schemas.openxmlformats.org/presentationml/2006/main">
+  <p:cSld>
+    <p:spTree>
+      <p:nvGrpSpPr>
+        <p:cNvPr id="1" name=""/>
+        <p:cNvGrpSpPr/>
+        <p:nvPr/>
+      </p:nvGrpSpPr>
+      <p:grpSpPr>
+        <a:xfrm>
+          <a:off x="0" y="0"/>
+          <a:ext cx="0" cy="0"/>
+          <a:chOff x="0" y="0"/>
+          <a:chExt cx="0" cy="0"/>
+        </a:xfrm>
+      </p:grpSpPr>
+      <p:sp>
+        <p:nvSpPr>
+          <p:cNvPr id="2" name="Title 1"/>
+          <p:cNvSpPr>
+            <a:spLocks noGrp="1"/>
+          </p:cNvSpPr>
+          <p:nvPr>
+            <p:ph type="title"/>
+          </p:nvPr>
+        </p:nvSpPr>
+        <p:spPr>
+          <a:xfrm>
+            <a:off x="914400" y="152400"/>
+            <a:ext cx="7315200" cy="1154097"/>
+          </a:xfrm>
+        </p:spPr>
+        <p:txBody>
+          <a:bodyPr/>
+          <a:lstStyle/>
+          <a:p>
+            <a:pPr algn="ctr"/>
+            <a:r>
+              <a:rPr lang="en-US" dirty="0" smtClean="0"/>
+              <a:t>Problem Statement</a:t>
+            </a:r>
+            <a:endParaRPr lang="en-US" dirty="0"/>
+          </a:p>
+        </p:txBody>
+      </p:sp>
+      <p:sp>
+        <p:nvSpPr>
+          <p:cNvPr id="3" name="Content Placeholder 2"/>
+          <p:cNvSpPr>
+            <a:spLocks noGrp="1"/>
+          </p:cNvSpPr>
+          <p:nvPr>
+            <p:ph idx="1"/>
+          </p:nvPr>
+        </p:nvSpPr>
+        <p:spPr>
+          <a:xfrm>
+            <a:off x="914400" y="1828800"/>
+            <a:ext cx="7315200" cy="3810000"/>
+          </a:xfrm>
+        </p:spPr>
+        <p:txBody>
+          <a:bodyPr>
+            <a:normAutofit lnSpcReduction="10000"/>
+          </a:bodyPr>
+          <a:lstStyle/>
+          <a:p>
+            <a:pPr lvl="1">
+              <a:lnSpc>
+                <a:spcPct val="150000"/>
+              </a:lnSpc>
+            </a:pPr>
+            <a:r>
+              <a:rPr lang="en-US" sz="3000" dirty="0" smtClean="0"/>
+              <a:t>Designed Specifically for MCHC</a:t>
+            </a:r>
+          </a:p>
+          <a:p>
+            <a:pPr lvl="1">
+              <a:lnSpc>
+                <a:spcPct val="150000"/>
+              </a:lnSpc>
+            </a:pPr>
+            <a:r>
+              <a:rPr lang="en-US" sz="3000" dirty="0" smtClean="0"/>
+              <a:t>Loss/Damage to Patient’s files</a:t>
+            </a:r>
+            <a:endParaRPr lang="en-US" sz="3000" dirty="0"/>
+          </a:p>
+          <a:p>
+            <a:pPr lvl="1">
+              <a:lnSpc>
+                <a:spcPct val="150000"/>
+              </a:lnSpc>
+            </a:pPr>
+            <a:r>
+              <a:rPr lang="en-US" sz="3000" dirty="0"/>
+              <a:t>Delay or hinder treatment </a:t>
+            </a:r>
+            <a:r>
+              <a:rPr lang="en-US" sz="3000" dirty="0" smtClean="0"/>
+              <a:t>progress</a:t>
+            </a:r>
+          </a:p>
+          <a:p>
+            <a:pPr lvl="1">
+              <a:lnSpc>
+                <a:spcPct val="150000"/>
+              </a:lnSpc>
+            </a:pPr>
+            <a:r>
+              <a:rPr lang="en-US" sz="3000" dirty="0" smtClean="0"/>
+              <a:t>Confidentiality of patient files</a:t>
+            </a:r>
+          </a:p>
+          <a:p>
+            <a:pPr lvl="1">
+              <a:lnSpc>
+                <a:spcPct val="150000"/>
+              </a:lnSpc>
+            </a:pPr>
+            <a:r>
+              <a:rPr lang="en-US" sz="3000" dirty="0" smtClean="0"/>
+              <a:t>Data integrity</a:t>
+            </a:r>
+            <a:endParaRPr lang="en-US" sz="3000" dirty="0"/>
+          </a:p>
+          <a:p>
+            <a:pPr marL="45720" indent="0">
+              <a:buNone/>
+            </a:pPr>
+            <a:endParaRPr lang="en-US" dirty="0"/>
+          </a:p>
+        </p:txBody>
+      </p:sp>
+      <p:sp>
+        <p:nvSpPr>
+          <p:cNvPr id="4" name="Slide Number Placeholder 3"/>
+          <p:cNvSpPr>
+            <a:spLocks noGrp="1"/>
+          </p:cNvSpPr>
+          <p:nvPr>
+            <p:ph type="sldNum" sz="quarter" idx="12"/>
+          </p:nvPr>
+        </p:nvSpPr>
+        <p:spPr/>
+        <p:txBody>
+          <a:bodyPr/>
+          <a:lstStyle/>
+          <a:p>
+            <a:fld id="{85816456-AF90-4826-9770-6E0598D9C364}" type="slidenum">
+              <a:rPr lang="en-US" smtClean="0"/>
+              <a:t>2</a:t>
+            </a:fld>
+            <a:endParaRPr lang="en-US" dirty="0"/>
+          </a:p>
+        </p:txBody>
+      </p:sp>
+    </p:spTree>
+    <p:extLst>
+      <p:ext uri="{BB962C8B-B14F-4D97-AF65-F5344CB8AC3E}">
+        <p14:creationId xmlns:p14="http://schemas.microsoft.com/office/powerpoint/2010/main" val="941291479"/>
+      </p:ext>
+    </p:extLst>
+  </p:cSld>
+  <p:clrMapOvr>
+    <a:masterClrMapping/>
+  </p:clrMapOvr>
+</p:sld>
+</file>
+
+<file path=ppt/slides/slide3.xml><?xml version="1.0" encoding="utf-8"?>
+<p:sld xmlns:a="http://schemas.openxmlformats.org/drawingml/2006/main" xmlns:r="http://schemas.openxmlformats.org/officeDocument/2006/relationships" xmlns:p="http://schemas.openxmlformats.org/presentationml/2006/main">
+  <p:cSld>
+    <p:spTree>
+      <p:nvGrpSpPr>
+        <p:cNvPr id="1" name=""/>
+        <p:cNvGrpSpPr/>
+        <p:nvPr/>
+      </p:nvGrpSpPr>
+      <p:grpSpPr>
+        <a:xfrm>
+          <a:off x="0" y="0"/>
+          <a:ext cx="0" cy="0"/>
+          <a:chOff x="0" y="0"/>
+          <a:chExt cx="0" cy="0"/>
+        </a:xfrm>
+      </p:grpSpPr>
+      <p:sp>
+        <p:nvSpPr>
+          <p:cNvPr id="2" name="Title 1"/>
+          <p:cNvSpPr>
+            <a:spLocks noGrp="1"/>
+          </p:cNvSpPr>
+          <p:nvPr>
+            <p:ph type="title"/>
+          </p:nvPr>
+        </p:nvSpPr>
+        <p:spPr>
+          <a:xfrm>
+            <a:off x="914400" y="141303"/>
+            <a:ext cx="7315200" cy="1154097"/>
+          </a:xfrm>
+        </p:spPr>
+        <p:txBody>
+          <a:bodyPr/>
+          <a:lstStyle/>
+          <a:p>
+            <a:pPr algn="ctr"/>
+            <a:r>
+              <a:rPr lang="en-US" dirty="0" smtClean="0"/>
+              <a:t>Motivation</a:t>
+            </a:r>
+            <a:endParaRPr lang="en-US" dirty="0"/>
+          </a:p>
+        </p:txBody>
+      </p:sp>
+      <p:sp>
+        <p:nvSpPr>
+          <p:cNvPr id="3" name="Content Placeholder 2"/>
+          <p:cNvSpPr>
+            <a:spLocks noGrp="1"/>
+          </p:cNvSpPr>
+          <p:nvPr>
+            <p:ph idx="1"/>
+          </p:nvPr>
+        </p:nvSpPr>
+        <p:spPr>
+          <a:xfrm>
+            <a:off x="914400" y="1676400"/>
+            <a:ext cx="7315200" cy="4343400"/>
+          </a:xfrm>
+        </p:spPr>
+        <p:txBody>
+          <a:bodyPr>
+            <a:normAutofit/>
+          </a:bodyPr>
+          <a:lstStyle/>
+          <a:p>
+            <a:r>
+              <a:rPr lang="en-US" sz="3200" dirty="0" smtClean="0"/>
+              <a:t>MCHC needs a better medical </a:t>
+            </a:r>
+            <a:r>
+              <a:rPr lang="en-US" sz="3200" dirty="0" smtClean="0"/>
+              <a:t>records management </a:t>
+            </a:r>
+            <a:r>
+              <a:rPr lang="en-US" sz="3200" dirty="0" smtClean="0"/>
+              <a:t>system</a:t>
+            </a:r>
+          </a:p>
+          <a:p>
+            <a:r>
+              <a:rPr lang="en-US" sz="3200" dirty="0" smtClean="0"/>
+              <a:t>This system can improve the overall treatment process</a:t>
+            </a:r>
+          </a:p>
+          <a:p>
+            <a:r>
+              <a:rPr lang="en-US" sz="3200" dirty="0" smtClean="0"/>
+              <a:t>Want to provide a system that is: </a:t>
+            </a:r>
+          </a:p>
+          <a:p>
+            <a:pPr marL="45720" indent="0">
+              <a:buNone/>
+            </a:pPr>
+            <a:r>
+              <a:rPr lang="en-US" dirty="0" smtClean="0"/>
+              <a:t>	</a:t>
+            </a:r>
+            <a:r>
+              <a:rPr lang="en-US" sz="2800" dirty="0" smtClean="0"/>
+              <a:t>-Easy to use </a:t>
+            </a:r>
+          </a:p>
+          <a:p>
+            <a:pPr marL="45720" indent="0">
+              <a:buNone/>
+            </a:pPr>
+            <a:r>
+              <a:rPr lang="en-US" sz="2800" dirty="0"/>
+              <a:t>	</a:t>
+            </a:r>
+            <a:r>
+              <a:rPr lang="en-US" sz="2800" dirty="0" smtClean="0"/>
+              <a:t>-Secure </a:t>
+            </a:r>
+          </a:p>
+          <a:p>
+            <a:pPr marL="45720" indent="0">
+              <a:buNone/>
+            </a:pPr>
+            <a:r>
+              <a:rPr lang="en-US" sz="2800" dirty="0"/>
+              <a:t>	</a:t>
+            </a:r>
+            <a:endParaRPr lang="en-US" dirty="0"/>
+          </a:p>
+        </p:txBody>
+      </p:sp>
+      <p:sp>
+        <p:nvSpPr>
+          <p:cNvPr id="4" name="Slide Number Placeholder 3"/>
+          <p:cNvSpPr>
+            <a:spLocks noGrp="1"/>
+          </p:cNvSpPr>
+          <p:nvPr>
+            <p:ph type="sldNum" sz="quarter" idx="12"/>
+          </p:nvPr>
+        </p:nvSpPr>
+        <p:spPr/>
+        <p:txBody>
+          <a:bodyPr/>
+          <a:lstStyle/>
+          <a:p>
+            <a:fld id="{85816456-AF90-4826-9770-6E0598D9C364}" type="slidenum">
+              <a:rPr lang="en-US" smtClean="0"/>
+              <a:t>3</a:t>
+            </a:fld>
+            <a:endParaRPr lang="en-US" dirty="0"/>
+          </a:p>
+        </p:txBody>
+      </p:sp>
+    </p:spTree>
+    <p:extLst>
+      <p:ext uri="{BB962C8B-B14F-4D97-AF65-F5344CB8AC3E}">
+        <p14:creationId xmlns:p14="http://schemas.microsoft.com/office/powerpoint/2010/main" val="2035189606"/>
+      </p:ext>
+    </p:extLst>
+  </p:cSld>
+  <p:clrMapOvr>
+    <a:masterClrMapping/>
+  </p:clrMapOvr>
+</p:sld>
+</file>
+
+<file path=ppt/slides/slide4.xml><?xml version="1.0" encoding="utf-8"?>
+<p:sld xmlns:a="http://schemas.openxmlformats.org/drawingml/2006/main" xmlns:r="http://schemas.openxmlformats.org/officeDocument/2006/relationships" xmlns:p="http://schemas.openxmlformats.org/presentationml/2006/main">
+  <p:cSld>
+    <p:spTree>
+      <p:nvGrpSpPr>
+        <p:cNvPr id="1" name=""/>
+        <p:cNvGrpSpPr/>
+        <p:nvPr/>
+      </p:nvGrpSpPr>
+      <p:grpSpPr>
+        <a:xfrm>
+          <a:off x="0" y="0"/>
+          <a:ext cx="0" cy="0"/>
+          <a:chOff x="0" y="0"/>
+          <a:chExt cx="0" cy="0"/>
+        </a:xfrm>
+      </p:grpSpPr>
+      <p:sp>
+        <p:nvSpPr>
+          <p:cNvPr id="2" name="Title 1"/>
+          <p:cNvSpPr>
+            <a:spLocks noGrp="1"/>
+          </p:cNvSpPr>
+          <p:nvPr>
+            <p:ph type="title"/>
+          </p:nvPr>
+        </p:nvSpPr>
+        <p:spPr>
+          <a:xfrm>
+            <a:off x="0" y="457200"/>
+            <a:ext cx="8458200" cy="717612"/>
+          </a:xfrm>
+        </p:spPr>
+        <p:txBody>
+          <a:bodyPr>
+            <a:normAutofit/>
+          </a:bodyPr>
+          <a:lstStyle/>
+          <a:p>
+            <a:pPr algn="ctr"/>
+            <a:r>
+              <a:rPr lang="en-US" dirty="0" smtClean="0"/>
+              <a:t>History of Past EMR Systems</a:t>
+            </a:r>
+            <a:endParaRPr lang="en-US" dirty="0"/>
+          </a:p>
+        </p:txBody>
+      </p:sp>
+      <p:sp>
+        <p:nvSpPr>
+          <p:cNvPr id="3" name="Content Placeholder 2"/>
+          <p:cNvSpPr>
+            <a:spLocks noGrp="1"/>
+          </p:cNvSpPr>
+          <p:nvPr>
+            <p:ph idx="1"/>
+          </p:nvPr>
+        </p:nvSpPr>
+        <p:spPr>
+          <a:xfrm>
+            <a:off x="914400" y="1600201"/>
+            <a:ext cx="7315200" cy="4709160"/>
+          </a:xfrm>
+        </p:spPr>
+        <p:txBody>
+          <a:bodyPr>
+            <a:normAutofit/>
+          </a:bodyPr>
+          <a:lstStyle/>
+          <a:p>
+            <a:pPr>
+              <a:lnSpc>
+                <a:spcPct val="150000"/>
+              </a:lnSpc>
+            </a:pPr>
+            <a:r>
+              <a:rPr lang="en-US" sz="2800" dirty="0" smtClean="0"/>
+              <a:t>Earliest dates back to 1995; </a:t>
+            </a:r>
+            <a:r>
+              <a:rPr lang="en-US" sz="2800" dirty="0" err="1" smtClean="0"/>
+              <a:t>VistA</a:t>
+            </a:r>
+            <a:endParaRPr lang="en-US" sz="2800" dirty="0" smtClean="0"/>
+          </a:p>
+          <a:p>
+            <a:pPr>
+              <a:lnSpc>
+                <a:spcPct val="150000"/>
+              </a:lnSpc>
+            </a:pPr>
+            <a:r>
+              <a:rPr lang="en-US" sz="2800" dirty="0" smtClean="0"/>
+              <a:t>Few web enabled EMR systems:</a:t>
+            </a:r>
+          </a:p>
+          <a:p>
+            <a:pPr lvl="1">
+              <a:lnSpc>
+                <a:spcPct val="150000"/>
+              </a:lnSpc>
+            </a:pPr>
+            <a:r>
+              <a:rPr lang="en-US" sz="2800" dirty="0" smtClean="0"/>
+              <a:t>ZEPRS - 2001</a:t>
+            </a:r>
+          </a:p>
+          <a:p>
+            <a:pPr lvl="1">
+              <a:lnSpc>
+                <a:spcPct val="150000"/>
+              </a:lnSpc>
+            </a:pPr>
+            <a:r>
+              <a:rPr lang="en-US" sz="2600" dirty="0" err="1" smtClean="0"/>
+              <a:t>OpenEMR</a:t>
+            </a:r>
+            <a:r>
+              <a:rPr lang="en-US" sz="2600" dirty="0" smtClean="0"/>
+              <a:t> – 2001</a:t>
+            </a:r>
+          </a:p>
+          <a:p>
+            <a:pPr lvl="1">
+              <a:lnSpc>
+                <a:spcPct val="150000"/>
+              </a:lnSpc>
+            </a:pPr>
+            <a:r>
+              <a:rPr lang="en-US" sz="2400" dirty="0"/>
+              <a:t>THIRRA - </a:t>
+            </a:r>
+            <a:r>
+              <a:rPr lang="en-US" sz="2400" dirty="0" smtClean="0"/>
+              <a:t>2007</a:t>
+            </a:r>
+            <a:endParaRPr lang="en-US" sz="2400" dirty="0"/>
+          </a:p>
+        </p:txBody>
+      </p:sp>
+      <p:sp>
+        <p:nvSpPr>
+          <p:cNvPr id="7" name="Slide Number Placeholder 6"/>
+          <p:cNvSpPr>
+            <a:spLocks noGrp="1"/>
+          </p:cNvSpPr>
+          <p:nvPr>
+            <p:ph type="sldNum" sz="quarter" idx="12"/>
+          </p:nvPr>
+        </p:nvSpPr>
+        <p:spPr/>
+        <p:txBody>
+          <a:bodyPr/>
+          <a:lstStyle/>
+          <a:p>
+            <a:fld id="{85816456-AF90-4826-9770-6E0598D9C364}" type="slidenum">
+              <a:rPr lang="en-US" smtClean="0"/>
+              <a:t>4</a:t>
+            </a:fld>
+            <a:endParaRPr lang="en-US" dirty="0"/>
+          </a:p>
+        </p:txBody>
+      </p:sp>
+    </p:spTree>
+    <p:extLst>
+      <p:ext uri="{BB962C8B-B14F-4D97-AF65-F5344CB8AC3E}">
+        <p14:creationId xmlns:p14="http://schemas.microsoft.com/office/powerpoint/2010/main" val="1664243675"/>
+      </p:ext>
+    </p:extLst>
+  </p:cSld>
+  <p:clrMapOvr>
+    <a:masterClrMapping/>
+  </p:clrMapOvr>
+  <p:timing>
+    <p:tnLst>
+      <p:par>
+        <p:cTn id="1" dur="indefinite" restart="never" nodeType="tmRoot"/>
+      </p:par>
+    </p:tnLst>
+  </p:timing>
+</p:sld>
+</file>
+
+<file path=ppt/slides/slide5.xml><?xml version="1.0" encoding="utf-8"?>
+<p:sld xmlns:a="http://schemas.openxmlformats.org/drawingml/2006/main" xmlns:r="http://schemas.openxmlformats.org/officeDocument/2006/relationships" xmlns:p="http://schemas.openxmlformats.org/presentationml/2006/main">
+  <p:cSld>
+    <p:spTree>
+      <p:nvGrpSpPr>
+        <p:cNvPr id="1" name=""/>
+        <p:cNvGrpSpPr/>
+        <p:nvPr/>
+      </p:nvGrpSpPr>
+      <p:grpSpPr>
+        <a:xfrm>
+          <a:off x="0" y="0"/>
+          <a:ext cx="0" cy="0"/>
+          <a:chOff x="0" y="0"/>
+          <a:chExt cx="0" cy="0"/>
+        </a:xfrm>
+      </p:grpSpPr>
+      <p:sp>
+        <p:nvSpPr>
+          <p:cNvPr id="2" name="Title 1"/>
+          <p:cNvSpPr>
+            <a:spLocks noGrp="1"/>
+          </p:cNvSpPr>
+          <p:nvPr>
+            <p:ph type="title"/>
+          </p:nvPr>
+        </p:nvSpPr>
+        <p:spPr>
+          <a:xfrm>
+            <a:off x="0" y="228600"/>
+            <a:ext cx="8458200" cy="1219200"/>
+          </a:xfrm>
+        </p:spPr>
+        <p:txBody>
+          <a:bodyPr>
+            <a:normAutofit fontScale="90000"/>
+          </a:bodyPr>
+          <a:lstStyle/>
+          <a:p>
+            <a:pPr algn="ctr"/>
+            <a:r>
+              <a:rPr lang="en-US" dirty="0" smtClean="0"/>
+              <a:t>Electronic </a:t>
+            </a:r>
+            <a:r>
+              <a:rPr lang="en-US" dirty="0" smtClean="0"/>
+              <a:t>Medical Records Management Systems </a:t>
+            </a:r>
+            <a:r>
+              <a:rPr lang="en-US" dirty="0" smtClean="0"/>
+              <a:t>Overview </a:t>
+            </a:r>
+            <a:endParaRPr lang="en-US" dirty="0"/>
+          </a:p>
+        </p:txBody>
+      </p:sp>
+      <p:sp>
+        <p:nvSpPr>
+          <p:cNvPr id="3" name="Content Placeholder 2"/>
+          <p:cNvSpPr>
+            <a:spLocks noGrp="1"/>
+          </p:cNvSpPr>
+          <p:nvPr>
+            <p:ph idx="1"/>
+          </p:nvPr>
+        </p:nvSpPr>
+        <p:spPr>
+          <a:xfrm>
+            <a:off x="876300" y="1676400"/>
+            <a:ext cx="7315200" cy="3809999"/>
+          </a:xfrm>
+        </p:spPr>
+        <p:txBody>
+          <a:bodyPr>
+            <a:normAutofit/>
+          </a:bodyPr>
+          <a:lstStyle/>
+          <a:p>
+            <a:pPr>
+              <a:lnSpc>
+                <a:spcPct val="150000"/>
+              </a:lnSpc>
+            </a:pPr>
+            <a:r>
+              <a:rPr lang="en-US" sz="2800" dirty="0" smtClean="0"/>
+              <a:t>Healthcare world moving away from paper </a:t>
+            </a:r>
+            <a:r>
+              <a:rPr lang="en-US" sz="2800" dirty="0" smtClean="0"/>
+              <a:t>records</a:t>
+            </a:r>
+          </a:p>
+          <a:p>
+            <a:pPr>
+              <a:lnSpc>
+                <a:spcPct val="150000"/>
+              </a:lnSpc>
+            </a:pPr>
+            <a:r>
+              <a:rPr lang="en-US" sz="2800" dirty="0" smtClean="0"/>
+              <a:t>Enforce </a:t>
+            </a:r>
+            <a:r>
+              <a:rPr lang="en-US" sz="2800" dirty="0"/>
+              <a:t>p</a:t>
+            </a:r>
+            <a:r>
+              <a:rPr lang="en-US" sz="2800" dirty="0" smtClean="0"/>
+              <a:t>atient confidentiality</a:t>
+            </a:r>
+          </a:p>
+          <a:p>
+            <a:pPr>
+              <a:lnSpc>
+                <a:spcPct val="150000"/>
+              </a:lnSpc>
+            </a:pPr>
+            <a:r>
+              <a:rPr lang="en-US" sz="2800" dirty="0" smtClean="0"/>
+              <a:t>Ensure data integrity</a:t>
+            </a:r>
+            <a:endParaRPr lang="en-US" sz="2800" dirty="0" smtClean="0"/>
+          </a:p>
+          <a:p>
+            <a:pPr>
+              <a:lnSpc>
+                <a:spcPct val="150000"/>
+              </a:lnSpc>
+            </a:pPr>
+            <a:r>
+              <a:rPr lang="en-US" sz="2800" dirty="0" smtClean="0"/>
+              <a:t>Patient confidentiality &gt; National </a:t>
+            </a:r>
+            <a:r>
+              <a:rPr lang="en-US" sz="2800" dirty="0" smtClean="0"/>
+              <a:t>priorities</a:t>
+            </a:r>
+            <a:endParaRPr lang="en-US" sz="2800" dirty="0" smtClean="0"/>
+          </a:p>
+        </p:txBody>
+      </p:sp>
+      <p:sp>
+        <p:nvSpPr>
+          <p:cNvPr id="7" name="Slide Number Placeholder 6"/>
+          <p:cNvSpPr>
+            <a:spLocks noGrp="1"/>
+          </p:cNvSpPr>
+          <p:nvPr>
+            <p:ph type="sldNum" sz="quarter" idx="12"/>
+          </p:nvPr>
+        </p:nvSpPr>
+        <p:spPr/>
+        <p:txBody>
+          <a:bodyPr/>
+          <a:lstStyle/>
+          <a:p>
+            <a:fld id="{85816456-AF90-4826-9770-6E0598D9C364}" type="slidenum">
+              <a:rPr lang="en-US" smtClean="0"/>
+              <a:t>5</a:t>
+            </a:fld>
+            <a:endParaRPr lang="en-US" dirty="0"/>
+          </a:p>
+        </p:txBody>
+      </p:sp>
+    </p:spTree>
+    <p:extLst>
+      <p:ext uri="{BB962C8B-B14F-4D97-AF65-F5344CB8AC3E}">
+        <p14:creationId xmlns:p14="http://schemas.microsoft.com/office/powerpoint/2010/main" val="2383770867"/>
+      </p:ext>
+    </p:extLst>
+  </p:cSld>
+  <p:clrMapOvr>
+    <a:masterClrMapping/>
+  </p:clrMapOvr>
+  <p:timing>
+    <p:tnLst>
+      <p:par>
+        <p:cTn id="1" dur="indefinite" restart="never" nodeType="tmRoot"/>
+      </p:par>
+    </p:tnLst>
+  </p:timing>
+</p:sld>
+</file>
+
+<file path=ppt/slides/slide6.xml><?xml version="1.0" encoding="utf-8"?>
+<p:sld xmlns:a="http://schemas.openxmlformats.org/drawingml/2006/main" xmlns:r="http://schemas.openxmlformats.org/officeDocument/2006/relationships" xmlns:p="http://schemas.openxmlformats.org/presentationml/2006/main">
+  <p:cSld>
+    <p:spTree>
+      <p:nvGrpSpPr>
+        <p:cNvPr id="1" name=""/>
+        <p:cNvGrpSpPr/>
+        <p:nvPr/>
+      </p:nvGrpSpPr>
+      <p:grpSpPr>
+        <a:xfrm>
+          <a:off x="0" y="0"/>
+          <a:ext cx="0" cy="0"/>
+          <a:chOff x="0" y="0"/>
+          <a:chExt cx="0" cy="0"/>
+        </a:xfrm>
+      </p:grpSpPr>
+      <p:sp>
+        <p:nvSpPr>
+          <p:cNvPr id="2" name="Title 1"/>
+          <p:cNvSpPr>
+            <a:spLocks noGrp="1"/>
+          </p:cNvSpPr>
+          <p:nvPr>
+            <p:ph type="title"/>
+          </p:nvPr>
+        </p:nvSpPr>
+        <p:spPr>
+          <a:xfrm>
             <a:off x="0" y="381000"/>
             <a:ext cx="8458200" cy="793812"/>
           </a:xfrm>
@@ -7164,11 +6408,7 @@
             </a:pPr>
             <a:r>
               <a:rPr lang="en-US" sz="2800" dirty="0" smtClean="0"/>
-              <a:t>Much </a:t>
-            </a:r>
-            <a:r>
-              <a:rPr lang="en-US" sz="2800" dirty="0" smtClean="0"/>
-              <a:t>simpler than </a:t>
+              <a:t>Much simpler than </a:t>
             </a:r>
             <a:r>
               <a:rPr lang="en-US" sz="2800" dirty="0" err="1" smtClean="0"/>
@@ -7176,15 +6416,7 @@
             </a:r>
             <a:r>
               <a:rPr lang="en-US" sz="2800" dirty="0" smtClean="0"/>
-              <a:t>, </a:t>
-            </a:r>
-            <a:r>
-              <a:rPr lang="en-US" sz="2800" dirty="0" smtClean="0"/>
-              <a:t>removed </a:t>
-            </a:r>
-            <a:r>
-              <a:rPr lang="en-US" sz="2800" dirty="0" smtClean="0"/>
-              <a:t>many unneeded features. </a:t>
+              <a:t>, removed many unneeded features. </a:t>
             </a:r>
           </a:p>
           <a:p>
@@ -7195,11 +6427,7 @@
             </a:pPr>
             <a:r>
               <a:rPr lang="en-US" sz="2800" dirty="0" smtClean="0"/>
-              <a:t>Onsite Access through intranet (LAN</a:t>
-            </a:r>
-            <a:r>
-              <a:rPr lang="en-US" sz="2800" dirty="0" smtClean="0"/>
-              <a:t>).</a:t>
+              <a:t>Onsite Access through intranet (LAN).</a:t>
             </a:r>
           </a:p>
           <a:p>
@@ -7233,7 +6461,7 @@
           <a:p>
             <a:fld id="{85816456-AF90-4826-9770-6E0598D9C364}" type="slidenum">
               <a:rPr lang="en-US" smtClean="0"/>
-              <a:t>9</a:t>
+              <a:t>6</a:t>
             </a:fld>
             <a:endParaRPr lang="en-US" dirty="0"/>
           </a:p>
@@ -7273,6 +6501,517 @@
     <p:extLst>
       <p:ext uri="{BB962C8B-B14F-4D97-AF65-F5344CB8AC3E}">
         <p14:creationId xmlns:p14="http://schemas.microsoft.com/office/powerpoint/2010/main" val="1669242324"/>
+      </p:ext>
+    </p:extLst>
+  </p:cSld>
+  <p:clrMapOvr>
+    <a:masterClrMapping/>
+  </p:clrMapOvr>
+  <p:timing>
+    <p:tnLst>
+      <p:par>
+        <p:cTn id="1" dur="indefinite" restart="never" nodeType="tmRoot"/>
+      </p:par>
+    </p:tnLst>
+  </p:timing>
+</p:sld>
+</file>
+
+<file path=ppt/slides/slide7.xml><?xml version="1.0" encoding="utf-8"?>
+<p:sld xmlns:a="http://schemas.openxmlformats.org/drawingml/2006/main" xmlns:r="http://schemas.openxmlformats.org/officeDocument/2006/relationships" xmlns:p="http://schemas.openxmlformats.org/presentationml/2006/main">
+  <p:cSld>
+    <p:spTree>
+      <p:nvGrpSpPr>
+        <p:cNvPr id="1" name=""/>
+        <p:cNvGrpSpPr/>
+        <p:nvPr/>
+      </p:nvGrpSpPr>
+      <p:grpSpPr>
+        <a:xfrm>
+          <a:off x="0" y="0"/>
+          <a:ext cx="0" cy="0"/>
+          <a:chOff x="0" y="0"/>
+          <a:chExt cx="0" cy="0"/>
+        </a:xfrm>
+      </p:grpSpPr>
+      <p:sp>
+        <p:nvSpPr>
+          <p:cNvPr id="2" name="Title 1"/>
+          <p:cNvSpPr>
+            <a:spLocks noGrp="1"/>
+          </p:cNvSpPr>
+          <p:nvPr>
+            <p:ph type="title"/>
+          </p:nvPr>
+        </p:nvSpPr>
+        <p:spPr>
+          <a:xfrm>
+            <a:off x="914400" y="0"/>
+            <a:ext cx="7315200" cy="1154097"/>
+          </a:xfrm>
+        </p:spPr>
+        <p:txBody>
+          <a:bodyPr/>
+          <a:lstStyle/>
+          <a:p>
+            <a:pPr algn="ctr"/>
+            <a:r>
+              <a:rPr lang="en-US" dirty="0" smtClean="0"/>
+              <a:t>System Context Diagram</a:t>
+            </a:r>
+            <a:endParaRPr lang="en-US" dirty="0"/>
+          </a:p>
+        </p:txBody>
+      </p:sp>
+      <p:sp>
+        <p:nvSpPr>
+          <p:cNvPr id="4" name="Slide Number Placeholder 3"/>
+          <p:cNvSpPr>
+            <a:spLocks noGrp="1"/>
+          </p:cNvSpPr>
+          <p:nvPr>
+            <p:ph type="sldNum" sz="quarter" idx="12"/>
+          </p:nvPr>
+        </p:nvSpPr>
+        <p:spPr/>
+        <p:txBody>
+          <a:bodyPr/>
+          <a:lstStyle/>
+          <a:p>
+            <a:fld id="{85816456-AF90-4826-9770-6E0598D9C364}" type="slidenum">
+              <a:rPr lang="en-US" smtClean="0"/>
+              <a:t>7</a:t>
+            </a:fld>
+            <a:endParaRPr lang="en-US" dirty="0"/>
+          </a:p>
+        </p:txBody>
+      </p:sp>
+      <p:pic>
+        <p:nvPicPr>
+          <p:cNvPr id="1026" name="Picture 2" descr="This diagram depicts the basic input, output, and processing of the SEMRS system. &#10;" title="System Context Diagram"/>
+          <p:cNvPicPr>
+            <a:picLocks noGrp="1" noChangeAspect="1" noChangeArrowheads="1"/>
+          </p:cNvPicPr>
+          <p:nvPr>
+            <p:ph idx="1"/>
+          </p:nvPr>
+        </p:nvPicPr>
+        <p:blipFill>
+          <a:blip r:embed="rId2">
+            <a:extLst>
+              <a:ext uri="{28A0092B-C50C-407E-A947-70E740481C1C}">
+                <a14:useLocalDpi xmlns:a14="http://schemas.microsoft.com/office/drawing/2010/main" val="0"/>
+              </a:ext>
+            </a:extLst>
+          </a:blip>
+          <a:srcRect/>
+          <a:stretch>
+            <a:fillRect/>
+          </a:stretch>
+        </p:blipFill>
+        <p:spPr bwMode="auto">
+          <a:xfrm>
+            <a:off x="1371600" y="1444141"/>
+            <a:ext cx="6553200" cy="3889859"/>
+          </a:xfrm>
+          <a:prstGeom prst="rect">
+            <a:avLst/>
+          </a:prstGeom>
+          <a:noFill/>
+          <a:ln>
+            <a:noFill/>
+          </a:ln>
+          <a:effectLst/>
+          <a:extLst>
+            <a:ext uri="{909E8E84-426E-40DD-AFC4-6F175D3DCCD1}">
+              <a14:hiddenFill xmlns:a14="http://schemas.microsoft.com/office/drawing/2010/main">
+                <a:solidFill>
+                  <a:schemeClr val="accent1"/>
+                </a:solidFill>
+              </a14:hiddenFill>
+            </a:ext>
+            <a:ext uri="{91240B29-F687-4F45-9708-019B960494DF}">
+              <a14:hiddenLine xmlns:a14="http://schemas.microsoft.com/office/drawing/2010/main" w="9525">
+                <a:solidFill>
+                  <a:schemeClr val="tx1"/>
+                </a:solidFill>
+                <a:miter lim="800000"/>
+                <a:headEnd/>
+                <a:tailEnd/>
+              </a14:hiddenLine>
+            </a:ext>
+            <a:ext uri="{AF507438-7753-43E0-B8FC-AC1667EBCBE1}">
+              <a14:hiddenEffects xmlns:a14="http://schemas.microsoft.com/office/drawing/2010/main">
+                <a:effectLst>
+                  <a:outerShdw dist="35921" dir="2700000" algn="ctr" rotWithShape="0">
+                    <a:schemeClr val="bg2"/>
+                  </a:outerShdw>
+                </a:effectLst>
+              </a14:hiddenEffects>
+            </a:ext>
+          </a:extLst>
+        </p:spPr>
+      </p:pic>
+      <p:sp>
+        <p:nvSpPr>
+          <p:cNvPr id="5" name="TextBox 4"/>
+          <p:cNvSpPr txBox="1"/>
+          <p:nvPr/>
+        </p:nvSpPr>
+        <p:spPr>
+          <a:xfrm>
+            <a:off x="1371600" y="5638800"/>
+            <a:ext cx="6553200" cy="646331"/>
+          </a:xfrm>
+          <a:prstGeom prst="rect">
+            <a:avLst/>
+          </a:prstGeom>
+          <a:noFill/>
+        </p:spPr>
+        <p:txBody>
+          <a:bodyPr wrap="square" rtlCol="0">
+            <a:spAutoFit/>
+          </a:bodyPr>
+          <a:lstStyle/>
+          <a:p>
+            <a:r>
+              <a:rPr lang="en-US" dirty="0" smtClean="0"/>
+              <a:t>This system context diagram depicts the basic input, output, and processing of the SEMRS system. </a:t>
+            </a:r>
+            <a:endParaRPr lang="en-US" dirty="0"/>
+          </a:p>
+        </p:txBody>
+      </p:sp>
+    </p:spTree>
+    <p:extLst>
+      <p:ext uri="{BB962C8B-B14F-4D97-AF65-F5344CB8AC3E}">
+        <p14:creationId xmlns:p14="http://schemas.microsoft.com/office/powerpoint/2010/main" val="3990745985"/>
+      </p:ext>
+    </p:extLst>
+  </p:cSld>
+  <p:clrMapOvr>
+    <a:masterClrMapping/>
+  </p:clrMapOvr>
+  <p:timing>
+    <p:tnLst>
+      <p:par>
+        <p:cTn id="1" dur="indefinite" restart="never" nodeType="tmRoot"/>
+      </p:par>
+    </p:tnLst>
+  </p:timing>
+</p:sld>
+</file>
+
+<file path=ppt/slides/slide8.xml><?xml version="1.0" encoding="utf-8"?>
+<p:sld xmlns:a="http://schemas.openxmlformats.org/drawingml/2006/main" xmlns:r="http://schemas.openxmlformats.org/officeDocument/2006/relationships" xmlns:p="http://schemas.openxmlformats.org/presentationml/2006/main">
+  <p:cSld>
+    <p:spTree>
+      <p:nvGrpSpPr>
+        <p:cNvPr id="1" name=""/>
+        <p:cNvGrpSpPr/>
+        <p:nvPr/>
+      </p:nvGrpSpPr>
+      <p:grpSpPr>
+        <a:xfrm>
+          <a:off x="0" y="0"/>
+          <a:ext cx="0" cy="0"/>
+          <a:chOff x="0" y="0"/>
+          <a:chExt cx="0" cy="0"/>
+        </a:xfrm>
+      </p:grpSpPr>
+      <p:sp>
+        <p:nvSpPr>
+          <p:cNvPr id="2" name="Title 1"/>
+          <p:cNvSpPr>
+            <a:spLocks noGrp="1"/>
+          </p:cNvSpPr>
+          <p:nvPr>
+            <p:ph type="title"/>
+          </p:nvPr>
+        </p:nvSpPr>
+        <p:spPr>
+          <a:xfrm>
+            <a:off x="914400" y="76200"/>
+            <a:ext cx="7315200" cy="1154097"/>
+          </a:xfrm>
+        </p:spPr>
+        <p:txBody>
+          <a:bodyPr/>
+          <a:lstStyle/>
+          <a:p>
+            <a:pPr algn="ctr"/>
+            <a:r>
+              <a:rPr lang="en-US" dirty="0" smtClean="0"/>
+              <a:t>Use Case Diagram</a:t>
+            </a:r>
+            <a:endParaRPr lang="en-US" dirty="0"/>
+          </a:p>
+        </p:txBody>
+      </p:sp>
+      <p:sp>
+        <p:nvSpPr>
+          <p:cNvPr id="4" name="Slide Number Placeholder 3"/>
+          <p:cNvSpPr>
+            <a:spLocks noGrp="1"/>
+          </p:cNvSpPr>
+          <p:nvPr>
+            <p:ph type="sldNum" sz="quarter" idx="12"/>
+          </p:nvPr>
+        </p:nvSpPr>
+        <p:spPr/>
+        <p:txBody>
+          <a:bodyPr/>
+          <a:lstStyle/>
+          <a:p>
+            <a:fld id="{85816456-AF90-4826-9770-6E0598D9C364}" type="slidenum">
+              <a:rPr lang="en-US" smtClean="0"/>
+              <a:t>8</a:t>
+            </a:fld>
+            <a:endParaRPr lang="en-US" dirty="0"/>
+          </a:p>
+        </p:txBody>
+      </p:sp>
+      <p:pic>
+        <p:nvPicPr>
+          <p:cNvPr id="2050" name="Picture 2"/>
+          <p:cNvPicPr>
+            <a:picLocks noGrp="1" noChangeAspect="1" noChangeArrowheads="1"/>
+          </p:cNvPicPr>
+          <p:nvPr>
+            <p:ph idx="1"/>
+          </p:nvPr>
+        </p:nvPicPr>
+        <p:blipFill>
+          <a:blip r:embed="rId3">
+            <a:extLst>
+              <a:ext uri="{28A0092B-C50C-407E-A947-70E740481C1C}">
+                <a14:useLocalDpi xmlns:a14="http://schemas.microsoft.com/office/drawing/2010/main" val="0"/>
+              </a:ext>
+            </a:extLst>
+          </a:blip>
+          <a:srcRect/>
+          <a:stretch>
+            <a:fillRect/>
+          </a:stretch>
+        </p:blipFill>
+        <p:spPr bwMode="auto">
+          <a:xfrm>
+            <a:off x="1219200" y="1371600"/>
+            <a:ext cx="6762565" cy="3962400"/>
+          </a:xfrm>
+          <a:prstGeom prst="rect">
+            <a:avLst/>
+          </a:prstGeom>
+          <a:noFill/>
+          <a:ln>
+            <a:noFill/>
+          </a:ln>
+          <a:effectLst/>
+          <a:extLst>
+            <a:ext uri="{909E8E84-426E-40DD-AFC4-6F175D3DCCD1}">
+              <a14:hiddenFill xmlns:a14="http://schemas.microsoft.com/office/drawing/2010/main">
+                <a:solidFill>
+                  <a:schemeClr val="accent1"/>
+                </a:solidFill>
+              </a14:hiddenFill>
+            </a:ext>
+            <a:ext uri="{91240B29-F687-4F45-9708-019B960494DF}">
+              <a14:hiddenLine xmlns:a14="http://schemas.microsoft.com/office/drawing/2010/main" w="9525">
+                <a:solidFill>
+                  <a:schemeClr val="tx1"/>
+                </a:solidFill>
+                <a:miter lim="800000"/>
+                <a:headEnd/>
+                <a:tailEnd/>
+              </a14:hiddenLine>
+            </a:ext>
+            <a:ext uri="{AF507438-7753-43E0-B8FC-AC1667EBCBE1}">
+              <a14:hiddenEffects xmlns:a14="http://schemas.microsoft.com/office/drawing/2010/main">
+                <a:effectLst>
+                  <a:outerShdw dist="35921" dir="2700000" algn="ctr" rotWithShape="0">
+                    <a:schemeClr val="bg2"/>
+                  </a:outerShdw>
+                </a:effectLst>
+              </a14:hiddenEffects>
+            </a:ext>
+          </a:extLst>
+        </p:spPr>
+      </p:pic>
+      <p:sp>
+        <p:nvSpPr>
+          <p:cNvPr id="6" name="TextBox 5"/>
+          <p:cNvSpPr txBox="1"/>
+          <p:nvPr/>
+        </p:nvSpPr>
+        <p:spPr>
+          <a:xfrm>
+            <a:off x="1219200" y="5638800"/>
+            <a:ext cx="6858000" cy="646331"/>
+          </a:xfrm>
+          <a:prstGeom prst="rect">
+            <a:avLst/>
+          </a:prstGeom>
+          <a:noFill/>
+        </p:spPr>
+        <p:txBody>
+          <a:bodyPr wrap="square" rtlCol="0">
+            <a:spAutoFit/>
+          </a:bodyPr>
+          <a:lstStyle/>
+          <a:p>
+            <a:r>
+              <a:rPr lang="en-US" dirty="0" smtClean="0"/>
+              <a:t>This use case diagram depicts the different user account types and what they have access to within the SEMRS system. </a:t>
+            </a:r>
+            <a:endParaRPr lang="en-US" dirty="0"/>
+          </a:p>
+        </p:txBody>
+      </p:sp>
+    </p:spTree>
+    <p:extLst>
+      <p:ext uri="{BB962C8B-B14F-4D97-AF65-F5344CB8AC3E}">
+        <p14:creationId xmlns:p14="http://schemas.microsoft.com/office/powerpoint/2010/main" val="1891132232"/>
+      </p:ext>
+    </p:extLst>
+  </p:cSld>
+  <p:clrMapOvr>
+    <a:masterClrMapping/>
+  </p:clrMapOvr>
+  <p:timing>
+    <p:tnLst>
+      <p:par>
+        <p:cTn id="1" dur="indefinite" restart="never" nodeType="tmRoot"/>
+      </p:par>
+    </p:tnLst>
+  </p:timing>
+</p:sld>
+</file>
+
+<file path=ppt/slides/slide9.xml><?xml version="1.0" encoding="utf-8"?>
+<p:sld xmlns:a="http://schemas.openxmlformats.org/drawingml/2006/main" xmlns:r="http://schemas.openxmlformats.org/officeDocument/2006/relationships" xmlns:p="http://schemas.openxmlformats.org/presentationml/2006/main">
+  <p:cSld>
+    <p:spTree>
+      <p:nvGrpSpPr>
+        <p:cNvPr id="1" name=""/>
+        <p:cNvGrpSpPr/>
+        <p:nvPr/>
+      </p:nvGrpSpPr>
+      <p:grpSpPr>
+        <a:xfrm>
+          <a:off x="0" y="0"/>
+          <a:ext cx="0" cy="0"/>
+          <a:chOff x="0" y="0"/>
+          <a:chExt cx="0" cy="0"/>
+        </a:xfrm>
+      </p:grpSpPr>
+      <p:sp>
+        <p:nvSpPr>
+          <p:cNvPr id="2" name="Title 1"/>
+          <p:cNvSpPr>
+            <a:spLocks noGrp="1"/>
+          </p:cNvSpPr>
+          <p:nvPr>
+            <p:ph type="title"/>
+          </p:nvPr>
+        </p:nvSpPr>
+        <p:spPr>
+          <a:xfrm>
+            <a:off x="0" y="381000"/>
+            <a:ext cx="8458200" cy="793812"/>
+          </a:xfrm>
+        </p:spPr>
+        <p:txBody>
+          <a:bodyPr>
+            <a:normAutofit/>
+          </a:bodyPr>
+          <a:lstStyle/>
+          <a:p>
+            <a:pPr algn="ctr"/>
+            <a:r>
+              <a:rPr lang="en-US" dirty="0" smtClean="0"/>
+              <a:t>Future Work</a:t>
+            </a:r>
+            <a:endParaRPr lang="en-US" dirty="0"/>
+          </a:p>
+        </p:txBody>
+      </p:sp>
+      <p:sp>
+        <p:nvSpPr>
+          <p:cNvPr id="3" name="Content Placeholder 2"/>
+          <p:cNvSpPr>
+            <a:spLocks noGrp="1"/>
+          </p:cNvSpPr>
+          <p:nvPr>
+            <p:ph idx="1"/>
+          </p:nvPr>
+        </p:nvSpPr>
+        <p:spPr>
+          <a:xfrm>
+            <a:off x="914400" y="1752600"/>
+            <a:ext cx="7391400" cy="4556761"/>
+          </a:xfrm>
+        </p:spPr>
+        <p:txBody>
+          <a:bodyPr>
+            <a:normAutofit/>
+          </a:bodyPr>
+          <a:lstStyle/>
+          <a:p>
+            <a:pPr>
+              <a:lnSpc>
+                <a:spcPct val="200000"/>
+              </a:lnSpc>
+            </a:pPr>
+            <a:r>
+              <a:rPr lang="en-US" sz="2800" dirty="0" smtClean="0"/>
+              <a:t>Ability to upload Patient files</a:t>
+            </a:r>
+          </a:p>
+          <a:p>
+            <a:pPr>
+              <a:lnSpc>
+                <a:spcPct val="200000"/>
+              </a:lnSpc>
+            </a:pPr>
+            <a:endParaRPr lang="en-US" sz="2800" dirty="0" smtClean="0"/>
+          </a:p>
+          <a:p>
+            <a:pPr>
+              <a:lnSpc>
+                <a:spcPct val="200000"/>
+              </a:lnSpc>
+            </a:pPr>
+            <a:endParaRPr lang="en-US" sz="2800" dirty="0" smtClean="0"/>
+          </a:p>
+        </p:txBody>
+      </p:sp>
+      <p:sp>
+        <p:nvSpPr>
+          <p:cNvPr id="7" name="Slide Number Placeholder 6"/>
+          <p:cNvSpPr>
+            <a:spLocks noGrp="1"/>
+          </p:cNvSpPr>
+          <p:nvPr>
+            <p:ph type="sldNum" sz="quarter" idx="12"/>
+          </p:nvPr>
+        </p:nvSpPr>
+        <p:spPr/>
+        <p:txBody>
+          <a:bodyPr/>
+          <a:lstStyle/>
+          <a:p>
+            <a:fld id="{85816456-AF90-4826-9770-6E0598D9C364}" type="slidenum">
+              <a:rPr lang="en-US" smtClean="0"/>
+              <a:t>9</a:t>
+            </a:fld>
+            <a:endParaRPr lang="en-US" dirty="0"/>
+          </a:p>
+        </p:txBody>
+      </p:sp>
+    </p:spTree>
+    <p:extLst>
+      <p:ext uri="{BB962C8B-B14F-4D97-AF65-F5344CB8AC3E}">
+        <p14:creationId xmlns:p14="http://schemas.microsoft.com/office/powerpoint/2010/main" val="3200271559"/>
       </p:ext>
     </p:extLst>
   </p:cSld>

</xml_diff>

<commit_message>
Added to powerpoint, still needs work
</commit_message>
<xml_diff>
--- a/Documentation/Final_Presentation.pptx
+++ b/Documentation/Final_Presentation.pptx
@@ -202,7 +202,7 @@
           <a:p>
             <a:fld id="{F8A13CF6-5412-437F-BBE9-70CB654C0E12}" type="datetimeFigureOut">
               <a:rPr lang="en-US" smtClean="0"/>
-              <a:t>5/8/2012</a:t>
+              <a:t>5/9/2012</a:t>
             </a:fld>
             <a:endParaRPr lang="en-US"/>
           </a:p>
@@ -2152,7 +2152,7 @@
           <a:p>
             <a:fld id="{F860A560-75BB-4DDF-8B63-A975FA1C797F}" type="datetime1">
               <a:rPr lang="en-US" smtClean="0"/>
-              <a:t>5/8/2012</a:t>
+              <a:t>5/9/2012</a:t>
             </a:fld>
             <a:endParaRPr lang="en-US"/>
           </a:p>
@@ -2324,7 +2324,7 @@
           <a:p>
             <a:fld id="{819A4B5B-3CC6-4E48-8F80-7D599914EF89}" type="datetime1">
               <a:rPr lang="en-US" smtClean="0"/>
-              <a:t>5/8/2012</a:t>
+              <a:t>5/9/2012</a:t>
             </a:fld>
             <a:endParaRPr lang="en-US"/>
           </a:p>
@@ -2499,7 +2499,7 @@
           <a:p>
             <a:fld id="{AB5F6EC1-A62E-41C8-88AD-A2D7337832AA}" type="datetime1">
               <a:rPr lang="en-US" smtClean="0"/>
-              <a:t>5/8/2012</a:t>
+              <a:t>5/9/2012</a:t>
             </a:fld>
             <a:endParaRPr lang="en-US"/>
           </a:p>
@@ -2664,7 +2664,7 @@
           <a:p>
             <a:fld id="{555C1C78-3ACF-46D8-8BB2-57E2D7F6FC19}" type="datetime1">
               <a:rPr lang="en-US" smtClean="0"/>
-              <a:t>5/8/2012</a:t>
+              <a:t>5/9/2012</a:t>
             </a:fld>
             <a:endParaRPr lang="en-US"/>
           </a:p>
@@ -2910,7 +2910,7 @@
           <a:p>
             <a:fld id="{F55A0451-9590-4A1C-9976-5B991B64B9EA}" type="datetime1">
               <a:rPr lang="en-US" smtClean="0"/>
-              <a:t>5/8/2012</a:t>
+              <a:t>5/9/2012</a:t>
             </a:fld>
             <a:endParaRPr lang="en-US"/>
           </a:p>
@@ -3007,7 +3007,7 @@
           <a:p>
             <a:fld id="{EA026219-B328-42D7-AAAF-98D7A5F4B509}" type="datetime1">
               <a:rPr lang="en-US" smtClean="0"/>
-              <a:t>5/8/2012</a:t>
+              <a:t>5/9/2012</a:t>
             </a:fld>
             <a:endParaRPr lang="en-US"/>
           </a:p>
@@ -3381,7 +3381,7 @@
           <a:p>
             <a:fld id="{C3C85DBB-887A-43C7-AF91-EDD9C8BD0F87}" type="datetime1">
               <a:rPr lang="en-US" smtClean="0"/>
-              <a:t>5/8/2012</a:t>
+              <a:t>5/9/2012</a:t>
             </a:fld>
             <a:endParaRPr lang="en-US"/>
           </a:p>
@@ -3636,7 +3636,7 @@
           <a:p>
             <a:fld id="{6BB3112F-08FD-4A00-8761-87402F2FB62E}" type="datetime1">
               <a:rPr lang="en-US" smtClean="0"/>
-              <a:t>5/8/2012</a:t>
+              <a:t>5/9/2012</a:t>
             </a:fld>
             <a:endParaRPr lang="en-US"/>
           </a:p>
@@ -3726,7 +3726,7 @@
           <a:p>
             <a:fld id="{774FBF8C-E852-4416-8043-D9509D71997B}" type="datetime1">
               <a:rPr lang="en-US" smtClean="0"/>
-              <a:t>5/8/2012</a:t>
+              <a:t>5/9/2012</a:t>
             </a:fld>
             <a:endParaRPr lang="en-US"/>
           </a:p>
@@ -4000,7 +4000,7 @@
           <a:p>
             <a:fld id="{370F731C-0A04-47AB-95E7-C4B7280CE3EF}" type="datetime1">
               <a:rPr lang="en-US" smtClean="0"/>
-              <a:t>5/8/2012</a:t>
+              <a:t>5/9/2012</a:t>
             </a:fld>
             <a:endParaRPr lang="en-US"/>
           </a:p>
@@ -4272,7 +4272,7 @@
           <a:p>
             <a:fld id="{6E71A764-0912-4B71-AEAC-C5429135FCA3}" type="datetime1">
               <a:rPr lang="en-US" smtClean="0"/>
-              <a:t>5/8/2012</a:t>
+              <a:t>5/9/2012</a:t>
             </a:fld>
             <a:endParaRPr lang="en-US"/>
           </a:p>
@@ -4572,7 +4572,7 @@
           <a:p>
             <a:fld id="{3F326007-896C-49C9-B074-1A1918D84138}" type="datetime1">
               <a:rPr lang="en-US" smtClean="0"/>
-              <a:t>5/8/2012</a:t>
+              <a:t>5/9/2012</a:t>
             </a:fld>
             <a:endParaRPr lang="en-US"/>
           </a:p>
@@ -5272,7 +5272,7 @@
             </a:pPr>
             <a:r>
               <a:rPr lang="en-US" sz="2600" dirty="0" smtClean="0"/>
-              <a:t>Blah</a:t>
+              <a:t>[point 2]</a:t>
             </a:r>
           </a:p>
           <a:p>
@@ -5283,8 +5283,9 @@
             </a:pPr>
             <a:r>
               <a:rPr lang="en-US" sz="2600" dirty="0" smtClean="0"/>
-              <a:t>Blah</a:t>
-            </a:r>
+              <a:t>[point 3]</a:t>
+            </a:r>
+            <a:endParaRPr lang="en-US" sz="2600" dirty="0" smtClean="0"/>
           </a:p>
           <a:p>
             <a:pPr>
@@ -5384,11 +5385,7 @@
             <a:pPr algn="ctr"/>
             <a:r>
               <a:rPr lang="en-US" dirty="0" smtClean="0"/>
-              <a:t>Possible Future </a:t>
-            </a:r>
-            <a:r>
-              <a:rPr lang="en-US" dirty="0" smtClean="0"/>
-              <a:t>Work</a:t>
+              <a:t>Possible Future Work</a:t>
             </a:r>
             <a:endParaRPr lang="en-US" dirty="0"/>
           </a:p>
@@ -5423,11 +5420,7 @@
             </a:pPr>
             <a:r>
               <a:rPr lang="en-US" sz="2800" dirty="0" smtClean="0"/>
-              <a:t>Ability to upload </a:t>
-            </a:r>
-            <a:r>
-              <a:rPr lang="en-US" sz="2800" dirty="0" smtClean="0"/>
-              <a:t>existing hardcopy files</a:t>
+              <a:t>Ability to upload existing hardcopy files</a:t>
             </a:r>
           </a:p>
           <a:p>
@@ -5608,13 +5601,18 @@
           <a:p>
             <a:r>
               <a:rPr lang="en-US" dirty="0" smtClean="0"/>
-              <a:t>HIV/AIDS population</a:t>
-            </a:r>
-          </a:p>
-          <a:p>
-            <a:pPr marL="45720" indent="0">
-              <a:buNone/>
-            </a:pPr>
+              <a:t>HIV/AIDS </a:t>
+            </a:r>
+            <a:r>
+              <a:rPr lang="en-US" dirty="0" smtClean="0"/>
+              <a:t>population</a:t>
+            </a:r>
+          </a:p>
+          <a:p>
+            <a:r>
+              <a:rPr lang="en-US" dirty="0" smtClean="0"/>
+              <a:t>[See notes]</a:t>
+            </a:r>
             <a:endParaRPr lang="en-US" dirty="0" smtClean="0"/>
           </a:p>
           <a:p>
@@ -5740,19 +5738,7 @@
             </a:pPr>
             <a:r>
               <a:rPr lang="en-US" sz="3000" dirty="0" smtClean="0"/>
-              <a:t>Loss/Damage </a:t>
-            </a:r>
-            <a:r>
-              <a:rPr lang="en-US" sz="3000" dirty="0" smtClean="0"/>
-              <a:t>to </a:t>
-            </a:r>
-            <a:r>
-              <a:rPr lang="en-US" sz="3000" dirty="0" smtClean="0"/>
-              <a:t>patient </a:t>
-            </a:r>
-            <a:r>
-              <a:rPr lang="en-US" sz="3000" dirty="0" smtClean="0"/>
-              <a:t>files</a:t>
+              <a:t>Loss/Damage to patient files</a:t>
             </a:r>
             <a:endParaRPr lang="en-US" sz="3000" dirty="0"/>
           </a:p>
@@ -5920,15 +5906,7 @@
             </a:pPr>
             <a:r>
               <a:rPr lang="en-US" sz="2800" dirty="0" smtClean="0"/>
-              <a:t>Improved medical </a:t>
-            </a:r>
-            <a:r>
-              <a:rPr lang="en-US" sz="2800" dirty="0" smtClean="0"/>
-              <a:t>records management </a:t>
-            </a:r>
-            <a:r>
-              <a:rPr lang="en-US" sz="2800" dirty="0" smtClean="0"/>
-              <a:t>system</a:t>
+              <a:t>Improved medical records management system</a:t>
             </a:r>
           </a:p>
           <a:p>
@@ -6096,11 +6074,7 @@
             <a:pPr algn="ctr"/>
             <a:r>
               <a:rPr lang="en-US" dirty="0" smtClean="0"/>
-              <a:t>EMR </a:t>
-            </a:r>
-            <a:r>
-              <a:rPr lang="en-US" dirty="0" smtClean="0"/>
-              <a:t>Systems</a:t>
+              <a:t>EMR Systems</a:t>
             </a:r>
             <a:endParaRPr lang="en-US" dirty="0"/>
           </a:p>
@@ -6116,7 +6090,7 @@
             <p:ph idx="1"/>
             <p:extLst>
               <p:ext uri="{D42A27DB-BD31-4B8C-83A1-F6EECF244321}">
-                <p14:modId xmlns:p14="http://schemas.microsoft.com/office/powerpoint/2010/main" val="1643321385"/>
+                <p14:modId xmlns:p14="http://schemas.microsoft.com/office/powerpoint/2010/main" val="3917911543"/>
               </p:ext>
             </p:extLst>
           </p:nvPr>
@@ -6328,6 +6302,10 @@
                         <a:buFont typeface="Arial" pitchFamily="34" charset="0"/>
                         <a:buChar char="•"/>
                       </a:pPr>
+                      <a:r>
+                        <a:rPr lang="en-US" sz="1800" dirty="0" smtClean="0"/>
+                        <a:t>[]</a:t>
+                      </a:r>
                       <a:endParaRPr lang="en-US" sz="1800" dirty="0"/>
                     </a:p>
                   </a:txBody>
@@ -6342,6 +6320,10 @@
                         <a:buFont typeface="Arial" pitchFamily="34" charset="0"/>
                         <a:buChar char="•"/>
                       </a:pPr>
+                      <a:r>
+                        <a:rPr lang="en-US" sz="1800" dirty="0" smtClean="0"/>
+                        <a:t>[]</a:t>
+                      </a:r>
                       <a:endParaRPr lang="en-US" sz="1800" dirty="0"/>
                     </a:p>
                   </a:txBody>
@@ -6356,7 +6338,11 @@
                         <a:buFont typeface="Arial" pitchFamily="34" charset="0"/>
                         <a:buChar char="•"/>
                       </a:pPr>
-                      <a:endParaRPr lang="en-US" sz="1800"/>
+                      <a:r>
+                        <a:rPr lang="en-US" sz="1800" dirty="0" smtClean="0"/>
+                        <a:t>[]</a:t>
+                      </a:r>
+                      <a:endParaRPr lang="en-US" sz="1800" dirty="0"/>
                     </a:p>
                   </a:txBody>
                   <a:tcPr/>
@@ -6383,6 +6369,52 @@
                     <a:bodyPr/>
                     <a:lstStyle/>
                     <a:p>
+                      <a:pPr marL="285750" marR="0" indent="-285750" algn="l" defTabSz="914400" rtl="0" eaLnBrk="1" fontAlgn="auto" latinLnBrk="0" hangingPunct="1">
+                        <a:lnSpc>
+                          <a:spcPct val="100000"/>
+                        </a:lnSpc>
+                        <a:spcBef>
+                          <a:spcPts val="0"/>
+                        </a:spcBef>
+                        <a:spcAft>
+                          <a:spcPts val="0"/>
+                        </a:spcAft>
+                        <a:buClrTx/>
+                        <a:buSzTx/>
+                        <a:buFont typeface="Arial" pitchFamily="34" charset="0"/>
+                        <a:buChar char="•"/>
+                        <a:tabLst/>
+                        <a:defRPr/>
+                      </a:pPr>
+                      <a:r>
+                        <a:rPr lang="en-US" sz="1800" dirty="0" smtClean="0"/>
+                        <a:t>Perinatal</a:t>
+                      </a:r>
+                    </a:p>
+                    <a:p>
+                      <a:pPr marL="285750" marR="0" indent="-285750" algn="l" defTabSz="914400" rtl="0" eaLnBrk="1" fontAlgn="auto" latinLnBrk="0" hangingPunct="1">
+                        <a:lnSpc>
+                          <a:spcPct val="100000"/>
+                        </a:lnSpc>
+                        <a:spcBef>
+                          <a:spcPts val="0"/>
+                        </a:spcBef>
+                        <a:spcAft>
+                          <a:spcPts val="0"/>
+                        </a:spcAft>
+                        <a:buClrTx/>
+                        <a:buSzTx/>
+                        <a:buFont typeface="Arial" pitchFamily="34" charset="0"/>
+                        <a:buChar char="•"/>
+                        <a:tabLst/>
+                        <a:defRPr/>
+                      </a:pPr>
+                      <a:r>
+                        <a:rPr lang="en-US" sz="1800" dirty="0" smtClean="0"/>
+                        <a:t>Lacks Security</a:t>
+                      </a:r>
+                    </a:p>
+                    <a:p>
                       <a:pPr marL="285750" indent="-285750" algn="l">
                         <a:buFont typeface="Arial" pitchFamily="34" charset="0"/>
                         <a:buChar char="•"/>
@@ -6396,6 +6428,29 @@
                   <a:txBody>
                     <a:bodyPr/>
                     <a:lstStyle/>
+                    <a:p>
+                      <a:pPr marL="285750" marR="0" indent="-285750" algn="l" defTabSz="914400" rtl="0" eaLnBrk="1" fontAlgn="auto" latinLnBrk="0" hangingPunct="1">
+                        <a:lnSpc>
+                          <a:spcPct val="100000"/>
+                        </a:lnSpc>
+                        <a:spcBef>
+                          <a:spcPts val="0"/>
+                        </a:spcBef>
+                        <a:spcAft>
+                          <a:spcPts val="0"/>
+                        </a:spcAft>
+                        <a:buClrTx/>
+                        <a:buSzTx/>
+                        <a:buFont typeface="Arial" pitchFamily="34" charset="0"/>
+                        <a:buChar char="•"/>
+                        <a:tabLst/>
+                        <a:defRPr/>
+                      </a:pPr>
+                      <a:r>
+                        <a:rPr lang="en-US" sz="1800" dirty="0" smtClean="0"/>
+                        <a:t>Too Broad</a:t>
+                      </a:r>
+                    </a:p>
                     <a:p>
                       <a:pPr marL="285750" indent="-285750" algn="l">
                         <a:buFont typeface="Arial" pitchFamily="34" charset="0"/>
@@ -6415,6 +6470,10 @@
                         <a:buFont typeface="Arial" pitchFamily="34" charset="0"/>
                         <a:buChar char="•"/>
                       </a:pPr>
+                      <a:r>
+                        <a:rPr lang="en-US" sz="1800" dirty="0" smtClean="0"/>
+                        <a:t>[]</a:t>
+                      </a:r>
                       <a:endParaRPr lang="en-US" sz="1800" dirty="0"/>
                     </a:p>
                   </a:txBody>
@@ -6564,11 +6623,7 @@
             </a:pPr>
             <a:r>
               <a:rPr lang="en-US" sz="3200" dirty="0" smtClean="0"/>
-              <a:t>Ensure data </a:t>
-            </a:r>
-            <a:r>
-              <a:rPr lang="en-US" sz="3200" dirty="0" smtClean="0"/>
-              <a:t>integrity</a:t>
+              <a:t>Ensure data integrity</a:t>
             </a:r>
           </a:p>
           <a:p>
@@ -6862,11 +6917,7 @@
             <a:pPr algn="ctr"/>
             <a:r>
               <a:rPr lang="en-US" dirty="0" smtClean="0"/>
-              <a:t>System </a:t>
-            </a:r>
-            <a:r>
-              <a:rPr lang="en-US" dirty="0" smtClean="0"/>
-              <a:t>Architecture Diagram</a:t>
+              <a:t>System Architecture Diagram</a:t>
             </a:r>
             <a:endParaRPr lang="en-US" dirty="0"/>
           </a:p>
@@ -7170,15 +7221,7 @@
           <a:p>
             <a:r>
               <a:rPr lang="en-US" dirty="0" smtClean="0"/>
-              <a:t>This use case diagram depicts the different user </a:t>
-            </a:r>
-            <a:r>
-              <a:rPr lang="en-US" dirty="0" smtClean="0"/>
-              <a:t>types </a:t>
-            </a:r>
-            <a:r>
-              <a:rPr lang="en-US" dirty="0" smtClean="0"/>
-              <a:t>and what they have access to within the SEMRS system. </a:t>
+              <a:t>This use case diagram depicts the different user types and what they have access to within the SEMRS system. </a:t>
             </a:r>
             <a:endParaRPr lang="en-US" dirty="0"/>
           </a:p>

</xml_diff>

<commit_message>
Changes to be made to presentation
</commit_message>
<xml_diff>
--- a/Documentation/Final_Presentation.pptx
+++ b/Documentation/Final_Presentation.pptx
@@ -5,20 +5,21 @@
     <p:sldMasterId id="2147483672" r:id="rId1"/>
   </p:sldMasterIdLst>
   <p:notesMasterIdLst>
-    <p:notesMasterId r:id="rId13"/>
+    <p:notesMasterId r:id="rId14"/>
   </p:notesMasterIdLst>
   <p:sldIdLst>
     <p:sldId id="256" r:id="rId2"/>
     <p:sldId id="269" r:id="rId3"/>
-    <p:sldId id="265" r:id="rId4"/>
-    <p:sldId id="266" r:id="rId5"/>
+    <p:sldId id="271" r:id="rId4"/>
+    <p:sldId id="258" r:id="rId5"/>
     <p:sldId id="259" r:id="rId6"/>
-    <p:sldId id="258" r:id="rId7"/>
-    <p:sldId id="260" r:id="rId8"/>
+    <p:sldId id="265" r:id="rId7"/>
+    <p:sldId id="266" r:id="rId8"/>
     <p:sldId id="267" r:id="rId9"/>
     <p:sldId id="268" r:id="rId10"/>
-    <p:sldId id="270" r:id="rId11"/>
-    <p:sldId id="263" r:id="rId12"/>
+    <p:sldId id="260" r:id="rId11"/>
+    <p:sldId id="270" r:id="rId12"/>
+    <p:sldId id="263" r:id="rId13"/>
   </p:sldIdLst>
   <p:sldSz cx="9144000" cy="6858000" type="screen4x3"/>
   <p:notesSz cx="7010400" cy="9296400"/>
@@ -600,6 +601,363 @@
           <a:p>
             <a:r>
               <a:rPr lang="en-US" dirty="0" smtClean="0"/>
+              <a:t>Dong:</a:t>
+            </a:r>
+          </a:p>
+          <a:p>
+            <a:endParaRPr lang="en-US" dirty="0" smtClean="0"/>
+          </a:p>
+          <a:p>
+            <a:r>
+              <a:rPr lang="en-US" dirty="0" smtClean="0"/>
+              <a:t>You</a:t>
+            </a:r>
+            <a:r>
+              <a:rPr lang="en-US" baseline="0" dirty="0" smtClean="0"/>
+              <a:t> should list and talk about the security features you implemented, including</a:t>
+            </a:r>
+          </a:p>
+          <a:p>
+            <a:r>
+              <a:rPr lang="en-US" baseline="0" dirty="0" smtClean="0"/>
+              <a:t>User group access control (see here </a:t>
+            </a:r>
+            <a:r>
+              <a:rPr lang="en-US" baseline="0" smtClean="0"/>
+              <a:t>for explanations: http://www.tonymarston.net/php-mysql/role-based-access-control.html)</a:t>
+            </a:r>
+            <a:endParaRPr lang="en-US" baseline="0" dirty="0" smtClean="0"/>
+          </a:p>
+          <a:p>
+            <a:r>
+              <a:rPr lang="en-US" baseline="0" dirty="0" smtClean="0"/>
+              <a:t>Encryption and description algorithms </a:t>
+            </a:r>
+          </a:p>
+          <a:p>
+            <a:r>
+              <a:rPr lang="en-US" baseline="0" dirty="0" smtClean="0"/>
+              <a:t>Secure transmission via </a:t>
+            </a:r>
+            <a:r>
+              <a:rPr lang="en-US" baseline="0" dirty="0" err="1" smtClean="0"/>
+              <a:t>openSSL</a:t>
+            </a:r>
+            <a:endParaRPr lang="en-US" baseline="0" dirty="0" smtClean="0"/>
+          </a:p>
+          <a:p>
+            <a:r>
+              <a:rPr lang="en-US" baseline="0" dirty="0" smtClean="0"/>
+              <a:t>Audit log</a:t>
+            </a:r>
+          </a:p>
+          <a:p>
+            <a:r>
+              <a:rPr lang="en-US" baseline="0" dirty="0" smtClean="0"/>
+              <a:t>Automatic log off</a:t>
+            </a:r>
+          </a:p>
+          <a:p>
+            <a:r>
+              <a:rPr lang="en-US" baseline="0" dirty="0" smtClean="0"/>
+              <a:t>Others that I am not aware of</a:t>
+            </a:r>
+          </a:p>
+          <a:p>
+            <a:endParaRPr lang="en-US" baseline="0" dirty="0" smtClean="0"/>
+          </a:p>
+          <a:p>
+            <a:r>
+              <a:rPr lang="en-US" baseline="0" dirty="0" smtClean="0"/>
+              <a:t>This should be your presentation emphasis. Use one or two slide and present algorithm involved. </a:t>
+            </a:r>
+          </a:p>
+          <a:p>
+            <a:endParaRPr lang="en-US" baseline="0" dirty="0" smtClean="0"/>
+          </a:p>
+          <a:p>
+            <a:r>
+              <a:rPr lang="en-US" baseline="0" dirty="0" smtClean="0"/>
+              <a:t>****</a:t>
+            </a:r>
+          </a:p>
+          <a:p>
+            <a:r>
+              <a:rPr lang="en-US" baseline="0" dirty="0" smtClean="0"/>
+              <a:t> </a:t>
+            </a:r>
+            <a:endParaRPr lang="en-US" dirty="0" smtClean="0"/>
+          </a:p>
+          <a:p>
+            <a:endParaRPr lang="en-US" dirty="0" smtClean="0"/>
+          </a:p>
+          <a:p>
+            <a:r>
+              <a:rPr lang="en-US" dirty="0" smtClean="0"/>
+              <a:t>- Taken out financial data</a:t>
+            </a:r>
+            <a:r>
+              <a:rPr lang="en-US" baseline="0" dirty="0" smtClean="0"/>
+              <a:t> </a:t>
+            </a:r>
+          </a:p>
+          <a:p>
+            <a:pPr marL="171450" indent="-171450">
+              <a:buFontTx/>
+              <a:buChar char="-"/>
+            </a:pPr>
+            <a:r>
+              <a:rPr lang="en-US" baseline="0" dirty="0" smtClean="0"/>
+              <a:t>Safeguard, (electronic paper trail)  </a:t>
+            </a:r>
+          </a:p>
+          <a:p>
+            <a:pPr marL="171450" indent="-171450">
+              <a:buFontTx/>
+              <a:buChar char="-"/>
+            </a:pPr>
+            <a:r>
+              <a:rPr lang="en-US" baseline="0" dirty="0" smtClean="0"/>
+              <a:t>SHA1 for message Authentication, DHE_RSA as the key exchange mechanism, allows for HTTPS Protocol, ( combination of hypertext transfer </a:t>
+            </a:r>
+            <a:r>
+              <a:rPr lang="en-US" baseline="0" dirty="0" err="1" smtClean="0"/>
+              <a:t>protocal</a:t>
+            </a:r>
+            <a:r>
+              <a:rPr lang="en-US" baseline="0" dirty="0" smtClean="0"/>
+              <a:t> and SSL/TLS </a:t>
+            </a:r>
+            <a:r>
+              <a:rPr lang="en-US" baseline="0" dirty="0" err="1" smtClean="0"/>
+              <a:t>protocal</a:t>
+            </a:r>
+            <a:r>
+              <a:rPr lang="en-US" baseline="0" dirty="0" smtClean="0"/>
+              <a:t>.) Provides encrypted communication to allow for secure identification of a network web server </a:t>
+            </a:r>
+          </a:p>
+          <a:p>
+            <a:pPr marL="171450" indent="-171450">
+              <a:buFontTx/>
+              <a:buChar char="-"/>
+            </a:pPr>
+            <a:endParaRPr lang="en-US" dirty="0" smtClean="0"/>
+          </a:p>
+          <a:p>
+            <a:r>
+              <a:rPr lang="en-US" b="1" dirty="0" smtClean="0"/>
+              <a:t>How -</a:t>
+            </a:r>
+            <a:r>
+              <a:rPr lang="en-US" dirty="0" smtClean="0"/>
+              <a:t> </a:t>
+            </a:r>
+          </a:p>
+          <a:p>
+            <a:r>
+              <a:rPr lang="en-US" dirty="0" smtClean="0"/>
+              <a:t>A software system that backs up patients’ files securely so that they can be readily available when needed </a:t>
+            </a:r>
+          </a:p>
+          <a:p>
+            <a:r>
+              <a:rPr lang="en-US" baseline="0" dirty="0" smtClean="0"/>
+              <a:t> - I</a:t>
+            </a:r>
+            <a:r>
+              <a:rPr lang="en-US" dirty="0" smtClean="0"/>
+              <a:t>dentity</a:t>
+            </a:r>
+            <a:r>
+              <a:rPr lang="en-US" baseline="0" dirty="0" smtClean="0"/>
+              <a:t> theft eliminated by integrating a photo into the system for each patient so that they can be identified through facial recognition and name, eliminating the need for a patient ID card, making the overall process smoother and easier for patients’</a:t>
+            </a:r>
+            <a:endParaRPr lang="en-US" dirty="0" smtClean="0"/>
+          </a:p>
+          <a:p>
+            <a:pPr marL="171450" indent="-171450">
+              <a:buFontTx/>
+              <a:buChar char="-"/>
+            </a:pPr>
+            <a:endParaRPr lang="en-US" dirty="0"/>
+          </a:p>
+        </p:txBody>
+      </p:sp>
+      <p:sp>
+        <p:nvSpPr>
+          <p:cNvPr id="4" name="Slide Number Placeholder 3"/>
+          <p:cNvSpPr>
+            <a:spLocks noGrp="1"/>
+          </p:cNvSpPr>
+          <p:nvPr>
+            <p:ph type="sldNum" sz="quarter" idx="10"/>
+          </p:nvPr>
+        </p:nvSpPr>
+        <p:spPr/>
+        <p:txBody>
+          <a:bodyPr/>
+          <a:lstStyle/>
+          <a:p>
+            <a:fld id="{6538AC3F-63CE-4DD6-92CD-9B13526C2825}" type="slidenum">
+              <a:rPr lang="en-US" smtClean="0"/>
+              <a:t>10</a:t>
+            </a:fld>
+            <a:endParaRPr lang="en-US"/>
+          </a:p>
+        </p:txBody>
+      </p:sp>
+    </p:spTree>
+    <p:extLst>
+      <p:ext uri="{BB962C8B-B14F-4D97-AF65-F5344CB8AC3E}">
+        <p14:creationId xmlns:p14="http://schemas.microsoft.com/office/powerpoint/2010/main" val="2423766743"/>
+      </p:ext>
+    </p:extLst>
+  </p:cSld>
+  <p:clrMapOvr>
+    <a:masterClrMapping/>
+  </p:clrMapOvr>
+</p:notes>
+</file>
+
+<file path=ppt/notesSlides/notesSlide11.xml><?xml version="1.0" encoding="utf-8"?>
+<p:notes xmlns:a="http://schemas.openxmlformats.org/drawingml/2006/main" xmlns:r="http://schemas.openxmlformats.org/officeDocument/2006/relationships" xmlns:p="http://schemas.openxmlformats.org/presentationml/2006/main">
+  <p:cSld>
+    <p:spTree>
+      <p:nvGrpSpPr>
+        <p:cNvPr id="1" name=""/>
+        <p:cNvGrpSpPr/>
+        <p:nvPr/>
+      </p:nvGrpSpPr>
+      <p:grpSpPr>
+        <a:xfrm>
+          <a:off x="0" y="0"/>
+          <a:ext cx="0" cy="0"/>
+          <a:chOff x="0" y="0"/>
+          <a:chExt cx="0" cy="0"/>
+        </a:xfrm>
+      </p:grpSpPr>
+      <p:sp>
+        <p:nvSpPr>
+          <p:cNvPr id="2" name="Slide Image Placeholder 1"/>
+          <p:cNvSpPr>
+            <a:spLocks noGrp="1" noRot="1" noChangeAspect="1"/>
+          </p:cNvSpPr>
+          <p:nvPr>
+            <p:ph type="sldImg"/>
+          </p:nvPr>
+        </p:nvSpPr>
+        <p:spPr/>
+      </p:sp>
+      <p:sp>
+        <p:nvSpPr>
+          <p:cNvPr id="3" name="Notes Placeholder 2"/>
+          <p:cNvSpPr>
+            <a:spLocks noGrp="1"/>
+          </p:cNvSpPr>
+          <p:nvPr>
+            <p:ph type="body" idx="1"/>
+          </p:nvPr>
+        </p:nvSpPr>
+        <p:spPr/>
+        <p:txBody>
+          <a:bodyPr/>
+          <a:lstStyle/>
+          <a:p>
+            <a:r>
+              <a:rPr lang="en-US" dirty="0" smtClean="0"/>
+              <a:t>Easily</a:t>
+            </a:r>
+            <a:r>
+              <a:rPr lang="en-US" baseline="0" dirty="0" smtClean="0"/>
+              <a:t> ported to other types of practices: pharmacies, cancer clinics, tuberculosis</a:t>
+            </a:r>
+            <a:endParaRPr lang="en-US" dirty="0"/>
+          </a:p>
+        </p:txBody>
+      </p:sp>
+      <p:sp>
+        <p:nvSpPr>
+          <p:cNvPr id="4" name="Slide Number Placeholder 3"/>
+          <p:cNvSpPr>
+            <a:spLocks noGrp="1"/>
+          </p:cNvSpPr>
+          <p:nvPr>
+            <p:ph type="sldNum" sz="quarter" idx="10"/>
+          </p:nvPr>
+        </p:nvSpPr>
+        <p:spPr/>
+        <p:txBody>
+          <a:bodyPr/>
+          <a:lstStyle/>
+          <a:p>
+            <a:fld id="{6538AC3F-63CE-4DD6-92CD-9B13526C2825}" type="slidenum">
+              <a:rPr lang="en-US" smtClean="0"/>
+              <a:t>11</a:t>
+            </a:fld>
+            <a:endParaRPr lang="en-US"/>
+          </a:p>
+        </p:txBody>
+      </p:sp>
+    </p:spTree>
+    <p:extLst>
+      <p:ext uri="{BB962C8B-B14F-4D97-AF65-F5344CB8AC3E}">
+        <p14:creationId xmlns:p14="http://schemas.microsoft.com/office/powerpoint/2010/main" val="2185386872"/>
+      </p:ext>
+    </p:extLst>
+  </p:cSld>
+  <p:clrMapOvr>
+    <a:masterClrMapping/>
+  </p:clrMapOvr>
+</p:notes>
+</file>
+
+<file path=ppt/notesSlides/notesSlide12.xml><?xml version="1.0" encoding="utf-8"?>
+<p:notes xmlns:a="http://schemas.openxmlformats.org/drawingml/2006/main" xmlns:r="http://schemas.openxmlformats.org/officeDocument/2006/relationships" xmlns:p="http://schemas.openxmlformats.org/presentationml/2006/main">
+  <p:cSld>
+    <p:spTree>
+      <p:nvGrpSpPr>
+        <p:cNvPr id="1" name=""/>
+        <p:cNvGrpSpPr/>
+        <p:nvPr/>
+      </p:nvGrpSpPr>
+      <p:grpSpPr>
+        <a:xfrm>
+          <a:off x="0" y="0"/>
+          <a:ext cx="0" cy="0"/>
+          <a:chOff x="0" y="0"/>
+          <a:chExt cx="0" cy="0"/>
+        </a:xfrm>
+      </p:grpSpPr>
+      <p:sp>
+        <p:nvSpPr>
+          <p:cNvPr id="2" name="Slide Image Placeholder 1"/>
+          <p:cNvSpPr>
+            <a:spLocks noGrp="1" noRot="1" noChangeAspect="1"/>
+          </p:cNvSpPr>
+          <p:nvPr>
+            <p:ph type="sldImg"/>
+          </p:nvPr>
+        </p:nvSpPr>
+        <p:spPr/>
+      </p:sp>
+      <p:sp>
+        <p:nvSpPr>
+          <p:cNvPr id="3" name="Notes Placeholder 2"/>
+          <p:cNvSpPr>
+            <a:spLocks noGrp="1"/>
+          </p:cNvSpPr>
+          <p:nvPr>
+            <p:ph type="body" idx="1"/>
+          </p:nvPr>
+        </p:nvSpPr>
+        <p:spPr/>
+        <p:txBody>
+          <a:bodyPr/>
+          <a:lstStyle/>
+          <a:p>
+            <a:r>
+              <a:rPr lang="en-US" dirty="0" smtClean="0"/>
               <a:t>X-Rays,</a:t>
             </a:r>
             <a:r>
@@ -627,7 +985,7 @@
           <a:p>
             <a:fld id="{6538AC3F-63CE-4DD6-92CD-9B13526C2825}" type="slidenum">
               <a:rPr lang="en-US" smtClean="0"/>
-              <a:t>11</a:t>
+              <a:t>12</a:t>
             </a:fld>
             <a:endParaRPr lang="en-US"/>
           </a:p>
@@ -690,6 +1048,52 @@
           <a:bodyPr/>
           <a:lstStyle/>
           <a:p>
+            <a:pPr marL="0" indent="0">
+              <a:buFontTx/>
+              <a:buNone/>
+            </a:pPr>
+            <a:r>
+              <a:rPr lang="en-US" dirty="0" smtClean="0"/>
+              <a:t>Dong:</a:t>
+            </a:r>
+          </a:p>
+          <a:p>
+            <a:pPr marL="0" indent="0">
+              <a:buFontTx/>
+              <a:buNone/>
+            </a:pPr>
+            <a:r>
+              <a:rPr lang="en-US" dirty="0" smtClean="0"/>
+              <a:t>You should</a:t>
+            </a:r>
+            <a:r>
+              <a:rPr lang="en-US" baseline="0" dirty="0" smtClean="0"/>
+              <a:t> just describe the problem here.</a:t>
+            </a:r>
+            <a:endParaRPr lang="en-US" dirty="0" smtClean="0"/>
+          </a:p>
+          <a:p>
+            <a:pPr marL="0" indent="0">
+              <a:buFontTx/>
+              <a:buNone/>
+            </a:pPr>
+            <a:endParaRPr lang="en-US" baseline="0" dirty="0" smtClean="0"/>
+          </a:p>
+          <a:p>
+            <a:pPr marL="0" indent="0">
+              <a:buFontTx/>
+              <a:buNone/>
+            </a:pPr>
+            <a:endParaRPr lang="en-US" baseline="0" dirty="0" smtClean="0"/>
+          </a:p>
+          <a:p>
+            <a:pPr marL="171450" indent="-171450">
+              <a:buFontTx/>
+              <a:buChar char="-"/>
+            </a:pPr>
+            <a:endParaRPr lang="en-US" dirty="0" smtClean="0"/>
+          </a:p>
+          <a:p>
             <a:pPr marL="171450" indent="-171450">
               <a:buFontTx/>
               <a:buChar char="-"/>
@@ -851,62 +1255,110 @@
           <a:bodyPr/>
           <a:lstStyle/>
           <a:p>
-            <a:pPr defTabSz="931774">
-              <a:defRPr/>
-            </a:pPr>
+            <a:r>
+              <a:rPr lang="en-US" dirty="0" smtClean="0"/>
+              <a:t>Dong:</a:t>
+            </a:r>
+          </a:p>
+          <a:p>
+            <a:r>
+              <a:rPr lang="en-US" dirty="0" smtClean="0"/>
+              <a:t>HIPAA standards.</a:t>
+            </a:r>
+            <a:r>
+              <a:rPr lang="en-US" baseline="0" dirty="0" smtClean="0"/>
+              <a:t> Be prepared to answer related HIPAA standards.</a:t>
+            </a:r>
+            <a:endParaRPr lang="en-US" dirty="0" smtClean="0"/>
+          </a:p>
+          <a:p>
+            <a:r>
+              <a:rPr lang="en-US" dirty="0" smtClean="0"/>
+              <a:t>Check</a:t>
+            </a:r>
+            <a:r>
+              <a:rPr lang="en-US" baseline="0" dirty="0" smtClean="0"/>
+              <a:t> out HIPAA security rule. Focus on the technical safeguard</a:t>
+            </a:r>
+          </a:p>
+          <a:p>
+            <a:r>
+              <a:rPr lang="en-US" dirty="0" smtClean="0"/>
+              <a:t>http://www.hhs.gov/ocr/privacy/hipaa/understanding/srsummary.html</a:t>
+            </a:r>
+          </a:p>
+          <a:p>
             <a:r>
               <a:rPr lang="en-US" b="1" dirty="0" smtClean="0"/>
-              <a:t>Why -</a:t>
+              <a:t>Technical Safeguards</a:t>
+            </a:r>
+            <a:endParaRPr lang="en-US" dirty="0" smtClean="0"/>
+          </a:p>
+          <a:p>
+            <a:r>
+              <a:rPr lang="en-US" b="1" dirty="0" smtClean="0"/>
+              <a:t>Access Control.</a:t>
             </a:r>
             <a:r>
               <a:rPr lang="en-US" dirty="0" smtClean="0"/>
-              <a:t> </a:t>
-            </a:r>
-          </a:p>
-          <a:p>
-            <a:pPr defTabSz="931774">
-              <a:defRPr/>
-            </a:pPr>
+              <a:t> A covered entity must implement technical policies and procedures that allow only authorized persons to access electronic protected health information (e-PHI).</a:t>
+            </a:r>
+            <a:r>
+              <a:rPr lang="en-US" baseline="30000" dirty="0" smtClean="0"/>
+              <a:t>24</a:t>
+            </a:r>
             <a:r>
               <a:rPr lang="en-US" dirty="0" smtClean="0"/>
-              <a:t>This project is for Mitchells</a:t>
-            </a:r>
-            <a:r>
-              <a:rPr lang="en-US" baseline="0" dirty="0" smtClean="0"/>
-              <a:t> Plain Community H</a:t>
+              <a:t> </a:t>
+            </a:r>
+          </a:p>
+          <a:p>
+            <a:r>
+              <a:rPr lang="en-US" b="1" dirty="0" smtClean="0"/>
+              <a:t>Audit Controls.</a:t>
             </a:r>
             <a:r>
               <a:rPr lang="en-US" dirty="0" smtClean="0"/>
-              <a:t>ealthcare</a:t>
-            </a:r>
-            <a:r>
-              <a:rPr lang="en-US" baseline="0" dirty="0" smtClean="0"/>
-              <a:t> </a:t>
+              <a:t> A covered entity must implement hardware, software, and/or procedural mechanisms to record and examine access and other activity in information systems that contain or use e-PHI.</a:t>
+            </a:r>
+            <a:r>
+              <a:rPr lang="en-US" baseline="30000" dirty="0" smtClean="0"/>
+              <a:t>25</a:t>
             </a:r>
             <a:r>
               <a:rPr lang="en-US" dirty="0" smtClean="0"/>
-              <a:t>Center in Cape</a:t>
-            </a:r>
-            <a:r>
-              <a:rPr lang="en-US" baseline="0" dirty="0" smtClean="0"/>
-              <a:t> Town, South </a:t>
+              <a:t> </a:t>
+            </a:r>
+          </a:p>
+          <a:p>
+            <a:r>
+              <a:rPr lang="en-US" b="1" dirty="0" smtClean="0"/>
+              <a:t>Integrity Controls.</a:t>
             </a:r>
             <a:r>
               <a:rPr lang="en-US" dirty="0" smtClean="0"/>
-              <a:t>Africa that treats patients for HIV/AIDS. All</a:t>
-            </a:r>
-            <a:r>
-              <a:rPr lang="en-US" baseline="0" dirty="0" smtClean="0"/>
-              <a:t> patients records are currently hard copy only, and patients’ records get displaced and damaged. </a:t>
+              <a:t> A covered entity must implement policies and procedures to ensure that e-PHI is not improperly altered or destroyed. Electronic measures must be put in place to confirm that e-PHI has not been improperly altered or destroyed.</a:t>
+            </a:r>
+            <a:r>
+              <a:rPr lang="en-US" baseline="30000" dirty="0" smtClean="0"/>
+              <a:t>26</a:t>
+            </a:r>
+            <a:endParaRPr lang="en-US" dirty="0" smtClean="0"/>
+          </a:p>
+          <a:p>
+            <a:r>
+              <a:rPr lang="en-US" b="1" dirty="0" smtClean="0"/>
+              <a:t>Transmission Security.</a:t>
             </a:r>
             <a:r>
               <a:rPr lang="en-US" dirty="0" smtClean="0"/>
-              <a:t>Ultimately, a “hassle</a:t>
-            </a:r>
-            <a:r>
-              <a:rPr lang="en-US" baseline="0" dirty="0" smtClean="0"/>
-              <a:t> free treatment process”</a:t>
-            </a:r>
+              <a:t> A covered entity must implement technical security measures that guard against unauthorized access to e-PHI that is being transmitted over an electronic network.</a:t>
+            </a:r>
+            <a:r>
+              <a:rPr lang="en-US" baseline="30000" dirty="0" smtClean="0"/>
+              <a:t>27 </a:t>
+            </a:r>
+            <a:endParaRPr lang="en-US" dirty="0" smtClean="0"/>
           </a:p>
           <a:p>
             <a:endParaRPr lang="en-US" dirty="0"/>
@@ -939,7 +1391,7 @@
     </p:spTree>
     <p:extLst>
       <p:ext uri="{BB962C8B-B14F-4D97-AF65-F5344CB8AC3E}">
-        <p14:creationId xmlns:p14="http://schemas.microsoft.com/office/powerpoint/2010/main" val="93275497"/>
+        <p14:creationId xmlns:p14="http://schemas.microsoft.com/office/powerpoint/2010/main" val="456732720"/>
       </p:ext>
     </p:extLst>
   </p:cSld>
@@ -995,50 +1447,91 @@
           <a:p>
             <a:r>
               <a:rPr lang="en-US" dirty="0" smtClean="0"/>
-              <a:t>-MCHC is one of the few public health clinics</a:t>
+              <a:t>Dong:</a:t>
+            </a:r>
+          </a:p>
+          <a:p>
+            <a:r>
+              <a:rPr lang="en-US" dirty="0" smtClean="0"/>
+              <a:t>Put</a:t>
             </a:r>
             <a:r>
               <a:rPr lang="en-US" baseline="0" dirty="0" smtClean="0"/>
-              <a:t> in South Africa, </a:t>
-            </a:r>
-          </a:p>
-          <a:p>
+              <a:t> this here as background knowledge.</a:t>
+            </a:r>
+            <a:endParaRPr lang="en-US" dirty="0" smtClean="0"/>
+          </a:p>
+          <a:p>
+            <a:endParaRPr lang="en-US" dirty="0" smtClean="0"/>
+          </a:p>
+          <a:p>
+            <a:endParaRPr lang="en-US" dirty="0" smtClean="0"/>
+          </a:p>
+          <a:p>
+            <a:r>
+              <a:rPr lang="en-US" dirty="0" smtClean="0"/>
+              <a:t>It </a:t>
+            </a:r>
+            <a:r>
+              <a:rPr lang="en-US" dirty="0"/>
+              <a:t>is important to weigh patient confidentiality against a public responsibility to support national priorities.</a:t>
+            </a:r>
+          </a:p>
+          <a:p>
+            <a:endParaRPr lang="en-US" dirty="0" smtClean="0"/>
+          </a:p>
+          <a:p>
+            <a:r>
+              <a:rPr lang="en-US" dirty="0" smtClean="0"/>
+              <a:t>HIPAA</a:t>
+            </a:r>
             <a:r>
               <a:rPr lang="en-US" baseline="0" dirty="0" smtClean="0"/>
-              <a:t>-Only 2 physicians</a:t>
-            </a:r>
-          </a:p>
-          <a:p>
-            <a:endParaRPr lang="en-US" baseline="0" dirty="0" smtClean="0"/>
-          </a:p>
-          <a:p>
-            <a:r>
-              <a:rPr lang="en-US" b="1" dirty="0" smtClean="0"/>
-              <a:t>What - </a:t>
-            </a:r>
-          </a:p>
-          <a:p>
-            <a:r>
-              <a:rPr lang="en-US" dirty="0" smtClean="0"/>
-              <a:t>Solve the problem of</a:t>
-            </a:r>
-            <a:r>
-              <a:rPr lang="en-US" baseline="0" dirty="0" smtClean="0"/>
-              <a:t> displacement and damage to patients’ files</a:t>
-            </a:r>
-          </a:p>
-          <a:p>
-            <a:r>
-              <a:rPr lang="en-US" baseline="0" dirty="0" smtClean="0"/>
-              <a:t> - Eliminate identity theft</a:t>
-            </a:r>
-          </a:p>
-          <a:p>
-            <a:r>
-              <a:rPr lang="en-US" baseline="0" dirty="0" smtClean="0"/>
-              <a:t> - Ensure patient stays on the right regiment</a:t>
+              <a:t> – Health Insurance Portability &amp; Accountability Act</a:t>
             </a:r>
             <a:endParaRPr lang="en-US" dirty="0" smtClean="0"/>
+          </a:p>
+          <a:p>
+            <a:endParaRPr lang="en-US" dirty="0"/>
+          </a:p>
+          <a:p>
+            <a:r>
+              <a:rPr lang="en-US" dirty="0"/>
+              <a:t>Pros:</a:t>
+            </a:r>
+          </a:p>
+          <a:p>
+            <a:r>
+              <a:rPr lang="en-US" dirty="0"/>
+              <a:t> - Hospitals/Clinics more efficient</a:t>
+            </a:r>
+          </a:p>
+          <a:p>
+            <a:r>
+              <a:rPr lang="en-US" dirty="0"/>
+              <a:t> - Reduce medical errors</a:t>
+            </a:r>
+          </a:p>
+          <a:p>
+            <a:r>
+              <a:rPr lang="en-US" dirty="0"/>
+              <a:t> - Lower healthcare costs</a:t>
+            </a:r>
+          </a:p>
+          <a:p>
+            <a:endParaRPr lang="en-US" dirty="0"/>
+          </a:p>
+          <a:p>
+            <a:endParaRPr lang="en-US" dirty="0"/>
+          </a:p>
+          <a:p>
+            <a:endParaRPr lang="en-US" dirty="0"/>
+          </a:p>
+          <a:p>
+            <a:endParaRPr lang="en-US" dirty="0"/>
+          </a:p>
+          <a:p>
+            <a:endParaRPr lang="en-US" dirty="0"/>
           </a:p>
           <a:p>
             <a:endParaRPr lang="en-US" dirty="0"/>
@@ -1071,7 +1564,7 @@
     </p:spTree>
     <p:extLst>
       <p:ext uri="{BB962C8B-B14F-4D97-AF65-F5344CB8AC3E}">
-        <p14:creationId xmlns:p14="http://schemas.microsoft.com/office/powerpoint/2010/main" val="2162373667"/>
+        <p14:creationId xmlns:p14="http://schemas.microsoft.com/office/powerpoint/2010/main" val="4279931477"/>
       </p:ext>
     </p:extLst>
   </p:cSld>
@@ -1124,6 +1617,26 @@
         <p:txBody>
           <a:bodyPr/>
           <a:lstStyle/>
+          <a:p>
+            <a:r>
+              <a:rPr lang="en-US" dirty="0" smtClean="0"/>
+              <a:t>Dong:</a:t>
+            </a:r>
+          </a:p>
+          <a:p>
+            <a:r>
+              <a:rPr lang="en-US" dirty="0" smtClean="0"/>
+              <a:t>This should be here as part of</a:t>
+            </a:r>
+            <a:r>
+              <a:rPr lang="en-US" baseline="0" dirty="0" smtClean="0"/>
+              <a:t> background</a:t>
+            </a:r>
+            <a:endParaRPr lang="en-US" dirty="0" smtClean="0"/>
+          </a:p>
+          <a:p>
+            <a:endParaRPr lang="en-US" dirty="0" smtClean="0"/>
+          </a:p>
           <a:p>
             <a:r>
               <a:rPr lang="en-US" dirty="0" smtClean="0"/>
@@ -1511,66 +2024,62 @@
           <a:bodyPr/>
           <a:lstStyle/>
           <a:p>
-            <a:r>
-              <a:rPr lang="en-US" dirty="0"/>
-              <a:t>It is important to weigh patient confidentiality against a public responsibility to support national priorities.</a:t>
-            </a:r>
-          </a:p>
-          <a:p>
-            <a:endParaRPr lang="en-US" dirty="0" smtClean="0"/>
-          </a:p>
-          <a:p>
+            <a:pPr defTabSz="931774">
+              <a:defRPr/>
+            </a:pPr>
+            <a:r>
+              <a:rPr lang="en-US" b="1" dirty="0" smtClean="0"/>
+              <a:t>Why -</a:t>
+            </a:r>
             <a:r>
               <a:rPr lang="en-US" dirty="0" smtClean="0"/>
-              <a:t>HIPAA</a:t>
+              <a:t> </a:t>
+            </a:r>
+          </a:p>
+          <a:p>
+            <a:pPr defTabSz="931774">
+              <a:defRPr/>
+            </a:pPr>
+            <a:r>
+              <a:rPr lang="en-US" dirty="0" smtClean="0"/>
+              <a:t>This project is for Mitchells</a:t>
             </a:r>
             <a:r>
               <a:rPr lang="en-US" baseline="0" dirty="0" smtClean="0"/>
-              <a:t> – Health Insurance Portability &amp; Accountability Act</a:t>
-            </a:r>
-            <a:endParaRPr lang="en-US" dirty="0" smtClean="0"/>
-          </a:p>
-          <a:p>
-            <a:endParaRPr lang="en-US" dirty="0"/>
-          </a:p>
-          <a:p>
-            <a:r>
-              <a:rPr lang="en-US" dirty="0"/>
-              <a:t>Pros:</a:t>
-            </a:r>
-          </a:p>
-          <a:p>
-            <a:r>
-              <a:rPr lang="en-US" dirty="0"/>
-              <a:t> - Hospitals/Clinics more efficient</a:t>
-            </a:r>
-          </a:p>
-          <a:p>
-            <a:r>
-              <a:rPr lang="en-US" dirty="0"/>
-              <a:t> - Reduce medical errors</a:t>
-            </a:r>
-          </a:p>
-          <a:p>
-            <a:r>
-              <a:rPr lang="en-US" dirty="0"/>
-              <a:t> - Lower healthcare costs</a:t>
-            </a:r>
-          </a:p>
-          <a:p>
-            <a:endParaRPr lang="en-US" dirty="0"/>
-          </a:p>
-          <a:p>
-            <a:endParaRPr lang="en-US" dirty="0"/>
-          </a:p>
-          <a:p>
-            <a:endParaRPr lang="en-US" dirty="0"/>
-          </a:p>
-          <a:p>
-            <a:endParaRPr lang="en-US" dirty="0"/>
-          </a:p>
-          <a:p>
-            <a:endParaRPr lang="en-US" dirty="0"/>
+              <a:t> Plain Community H</a:t>
+            </a:r>
+            <a:r>
+              <a:rPr lang="en-US" dirty="0" smtClean="0"/>
+              <a:t>ealthcare</a:t>
+            </a:r>
+            <a:r>
+              <a:rPr lang="en-US" baseline="0" dirty="0" smtClean="0"/>
+              <a:t> </a:t>
+            </a:r>
+            <a:r>
+              <a:rPr lang="en-US" dirty="0" smtClean="0"/>
+              <a:t>Center in Cape</a:t>
+            </a:r>
+            <a:r>
+              <a:rPr lang="en-US" baseline="0" dirty="0" smtClean="0"/>
+              <a:t> Town, South </a:t>
+            </a:r>
+            <a:r>
+              <a:rPr lang="en-US" dirty="0" smtClean="0"/>
+              <a:t>Africa that treats patients for HIV/AIDS. All</a:t>
+            </a:r>
+            <a:r>
+              <a:rPr lang="en-US" baseline="0" dirty="0" smtClean="0"/>
+              <a:t> patients records are currently hard copy only, and patients’ records get displaced and damaged. </a:t>
+            </a:r>
+            <a:r>
+              <a:rPr lang="en-US" dirty="0" smtClean="0"/>
+              <a:t>Ultimately, a “hassle</a:t>
+            </a:r>
+            <a:r>
+              <a:rPr lang="en-US" baseline="0" dirty="0" smtClean="0"/>
+              <a:t> free treatment process”</a:t>
+            </a:r>
           </a:p>
           <a:p>
             <a:endParaRPr lang="en-US" dirty="0"/>
@@ -1603,7 +2112,7 @@
     </p:spTree>
     <p:extLst>
       <p:ext uri="{BB962C8B-B14F-4D97-AF65-F5344CB8AC3E}">
-        <p14:creationId xmlns:p14="http://schemas.microsoft.com/office/powerpoint/2010/main" val="4279931477"/>
+        <p14:creationId xmlns:p14="http://schemas.microsoft.com/office/powerpoint/2010/main" val="93275497"/>
       </p:ext>
     </p:extLst>
   </p:cSld>
@@ -1659,92 +2168,52 @@
           <a:p>
             <a:r>
               <a:rPr lang="en-US" dirty="0" smtClean="0"/>
-              <a:t>- Taken out financial data</a:t>
+              <a:t>-MCHC is one of the few public health clinics</a:t>
             </a:r>
             <a:r>
               <a:rPr lang="en-US" baseline="0" dirty="0" smtClean="0"/>
-              <a:t> </a:t>
-            </a:r>
-          </a:p>
-          <a:p>
-            <a:pPr marL="171450" indent="-171450">
-              <a:buFontTx/>
-              <a:buChar char="-"/>
-            </a:pPr>
+              <a:t> in South Africa, </a:t>
+            </a:r>
+          </a:p>
+          <a:p>
             <a:r>
               <a:rPr lang="en-US" baseline="0" dirty="0" smtClean="0"/>
-              <a:t>Safeguard, (electronic paper trail)  </a:t>
-            </a:r>
-          </a:p>
-          <a:p>
-            <a:pPr marL="171450" indent="-171450">
-              <a:buFontTx/>
-              <a:buChar char="-"/>
-            </a:pPr>
+              <a:t>-Only 2 physicians</a:t>
+            </a:r>
+          </a:p>
+          <a:p>
+            <a:endParaRPr lang="en-US" baseline="0" dirty="0" smtClean="0"/>
+          </a:p>
+          <a:p>
+            <a:r>
+              <a:rPr lang="en-US" b="1" dirty="0" smtClean="0"/>
+              <a:t>What - </a:t>
+            </a:r>
+          </a:p>
+          <a:p>
+            <a:r>
+              <a:rPr lang="en-US" dirty="0" smtClean="0"/>
+              <a:t>Solve the problem of</a:t>
+            </a:r>
             <a:r>
               <a:rPr lang="en-US" baseline="0" dirty="0" smtClean="0"/>
-              <a:t>SHA1 for message Authentication, DHE_RSA as the key exchange mechanism, allows for HTTPS Protocol, ( combination of hypertext transfer </a:t>
-            </a:r>
-            <a:r>
-              <a:rPr lang="en-US" baseline="0" dirty="0" err="1" smtClean="0"/>
-              <a:t>protocal</a:t>
-            </a:r>
+              <a:t> displacement and damage to patients’ files</a:t>
+            </a:r>
+          </a:p>
+          <a:p>
             <a:r>
               <a:rPr lang="en-US" baseline="0" dirty="0" smtClean="0"/>
-              <a:t> and SSL/TLS </a:t>
-            </a:r>
-            <a:r>
-              <a:rPr lang="en-US" baseline="0" dirty="0" err="1" smtClean="0"/>
-              <a:t>protocal</a:t>
-            </a:r>
+              <a:t> - Eliminate identity theft</a:t>
+            </a:r>
+          </a:p>
+          <a:p>
             <a:r>
               <a:rPr lang="en-US" baseline="0" dirty="0" smtClean="0"/>
-              <a:t>.) Provides encrypted communication to allow for secure identification of a network web server </a:t>
-            </a:r>
-          </a:p>
-          <a:p>
-            <a:pPr marL="171450" indent="-171450">
-              <a:buFontTx/>
-              <a:buChar char="-"/>
-            </a:pPr>
+              <a:t> - Ensure patient stays on the right regiment</a:t>
+            </a:r>
             <a:endParaRPr lang="en-US" dirty="0" smtClean="0"/>
           </a:p>
           <a:p>
-            <a:r>
-              <a:rPr lang="en-US" b="1" dirty="0" smtClean="0"/>
-              <a:t>How -</a:t>
-            </a:r>
-            <a:r>
-              <a:rPr lang="en-US" dirty="0" smtClean="0"/>
-              <a:t> </a:t>
-            </a:r>
-          </a:p>
-          <a:p>
-            <a:r>
-              <a:rPr lang="en-US" dirty="0" smtClean="0"/>
-              <a:t>A software system that backs up patients’ files securely so that they can be readily available when needed </a:t>
-            </a:r>
-          </a:p>
-          <a:p>
-            <a:r>
-              <a:rPr lang="en-US" baseline="0" dirty="0" smtClean="0"/>
-              <a:t> - I</a:t>
-            </a:r>
-            <a:r>
-              <a:rPr lang="en-US" dirty="0" smtClean="0"/>
-              <a:t>dentity</a:t>
-            </a:r>
-            <a:r>
-              <a:rPr lang="en-US" baseline="0" dirty="0" smtClean="0"/>
-              <a:t> theft eliminated by integrating a photo into the system for each patient so that they can be identified through facial recognition and name, eliminating the need for a patient ID card, making the overall process smoother and easier for patients’</a:t>
-            </a:r>
-            <a:endParaRPr lang="en-US" dirty="0" smtClean="0"/>
-          </a:p>
-          <a:p>
-            <a:pPr marL="171450" indent="-171450">
-              <a:buFontTx/>
-              <a:buChar char="-"/>
-            </a:pPr>
             <a:endParaRPr lang="en-US" dirty="0"/>
           </a:p>
         </p:txBody>
@@ -1775,7 +2244,7 @@
     </p:spTree>
     <p:extLst>
       <p:ext uri="{BB962C8B-B14F-4D97-AF65-F5344CB8AC3E}">
-        <p14:creationId xmlns:p14="http://schemas.microsoft.com/office/powerpoint/2010/main" val="2423766743"/>
+        <p14:creationId xmlns:p14="http://schemas.microsoft.com/office/powerpoint/2010/main" val="2162373667"/>
       </p:ext>
     </p:extLst>
   </p:cSld>
@@ -1831,7 +2300,17 @@
           <a:p>
             <a:r>
               <a:rPr lang="en-US" dirty="0" smtClean="0"/>
-              <a:t>***********May need a re-write on the caption </a:t>
+              <a:t>Dong:</a:t>
+            </a:r>
+          </a:p>
+          <a:p>
+            <a:r>
+              <a:rPr lang="en-US" dirty="0" smtClean="0"/>
+              <a:t>This does</a:t>
+            </a:r>
+            <a:r>
+              <a:rPr lang="en-US" baseline="0" dirty="0" smtClean="0"/>
+              <a:t> not tell much.</a:t>
             </a:r>
             <a:endParaRPr lang="en-US" dirty="0"/>
           </a:p>
@@ -1854,7 +2333,7 @@
           <a:p>
             <a:fld id="{6538AC3F-63CE-4DD6-92CD-9B13526C2825}" type="slidenum">
               <a:rPr lang="en-US" smtClean="0"/>
-              <a:t>9</a:t>
+              <a:t>8</a:t>
             </a:fld>
             <a:endParaRPr lang="en-US"/>
           </a:p>
@@ -1863,7 +2342,7 @@
     </p:spTree>
     <p:extLst>
       <p:ext uri="{BB962C8B-B14F-4D97-AF65-F5344CB8AC3E}">
-        <p14:creationId xmlns:p14="http://schemas.microsoft.com/office/powerpoint/2010/main" val="717272626"/>
+        <p14:creationId xmlns:p14="http://schemas.microsoft.com/office/powerpoint/2010/main" val="3836898972"/>
       </p:ext>
     </p:extLst>
   </p:cSld>
@@ -1919,11 +2398,7 @@
           <a:p>
             <a:r>
               <a:rPr lang="en-US" dirty="0" smtClean="0"/>
-              <a:t>Easily</a:t>
-            </a:r>
-            <a:r>
-              <a:rPr lang="en-US" baseline="0" dirty="0" smtClean="0"/>
-              <a:t> ported to other types of practices: pharmacies, cancer clinics, tuberculosis</a:t>
+              <a:t>***********May need a re-write on the caption </a:t>
             </a:r>
             <a:endParaRPr lang="en-US" dirty="0"/>
           </a:p>
@@ -1946,7 +2421,7 @@
           <a:p>
             <a:fld id="{6538AC3F-63CE-4DD6-92CD-9B13526C2825}" type="slidenum">
               <a:rPr lang="en-US" smtClean="0"/>
-              <a:t>10</a:t>
+              <a:t>9</a:t>
             </a:fld>
             <a:endParaRPr lang="en-US"/>
           </a:p>
@@ -1955,7 +2430,7 @@
     </p:spTree>
     <p:extLst>
       <p:ext uri="{BB962C8B-B14F-4D97-AF65-F5344CB8AC3E}">
-        <p14:creationId xmlns:p14="http://schemas.microsoft.com/office/powerpoint/2010/main" val="2185386872"/>
+        <p14:creationId xmlns:p14="http://schemas.microsoft.com/office/powerpoint/2010/main" val="717272626"/>
       </p:ext>
     </p:extLst>
   </p:cSld>
@@ -5200,7 +5675,7 @@
             <a:pPr algn="ctr"/>
             <a:r>
               <a:rPr lang="en-US" dirty="0" smtClean="0"/>
-              <a:t>Summary</a:t>
+              <a:t>Solution highlights</a:t>
             </a:r>
             <a:endParaRPr lang="en-US" dirty="0"/>
           </a:p>
@@ -5218,13 +5693,13 @@
         </p:nvSpPr>
         <p:spPr>
           <a:xfrm>
-            <a:off x="914400" y="1752600"/>
-            <a:ext cx="7391400" cy="4556761"/>
+            <a:off x="914400" y="1676400"/>
+            <a:ext cx="7315200" cy="4632961"/>
           </a:xfrm>
         </p:spPr>
         <p:txBody>
           <a:bodyPr>
-            <a:normAutofit fontScale="85000" lnSpcReduction="10000"/>
+            <a:normAutofit/>
           </a:bodyPr>
           <a:lstStyle/>
           <a:p>
@@ -5234,12 +5709,16 @@
               </a:lnSpc>
             </a:pPr>
             <a:r>
-              <a:rPr lang="en-US" sz="2800" dirty="0"/>
-              <a:t>L</a:t>
-            </a:r>
-            <a:r>
               <a:rPr lang="en-US" sz="2800" dirty="0" smtClean="0"/>
-              <a:t>ightweight</a:t>
+              <a:t>Much simpler than </a:t>
+            </a:r>
+            <a:r>
+              <a:rPr lang="en-US" sz="2800" dirty="0" err="1" smtClean="0"/>
+              <a:t>OpenEMR</a:t>
+            </a:r>
+            <a:r>
+              <a:rPr lang="en-US" sz="2800" dirty="0" smtClean="0"/>
+              <a:t>, removed many unneeded features. </a:t>
             </a:r>
           </a:p>
           <a:p>
@@ -5250,42 +5729,8 @@
             </a:pPr>
             <a:r>
               <a:rPr lang="en-US" sz="2800" dirty="0" smtClean="0"/>
-              <a:t>Secure EMR System</a:t>
-            </a:r>
-          </a:p>
-          <a:p>
-            <a:pPr lvl="1">
-              <a:lnSpc>
-                <a:spcPct val="200000"/>
-              </a:lnSpc>
-            </a:pPr>
-            <a:r>
-              <a:rPr lang="en-US" sz="2600" dirty="0" smtClean="0"/>
-              <a:t>[Reiterate our main points]</a:t>
-            </a:r>
-          </a:p>
-          <a:p>
-            <a:pPr lvl="1">
-              <a:lnSpc>
-                <a:spcPct val="200000"/>
-              </a:lnSpc>
-            </a:pPr>
-            <a:r>
-              <a:rPr lang="en-US" sz="2600" dirty="0" smtClean="0"/>
-              <a:t>[point 2]</a:t>
-            </a:r>
-          </a:p>
-          <a:p>
-            <a:pPr lvl="1">
-              <a:lnSpc>
-                <a:spcPct val="200000"/>
-              </a:lnSpc>
-            </a:pPr>
-            <a:r>
-              <a:rPr lang="en-US" sz="2600" dirty="0" smtClean="0"/>
-              <a:t>[point 3]</a:t>
-            </a:r>
-            <a:endParaRPr lang="en-US" sz="2600" dirty="0" smtClean="0"/>
+              <a:t>Onsite Access through intranet (LAN).</a:t>
+            </a:r>
           </a:p>
           <a:p>
             <a:pPr>
@@ -5295,8 +5740,9 @@
             </a:pPr>
             <a:r>
               <a:rPr lang="en-US" sz="2800" dirty="0" smtClean="0"/>
-              <a:t>Portability of a streamlined secure system</a:t>
-            </a:r>
+              <a:t>SSL Encryption </a:t>
+            </a:r>
+            <a:endParaRPr lang="en-US" sz="2800" dirty="0"/>
           </a:p>
         </p:txBody>
       </p:sp>
@@ -5323,10 +5769,40 @@
           </a:p>
         </p:txBody>
       </p:sp>
+      <p:pic>
+        <p:nvPicPr>
+          <p:cNvPr id="5" name="Picture 4"/>
+          <p:cNvPicPr>
+            <a:picLocks noChangeAspect="1"/>
+          </p:cNvPicPr>
+          <p:nvPr/>
+        </p:nvPicPr>
+        <p:blipFill>
+          <a:blip r:embed="rId3">
+            <a:extLst>
+              <a:ext uri="{28A0092B-C50C-407E-A947-70E740481C1C}">
+                <a14:useLocalDpi xmlns:a14="http://schemas.microsoft.com/office/drawing/2010/main" val="0"/>
+              </a:ext>
+            </a:extLst>
+          </a:blip>
+          <a:stretch>
+            <a:fillRect/>
+          </a:stretch>
+        </p:blipFill>
+        <p:spPr>
+          <a:xfrm>
+            <a:off x="6934200" y="4953000"/>
+            <a:ext cx="1773418" cy="1573730"/>
+          </a:xfrm>
+          <a:prstGeom prst="rect">
+            <a:avLst/>
+          </a:prstGeom>
+        </p:spPr>
+      </p:pic>
     </p:spTree>
     <p:extLst>
       <p:ext uri="{BB962C8B-B14F-4D97-AF65-F5344CB8AC3E}">
-        <p14:creationId xmlns:p14="http://schemas.microsoft.com/office/powerpoint/2010/main" val="952147915"/>
+        <p14:creationId xmlns:p14="http://schemas.microsoft.com/office/powerpoint/2010/main" val="1669242324"/>
       </p:ext>
     </p:extLst>
   </p:cSld>
@@ -5385,7 +5861,7 @@
             <a:pPr algn="ctr"/>
             <a:r>
               <a:rPr lang="en-US" dirty="0" smtClean="0"/>
-              <a:t>Possible Future Work</a:t>
+              <a:t>Summary</a:t>
             </a:r>
             <a:endParaRPr lang="en-US" dirty="0"/>
           </a:p>
@@ -5409,7 +5885,7 @@
         </p:spPr>
         <p:txBody>
           <a:bodyPr>
-            <a:normAutofit/>
+            <a:normAutofit fontScale="85000" lnSpcReduction="10000"/>
           </a:bodyPr>
           <a:lstStyle/>
           <a:p>
@@ -5419,8 +5895,12 @@
               </a:lnSpc>
             </a:pPr>
             <a:r>
+              <a:rPr lang="en-US" sz="2800" dirty="0"/>
+              <a:t>L</a:t>
+            </a:r>
+            <a:r>
               <a:rPr lang="en-US" sz="2800" dirty="0" smtClean="0"/>
-              <a:t>Ability to upload existing hardcopy files</a:t>
+              <a:t>ightweight</a:t>
             </a:r>
           </a:p>
           <a:p>
@@ -5431,7 +5911,7 @@
             </a:pPr>
             <a:r>
               <a:rPr lang="en-US" sz="2800" dirty="0" smtClean="0"/>
-              <a:t>Prescriptions:</a:t>
+              <a:t>Secure EMR System</a:t>
             </a:r>
           </a:p>
           <a:p>
@@ -5442,7 +5922,7 @@
             </a:pPr>
             <a:r>
               <a:rPr lang="en-US" sz="2600" dirty="0" smtClean="0"/>
-              <a:t>Add</a:t>
+              <a:t>[Reiterate our main points]</a:t>
             </a:r>
           </a:p>
           <a:p>
@@ -5453,7 +5933,7 @@
             </a:pPr>
             <a:r>
               <a:rPr lang="en-US" sz="2600" dirty="0" smtClean="0"/>
-              <a:t>Update</a:t>
+              <a:t>[point 2]</a:t>
             </a:r>
           </a:p>
           <a:p>
@@ -5464,6 +5944,186 @@
             </a:pPr>
             <a:r>
               <a:rPr lang="en-US" sz="2600" dirty="0" smtClean="0"/>
+              <a:t>[point 3]</a:t>
+            </a:r>
+          </a:p>
+          <a:p>
+            <a:pPr>
+              <a:lnSpc>
+                <a:spcPct val="200000"/>
+              </a:lnSpc>
+            </a:pPr>
+            <a:r>
+              <a:rPr lang="en-US" sz="2800" dirty="0" smtClean="0"/>
+              <a:t>Portability of a streamlined secure system</a:t>
+            </a:r>
+          </a:p>
+        </p:txBody>
+      </p:sp>
+      <p:sp>
+        <p:nvSpPr>
+          <p:cNvPr id="7" name="Slide Number Placeholder 6"/>
+          <p:cNvSpPr>
+            <a:spLocks noGrp="1"/>
+          </p:cNvSpPr>
+          <p:nvPr>
+            <p:ph type="sldNum" sz="quarter" idx="12"/>
+          </p:nvPr>
+        </p:nvSpPr>
+        <p:spPr/>
+        <p:txBody>
+          <a:bodyPr/>
+          <a:lstStyle/>
+          <a:p>
+            <a:fld id="{85816456-AF90-4826-9770-6E0598D9C364}" type="slidenum">
+              <a:rPr lang="en-US" smtClean="0"/>
+              <a:t>11</a:t>
+            </a:fld>
+            <a:endParaRPr lang="en-US" dirty="0"/>
+          </a:p>
+        </p:txBody>
+      </p:sp>
+    </p:spTree>
+    <p:extLst>
+      <p:ext uri="{BB962C8B-B14F-4D97-AF65-F5344CB8AC3E}">
+        <p14:creationId xmlns:p14="http://schemas.microsoft.com/office/powerpoint/2010/main" val="952147915"/>
+      </p:ext>
+    </p:extLst>
+  </p:cSld>
+  <p:clrMapOvr>
+    <a:masterClrMapping/>
+  </p:clrMapOvr>
+  <p:timing>
+    <p:tnLst>
+      <p:par>
+        <p:cTn id="1" dur="indefinite" restart="never" nodeType="tmRoot"/>
+      </p:par>
+    </p:tnLst>
+  </p:timing>
+</p:sld>
+</file>
+
+<file path=ppt/slides/slide12.xml><?xml version="1.0" encoding="utf-8"?>
+<p:sld xmlns:a="http://schemas.openxmlformats.org/drawingml/2006/main" xmlns:r="http://schemas.openxmlformats.org/officeDocument/2006/relationships" xmlns:p="http://schemas.openxmlformats.org/presentationml/2006/main">
+  <p:cSld>
+    <p:spTree>
+      <p:nvGrpSpPr>
+        <p:cNvPr id="1" name=""/>
+        <p:cNvGrpSpPr/>
+        <p:nvPr/>
+      </p:nvGrpSpPr>
+      <p:grpSpPr>
+        <a:xfrm>
+          <a:off x="0" y="0"/>
+          <a:ext cx="0" cy="0"/>
+          <a:chOff x="0" y="0"/>
+          <a:chExt cx="0" cy="0"/>
+        </a:xfrm>
+      </p:grpSpPr>
+      <p:sp>
+        <p:nvSpPr>
+          <p:cNvPr id="2" name="Title 1"/>
+          <p:cNvSpPr>
+            <a:spLocks noGrp="1"/>
+          </p:cNvSpPr>
+          <p:nvPr>
+            <p:ph type="title"/>
+          </p:nvPr>
+        </p:nvSpPr>
+        <p:spPr>
+          <a:xfrm>
+            <a:off x="0" y="381000"/>
+            <a:ext cx="8458200" cy="793812"/>
+          </a:xfrm>
+        </p:spPr>
+        <p:txBody>
+          <a:bodyPr>
+            <a:normAutofit/>
+          </a:bodyPr>
+          <a:lstStyle/>
+          <a:p>
+            <a:pPr algn="ctr"/>
+            <a:r>
+              <a:rPr lang="en-US" dirty="0" smtClean="0"/>
+              <a:t>Possible Future Work</a:t>
+            </a:r>
+            <a:endParaRPr lang="en-US" dirty="0"/>
+          </a:p>
+        </p:txBody>
+      </p:sp>
+      <p:sp>
+        <p:nvSpPr>
+          <p:cNvPr id="3" name="Content Placeholder 2"/>
+          <p:cNvSpPr>
+            <a:spLocks noGrp="1"/>
+          </p:cNvSpPr>
+          <p:nvPr>
+            <p:ph idx="1"/>
+          </p:nvPr>
+        </p:nvSpPr>
+        <p:spPr>
+          <a:xfrm>
+            <a:off x="914400" y="1752600"/>
+            <a:ext cx="7391400" cy="4556761"/>
+          </a:xfrm>
+        </p:spPr>
+        <p:txBody>
+          <a:bodyPr>
+            <a:normAutofit/>
+          </a:bodyPr>
+          <a:lstStyle/>
+          <a:p>
+            <a:pPr>
+              <a:lnSpc>
+                <a:spcPct val="200000"/>
+              </a:lnSpc>
+            </a:pPr>
+            <a:r>
+              <a:rPr lang="en-US" sz="2800" dirty="0" smtClean="0"/>
+              <a:t>Ability to upload existing hardcopy files</a:t>
+            </a:r>
+          </a:p>
+          <a:p>
+            <a:pPr>
+              <a:lnSpc>
+                <a:spcPct val="200000"/>
+              </a:lnSpc>
+            </a:pPr>
+            <a:r>
+              <a:rPr lang="en-US" sz="2800" dirty="0" smtClean="0"/>
+              <a:t>Prescriptions:</a:t>
+            </a:r>
+          </a:p>
+          <a:p>
+            <a:pPr lvl="1">
+              <a:lnSpc>
+                <a:spcPct val="200000"/>
+              </a:lnSpc>
+            </a:pPr>
+            <a:r>
+              <a:rPr lang="en-US" sz="2600" dirty="0" smtClean="0"/>
+              <a:t>Add</a:t>
+            </a:r>
+          </a:p>
+          <a:p>
+            <a:pPr lvl="1">
+              <a:lnSpc>
+                <a:spcPct val="200000"/>
+              </a:lnSpc>
+            </a:pPr>
+            <a:r>
+              <a:rPr lang="en-US" sz="2600" dirty="0" smtClean="0"/>
+              <a:t>Update</a:t>
+            </a:r>
+          </a:p>
+          <a:p>
+            <a:pPr lvl="1">
+              <a:lnSpc>
+                <a:spcPct val="200000"/>
+              </a:lnSpc>
+            </a:pPr>
+            <a:r>
+              <a:rPr lang="en-US" sz="2600" dirty="0" smtClean="0"/>
               <a:t>Control dispensing</a:t>
             </a:r>
             <a:endParaRPr lang="en-US" sz="2800" dirty="0" smtClean="0"/>
@@ -5487,7 +6147,7 @@
           <a:p>
             <a:fld id="{85816456-AF90-4826-9770-6E0598D9C364}" type="slidenum">
               <a:rPr lang="en-US" smtClean="0"/>
-              <a:t>11</a:t>
+              <a:t>12</a:t>
             </a:fld>
             <a:endParaRPr lang="en-US" dirty="0"/>
           </a:p>
@@ -5601,11 +6261,7 @@
           <a:p>
             <a:r>
               <a:rPr lang="en-US" dirty="0" smtClean="0"/>
-              <a:t>HIV/AIDS </a:t>
-            </a:r>
-            <a:r>
-              <a:rPr lang="en-US" dirty="0" smtClean="0"/>
-              <a:t>population</a:t>
+              <a:t>HIV/AIDS population</a:t>
             </a:r>
           </a:p>
           <a:p>
@@ -5613,7 +6269,6 @@
               <a:rPr lang="en-US" dirty="0" smtClean="0"/>
               <a:t>[See notes]</a:t>
             </a:r>
-            <a:endParaRPr lang="en-US" dirty="0" smtClean="0"/>
           </a:p>
           <a:p>
             <a:endParaRPr lang="en-US" dirty="0"/>
@@ -5690,20 +6345,20 @@
             <p:ph type="title"/>
           </p:nvPr>
         </p:nvSpPr>
-        <p:spPr>
-          <a:xfrm>
-            <a:off x="914400" y="152400"/>
-            <a:ext cx="7315200" cy="1154097"/>
-          </a:xfrm>
-        </p:spPr>
-        <p:txBody>
-          <a:bodyPr/>
-          <a:lstStyle/>
-          <a:p>
-            <a:pPr algn="ctr"/>
+        <p:spPr/>
+        <p:txBody>
+          <a:bodyPr>
+            <a:normAutofit fontScale="90000"/>
+          </a:bodyPr>
+          <a:lstStyle/>
+          <a:p>
+            <a:r>
+              <a:rPr lang="en-US" dirty="0"/>
+              <a:t>Background on HIPAA </a:t>
+            </a:r>
             <a:r>
               <a:rPr lang="en-US" dirty="0" smtClean="0"/>
-              <a:t>Problem Statement</a:t>
+              <a:t>security rules</a:t>
             </a:r>
             <a:endParaRPr lang="en-US" dirty="0"/>
           </a:p>
@@ -5719,72 +6374,12 @@
             <p:ph idx="1"/>
           </p:nvPr>
         </p:nvSpPr>
-        <p:spPr>
-          <a:xfrm>
-            <a:off x="914400" y="1828800"/>
-            <a:ext cx="7315200" cy="3810000"/>
-          </a:xfrm>
-        </p:spPr>
-        <p:txBody>
-          <a:bodyPr>
-            <a:normAutofit/>
-          </a:bodyPr>
-          <a:lstStyle/>
-          <a:p>
-            <a:pPr lvl="1">
-              <a:lnSpc>
-                <a:spcPct val="150000"/>
-              </a:lnSpc>
-            </a:pPr>
-            <a:r>
-              <a:rPr lang="en-US" sz="3000" dirty="0" smtClean="0"/>
-              <a:t>Loss/Damage to patient files</a:t>
-            </a:r>
-            <a:endParaRPr lang="en-US" sz="3000" dirty="0"/>
-          </a:p>
-          <a:p>
-            <a:pPr lvl="1">
-              <a:lnSpc>
-                <a:spcPct val="150000"/>
-              </a:lnSpc>
-            </a:pPr>
-            <a:r>
-              <a:rPr lang="en-US" sz="3000" dirty="0"/>
-              <a:t>Delay or hinder treatment </a:t>
-            </a:r>
-            <a:r>
-              <a:rPr lang="en-US" sz="3000" dirty="0" smtClean="0"/>
-              <a:t>progress</a:t>
-            </a:r>
-          </a:p>
-          <a:p>
-            <a:pPr lvl="1">
-              <a:lnSpc>
-                <a:spcPct val="150000"/>
-              </a:lnSpc>
-            </a:pPr>
-            <a:r>
-              <a:rPr lang="en-US" sz="3000" dirty="0" smtClean="0"/>
-              <a:t>Confidentiality of patient files</a:t>
-            </a:r>
-          </a:p>
-          <a:p>
-            <a:pPr lvl="1">
-              <a:lnSpc>
-                <a:spcPct val="150000"/>
-              </a:lnSpc>
-            </a:pPr>
-            <a:r>
-              <a:rPr lang="en-US" sz="3000" dirty="0" smtClean="0"/>
-              <a:t>Data integrity</a:t>
-            </a:r>
-            <a:endParaRPr lang="en-US" sz="3000" dirty="0"/>
-          </a:p>
-          <a:p>
-            <a:pPr marL="45720" indent="0">
-              <a:buNone/>
-            </a:pPr>
-            <a:endParaRPr lang="en-US" dirty="0"/>
+        <p:spPr/>
+        <p:txBody>
+          <a:bodyPr/>
+          <a:lstStyle/>
+          <a:p>
+            <a:endParaRPr lang="en-US"/>
           </a:p>
         </p:txBody>
       </p:sp>
@@ -5814,20 +6409,13 @@
     </p:spTree>
     <p:extLst>
       <p:ext uri="{BB962C8B-B14F-4D97-AF65-F5344CB8AC3E}">
-        <p14:creationId xmlns:p14="http://schemas.microsoft.com/office/powerpoint/2010/main" val="941291479"/>
+        <p14:creationId xmlns:p14="http://schemas.microsoft.com/office/powerpoint/2010/main" val="1742816927"/>
       </p:ext>
     </p:extLst>
   </p:cSld>
   <p:clrMapOvr>
     <a:masterClrMapping/>
   </p:clrMapOvr>
-  <p:timing>
-    <p:tnLst>
-      <p:par>
-        <p:cTn id="1" dur="indefinite" restart="never" nodeType="tmRoot"/>
-      </p:par>
-    </p:tnLst>
-  </p:timing>
 </p:sld>
 </file>
 
@@ -5860,18 +6448,20 @@
         </p:nvSpPr>
         <p:spPr>
           <a:xfrm>
-            <a:off x="914400" y="141303"/>
-            <a:ext cx="7315200" cy="1154097"/>
+            <a:off x="0" y="228600"/>
+            <a:ext cx="8458200" cy="1219200"/>
           </a:xfrm>
         </p:spPr>
         <p:txBody>
-          <a:bodyPr/>
+          <a:bodyPr>
+            <a:normAutofit fontScale="90000"/>
+          </a:bodyPr>
           <a:lstStyle/>
           <a:p>
             <a:pPr algn="ctr"/>
             <a:r>
               <a:rPr lang="en-US" dirty="0" smtClean="0"/>
-              <a:t>Motivation</a:t>
+              <a:t>Electronic Medical Records Management Systems Overview </a:t>
             </a:r>
             <a:endParaRPr lang="en-US" dirty="0"/>
           </a:p>
@@ -5889,109 +6479,70 @@
         </p:nvSpPr>
         <p:spPr>
           <a:xfrm>
-            <a:off x="914400" y="1676400"/>
-            <a:ext cx="7315200" cy="4343400"/>
+            <a:off x="876300" y="1676400"/>
+            <a:ext cx="7315200" cy="3809999"/>
           </a:xfrm>
         </p:spPr>
         <p:txBody>
           <a:bodyPr>
-            <a:normAutofit fontScale="85000" lnSpcReduction="10000"/>
+            <a:normAutofit/>
           </a:bodyPr>
           <a:lstStyle/>
           <a:p>
             <a:pPr>
               <a:lnSpc>
-                <a:spcPct val="160000"/>
+                <a:spcPct val="200000"/>
               </a:lnSpc>
             </a:pPr>
             <a:r>
-              <a:rPr lang="en-US" sz="2800" dirty="0" smtClean="0"/>
-              <a:t>Improved medical records management system</a:t>
-            </a:r>
-          </a:p>
-          <a:p>
-            <a:pPr lvl="1">
+              <a:rPr lang="en-US" sz="3200" dirty="0" smtClean="0"/>
+              <a:t>Enforce </a:t>
+            </a:r>
+            <a:r>
+              <a:rPr lang="en-US" sz="3200" dirty="0"/>
+              <a:t>p</a:t>
+            </a:r>
+            <a:r>
+              <a:rPr lang="en-US" sz="3200" dirty="0" smtClean="0"/>
+              <a:t>atient confidentiality</a:t>
+            </a:r>
+          </a:p>
+          <a:p>
+            <a:pPr>
               <a:lnSpc>
-                <a:spcPct val="160000"/>
+                <a:spcPct val="200000"/>
               </a:lnSpc>
             </a:pPr>
             <a:r>
-              <a:rPr lang="en-US" sz="2600" dirty="0" smtClean="0"/>
-              <a:t>Secure</a:t>
-            </a:r>
-          </a:p>
-          <a:p>
-            <a:pPr lvl="1">
+              <a:rPr lang="en-US" sz="3200" dirty="0" smtClean="0"/>
+              <a:t>Ensure data integrity</a:t>
+            </a:r>
+          </a:p>
+          <a:p>
+            <a:pPr>
               <a:lnSpc>
-                <a:spcPct val="160000"/>
+                <a:spcPct val="200000"/>
               </a:lnSpc>
             </a:pPr>
             <a:r>
-              <a:rPr lang="en-US" sz="2600" dirty="0" smtClean="0"/>
-              <a:t>Easy </a:t>
-            </a:r>
-            <a:r>
-              <a:rPr lang="en-US" sz="2600" dirty="0"/>
-              <a:t>to </a:t>
-            </a:r>
-            <a:r>
-              <a:rPr lang="en-US" sz="2600" dirty="0" smtClean="0"/>
-              <a:t>use</a:t>
-            </a:r>
+              <a:rPr lang="en-US" sz="3200" dirty="0" smtClean="0"/>
+              <a:t>HIPAA </a:t>
+            </a:r>
+            <a:endParaRPr lang="en-US" sz="3200" dirty="0"/>
           </a:p>
           <a:p>
             <a:pPr>
               <a:lnSpc>
-                <a:spcPct val="160000"/>
+                <a:spcPct val="200000"/>
               </a:lnSpc>
             </a:pPr>
-            <a:r>
-              <a:rPr lang="en-US" sz="2800" dirty="0" smtClean="0"/>
-              <a:t>Proposed Solution</a:t>
-            </a:r>
-          </a:p>
-          <a:p>
-            <a:pPr lvl="1">
-              <a:lnSpc>
-                <a:spcPct val="160000"/>
-              </a:lnSpc>
-            </a:pPr>
-            <a:r>
-              <a:rPr lang="en-US" sz="2600" dirty="0" smtClean="0"/>
-              <a:t>Enforce </a:t>
-            </a:r>
-            <a:r>
-              <a:rPr lang="en-US" sz="2600" dirty="0"/>
-              <a:t>patient confidentiality</a:t>
-            </a:r>
-          </a:p>
-          <a:p>
-            <a:pPr lvl="1">
-              <a:lnSpc>
-                <a:spcPct val="160000"/>
-              </a:lnSpc>
-            </a:pPr>
-            <a:r>
-              <a:rPr lang="en-US" sz="2600" dirty="0"/>
-              <a:t>Ensure data integrity</a:t>
-            </a:r>
-          </a:p>
-          <a:p>
-            <a:pPr lvl="1">
-              <a:lnSpc>
-                <a:spcPct val="160000"/>
-              </a:lnSpc>
-            </a:pPr>
-            <a:r>
-              <a:rPr lang="en-US" sz="2600" dirty="0"/>
-              <a:t>HIPAA </a:t>
-            </a:r>
-          </a:p>
-        </p:txBody>
-      </p:sp>
-      <p:sp>
-        <p:nvSpPr>
-          <p:cNvPr id="4" name="Slide Number Placeholder 3"/>
+            <a:endParaRPr lang="en-US" sz="3200" dirty="0" smtClean="0"/>
+          </a:p>
+        </p:txBody>
+      </p:sp>
+      <p:sp>
+        <p:nvSpPr>
+          <p:cNvPr id="7" name="Slide Number Placeholder 6"/>
           <p:cNvSpPr>
             <a:spLocks noGrp="1"/>
           </p:cNvSpPr>
@@ -6015,7 +6566,7 @@
     </p:spTree>
     <p:extLst>
       <p:ext uri="{BB962C8B-B14F-4D97-AF65-F5344CB8AC3E}">
-        <p14:creationId xmlns:p14="http://schemas.microsoft.com/office/powerpoint/2010/main" val="2035189606"/>
+        <p14:creationId xmlns:p14="http://schemas.microsoft.com/office/powerpoint/2010/main" val="2383770867"/>
       </p:ext>
     </p:extLst>
   </p:cSld>
@@ -6556,20 +7107,18 @@
         </p:nvSpPr>
         <p:spPr>
           <a:xfrm>
-            <a:off x="0" y="228600"/>
-            <a:ext cx="8458200" cy="1219200"/>
+            <a:off x="914400" y="152400"/>
+            <a:ext cx="7315200" cy="1154097"/>
           </a:xfrm>
         </p:spPr>
         <p:txBody>
-          <a:bodyPr>
-            <a:normAutofit fontScale="90000"/>
-          </a:bodyPr>
+          <a:bodyPr/>
           <a:lstStyle/>
           <a:p>
             <a:pPr algn="ctr"/>
             <a:r>
               <a:rPr lang="en-US" dirty="0" smtClean="0"/>
-              <a:t>Electronic Medical Records Management Systems Overview </a:t>
+              <a:t>Problem Statement</a:t>
             </a:r>
             <a:endParaRPr lang="en-US" dirty="0"/>
           </a:p>
@@ -6587,8 +7136,8 @@
         </p:nvSpPr>
         <p:spPr>
           <a:xfrm>
-            <a:off x="876300" y="1676400"/>
-            <a:ext cx="7315200" cy="3809999"/>
+            <a:off x="914400" y="1828800"/>
+            <a:ext cx="7315200" cy="3810000"/>
           </a:xfrm>
         </p:spPr>
         <p:txBody>
@@ -6597,60 +7146,66 @@
           </a:bodyPr>
           <a:lstStyle/>
           <a:p>
-            <a:pPr>
+            <a:pPr lvl="1">
               <a:lnSpc>
-                <a:spcPct val="200000"/>
+                <a:spcPct val="150000"/>
               </a:lnSpc>
             </a:pPr>
             <a:r>
-              <a:rPr lang="en-US" sz="3200" dirty="0" smtClean="0"/>
-              <a:t>Enforce </a:t>
-            </a:r>
-            <a:r>
-              <a:rPr lang="en-US" sz="3200" dirty="0"/>
-              <a:t>p</a:t>
-            </a:r>
-            <a:r>
-              <a:rPr lang="en-US" sz="3200" dirty="0" smtClean="0"/>
-              <a:t>atient confidentiality</a:t>
-            </a:r>
-          </a:p>
-          <a:p>
-            <a:pPr>
+              <a:rPr lang="en-US" sz="3000" dirty="0" smtClean="0"/>
+              <a:t>Loss/Damage to patient files</a:t>
+            </a:r>
+            <a:endParaRPr lang="en-US" sz="3000" dirty="0"/>
+          </a:p>
+          <a:p>
+            <a:pPr lvl="1">
               <a:lnSpc>
-                <a:spcPct val="200000"/>
+                <a:spcPct val="150000"/>
               </a:lnSpc>
             </a:pPr>
             <a:r>
-              <a:rPr lang="en-US" sz="3200" dirty="0" smtClean="0"/>
-              <a:t>Ensure data integrity</a:t>
-            </a:r>
-          </a:p>
-          <a:p>
-            <a:pPr>
+              <a:rPr lang="en-US" sz="3000" dirty="0"/>
+              <a:t>Delay or hinder treatment </a:t>
+            </a:r>
+            <a:r>
+              <a:rPr lang="en-US" sz="3000" dirty="0" smtClean="0"/>
+              <a:t>progress</a:t>
+            </a:r>
+          </a:p>
+          <a:p>
+            <a:pPr lvl="1">
               <a:lnSpc>
-                <a:spcPct val="200000"/>
+                <a:spcPct val="150000"/>
               </a:lnSpc>
             </a:pPr>
             <a:r>
-              <a:rPr lang="en-US" sz="3200" dirty="0" smtClean="0"/>
-              <a:t>HIPAA </a:t>
-            </a:r>
-            <a:endParaRPr lang="en-US" sz="3200" dirty="0"/>
-          </a:p>
-          <a:p>
-            <a:pPr>
+              <a:rPr lang="en-US" sz="3000" dirty="0" smtClean="0"/>
+              <a:t>Confidentiality of patient files</a:t>
+            </a:r>
+          </a:p>
+          <a:p>
+            <a:pPr lvl="1">
               <a:lnSpc>
-                <a:spcPct val="200000"/>
+                <a:spcPct val="150000"/>
               </a:lnSpc>
             </a:pPr>
-            <a:endParaRPr lang="en-US" sz="3200" dirty="0" smtClean="0"/>
-          </a:p>
-        </p:txBody>
-      </p:sp>
-      <p:sp>
-        <p:nvSpPr>
-          <p:cNvPr id="7" name="Slide Number Placeholder 6"/>
+            <a:r>
+              <a:rPr lang="en-US" sz="3000" dirty="0" smtClean="0"/>
+              <a:t>Data integrity</a:t>
+            </a:r>
+            <a:endParaRPr lang="en-US" sz="3000" dirty="0"/>
+          </a:p>
+          <a:p>
+            <a:pPr marL="45720" indent="0">
+              <a:buNone/>
+            </a:pPr>
+            <a:endParaRPr lang="en-US" dirty="0"/>
+          </a:p>
+        </p:txBody>
+      </p:sp>
+      <p:sp>
+        <p:nvSpPr>
+          <p:cNvPr id="4" name="Slide Number Placeholder 3"/>
           <p:cNvSpPr>
             <a:spLocks noGrp="1"/>
           </p:cNvSpPr>
@@ -6674,7 +7229,7 @@
     </p:spTree>
     <p:extLst>
       <p:ext uri="{BB962C8B-B14F-4D97-AF65-F5344CB8AC3E}">
-        <p14:creationId xmlns:p14="http://schemas.microsoft.com/office/powerpoint/2010/main" val="2383770867"/>
+        <p14:creationId xmlns:p14="http://schemas.microsoft.com/office/powerpoint/2010/main" val="941291479"/>
       </p:ext>
     </p:extLst>
   </p:cSld>
@@ -6720,20 +7275,18 @@
         </p:nvSpPr>
         <p:spPr>
           <a:xfrm>
-            <a:off x="0" y="381000"/>
-            <a:ext cx="8458200" cy="793812"/>
+            <a:off x="914400" y="141303"/>
+            <a:ext cx="7315200" cy="1154097"/>
           </a:xfrm>
         </p:spPr>
         <p:txBody>
-          <a:bodyPr>
-            <a:normAutofit/>
-          </a:bodyPr>
+          <a:bodyPr/>
           <a:lstStyle/>
           <a:p>
             <a:pPr algn="ctr"/>
             <a:r>
               <a:rPr lang="en-US" dirty="0" smtClean="0"/>
-              <a:t>Proposed Implementation</a:t>
+              <a:t>Motivation</a:t>
             </a:r>
             <a:endParaRPr lang="en-US" dirty="0"/>
           </a:p>
@@ -6752,61 +7305,108 @@
         <p:spPr>
           <a:xfrm>
             <a:off x="914400" y="1676400"/>
-            <a:ext cx="7315200" cy="4632961"/>
+            <a:ext cx="7315200" cy="4343400"/>
           </a:xfrm>
         </p:spPr>
         <p:txBody>
           <a:bodyPr>
-            <a:normAutofit/>
+            <a:normAutofit fontScale="85000" lnSpcReduction="10000"/>
           </a:bodyPr>
           <a:lstStyle/>
           <a:p>
             <a:pPr>
               <a:lnSpc>
-                <a:spcPct val="200000"/>
+                <a:spcPct val="160000"/>
               </a:lnSpc>
             </a:pPr>
             <a:r>
               <a:rPr lang="en-US" sz="2800" dirty="0" smtClean="0"/>
-              <a:t>Much simpler than </a:t>
-            </a:r>
-            <a:r>
-              <a:rPr lang="en-US" sz="2800" dirty="0" err="1" smtClean="0"/>
-              <a:t>OpenEMR</a:t>
-            </a:r>
-            <a:r>
-              <a:rPr lang="en-US" sz="2800" dirty="0" smtClean="0"/>
-              <a:t>, removed many unneeded features. </a:t>
+              <a:t>Improved medical records management system</a:t>
+            </a:r>
+          </a:p>
+          <a:p>
+            <a:pPr lvl="1">
+              <a:lnSpc>
+                <a:spcPct val="160000"/>
+              </a:lnSpc>
+            </a:pPr>
+            <a:r>
+              <a:rPr lang="en-US" sz="2600" dirty="0" smtClean="0"/>
+              <a:t>Secure</a:t>
+            </a:r>
+          </a:p>
+          <a:p>
+            <a:pPr lvl="1">
+              <a:lnSpc>
+                <a:spcPct val="160000"/>
+              </a:lnSpc>
+            </a:pPr>
+            <a:r>
+              <a:rPr lang="en-US" sz="2600" dirty="0" smtClean="0"/>
+              <a:t>Easy </a:t>
+            </a:r>
+            <a:r>
+              <a:rPr lang="en-US" sz="2600" dirty="0"/>
+              <a:t>to </a:t>
+            </a:r>
+            <a:r>
+              <a:rPr lang="en-US" sz="2600" dirty="0" smtClean="0"/>
+              <a:t>use</a:t>
             </a:r>
           </a:p>
           <a:p>
             <a:pPr>
               <a:lnSpc>
-                <a:spcPct val="200000"/>
+                <a:spcPct val="160000"/>
               </a:lnSpc>
             </a:pPr>
             <a:r>
               <a:rPr lang="en-US" sz="2800" dirty="0" smtClean="0"/>
-              <a:t>Onsite Access through intranet (LAN).</a:t>
-            </a:r>
-          </a:p>
-          <a:p>
-            <a:pPr>
+              <a:t>Proposed Solution</a:t>
+            </a:r>
+          </a:p>
+          <a:p>
+            <a:pPr lvl="1">
               <a:lnSpc>
-                <a:spcPct val="200000"/>
+                <a:spcPct val="160000"/>
               </a:lnSpc>
             </a:pPr>
             <a:r>
-              <a:rPr lang="en-US" sz="2800" dirty="0" smtClean="0"/>
-              <a:t>SSL Encryption </a:t>
-            </a:r>
-            <a:endParaRPr lang="en-US" sz="2800" dirty="0"/>
-          </a:p>
-        </p:txBody>
-      </p:sp>
-      <p:sp>
-        <p:nvSpPr>
-          <p:cNvPr id="7" name="Slide Number Placeholder 6"/>
+              <a:rPr lang="en-US" sz="2600" dirty="0" smtClean="0"/>
+              <a:t>Enforce </a:t>
+            </a:r>
+            <a:r>
+              <a:rPr lang="en-US" sz="2600" dirty="0"/>
+              <a:t>patient confidentiality</a:t>
+            </a:r>
+          </a:p>
+          <a:p>
+            <a:pPr lvl="1">
+              <a:lnSpc>
+                <a:spcPct val="160000"/>
+              </a:lnSpc>
+            </a:pPr>
+            <a:r>
+              <a:rPr lang="en-US" sz="2600" dirty="0"/>
+              <a:t>Ensure data integrity</a:t>
+            </a:r>
+          </a:p>
+          <a:p>
+            <a:pPr lvl="1">
+              <a:lnSpc>
+                <a:spcPct val="160000"/>
+              </a:lnSpc>
+            </a:pPr>
+            <a:r>
+              <a:rPr lang="en-US" sz="2600" dirty="0"/>
+              <a:t>HIPAA </a:t>
+            </a:r>
+          </a:p>
+        </p:txBody>
+      </p:sp>
+      <p:sp>
+        <p:nvSpPr>
+          <p:cNvPr id="4" name="Slide Number Placeholder 3"/>
           <p:cNvSpPr>
             <a:spLocks noGrp="1"/>
           </p:cNvSpPr>
@@ -6827,40 +7427,10 @@
           </a:p>
         </p:txBody>
       </p:sp>
-      <p:pic>
-        <p:nvPicPr>
-          <p:cNvPr id="5" name="Picture 4"/>
-          <p:cNvPicPr>
-            <a:picLocks noChangeAspect="1"/>
-          </p:cNvPicPr>
-          <p:nvPr/>
-        </p:nvPicPr>
-        <p:blipFill>
-          <a:blip r:embed="rId3">
-            <a:extLst>
-              <a:ext uri="{28A0092B-C50C-407E-A947-70E740481C1C}">
-                <a14:useLocalDpi xmlns:a14="http://schemas.microsoft.com/office/drawing/2010/main" val="0"/>
-              </a:ext>
-            </a:extLst>
-          </a:blip>
-          <a:stretch>
-            <a:fillRect/>
-          </a:stretch>
-        </p:blipFill>
-        <p:spPr>
-          <a:xfrm>
-            <a:off x="6934200" y="4953000"/>
-            <a:ext cx="1773418" cy="1573730"/>
-          </a:xfrm>
-          <a:prstGeom prst="rect">
-            <a:avLst/>
-          </a:prstGeom>
-        </p:spPr>
-      </p:pic>
     </p:spTree>
     <p:extLst>
       <p:ext uri="{BB962C8B-B14F-4D97-AF65-F5344CB8AC3E}">
-        <p14:creationId xmlns:p14="http://schemas.microsoft.com/office/powerpoint/2010/main" val="1669242324"/>
+        <p14:creationId xmlns:p14="http://schemas.microsoft.com/office/powerpoint/2010/main" val="2035189606"/>
       </p:ext>
     </p:extLst>
   </p:cSld>
@@ -6957,7 +7527,7 @@
           </p:nvPr>
         </p:nvPicPr>
         <p:blipFill>
-          <a:blip r:embed="rId2">
+          <a:blip r:embed="rId3">
             <a:extLst>
               <a:ext uri="{28A0092B-C50C-407E-A947-70E740481C1C}">
                 <a14:useLocalDpi xmlns:a14="http://schemas.microsoft.com/office/drawing/2010/main" val="0"/>

</xml_diff>

<commit_message>
Added the beginning of a script... changed the powerpoint a bit
</commit_message>
<xml_diff>
--- a/Documentation/Final_Presentation.pptx
+++ b/Documentation/Final_Presentation.pptx
@@ -5,7 +5,7 @@
     <p:sldMasterId id="2147483672" r:id="rId1"/>
   </p:sldMasterIdLst>
   <p:notesMasterIdLst>
-    <p:notesMasterId r:id="rId14"/>
+    <p:notesMasterId r:id="rId15"/>
   </p:notesMasterIdLst>
   <p:sldIdLst>
     <p:sldId id="256" r:id="rId2"/>
@@ -17,9 +17,10 @@
     <p:sldId id="266" r:id="rId8"/>
     <p:sldId id="267" r:id="rId9"/>
     <p:sldId id="268" r:id="rId10"/>
-    <p:sldId id="260" r:id="rId11"/>
-    <p:sldId id="270" r:id="rId12"/>
-    <p:sldId id="263" r:id="rId13"/>
+    <p:sldId id="272" r:id="rId11"/>
+    <p:sldId id="260" r:id="rId12"/>
+    <p:sldId id="270" r:id="rId13"/>
+    <p:sldId id="263" r:id="rId14"/>
   </p:sldIdLst>
   <p:sldSz cx="9144000" cy="6858000" type="screen4x3"/>
   <p:notesSz cx="7010400" cy="9296400"/>
@@ -620,13 +621,8 @@
           <a:p>
             <a:r>
               <a:rPr lang="en-US" baseline="0" dirty="0" smtClean="0"/>
-              <a:t>User group access control (see here </a:t>
-            </a:r>
-            <a:r>
-              <a:rPr lang="en-US" baseline="0" smtClean="0"/>
-              <a:t>for explanations: http://www.tonymarston.net/php-mysql/role-based-access-control.html)</a:t>
-            </a:r>
-            <a:endParaRPr lang="en-US" baseline="0" dirty="0" smtClean="0"/>
+              <a:t>User group access control (see here for explanations: http://www.tonymarston.net/php-mysql/role-based-access-control.html)</a:t>
+            </a:r>
           </a:p>
           <a:p>
             <a:r>
@@ -801,7 +797,7 @@
           <a:p>
             <a:fld id="{6538AC3F-63CE-4DD6-92CD-9B13526C2825}" type="slidenum">
               <a:rPr lang="en-US" smtClean="0"/>
-              <a:t>10</a:t>
+              <a:t>11</a:t>
             </a:fld>
             <a:endParaRPr lang="en-US"/>
           </a:p>
@@ -893,7 +889,7 @@
           <a:p>
             <a:fld id="{6538AC3F-63CE-4DD6-92CD-9B13526C2825}" type="slidenum">
               <a:rPr lang="en-US" smtClean="0"/>
-              <a:t>11</a:t>
+              <a:t>12</a:t>
             </a:fld>
             <a:endParaRPr lang="en-US"/>
           </a:p>
@@ -985,7 +981,7 @@
           <a:p>
             <a:fld id="{6538AC3F-63CE-4DD6-92CD-9B13526C2825}" type="slidenum">
               <a:rPr lang="en-US" smtClean="0"/>
-              <a:t>12</a:t>
+              <a:t>13</a:t>
             </a:fld>
             <a:endParaRPr lang="en-US"/>
           </a:p>
@@ -5662,6 +5658,151 @@
         </p:nvSpPr>
         <p:spPr>
           <a:xfrm>
+            <a:off x="0" y="533401"/>
+            <a:ext cx="8382000" cy="609599"/>
+          </a:xfrm>
+        </p:spPr>
+        <p:txBody>
+          <a:bodyPr>
+            <a:normAutofit fontScale="90000"/>
+          </a:bodyPr>
+          <a:lstStyle/>
+          <a:p>
+            <a:pPr algn="ctr"/>
+            <a:r>
+              <a:rPr lang="en-US" dirty="0" smtClean="0"/>
+              <a:t>Proposed Implementation</a:t>
+            </a:r>
+            <a:endParaRPr lang="en-US" dirty="0"/>
+          </a:p>
+        </p:txBody>
+      </p:sp>
+      <p:sp>
+        <p:nvSpPr>
+          <p:cNvPr id="3" name="Content Placeholder 2"/>
+          <p:cNvSpPr>
+            <a:spLocks noGrp="1"/>
+          </p:cNvSpPr>
+          <p:nvPr>
+            <p:ph idx="1"/>
+          </p:nvPr>
+        </p:nvSpPr>
+        <p:spPr>
+          <a:xfrm>
+            <a:off x="914400" y="2133599"/>
+            <a:ext cx="7315200" cy="4175761"/>
+          </a:xfrm>
+        </p:spPr>
+        <p:txBody>
+          <a:bodyPr>
+            <a:normAutofit/>
+          </a:bodyPr>
+          <a:lstStyle/>
+          <a:p>
+            <a:r>
+              <a:rPr lang="en-US" sz="2800" dirty="0"/>
+              <a:t>Much simpler than </a:t>
+            </a:r>
+            <a:r>
+              <a:rPr lang="en-US" sz="2800" dirty="0" err="1"/>
+              <a:t>OpenEMR</a:t>
+            </a:r>
+            <a:r>
+              <a:rPr lang="en-US" sz="2800" dirty="0"/>
+              <a:t>, removed many unneeded features. </a:t>
+            </a:r>
+          </a:p>
+          <a:p>
+            <a:r>
+              <a:rPr lang="en-US" sz="2800" dirty="0"/>
+              <a:t>Onsite Access through intranet (LAN).</a:t>
+            </a:r>
+          </a:p>
+          <a:p>
+            <a:r>
+              <a:rPr lang="en-US" sz="2800" dirty="0"/>
+              <a:t>SSL </a:t>
+            </a:r>
+            <a:r>
+              <a:rPr lang="en-US" sz="2800" dirty="0" smtClean="0"/>
+              <a:t>Encryption</a:t>
+            </a:r>
+            <a:endParaRPr lang="en-US" sz="2800" dirty="0"/>
+          </a:p>
+        </p:txBody>
+      </p:sp>
+      <p:sp>
+        <p:nvSpPr>
+          <p:cNvPr id="4" name="Slide Number Placeholder 3"/>
+          <p:cNvSpPr>
+            <a:spLocks noGrp="1"/>
+          </p:cNvSpPr>
+          <p:nvPr>
+            <p:ph type="sldNum" sz="quarter" idx="12"/>
+          </p:nvPr>
+        </p:nvSpPr>
+        <p:spPr/>
+        <p:txBody>
+          <a:bodyPr/>
+          <a:lstStyle/>
+          <a:p>
+            <a:fld id="{85816456-AF90-4826-9770-6E0598D9C364}" type="slidenum">
+              <a:rPr lang="en-US" smtClean="0"/>
+              <a:t>10</a:t>
+            </a:fld>
+            <a:endParaRPr lang="en-US" dirty="0"/>
+          </a:p>
+        </p:txBody>
+      </p:sp>
+    </p:spTree>
+    <p:extLst>
+      <p:ext uri="{BB962C8B-B14F-4D97-AF65-F5344CB8AC3E}">
+        <p14:creationId xmlns:p14="http://schemas.microsoft.com/office/powerpoint/2010/main" val="2684764040"/>
+      </p:ext>
+    </p:extLst>
+  </p:cSld>
+  <p:clrMapOvr>
+    <a:masterClrMapping/>
+  </p:clrMapOvr>
+  <p:timing>
+    <p:tnLst>
+      <p:par>
+        <p:cTn id="1" dur="indefinite" restart="never" nodeType="tmRoot"/>
+      </p:par>
+    </p:tnLst>
+  </p:timing>
+</p:sld>
+</file>
+
+<file path=ppt/slides/slide11.xml><?xml version="1.0" encoding="utf-8"?>
+<p:sld xmlns:a="http://schemas.openxmlformats.org/drawingml/2006/main" xmlns:r="http://schemas.openxmlformats.org/officeDocument/2006/relationships" xmlns:p="http://schemas.openxmlformats.org/presentationml/2006/main">
+  <p:cSld>
+    <p:spTree>
+      <p:nvGrpSpPr>
+        <p:cNvPr id="1" name=""/>
+        <p:cNvGrpSpPr/>
+        <p:nvPr/>
+      </p:nvGrpSpPr>
+      <p:grpSpPr>
+        <a:xfrm>
+          <a:off x="0" y="0"/>
+          <a:ext cx="0" cy="0"/>
+          <a:chOff x="0" y="0"/>
+          <a:chExt cx="0" cy="0"/>
+        </a:xfrm>
+      </p:grpSpPr>
+      <p:sp>
+        <p:nvSpPr>
+          <p:cNvPr id="2" name="Title 1"/>
+          <p:cNvSpPr>
+            <a:spLocks noGrp="1"/>
+          </p:cNvSpPr>
+          <p:nvPr>
+            <p:ph type="title"/>
+          </p:nvPr>
+        </p:nvSpPr>
+        <p:spPr>
+          <a:xfrm>
             <a:off x="0" y="381000"/>
             <a:ext cx="8458200" cy="793812"/>
           </a:xfrm>
@@ -5675,7 +5816,11 @@
             <a:pPr algn="ctr"/>
             <a:r>
               <a:rPr lang="en-US" dirty="0" smtClean="0"/>
-              <a:t>Solution highlights</a:t>
+              <a:t>Solution </a:t>
+            </a:r>
+            <a:r>
+              <a:rPr lang="en-US" dirty="0" smtClean="0"/>
+              <a:t>Highlights</a:t>
             </a:r>
             <a:endParaRPr lang="en-US" dirty="0"/>
           </a:p>
@@ -5703,47 +5848,48 @@
           </a:bodyPr>
           <a:lstStyle/>
           <a:p>
-            <a:pPr>
-              <a:lnSpc>
-                <a:spcPct val="200000"/>
-              </a:lnSpc>
-            </a:pPr>
+            <a:r>
+              <a:rPr lang="en-US" sz="2800" dirty="0"/>
+              <a:t>User group access </a:t>
+            </a:r>
             <a:r>
               <a:rPr lang="en-US" sz="2800" dirty="0" smtClean="0"/>
-              <a:t>Much simpler than </a:t>
-            </a:r>
-            <a:r>
-              <a:rPr lang="en-US" sz="2800" dirty="0" err="1" smtClean="0"/>
-              <a:t>OpenEMR</a:t>
-            </a:r>
+              <a:t>control</a:t>
+            </a:r>
+          </a:p>
+          <a:p>
             <a:r>
               <a:rPr lang="en-US" sz="2800" dirty="0" smtClean="0"/>
-              <a:t>, removed many unneeded features. </a:t>
-            </a:r>
-          </a:p>
-          <a:p>
-            <a:pPr>
-              <a:lnSpc>
-                <a:spcPct val="200000"/>
-              </a:lnSpc>
-            </a:pPr>
-            <a:r>
-              <a:rPr lang="en-US" sz="2800" dirty="0" smtClean="0"/>
-              <a:t>Onsite Access through intranet (LAN).</a:t>
-            </a:r>
-          </a:p>
-          <a:p>
-            <a:pPr>
-              <a:lnSpc>
-                <a:spcPct val="200000"/>
-              </a:lnSpc>
-            </a:pPr>
-            <a:r>
-              <a:rPr lang="en-US" sz="2800" dirty="0" smtClean="0"/>
-              <a:t>SSL Encryption </a:t>
+              <a:t>Encryption </a:t>
+            </a:r>
+            <a:r>
+              <a:rPr lang="en-US" sz="2800" dirty="0"/>
+              <a:t>and description algorithms </a:t>
+            </a:r>
+          </a:p>
+          <a:p>
+            <a:r>
+              <a:rPr lang="en-US" sz="2800" dirty="0"/>
+              <a:t>Secure transmission via </a:t>
+            </a:r>
+            <a:r>
+              <a:rPr lang="en-US" sz="2800" dirty="0" err="1"/>
+              <a:t>openSSL</a:t>
             </a:r>
             <a:endParaRPr lang="en-US" sz="2800" dirty="0"/>
           </a:p>
+          <a:p>
+            <a:r>
+              <a:rPr lang="en-US" sz="2800" dirty="0"/>
+              <a:t>Audit log</a:t>
+            </a:r>
+          </a:p>
+          <a:p>
+            <a:r>
+              <a:rPr lang="en-US" sz="2800" dirty="0"/>
+              <a:t>Automatic log off</a:t>
+            </a:r>
+          </a:p>
         </p:txBody>
       </p:sp>
       <p:sp>
@@ -5763,7 +5909,7 @@
           <a:p>
             <a:fld id="{85816456-AF90-4826-9770-6E0598D9C364}" type="slidenum">
               <a:rPr lang="en-US" smtClean="0"/>
-              <a:t>10</a:t>
+              <a:t>11</a:t>
             </a:fld>
             <a:endParaRPr lang="en-US" dirty="0"/>
           </a:p>
@@ -5819,7 +5965,7 @@
 </p:sld>
 </file>
 
-<file path=ppt/slides/slide11.xml><?xml version="1.0" encoding="utf-8"?>
+<file path=ppt/slides/slide12.xml><?xml version="1.0" encoding="utf-8"?>
 <p:sld xmlns:a="http://schemas.openxmlformats.org/drawingml/2006/main" xmlns:r="http://schemas.openxmlformats.org/officeDocument/2006/relationships" xmlns:p="http://schemas.openxmlformats.org/presentationml/2006/main">
   <p:cSld>
     <p:spTree>
@@ -5977,7 +6123,7 @@
           <a:p>
             <a:fld id="{85816456-AF90-4826-9770-6E0598D9C364}" type="slidenum">
               <a:rPr lang="en-US" smtClean="0"/>
-              <a:t>11</a:t>
+              <a:t>12</a:t>
             </a:fld>
             <a:endParaRPr lang="en-US" dirty="0"/>
           </a:p>
@@ -6003,7 +6149,7 @@
 </p:sld>
 </file>
 
-<file path=ppt/slides/slide12.xml><?xml version="1.0" encoding="utf-8"?>
+<file path=ppt/slides/slide13.xml><?xml version="1.0" encoding="utf-8"?>
 <p:sld xmlns:a="http://schemas.openxmlformats.org/drawingml/2006/main" xmlns:r="http://schemas.openxmlformats.org/officeDocument/2006/relationships" xmlns:p="http://schemas.openxmlformats.org/presentationml/2006/main">
   <p:cSld>
     <p:spTree>
@@ -6147,7 +6293,7 @@
           <a:p>
             <a:fld id="{85816456-AF90-4826-9770-6E0598D9C364}" type="slidenum">
               <a:rPr lang="en-US" smtClean="0"/>
-              <a:t>12</a:t>
+              <a:t>13</a:t>
             </a:fld>
             <a:endParaRPr lang="en-US" dirty="0"/>
           </a:p>
@@ -6345,20 +6491,38 @@
             <p:ph type="title"/>
           </p:nvPr>
         </p:nvSpPr>
-        <p:spPr/>
+        <p:spPr>
+          <a:xfrm>
+            <a:off x="0" y="533401"/>
+            <a:ext cx="8382000" cy="685799"/>
+          </a:xfrm>
+        </p:spPr>
         <p:txBody>
           <a:bodyPr>
             <a:normAutofit fontScale="90000"/>
           </a:bodyPr>
           <a:lstStyle/>
           <a:p>
+            <a:pPr algn="ctr"/>
             <a:r>
               <a:rPr lang="en-US" dirty="0"/>
               <a:t>Background on HIPAA </a:t>
             </a:r>
             <a:r>
+              <a:rPr lang="en-US" dirty="0"/>
+              <a:t>S</a:t>
+            </a:r>
+            <a:r>
               <a:rPr lang="en-US" dirty="0" smtClean="0"/>
-              <a:t>security rules</a:t>
+              <a:t>ecurity </a:t>
+            </a:r>
+            <a:r>
+              <a:rPr lang="en-US" dirty="0"/>
+              <a:t>R</a:t>
+            </a:r>
+            <a:r>
+              <a:rPr lang="en-US" dirty="0" smtClean="0"/>
+              <a:t>ules</a:t>
             </a:r>
             <a:endParaRPr lang="en-US" dirty="0"/>
           </a:p>
@@ -6374,12 +6538,54 @@
             <p:ph idx="1"/>
           </p:nvPr>
         </p:nvSpPr>
-        <p:spPr/>
-        <p:txBody>
-          <a:bodyPr/>
-          <a:lstStyle/>
-          <a:p>
-            <a:endParaRPr lang="en-US"/>
+        <p:spPr>
+          <a:xfrm>
+            <a:off x="914400" y="1676401"/>
+            <a:ext cx="7315200" cy="4632960"/>
+          </a:xfrm>
+        </p:spPr>
+        <p:txBody>
+          <a:bodyPr>
+            <a:normAutofit/>
+          </a:bodyPr>
+          <a:lstStyle/>
+          <a:p>
+            <a:r>
+              <a:rPr lang="en-US" sz="2800" dirty="0"/>
+              <a:t>Access </a:t>
+            </a:r>
+            <a:r>
+              <a:rPr lang="en-US" sz="2800" dirty="0" smtClean="0"/>
+              <a:t>Control</a:t>
+            </a:r>
+          </a:p>
+          <a:p>
+            <a:r>
+              <a:rPr lang="en-US" sz="2800" dirty="0" smtClean="0"/>
+              <a:t>Audit Controls</a:t>
+            </a:r>
+            <a:endParaRPr lang="en-US" sz="2800" dirty="0"/>
+          </a:p>
+          <a:p>
+            <a:r>
+              <a:rPr lang="en-US" sz="2800" dirty="0"/>
+              <a:t>Integrity </a:t>
+            </a:r>
+            <a:r>
+              <a:rPr lang="en-US" sz="2800" dirty="0" smtClean="0"/>
+              <a:t>Controls</a:t>
+            </a:r>
+          </a:p>
+          <a:p>
+            <a:r>
+              <a:rPr lang="en-US" sz="2800" dirty="0" smtClean="0"/>
+              <a:t>Transmission </a:t>
+            </a:r>
+            <a:r>
+              <a:rPr lang="en-US" sz="2800" dirty="0"/>
+              <a:t>Security</a:t>
+            </a:r>
+            <a:endParaRPr lang="en-US" sz="2800" dirty="0"/>
           </a:p>
         </p:txBody>
       </p:sp>
@@ -6416,6 +6622,13 @@
   <p:clrMapOvr>
     <a:masterClrMapping/>
   </p:clrMapOvr>
+  <p:timing>
+    <p:tnLst>
+      <p:par>
+        <p:cTn id="1" dur="indefinite" restart="never" nodeType="tmRoot"/>
+      </p:par>
+    </p:tnLst>
+  </p:timing>
 </p:sld>
 </file>
 
@@ -6461,7 +6674,11 @@
             <a:pPr algn="ctr"/>
             <a:r>
               <a:rPr lang="en-US" dirty="0" smtClean="0"/>
-              <a:t>Electronic Medical Records Management Systems Overview </a:t>
+              <a:t>Electronic </a:t>
+            </a:r>
+            <a:r>
+              <a:rPr lang="en-US" dirty="0" smtClean="0"/>
+              <a:t>Medical Records Management Systems Overview </a:t>
             </a:r>
             <a:endParaRPr lang="en-US" dirty="0"/>
           </a:p>

</xml_diff>